<commit_message>
Updated presentation with three utility function demonstrations.
</commit_message>
<xml_diff>
--- a/Data_science_nashville_jkk.pptx
+++ b/Data_science_nashville_jkk.pptx
@@ -10,18 +10,24 @@
     <p:sldId id="258" r:id="rId4"/>
     <p:sldId id="260" r:id="rId5"/>
     <p:sldId id="259" r:id="rId6"/>
-    <p:sldId id="262" r:id="rId7"/>
-    <p:sldId id="263" r:id="rId8"/>
-    <p:sldId id="264" r:id="rId9"/>
-    <p:sldId id="273" r:id="rId10"/>
+    <p:sldId id="263" r:id="rId7"/>
+    <p:sldId id="264" r:id="rId8"/>
+    <p:sldId id="273" r:id="rId9"/>
+    <p:sldId id="274" r:id="rId10"/>
     <p:sldId id="265" r:id="rId11"/>
     <p:sldId id="269" r:id="rId12"/>
     <p:sldId id="270" r:id="rId13"/>
     <p:sldId id="272" r:id="rId14"/>
     <p:sldId id="271" r:id="rId15"/>
-    <p:sldId id="268" r:id="rId16"/>
-    <p:sldId id="267" r:id="rId17"/>
-    <p:sldId id="266" r:id="rId18"/>
+    <p:sldId id="276" r:id="rId16"/>
+    <p:sldId id="277" r:id="rId17"/>
+    <p:sldId id="278" r:id="rId18"/>
+    <p:sldId id="279" r:id="rId19"/>
+    <p:sldId id="268" r:id="rId20"/>
+    <p:sldId id="267" r:id="rId21"/>
+    <p:sldId id="275" r:id="rId22"/>
+    <p:sldId id="266" r:id="rId23"/>
+    <p:sldId id="280" r:id="rId24"/>
   </p:sldIdLst>
   <p:sldSz cx="9144000" cy="6858000" type="screen4x3"/>
   <p:notesSz cx="6858000" cy="9144000"/>
@@ -263,7 +269,7 @@
           <a:p>
             <a:fld id="{446A68C1-49B4-4B53-A4B5-FD8CED86E0B5}" type="datetimeFigureOut">
               <a:rPr lang="en-US" smtClean="0"/>
-              <a:t>1/16/2018</a:t>
+              <a:t>1/21/2018</a:t>
             </a:fld>
             <a:endParaRPr lang="en-US"/>
           </a:p>
@@ -433,7 +439,7 @@
           <a:p>
             <a:fld id="{446A68C1-49B4-4B53-A4B5-FD8CED86E0B5}" type="datetimeFigureOut">
               <a:rPr lang="en-US" smtClean="0"/>
-              <a:t>1/16/2018</a:t>
+              <a:t>1/21/2018</a:t>
             </a:fld>
             <a:endParaRPr lang="en-US"/>
           </a:p>
@@ -613,7 +619,7 @@
           <a:p>
             <a:fld id="{446A68C1-49B4-4B53-A4B5-FD8CED86E0B5}" type="datetimeFigureOut">
               <a:rPr lang="en-US" smtClean="0"/>
-              <a:t>1/16/2018</a:t>
+              <a:t>1/21/2018</a:t>
             </a:fld>
             <a:endParaRPr lang="en-US"/>
           </a:p>
@@ -783,7 +789,7 @@
           <a:p>
             <a:fld id="{446A68C1-49B4-4B53-A4B5-FD8CED86E0B5}" type="datetimeFigureOut">
               <a:rPr lang="en-US" smtClean="0"/>
-              <a:t>1/16/2018</a:t>
+              <a:t>1/21/2018</a:t>
             </a:fld>
             <a:endParaRPr lang="en-US"/>
           </a:p>
@@ -1027,7 +1033,7 @@
           <a:p>
             <a:fld id="{446A68C1-49B4-4B53-A4B5-FD8CED86E0B5}" type="datetimeFigureOut">
               <a:rPr lang="en-US" smtClean="0"/>
-              <a:t>1/16/2018</a:t>
+              <a:t>1/21/2018</a:t>
             </a:fld>
             <a:endParaRPr lang="en-US"/>
           </a:p>
@@ -1259,7 +1265,7 @@
           <a:p>
             <a:fld id="{446A68C1-49B4-4B53-A4B5-FD8CED86E0B5}" type="datetimeFigureOut">
               <a:rPr lang="en-US" smtClean="0"/>
-              <a:t>1/16/2018</a:t>
+              <a:t>1/21/2018</a:t>
             </a:fld>
             <a:endParaRPr lang="en-US"/>
           </a:p>
@@ -1626,7 +1632,7 @@
           <a:p>
             <a:fld id="{446A68C1-49B4-4B53-A4B5-FD8CED86E0B5}" type="datetimeFigureOut">
               <a:rPr lang="en-US" smtClean="0"/>
-              <a:t>1/16/2018</a:t>
+              <a:t>1/21/2018</a:t>
             </a:fld>
             <a:endParaRPr lang="en-US"/>
           </a:p>
@@ -1744,7 +1750,7 @@
           <a:p>
             <a:fld id="{446A68C1-49B4-4B53-A4B5-FD8CED86E0B5}" type="datetimeFigureOut">
               <a:rPr lang="en-US" smtClean="0"/>
-              <a:t>1/16/2018</a:t>
+              <a:t>1/21/2018</a:t>
             </a:fld>
             <a:endParaRPr lang="en-US"/>
           </a:p>
@@ -1839,7 +1845,7 @@
           <a:p>
             <a:fld id="{446A68C1-49B4-4B53-A4B5-FD8CED86E0B5}" type="datetimeFigureOut">
               <a:rPr lang="en-US" smtClean="0"/>
-              <a:t>1/16/2018</a:t>
+              <a:t>1/21/2018</a:t>
             </a:fld>
             <a:endParaRPr lang="en-US"/>
           </a:p>
@@ -2116,7 +2122,7 @@
           <a:p>
             <a:fld id="{446A68C1-49B4-4B53-A4B5-FD8CED86E0B5}" type="datetimeFigureOut">
               <a:rPr lang="en-US" smtClean="0"/>
-              <a:t>1/16/2018</a:t>
+              <a:t>1/21/2018</a:t>
             </a:fld>
             <a:endParaRPr lang="en-US"/>
           </a:p>
@@ -2373,7 +2379,7 @@
           <a:p>
             <a:fld id="{446A68C1-49B4-4B53-A4B5-FD8CED86E0B5}" type="datetimeFigureOut">
               <a:rPr lang="en-US" smtClean="0"/>
-              <a:t>1/16/2018</a:t>
+              <a:t>1/21/2018</a:t>
             </a:fld>
             <a:endParaRPr lang="en-US"/>
           </a:p>
@@ -2586,7 +2592,7 @@
           <a:p>
             <a:fld id="{446A68C1-49B4-4B53-A4B5-FD8CED86E0B5}" type="datetimeFigureOut">
               <a:rPr lang="en-US" smtClean="0"/>
-              <a:t>1/16/2018</a:t>
+              <a:t>1/21/2018</a:t>
             </a:fld>
             <a:endParaRPr lang="en-US"/>
           </a:p>
@@ -3503,6 +3509,965 @@
           <p:cNvPr id="2" name="Title 1">
             <a:extLst>
               <a:ext uri="{FF2B5EF4-FFF2-40B4-BE49-F238E27FC236}">
+                <a16:creationId xmlns:a16="http://schemas.microsoft.com/office/drawing/2014/main" id="{00EAF0DA-00BB-405D-B4BC-8FE8557BF392}"/>
+              </a:ext>
+            </a:extLst>
+          </p:cNvPr>
+          <p:cNvSpPr>
+            <a:spLocks noGrp="1"/>
+          </p:cNvSpPr>
+          <p:nvPr>
+            <p:ph type="title"/>
+          </p:nvPr>
+        </p:nvSpPr>
+        <p:spPr/>
+        <p:txBody>
+          <a:bodyPr/>
+          <a:lstStyle/>
+          <a:p>
+            <a:r>
+              <a:rPr lang="en-US" dirty="0"/>
+              <a:t>Utility Functions</a:t>
+            </a:r>
+          </a:p>
+        </p:txBody>
+      </p:sp>
+      <mc:AlternateContent xmlns:mc="http://schemas.openxmlformats.org/markup-compatibility/2006">
+        <mc:Choice xmlns:a14="http://schemas.microsoft.com/office/drawing/2010/main" Requires="a14">
+          <p:sp>
+            <p:nvSpPr>
+              <p:cNvPr id="3" name="Content Placeholder 2">
+                <a:extLst>
+                  <a:ext uri="{FF2B5EF4-FFF2-40B4-BE49-F238E27FC236}">
+                    <a16:creationId xmlns:a16="http://schemas.microsoft.com/office/drawing/2014/main" id="{6550F769-B457-4155-A832-58617FDA4CD7}"/>
+                  </a:ext>
+                </a:extLst>
+              </p:cNvPr>
+              <p:cNvSpPr>
+                <a:spLocks noGrp="1"/>
+              </p:cNvSpPr>
+              <p:nvPr>
+                <p:ph idx="1"/>
+              </p:nvPr>
+            </p:nvSpPr>
+            <p:spPr/>
+            <p:txBody>
+              <a:bodyPr>
+                <a:normAutofit/>
+              </a:bodyPr>
+              <a:lstStyle/>
+              <a:p>
+                <a:r>
+                  <a:rPr lang="en-US" dirty="0"/>
+                  <a:t>Upper Confidence Bound (UCB)</a:t>
+                </a:r>
+              </a:p>
+              <a:p>
+                <a:pPr lvl="1"/>
+                <a14:m>
+                  <m:oMath xmlns:m="http://schemas.openxmlformats.org/officeDocument/2006/math">
+                    <m:r>
+                      <a:rPr lang="en-US" i="1">
+                        <a:latin typeface="Cambria Math" panose="02040503050406030204" pitchFamily="18" charset="0"/>
+                      </a:rPr>
+                      <m:t>𝑈𝐶𝐵</m:t>
+                    </m:r>
+                    <m:d>
+                      <m:dPr>
+                        <m:ctrlPr>
+                          <a:rPr lang="en-US" i="1">
+                            <a:latin typeface="Cambria Math" panose="02040503050406030204" pitchFamily="18" charset="0"/>
+                          </a:rPr>
+                        </m:ctrlPr>
+                      </m:dPr>
+                      <m:e>
+                        <m:r>
+                          <a:rPr lang="en-US" b="1" i="1">
+                            <a:latin typeface="Cambria Math" panose="02040503050406030204" pitchFamily="18" charset="0"/>
+                          </a:rPr>
+                          <m:t>𝒙</m:t>
+                        </m:r>
+                      </m:e>
+                    </m:d>
+                    <m:r>
+                      <a:rPr lang="en-US" i="1">
+                        <a:latin typeface="Cambria Math" panose="02040503050406030204" pitchFamily="18" charset="0"/>
+                      </a:rPr>
+                      <m:t>=</m:t>
+                    </m:r>
+                    <m:r>
+                      <a:rPr lang="en-US" i="1">
+                        <a:latin typeface="Cambria Math" panose="02040503050406030204" pitchFamily="18" charset="0"/>
+                        <a:ea typeface="Cambria Math" panose="02040503050406030204" pitchFamily="18" charset="0"/>
+                      </a:rPr>
+                      <m:t>𝜇</m:t>
+                    </m:r>
+                    <m:d>
+                      <m:dPr>
+                        <m:ctrlPr>
+                          <a:rPr lang="en-US" i="1">
+                            <a:latin typeface="Cambria Math" panose="02040503050406030204" pitchFamily="18" charset="0"/>
+                            <a:ea typeface="Cambria Math" panose="02040503050406030204" pitchFamily="18" charset="0"/>
+                          </a:rPr>
+                        </m:ctrlPr>
+                      </m:dPr>
+                      <m:e>
+                        <m:r>
+                          <a:rPr lang="en-US" b="1" i="1">
+                            <a:latin typeface="Cambria Math" panose="02040503050406030204" pitchFamily="18" charset="0"/>
+                            <a:ea typeface="Cambria Math" panose="02040503050406030204" pitchFamily="18" charset="0"/>
+                          </a:rPr>
+                          <m:t>𝒙</m:t>
+                        </m:r>
+                      </m:e>
+                    </m:d>
+                    <m:r>
+                      <a:rPr lang="en-US" i="1">
+                        <a:latin typeface="Cambria Math" panose="02040503050406030204" pitchFamily="18" charset="0"/>
+                        <a:ea typeface="Cambria Math" panose="02040503050406030204" pitchFamily="18" charset="0"/>
+                      </a:rPr>
+                      <m:t>+</m:t>
+                    </m:r>
+                    <m:r>
+                      <a:rPr lang="el-GR" i="1">
+                        <a:latin typeface="Cambria Math" panose="02040503050406030204" pitchFamily="18" charset="0"/>
+                        <a:ea typeface="Cambria Math" panose="02040503050406030204" pitchFamily="18" charset="0"/>
+                      </a:rPr>
+                      <m:t>𝜅</m:t>
+                    </m:r>
+                    <m:r>
+                      <a:rPr lang="el-GR" i="1">
+                        <a:latin typeface="Cambria Math" panose="02040503050406030204" pitchFamily="18" charset="0"/>
+                        <a:ea typeface="Cambria Math" panose="02040503050406030204" pitchFamily="18" charset="0"/>
+                      </a:rPr>
+                      <m:t>𝜎</m:t>
+                    </m:r>
+                    <m:d>
+                      <m:dPr>
+                        <m:ctrlPr>
+                          <a:rPr lang="el-GR" i="1">
+                            <a:latin typeface="Cambria Math" panose="02040503050406030204" pitchFamily="18" charset="0"/>
+                            <a:ea typeface="Cambria Math" panose="02040503050406030204" pitchFamily="18" charset="0"/>
+                          </a:rPr>
+                        </m:ctrlPr>
+                      </m:dPr>
+                      <m:e>
+                        <m:r>
+                          <a:rPr lang="en-US" b="1" i="1">
+                            <a:latin typeface="Cambria Math" panose="02040503050406030204" pitchFamily="18" charset="0"/>
+                            <a:ea typeface="Cambria Math" panose="02040503050406030204" pitchFamily="18" charset="0"/>
+                          </a:rPr>
+                          <m:t>𝒙</m:t>
+                        </m:r>
+                      </m:e>
+                    </m:d>
+                  </m:oMath>
+                </a14:m>
+                <a:endParaRPr lang="en-US" dirty="0"/>
+              </a:p>
+              <a:p>
+                <a:r>
+                  <a:rPr lang="en-US" dirty="0"/>
+                  <a:t>Probability of Improvement (PI)</a:t>
+                </a:r>
+              </a:p>
+              <a:p>
+                <a:pPr lvl="1"/>
+                <a14:m>
+                  <m:oMath xmlns:m="http://schemas.openxmlformats.org/officeDocument/2006/math">
+                    <m:r>
+                      <a:rPr lang="en-US" b="0" i="1" smtClean="0">
+                        <a:latin typeface="Cambria Math" panose="02040503050406030204" pitchFamily="18" charset="0"/>
+                      </a:rPr>
+                      <m:t>𝑃𝐼</m:t>
+                    </m:r>
+                    <m:d>
+                      <m:dPr>
+                        <m:ctrlPr>
+                          <a:rPr lang="en-US" b="0" i="1" smtClean="0">
+                            <a:latin typeface="Cambria Math" panose="02040503050406030204" pitchFamily="18" charset="0"/>
+                          </a:rPr>
+                        </m:ctrlPr>
+                      </m:dPr>
+                      <m:e>
+                        <m:r>
+                          <a:rPr lang="en-US" b="1" i="1" smtClean="0">
+                            <a:latin typeface="Cambria Math" panose="02040503050406030204" pitchFamily="18" charset="0"/>
+                          </a:rPr>
+                          <m:t>𝒙</m:t>
+                        </m:r>
+                      </m:e>
+                    </m:d>
+                    <m:r>
+                      <a:rPr lang="en-US" b="0" i="1" smtClean="0">
+                        <a:latin typeface="Cambria Math" panose="02040503050406030204" pitchFamily="18" charset="0"/>
+                      </a:rPr>
+                      <m:t>=</m:t>
+                    </m:r>
+                    <m:r>
+                      <a:rPr lang="en-US" b="0" i="1" smtClean="0">
+                        <a:latin typeface="Cambria Math" panose="02040503050406030204" pitchFamily="18" charset="0"/>
+                      </a:rPr>
+                      <m:t>𝑃</m:t>
+                    </m:r>
+                    <m:d>
+                      <m:dPr>
+                        <m:ctrlPr>
+                          <a:rPr lang="en-US" b="0" i="1" smtClean="0">
+                            <a:latin typeface="Cambria Math" panose="02040503050406030204" pitchFamily="18" charset="0"/>
+                          </a:rPr>
+                        </m:ctrlPr>
+                      </m:dPr>
+                      <m:e>
+                        <m:r>
+                          <a:rPr lang="en-US" b="0" i="1" smtClean="0">
+                            <a:latin typeface="Cambria Math" panose="02040503050406030204" pitchFamily="18" charset="0"/>
+                          </a:rPr>
+                          <m:t>𝑓</m:t>
+                        </m:r>
+                        <m:d>
+                          <m:dPr>
+                            <m:ctrlPr>
+                              <a:rPr lang="en-US" b="0" i="1" smtClean="0">
+                                <a:latin typeface="Cambria Math" panose="02040503050406030204" pitchFamily="18" charset="0"/>
+                              </a:rPr>
+                            </m:ctrlPr>
+                          </m:dPr>
+                          <m:e>
+                            <m:r>
+                              <a:rPr lang="en-US" b="1" i="1" smtClean="0">
+                                <a:latin typeface="Cambria Math" panose="02040503050406030204" pitchFamily="18" charset="0"/>
+                              </a:rPr>
+                              <m:t>𝒙</m:t>
+                            </m:r>
+                          </m:e>
+                        </m:d>
+                        <m:r>
+                          <a:rPr lang="en-US" b="0" i="1" smtClean="0">
+                            <a:latin typeface="Cambria Math" panose="02040503050406030204" pitchFamily="18" charset="0"/>
+                          </a:rPr>
+                          <m:t>&gt;</m:t>
+                        </m:r>
+                        <m:r>
+                          <a:rPr lang="en-US" b="0" i="1" smtClean="0">
+                            <a:latin typeface="Cambria Math" panose="02040503050406030204" pitchFamily="18" charset="0"/>
+                          </a:rPr>
+                          <m:t>𝑓</m:t>
+                        </m:r>
+                        <m:d>
+                          <m:dPr>
+                            <m:ctrlPr>
+                              <a:rPr lang="en-US" b="0" i="1" smtClean="0">
+                                <a:latin typeface="Cambria Math" panose="02040503050406030204" pitchFamily="18" charset="0"/>
+                              </a:rPr>
+                            </m:ctrlPr>
+                          </m:dPr>
+                          <m:e>
+                            <m:sSup>
+                              <m:sSupPr>
+                                <m:ctrlPr>
+                                  <a:rPr lang="en-US" b="0" i="1" smtClean="0">
+                                    <a:latin typeface="Cambria Math" panose="02040503050406030204" pitchFamily="18" charset="0"/>
+                                  </a:rPr>
+                                </m:ctrlPr>
+                              </m:sSupPr>
+                              <m:e>
+                                <m:r>
+                                  <a:rPr lang="en-US" b="1" i="1" smtClean="0">
+                                    <a:latin typeface="Cambria Math" panose="02040503050406030204" pitchFamily="18" charset="0"/>
+                                  </a:rPr>
+                                  <m:t>𝒙</m:t>
+                                </m:r>
+                              </m:e>
+                              <m:sup>
+                                <m:r>
+                                  <a:rPr lang="en-US" b="0" i="1" smtClean="0">
+                                    <a:latin typeface="Cambria Math" panose="02040503050406030204" pitchFamily="18" charset="0"/>
+                                  </a:rPr>
+                                  <m:t>+</m:t>
+                                </m:r>
+                              </m:sup>
+                            </m:sSup>
+                          </m:e>
+                        </m:d>
+                        <m:r>
+                          <a:rPr lang="en-US" b="0" i="1" smtClean="0">
+                            <a:latin typeface="Cambria Math" panose="02040503050406030204" pitchFamily="18" charset="0"/>
+                          </a:rPr>
+                          <m:t>+</m:t>
+                        </m:r>
+                        <m:r>
+                          <a:rPr lang="el-GR" i="1">
+                            <a:latin typeface="Cambria Math" panose="02040503050406030204" pitchFamily="18" charset="0"/>
+                          </a:rPr>
+                          <m:t>𝜉</m:t>
+                        </m:r>
+                        <m:r>
+                          <a:rPr lang="en-US" b="0" i="1" smtClean="0">
+                            <a:latin typeface="Cambria Math" panose="02040503050406030204" pitchFamily="18" charset="0"/>
+                          </a:rPr>
+                          <m:t>|</m:t>
+                        </m:r>
+                        <m:sSub>
+                          <m:sSubPr>
+                            <m:ctrlPr>
+                              <a:rPr lang="el-GR" i="1" smtClean="0">
+                                <a:latin typeface="Cambria Math" panose="02040503050406030204" pitchFamily="18" charset="0"/>
+                              </a:rPr>
+                            </m:ctrlPr>
+                          </m:sSubPr>
+                          <m:e>
+                            <m:r>
+                              <a:rPr lang="en-US" b="0" i="1" smtClean="0">
+                                <a:latin typeface="Cambria Math" panose="02040503050406030204" pitchFamily="18" charset="0"/>
+                              </a:rPr>
+                              <m:t>𝐷</m:t>
+                            </m:r>
+                          </m:e>
+                          <m:sub>
+                            <m:r>
+                              <a:rPr lang="en-US" b="0" i="1" smtClean="0">
+                                <a:latin typeface="Cambria Math" panose="02040503050406030204" pitchFamily="18" charset="0"/>
+                              </a:rPr>
+                              <m:t>1:</m:t>
+                            </m:r>
+                            <m:r>
+                              <a:rPr lang="en-US" b="0" i="1" smtClean="0">
+                                <a:latin typeface="Cambria Math" panose="02040503050406030204" pitchFamily="18" charset="0"/>
+                              </a:rPr>
+                              <m:t>𝑡</m:t>
+                            </m:r>
+                          </m:sub>
+                        </m:sSub>
+                      </m:e>
+                    </m:d>
+                  </m:oMath>
+                </a14:m>
+                <a:endParaRPr lang="en-US" dirty="0"/>
+              </a:p>
+              <a:p>
+                <a:pPr lvl="1"/>
+                <a14:m>
+                  <m:oMath xmlns:m="http://schemas.openxmlformats.org/officeDocument/2006/math">
+                    <m:r>
+                      <a:rPr lang="en-US" i="1">
+                        <a:latin typeface="Cambria Math" panose="02040503050406030204" pitchFamily="18" charset="0"/>
+                      </a:rPr>
+                      <m:t>𝑓</m:t>
+                    </m:r>
+                    <m:d>
+                      <m:dPr>
+                        <m:ctrlPr>
+                          <a:rPr lang="en-US" i="1">
+                            <a:latin typeface="Cambria Math" panose="02040503050406030204" pitchFamily="18" charset="0"/>
+                          </a:rPr>
+                        </m:ctrlPr>
+                      </m:dPr>
+                      <m:e>
+                        <m:sSup>
+                          <m:sSupPr>
+                            <m:ctrlPr>
+                              <a:rPr lang="en-US" i="1">
+                                <a:latin typeface="Cambria Math" panose="02040503050406030204" pitchFamily="18" charset="0"/>
+                              </a:rPr>
+                            </m:ctrlPr>
+                          </m:sSupPr>
+                          <m:e>
+                            <m:r>
+                              <a:rPr lang="en-US" b="1" i="1">
+                                <a:latin typeface="Cambria Math" panose="02040503050406030204" pitchFamily="18" charset="0"/>
+                              </a:rPr>
+                              <m:t>𝒙</m:t>
+                            </m:r>
+                          </m:e>
+                          <m:sup>
+                            <m:r>
+                              <a:rPr lang="en-US" i="1">
+                                <a:latin typeface="Cambria Math" panose="02040503050406030204" pitchFamily="18" charset="0"/>
+                              </a:rPr>
+                              <m:t>+</m:t>
+                            </m:r>
+                          </m:sup>
+                        </m:sSup>
+                      </m:e>
+                    </m:d>
+                    <m:r>
+                      <a:rPr lang="en-US" i="1">
+                        <a:latin typeface="Cambria Math" panose="02040503050406030204" pitchFamily="18" charset="0"/>
+                      </a:rPr>
+                      <m:t> </m:t>
+                    </m:r>
+                  </m:oMath>
+                </a14:m>
+                <a:r>
+                  <a:rPr lang="en-US" dirty="0"/>
+                  <a:t>is the current max</a:t>
+                </a:r>
+              </a:p>
+              <a:p>
+                <a:r>
+                  <a:rPr lang="en-US" dirty="0"/>
+                  <a:t>Expected Improvement (EI)</a:t>
+                </a:r>
+              </a:p>
+              <a:p>
+                <a:pPr lvl="1"/>
+                <a14:m>
+                  <m:oMath xmlns:m="http://schemas.openxmlformats.org/officeDocument/2006/math">
+                    <m:r>
+                      <a:rPr lang="en-US" b="0" i="1" smtClean="0">
+                        <a:latin typeface="Cambria Math" panose="02040503050406030204" pitchFamily="18" charset="0"/>
+                      </a:rPr>
+                      <m:t>𝐸𝐼</m:t>
+                    </m:r>
+                    <m:d>
+                      <m:dPr>
+                        <m:ctrlPr>
+                          <a:rPr lang="en-US" b="0" i="1" smtClean="0">
+                            <a:latin typeface="Cambria Math" panose="02040503050406030204" pitchFamily="18" charset="0"/>
+                          </a:rPr>
+                        </m:ctrlPr>
+                      </m:dPr>
+                      <m:e>
+                        <m:r>
+                          <a:rPr lang="en-US" b="0" i="1" smtClean="0">
+                            <a:latin typeface="Cambria Math" panose="02040503050406030204" pitchFamily="18" charset="0"/>
+                          </a:rPr>
+                          <m:t>𝑥</m:t>
+                        </m:r>
+                      </m:e>
+                    </m:d>
+                    <m:r>
+                      <a:rPr lang="en-US" b="0" i="1" smtClean="0">
+                        <a:latin typeface="Cambria Math" panose="02040503050406030204" pitchFamily="18" charset="0"/>
+                      </a:rPr>
+                      <m:t>=</m:t>
+                    </m:r>
+                    <m:r>
+                      <a:rPr lang="en-US" b="0" i="1" smtClean="0">
+                        <a:latin typeface="Cambria Math" panose="02040503050406030204" pitchFamily="18" charset="0"/>
+                      </a:rPr>
+                      <m:t>𝐸</m:t>
+                    </m:r>
+                    <m:d>
+                      <m:dPr>
+                        <m:begChr m:val="["/>
+                        <m:endChr m:val="]"/>
+                        <m:ctrlPr>
+                          <a:rPr lang="en-US" b="0" i="1" smtClean="0">
+                            <a:latin typeface="Cambria Math" panose="02040503050406030204" pitchFamily="18" charset="0"/>
+                          </a:rPr>
+                        </m:ctrlPr>
+                      </m:dPr>
+                      <m:e>
+                        <m:r>
+                          <a:rPr lang="en-US" b="0" i="1" smtClean="0">
+                            <a:latin typeface="Cambria Math" panose="02040503050406030204" pitchFamily="18" charset="0"/>
+                          </a:rPr>
+                          <m:t>𝑚𝑎𝑥</m:t>
+                        </m:r>
+                        <m:d>
+                          <m:dPr>
+                            <m:begChr m:val="{"/>
+                            <m:endChr m:val="}"/>
+                            <m:ctrlPr>
+                              <a:rPr lang="en-US" b="0" i="1" smtClean="0">
+                                <a:latin typeface="Cambria Math" panose="02040503050406030204" pitchFamily="18" charset="0"/>
+                              </a:rPr>
+                            </m:ctrlPr>
+                          </m:dPr>
+                          <m:e>
+                            <m:r>
+                              <a:rPr lang="en-US" b="0" i="1" smtClean="0">
+                                <a:latin typeface="Cambria Math" panose="02040503050406030204" pitchFamily="18" charset="0"/>
+                              </a:rPr>
+                              <m:t>0,</m:t>
+                            </m:r>
+                            <m:r>
+                              <a:rPr lang="en-US" b="0" i="1" smtClean="0">
+                                <a:latin typeface="Cambria Math" panose="02040503050406030204" pitchFamily="18" charset="0"/>
+                              </a:rPr>
+                              <m:t>𝑓</m:t>
+                            </m:r>
+                            <m:d>
+                              <m:dPr>
+                                <m:ctrlPr>
+                                  <a:rPr lang="en-US" b="0" i="1" smtClean="0">
+                                    <a:latin typeface="Cambria Math" panose="02040503050406030204" pitchFamily="18" charset="0"/>
+                                  </a:rPr>
+                                </m:ctrlPr>
+                              </m:dPr>
+                              <m:e>
+                                <m:r>
+                                  <a:rPr lang="en-US" b="0" i="1" smtClean="0">
+                                    <a:latin typeface="Cambria Math" panose="02040503050406030204" pitchFamily="18" charset="0"/>
+                                  </a:rPr>
+                                  <m:t>𝑥</m:t>
+                                </m:r>
+                              </m:e>
+                            </m:d>
+                            <m:r>
+                              <a:rPr lang="en-US" b="0" i="1" smtClean="0">
+                                <a:latin typeface="Cambria Math" panose="02040503050406030204" pitchFamily="18" charset="0"/>
+                              </a:rPr>
+                              <m:t>−</m:t>
+                            </m:r>
+                            <m:r>
+                              <a:rPr lang="en-US" b="0" i="1" smtClean="0">
+                                <a:latin typeface="Cambria Math" panose="02040503050406030204" pitchFamily="18" charset="0"/>
+                              </a:rPr>
+                              <m:t>𝑓</m:t>
+                            </m:r>
+                            <m:d>
+                              <m:dPr>
+                                <m:ctrlPr>
+                                  <a:rPr lang="en-US" b="0" i="1" smtClean="0">
+                                    <a:latin typeface="Cambria Math" panose="02040503050406030204" pitchFamily="18" charset="0"/>
+                                  </a:rPr>
+                                </m:ctrlPr>
+                              </m:dPr>
+                              <m:e>
+                                <m:sSup>
+                                  <m:sSupPr>
+                                    <m:ctrlPr>
+                                      <a:rPr lang="en-US" b="0" i="1" smtClean="0">
+                                        <a:latin typeface="Cambria Math" panose="02040503050406030204" pitchFamily="18" charset="0"/>
+                                      </a:rPr>
+                                    </m:ctrlPr>
+                                  </m:sSupPr>
+                                  <m:e>
+                                    <m:r>
+                                      <a:rPr lang="en-US" b="0" i="1" smtClean="0">
+                                        <a:latin typeface="Cambria Math" panose="02040503050406030204" pitchFamily="18" charset="0"/>
+                                      </a:rPr>
+                                      <m:t>𝑥</m:t>
+                                    </m:r>
+                                  </m:e>
+                                  <m:sup>
+                                    <m:r>
+                                      <a:rPr lang="en-US" b="0" i="1" smtClean="0">
+                                        <a:latin typeface="Cambria Math" panose="02040503050406030204" pitchFamily="18" charset="0"/>
+                                      </a:rPr>
+                                      <m:t>+</m:t>
+                                    </m:r>
+                                  </m:sup>
+                                </m:sSup>
+                              </m:e>
+                            </m:d>
+                            <m:r>
+                              <a:rPr lang="en-US" b="0" i="1" smtClean="0">
+                                <a:latin typeface="Cambria Math" panose="02040503050406030204" pitchFamily="18" charset="0"/>
+                              </a:rPr>
+                              <m:t>−</m:t>
+                            </m:r>
+                            <m:r>
+                              <a:rPr lang="el-GR" i="1">
+                                <a:latin typeface="Cambria Math" panose="02040503050406030204" pitchFamily="18" charset="0"/>
+                              </a:rPr>
+                              <m:t>𝜉</m:t>
+                            </m:r>
+                            <m:sSub>
+                              <m:sSubPr>
+                                <m:ctrlPr>
+                                  <a:rPr lang="el-GR" i="1">
+                                    <a:latin typeface="Cambria Math" panose="02040503050406030204" pitchFamily="18" charset="0"/>
+                                  </a:rPr>
+                                </m:ctrlPr>
+                              </m:sSubPr>
+                              <m:e>
+                                <m:r>
+                                  <a:rPr lang="en-US" b="0" i="1" smtClean="0">
+                                    <a:latin typeface="Cambria Math" panose="02040503050406030204" pitchFamily="18" charset="0"/>
+                                  </a:rPr>
+                                  <m:t>|</m:t>
+                                </m:r>
+                                <m:r>
+                                  <a:rPr lang="en-US" i="1">
+                                    <a:latin typeface="Cambria Math" panose="02040503050406030204" pitchFamily="18" charset="0"/>
+                                  </a:rPr>
+                                  <m:t>𝐷</m:t>
+                                </m:r>
+                              </m:e>
+                              <m:sub>
+                                <m:r>
+                                  <a:rPr lang="en-US" i="1">
+                                    <a:latin typeface="Cambria Math" panose="02040503050406030204" pitchFamily="18" charset="0"/>
+                                  </a:rPr>
+                                  <m:t>1:</m:t>
+                                </m:r>
+                                <m:r>
+                                  <a:rPr lang="en-US" i="1">
+                                    <a:latin typeface="Cambria Math" panose="02040503050406030204" pitchFamily="18" charset="0"/>
+                                  </a:rPr>
+                                  <m:t>𝑡</m:t>
+                                </m:r>
+                              </m:sub>
+                            </m:sSub>
+                          </m:e>
+                        </m:d>
+                      </m:e>
+                    </m:d>
+                  </m:oMath>
+                </a14:m>
+                <a:endParaRPr lang="en-US" dirty="0"/>
+              </a:p>
+            </p:txBody>
+          </p:sp>
+        </mc:Choice>
+        <mc:Fallback>
+          <p:sp>
+            <p:nvSpPr>
+              <p:cNvPr id="3" name="Content Placeholder 2">
+                <a:extLst>
+                  <a:ext uri="{FF2B5EF4-FFF2-40B4-BE49-F238E27FC236}">
+                    <a16:creationId xmlns:a16="http://schemas.microsoft.com/office/drawing/2014/main" id="{6550F769-B457-4155-A832-58617FDA4CD7}"/>
+                  </a:ext>
+                </a:extLst>
+              </p:cNvPr>
+              <p:cNvSpPr>
+                <a:spLocks noGrp="1" noRot="1" noChangeAspect="1" noMove="1" noResize="1" noEditPoints="1" noAdjustHandles="1" noChangeArrowheads="1" noChangeShapeType="1" noTextEdit="1"/>
+              </p:cNvSpPr>
+              <p:nvPr>
+                <p:ph idx="1"/>
+              </p:nvPr>
+            </p:nvSpPr>
+            <p:spPr>
+              <a:blipFill>
+                <a:blip r:embed="rId2"/>
+                <a:stretch>
+                  <a:fillRect l="-1391" t="-2241"/>
+                </a:stretch>
+              </a:blipFill>
+            </p:spPr>
+            <p:txBody>
+              <a:bodyPr/>
+              <a:lstStyle/>
+              <a:p>
+                <a:r>
+                  <a:rPr lang="en-US">
+                    <a:noFill/>
+                  </a:rPr>
+                  <a:t> </a:t>
+                </a:r>
+              </a:p>
+            </p:txBody>
+          </p:sp>
+        </mc:Fallback>
+      </mc:AlternateContent>
+    </p:spTree>
+    <p:extLst>
+      <p:ext uri="{BB962C8B-B14F-4D97-AF65-F5344CB8AC3E}">
+        <p14:creationId xmlns:p14="http://schemas.microsoft.com/office/powerpoint/2010/main" val="3736318972"/>
+      </p:ext>
+    </p:extLst>
+  </p:cSld>
+  <p:clrMapOvr>
+    <a:masterClrMapping/>
+  </p:clrMapOvr>
+</p:sld>
+</file>
+
+<file path=ppt/slides/slide16.xml><?xml version="1.0" encoding="utf-8"?>
+<p:sld xmlns:a="http://schemas.openxmlformats.org/drawingml/2006/main" xmlns:r="http://schemas.openxmlformats.org/officeDocument/2006/relationships" xmlns:p="http://schemas.openxmlformats.org/presentationml/2006/main">
+  <p:cSld>
+    <p:spTree>
+      <p:nvGrpSpPr>
+        <p:cNvPr id="1" name=""/>
+        <p:cNvGrpSpPr/>
+        <p:nvPr/>
+      </p:nvGrpSpPr>
+      <p:grpSpPr>
+        <a:xfrm>
+          <a:off x="0" y="0"/>
+          <a:ext cx="0" cy="0"/>
+          <a:chOff x="0" y="0"/>
+          <a:chExt cx="0" cy="0"/>
+        </a:xfrm>
+      </p:grpSpPr>
+      <p:sp>
+        <p:nvSpPr>
+          <p:cNvPr id="2" name="Title 1">
+            <a:extLst>
+              <a:ext uri="{FF2B5EF4-FFF2-40B4-BE49-F238E27FC236}">
+                <a16:creationId xmlns:a16="http://schemas.microsoft.com/office/drawing/2014/main" id="{E425E6F5-5447-4F3A-B5B4-0F669676A794}"/>
+              </a:ext>
+            </a:extLst>
+          </p:cNvPr>
+          <p:cNvSpPr>
+            <a:spLocks noGrp="1"/>
+          </p:cNvSpPr>
+          <p:nvPr>
+            <p:ph type="title"/>
+          </p:nvPr>
+        </p:nvSpPr>
+        <p:spPr/>
+        <p:txBody>
+          <a:bodyPr/>
+          <a:lstStyle/>
+          <a:p>
+            <a:r>
+              <a:rPr lang="en-US" dirty="0"/>
+              <a:t>Utility Functions</a:t>
+            </a:r>
+          </a:p>
+        </p:txBody>
+      </p:sp>
+      <p:pic>
+        <p:nvPicPr>
+          <p:cNvPr id="7" name="Content Placeholder 6">
+            <a:extLst>
+              <a:ext uri="{FF2B5EF4-FFF2-40B4-BE49-F238E27FC236}">
+                <a16:creationId xmlns:a16="http://schemas.microsoft.com/office/drawing/2014/main" id="{F4680150-0DC8-4F84-9E73-65FBD5E45FA2}"/>
+              </a:ext>
+            </a:extLst>
+          </p:cNvPr>
+          <p:cNvPicPr>
+            <a:picLocks noGrp="1" noChangeAspect="1"/>
+          </p:cNvPicPr>
+          <p:nvPr>
+            <p:ph idx="1"/>
+          </p:nvPr>
+        </p:nvPicPr>
+        <p:blipFill>
+          <a:blip r:embed="rId2">
+            <a:extLst>
+              <a:ext uri="{28A0092B-C50C-407E-A947-70E740481C1C}">
+                <a14:useLocalDpi xmlns:a14="http://schemas.microsoft.com/office/drawing/2010/main" val="0"/>
+              </a:ext>
+            </a:extLst>
+          </a:blip>
+          <a:stretch>
+            <a:fillRect/>
+          </a:stretch>
+        </p:blipFill>
+        <p:spPr>
+          <a:xfrm>
+            <a:off x="2368890" y="1825625"/>
+            <a:ext cx="4406219" cy="4351338"/>
+          </a:xfrm>
+        </p:spPr>
+      </p:pic>
+    </p:spTree>
+    <p:extLst>
+      <p:ext uri="{BB962C8B-B14F-4D97-AF65-F5344CB8AC3E}">
+        <p14:creationId xmlns:p14="http://schemas.microsoft.com/office/powerpoint/2010/main" val="4119882280"/>
+      </p:ext>
+    </p:extLst>
+  </p:cSld>
+  <p:clrMapOvr>
+    <a:masterClrMapping/>
+  </p:clrMapOvr>
+</p:sld>
+</file>
+
+<file path=ppt/slides/slide17.xml><?xml version="1.0" encoding="utf-8"?>
+<p:sld xmlns:a="http://schemas.openxmlformats.org/drawingml/2006/main" xmlns:r="http://schemas.openxmlformats.org/officeDocument/2006/relationships" xmlns:p="http://schemas.openxmlformats.org/presentationml/2006/main">
+  <p:cSld>
+    <p:spTree>
+      <p:nvGrpSpPr>
+        <p:cNvPr id="1" name=""/>
+        <p:cNvGrpSpPr/>
+        <p:nvPr/>
+      </p:nvGrpSpPr>
+      <p:grpSpPr>
+        <a:xfrm>
+          <a:off x="0" y="0"/>
+          <a:ext cx="0" cy="0"/>
+          <a:chOff x="0" y="0"/>
+          <a:chExt cx="0" cy="0"/>
+        </a:xfrm>
+      </p:grpSpPr>
+      <p:sp>
+        <p:nvSpPr>
+          <p:cNvPr id="2" name="Title 1">
+            <a:extLst>
+              <a:ext uri="{FF2B5EF4-FFF2-40B4-BE49-F238E27FC236}">
+                <a16:creationId xmlns:a16="http://schemas.microsoft.com/office/drawing/2014/main" id="{E425E6F5-5447-4F3A-B5B4-0F669676A794}"/>
+              </a:ext>
+            </a:extLst>
+          </p:cNvPr>
+          <p:cNvSpPr>
+            <a:spLocks noGrp="1"/>
+          </p:cNvSpPr>
+          <p:nvPr>
+            <p:ph type="title"/>
+          </p:nvPr>
+        </p:nvSpPr>
+        <p:spPr/>
+        <p:txBody>
+          <a:bodyPr/>
+          <a:lstStyle/>
+          <a:p>
+            <a:r>
+              <a:rPr lang="en-US" dirty="0"/>
+              <a:t>Utility Functions</a:t>
+            </a:r>
+          </a:p>
+        </p:txBody>
+      </p:sp>
+      <p:pic>
+        <p:nvPicPr>
+          <p:cNvPr id="7" name="Content Placeholder 6">
+            <a:extLst>
+              <a:ext uri="{FF2B5EF4-FFF2-40B4-BE49-F238E27FC236}">
+                <a16:creationId xmlns:a16="http://schemas.microsoft.com/office/drawing/2014/main" id="{F4680150-0DC8-4F84-9E73-65FBD5E45FA2}"/>
+              </a:ext>
+            </a:extLst>
+          </p:cNvPr>
+          <p:cNvPicPr>
+            <a:picLocks noGrp="1" noChangeAspect="1"/>
+          </p:cNvPicPr>
+          <p:nvPr>
+            <p:ph idx="1"/>
+          </p:nvPr>
+        </p:nvPicPr>
+        <p:blipFill>
+          <a:blip r:embed="rId2">
+            <a:extLst>
+              <a:ext uri="{28A0092B-C50C-407E-A947-70E740481C1C}">
+                <a14:useLocalDpi xmlns:a14="http://schemas.microsoft.com/office/drawing/2010/main" val="0"/>
+              </a:ext>
+            </a:extLst>
+          </a:blip>
+          <a:stretch>
+            <a:fillRect/>
+          </a:stretch>
+        </p:blipFill>
+        <p:spPr>
+          <a:xfrm>
+            <a:off x="2368890" y="1829490"/>
+            <a:ext cx="4406219" cy="4343608"/>
+          </a:xfrm>
+        </p:spPr>
+      </p:pic>
+    </p:spTree>
+    <p:extLst>
+      <p:ext uri="{BB962C8B-B14F-4D97-AF65-F5344CB8AC3E}">
+        <p14:creationId xmlns:p14="http://schemas.microsoft.com/office/powerpoint/2010/main" val="1933316888"/>
+      </p:ext>
+    </p:extLst>
+  </p:cSld>
+  <p:clrMapOvr>
+    <a:masterClrMapping/>
+  </p:clrMapOvr>
+</p:sld>
+</file>
+
+<file path=ppt/slides/slide18.xml><?xml version="1.0" encoding="utf-8"?>
+<p:sld xmlns:a="http://schemas.openxmlformats.org/drawingml/2006/main" xmlns:r="http://schemas.openxmlformats.org/officeDocument/2006/relationships" xmlns:p="http://schemas.openxmlformats.org/presentationml/2006/main">
+  <p:cSld>
+    <p:spTree>
+      <p:nvGrpSpPr>
+        <p:cNvPr id="1" name=""/>
+        <p:cNvGrpSpPr/>
+        <p:nvPr/>
+      </p:nvGrpSpPr>
+      <p:grpSpPr>
+        <a:xfrm>
+          <a:off x="0" y="0"/>
+          <a:ext cx="0" cy="0"/>
+          <a:chOff x="0" y="0"/>
+          <a:chExt cx="0" cy="0"/>
+        </a:xfrm>
+      </p:grpSpPr>
+      <p:sp>
+        <p:nvSpPr>
+          <p:cNvPr id="2" name="Title 1">
+            <a:extLst>
+              <a:ext uri="{FF2B5EF4-FFF2-40B4-BE49-F238E27FC236}">
+                <a16:creationId xmlns:a16="http://schemas.microsoft.com/office/drawing/2014/main" id="{E425E6F5-5447-4F3A-B5B4-0F669676A794}"/>
+              </a:ext>
+            </a:extLst>
+          </p:cNvPr>
+          <p:cNvSpPr>
+            <a:spLocks noGrp="1"/>
+          </p:cNvSpPr>
+          <p:nvPr>
+            <p:ph type="title"/>
+          </p:nvPr>
+        </p:nvSpPr>
+        <p:spPr/>
+        <p:txBody>
+          <a:bodyPr/>
+          <a:lstStyle/>
+          <a:p>
+            <a:r>
+              <a:rPr lang="en-US" dirty="0"/>
+              <a:t>Utility Functions</a:t>
+            </a:r>
+          </a:p>
+        </p:txBody>
+      </p:sp>
+      <p:pic>
+        <p:nvPicPr>
+          <p:cNvPr id="7" name="Content Placeholder 6">
+            <a:extLst>
+              <a:ext uri="{FF2B5EF4-FFF2-40B4-BE49-F238E27FC236}">
+                <a16:creationId xmlns:a16="http://schemas.microsoft.com/office/drawing/2014/main" id="{F4680150-0DC8-4F84-9E73-65FBD5E45FA2}"/>
+              </a:ext>
+            </a:extLst>
+          </p:cNvPr>
+          <p:cNvPicPr>
+            <a:picLocks noGrp="1" noChangeAspect="1"/>
+          </p:cNvPicPr>
+          <p:nvPr>
+            <p:ph idx="1"/>
+          </p:nvPr>
+        </p:nvPicPr>
+        <p:blipFill>
+          <a:blip r:embed="rId2">
+            <a:extLst>
+              <a:ext uri="{28A0092B-C50C-407E-A947-70E740481C1C}">
+                <a14:useLocalDpi xmlns:a14="http://schemas.microsoft.com/office/drawing/2010/main" val="0"/>
+              </a:ext>
+            </a:extLst>
+          </a:blip>
+          <a:stretch>
+            <a:fillRect/>
+          </a:stretch>
+        </p:blipFill>
+        <p:spPr>
+          <a:xfrm>
+            <a:off x="2368890" y="1856161"/>
+            <a:ext cx="4406219" cy="4290265"/>
+          </a:xfrm>
+        </p:spPr>
+      </p:pic>
+    </p:spTree>
+    <p:extLst>
+      <p:ext uri="{BB962C8B-B14F-4D97-AF65-F5344CB8AC3E}">
+        <p14:creationId xmlns:p14="http://schemas.microsoft.com/office/powerpoint/2010/main" val="4069320446"/>
+      </p:ext>
+    </p:extLst>
+  </p:cSld>
+  <p:clrMapOvr>
+    <a:masterClrMapping/>
+  </p:clrMapOvr>
+</p:sld>
+</file>
+
+<file path=ppt/slides/slide19.xml><?xml version="1.0" encoding="utf-8"?>
+<p:sld xmlns:a="http://schemas.openxmlformats.org/drawingml/2006/main" xmlns:r="http://schemas.openxmlformats.org/officeDocument/2006/relationships" xmlns:p="http://schemas.openxmlformats.org/presentationml/2006/main">
+  <p:cSld>
+    <p:spTree>
+      <p:nvGrpSpPr>
+        <p:cNvPr id="1" name=""/>
+        <p:cNvGrpSpPr/>
+        <p:nvPr/>
+      </p:nvGrpSpPr>
+      <p:grpSpPr>
+        <a:xfrm>
+          <a:off x="0" y="0"/>
+          <a:ext cx="0" cy="0"/>
+          <a:chOff x="0" y="0"/>
+          <a:chExt cx="0" cy="0"/>
+        </a:xfrm>
+      </p:grpSpPr>
+      <p:sp>
+        <p:nvSpPr>
+          <p:cNvPr id="2" name="Title 1">
+            <a:extLst>
+              <a:ext uri="{FF2B5EF4-FFF2-40B4-BE49-F238E27FC236}">
                 <a16:creationId xmlns:a16="http://schemas.microsoft.com/office/drawing/2014/main" id="{D69990CD-FFC3-458B-AFD0-940D78C85BF2}"/>
               </a:ext>
             </a:extLst>
@@ -3579,6 +4544,13 @@
             <a:r>
               <a:rPr lang="en-US" dirty="0"/>
               <a:t>Kernel choice</a:t>
+            </a:r>
+          </a:p>
+          <a:p>
+            <a:pPr lvl="1"/>
+            <a:r>
+              <a:rPr lang="en-US" dirty="0"/>
+              <a:t>Scaling</a:t>
             </a:r>
           </a:p>
           <a:p>
@@ -3629,7 +4601,105 @@
 </p:sld>
 </file>
 
-<file path=ppt/slides/slide16.xml><?xml version="1.0" encoding="utf-8"?>
+<file path=ppt/slides/slide2.xml><?xml version="1.0" encoding="utf-8"?>
+<p:sld xmlns:a="http://schemas.openxmlformats.org/drawingml/2006/main" xmlns:r="http://schemas.openxmlformats.org/officeDocument/2006/relationships" xmlns:p="http://schemas.openxmlformats.org/presentationml/2006/main">
+  <p:cSld>
+    <p:spTree>
+      <p:nvGrpSpPr>
+        <p:cNvPr id="1" name=""/>
+        <p:cNvGrpSpPr/>
+        <p:nvPr/>
+      </p:nvGrpSpPr>
+      <p:grpSpPr>
+        <a:xfrm>
+          <a:off x="0" y="0"/>
+          <a:ext cx="0" cy="0"/>
+          <a:chOff x="0" y="0"/>
+          <a:chExt cx="0" cy="0"/>
+        </a:xfrm>
+      </p:grpSpPr>
+      <p:sp>
+        <p:nvSpPr>
+          <p:cNvPr id="4" name="Title 3">
+            <a:extLst>
+              <a:ext uri="{FF2B5EF4-FFF2-40B4-BE49-F238E27FC236}">
+                <a16:creationId xmlns:a16="http://schemas.microsoft.com/office/drawing/2014/main" id="{824D6633-28F1-4DB1-B0D9-346036B465EE}"/>
+              </a:ext>
+            </a:extLst>
+          </p:cNvPr>
+          <p:cNvSpPr>
+            <a:spLocks noGrp="1"/>
+          </p:cNvSpPr>
+          <p:nvPr>
+            <p:ph type="title"/>
+          </p:nvPr>
+        </p:nvSpPr>
+        <p:spPr/>
+        <p:txBody>
+          <a:bodyPr/>
+          <a:lstStyle/>
+          <a:p>
+            <a:r>
+              <a:rPr lang="en-US" dirty="0"/>
+              <a:t>What led me to Bayesian Optimization?</a:t>
+            </a:r>
+          </a:p>
+        </p:txBody>
+      </p:sp>
+      <p:sp>
+        <p:nvSpPr>
+          <p:cNvPr id="5" name="Content Placeholder 4">
+            <a:extLst>
+              <a:ext uri="{FF2B5EF4-FFF2-40B4-BE49-F238E27FC236}">
+                <a16:creationId xmlns:a16="http://schemas.microsoft.com/office/drawing/2014/main" id="{66405E59-0BD8-4EE7-B41E-5C6C3FDC0709}"/>
+              </a:ext>
+            </a:extLst>
+          </p:cNvPr>
+          <p:cNvSpPr>
+            <a:spLocks noGrp="1"/>
+          </p:cNvSpPr>
+          <p:nvPr>
+            <p:ph idx="1"/>
+          </p:nvPr>
+        </p:nvSpPr>
+        <p:spPr/>
+        <p:txBody>
+          <a:bodyPr/>
+          <a:lstStyle/>
+          <a:p>
+            <a:r>
+              <a:rPr lang="en-US" dirty="0"/>
+              <a:t>Like many of you, I compete in Kaggle competitions</a:t>
+            </a:r>
+          </a:p>
+          <a:p>
+            <a:r>
+              <a:rPr lang="en-US" dirty="0"/>
+              <a:t>For whatever reason, GBMs tend to be the most popular model types</a:t>
+            </a:r>
+          </a:p>
+          <a:p>
+            <a:r>
+              <a:rPr lang="en-US" dirty="0"/>
+              <a:t>Significantly more hyperparameters to consider compared to GLMs</a:t>
+            </a:r>
+          </a:p>
+        </p:txBody>
+      </p:sp>
+    </p:spTree>
+    <p:extLst>
+      <p:ext uri="{BB962C8B-B14F-4D97-AF65-F5344CB8AC3E}">
+        <p14:creationId xmlns:p14="http://schemas.microsoft.com/office/powerpoint/2010/main" val="741182945"/>
+      </p:ext>
+    </p:extLst>
+  </p:cSld>
+  <p:clrMapOvr>
+    <a:masterClrMapping/>
+  </p:clrMapOvr>
+</p:sld>
+</file>
+
+<file path=ppt/slides/slide20.xml><?xml version="1.0" encoding="utf-8"?>
 <p:sld xmlns:a="http://schemas.openxmlformats.org/drawingml/2006/main" xmlns:r="http://schemas.openxmlformats.org/officeDocument/2006/relationships" xmlns:p="http://schemas.openxmlformats.org/presentationml/2006/main">
   <p:cSld>
     <p:spTree>
@@ -3722,7 +4792,7 @@
 </p:sld>
 </file>
 
-<file path=ppt/slides/slide17.xml><?xml version="1.0" encoding="utf-8"?>
+<file path=ppt/slides/slide21.xml><?xml version="1.0" encoding="utf-8"?>
 <p:sld xmlns:a="http://schemas.openxmlformats.org/drawingml/2006/main" xmlns:r="http://schemas.openxmlformats.org/officeDocument/2006/relationships" xmlns:p="http://schemas.openxmlformats.org/presentationml/2006/main">
   <p:cSld>
     <p:spTree>
@@ -3744,7 +4814,7 @@
           <p:cNvPr id="2" name="Title 1">
             <a:extLst>
               <a:ext uri="{FF2B5EF4-FFF2-40B4-BE49-F238E27FC236}">
-                <a16:creationId xmlns:a16="http://schemas.microsoft.com/office/drawing/2014/main" id="{0D102CFF-D46C-4B8C-80FA-E02FF3694FE9}"/>
+                <a16:creationId xmlns:a16="http://schemas.microsoft.com/office/drawing/2014/main" id="{9592584F-B7D5-4727-97B4-4243AD36D413}"/>
               </a:ext>
             </a:extLst>
           </p:cNvPr>
@@ -3762,7 +4832,7 @@
           <a:p>
             <a:r>
               <a:rPr lang="en-US" dirty="0"/>
-              <a:t>Modified utility functions</a:t>
+              <a:t>Target Scaling</a:t>
             </a:r>
           </a:p>
         </p:txBody>
@@ -3772,7 +4842,7 @@
           <p:cNvPr id="3" name="Content Placeholder 2">
             <a:extLst>
               <a:ext uri="{FF2B5EF4-FFF2-40B4-BE49-F238E27FC236}">
-                <a16:creationId xmlns:a16="http://schemas.microsoft.com/office/drawing/2014/main" id="{652A0362-F582-4AF7-84C6-52FFF2FEB8DF}"/>
+                <a16:creationId xmlns:a16="http://schemas.microsoft.com/office/drawing/2014/main" id="{26B72A78-823A-468F-807B-8C293B2D825E}"/>
               </a:ext>
             </a:extLst>
           </p:cNvPr>
@@ -3788,17 +4858,14 @@
           <a:bodyPr/>
           <a:lstStyle/>
           <a:p>
-            <a:r>
-              <a:rPr lang="en-US" dirty="0"/>
-              <a:t>Wrapper function for score to encompass additional constraints</a:t>
-            </a:r>
+            <a:endParaRPr lang="en-US"/>
           </a:p>
         </p:txBody>
       </p:sp>
     </p:spTree>
     <p:extLst>
       <p:ext uri="{BB962C8B-B14F-4D97-AF65-F5344CB8AC3E}">
-        <p14:creationId xmlns:p14="http://schemas.microsoft.com/office/powerpoint/2010/main" val="3224000482"/>
+        <p14:creationId xmlns:p14="http://schemas.microsoft.com/office/powerpoint/2010/main" val="2556837754"/>
       </p:ext>
     </p:extLst>
   </p:cSld>
@@ -3808,7 +4875,7 @@
 </p:sld>
 </file>
 
-<file path=ppt/slides/slide2.xml><?xml version="1.0" encoding="utf-8"?>
+<file path=ppt/slides/slide22.xml><?xml version="1.0" encoding="utf-8"?>
 <p:sld xmlns:a="http://schemas.openxmlformats.org/drawingml/2006/main" xmlns:r="http://schemas.openxmlformats.org/officeDocument/2006/relationships" xmlns:p="http://schemas.openxmlformats.org/presentationml/2006/main">
   <p:cSld>
     <p:spTree>
@@ -3827,10 +4894,10 @@
       </p:grpSpPr>
       <p:sp>
         <p:nvSpPr>
-          <p:cNvPr id="4" name="Title 3">
+          <p:cNvPr id="2" name="Title 1">
             <a:extLst>
               <a:ext uri="{FF2B5EF4-FFF2-40B4-BE49-F238E27FC236}">
-                <a16:creationId xmlns:a16="http://schemas.microsoft.com/office/drawing/2014/main" id="{824D6633-28F1-4DB1-B0D9-346036B465EE}"/>
+                <a16:creationId xmlns:a16="http://schemas.microsoft.com/office/drawing/2014/main" id="{0D102CFF-D46C-4B8C-80FA-E02FF3694FE9}"/>
               </a:ext>
             </a:extLst>
           </p:cNvPr>
@@ -3848,17 +4915,17 @@
           <a:p>
             <a:r>
               <a:rPr lang="en-US" dirty="0"/>
-              <a:t>What led me to Bayesian Optimization?</a:t>
-            </a:r>
-          </a:p>
-        </p:txBody>
-      </p:sp>
-      <p:sp>
-        <p:nvSpPr>
-          <p:cNvPr id="5" name="Content Placeholder 4">
+              <a:t>Modified utility functions</a:t>
+            </a:r>
+          </a:p>
+        </p:txBody>
+      </p:sp>
+      <p:sp>
+        <p:nvSpPr>
+          <p:cNvPr id="3" name="Content Placeholder 2">
             <a:extLst>
               <a:ext uri="{FF2B5EF4-FFF2-40B4-BE49-F238E27FC236}">
-                <a16:creationId xmlns:a16="http://schemas.microsoft.com/office/drawing/2014/main" id="{66405E59-0BD8-4EE7-B41E-5C6C3FDC0709}"/>
+                <a16:creationId xmlns:a16="http://schemas.microsoft.com/office/drawing/2014/main" id="{652A0362-F582-4AF7-84C6-52FFF2FEB8DF}"/>
               </a:ext>
             </a:extLst>
           </p:cNvPr>
@@ -3876,19 +4943,7 @@
           <a:p>
             <a:r>
               <a:rPr lang="en-US" dirty="0"/>
-              <a:t>Like many of you, I compete in Kaggle competitions</a:t>
-            </a:r>
-          </a:p>
-          <a:p>
-            <a:r>
-              <a:rPr lang="en-US" dirty="0"/>
-              <a:t>For whatever reason, GBMs tend to be the most popular model types</a:t>
-            </a:r>
-          </a:p>
-          <a:p>
-            <a:r>
-              <a:rPr lang="en-US" dirty="0"/>
-              <a:t>Significantly more hyperparameters to consider compared to GLMs</a:t>
+              <a:t>Wrapper function for score to encompass additional constraints</a:t>
             </a:r>
           </a:p>
         </p:txBody>
@@ -3896,7 +4951,93 @@
     </p:spTree>
     <p:extLst>
       <p:ext uri="{BB962C8B-B14F-4D97-AF65-F5344CB8AC3E}">
-        <p14:creationId xmlns:p14="http://schemas.microsoft.com/office/powerpoint/2010/main" val="741182945"/>
+        <p14:creationId xmlns:p14="http://schemas.microsoft.com/office/powerpoint/2010/main" val="3224000482"/>
+      </p:ext>
+    </p:extLst>
+  </p:cSld>
+  <p:clrMapOvr>
+    <a:masterClrMapping/>
+  </p:clrMapOvr>
+</p:sld>
+</file>
+
+<file path=ppt/slides/slide23.xml><?xml version="1.0" encoding="utf-8"?>
+<p:sld xmlns:a="http://schemas.openxmlformats.org/drawingml/2006/main" xmlns:r="http://schemas.openxmlformats.org/officeDocument/2006/relationships" xmlns:p="http://schemas.openxmlformats.org/presentationml/2006/main">
+  <p:cSld>
+    <p:spTree>
+      <p:nvGrpSpPr>
+        <p:cNvPr id="1" name=""/>
+        <p:cNvGrpSpPr/>
+        <p:nvPr/>
+      </p:nvGrpSpPr>
+      <p:grpSpPr>
+        <a:xfrm>
+          <a:off x="0" y="0"/>
+          <a:ext cx="0" cy="0"/>
+          <a:chOff x="0" y="0"/>
+          <a:chExt cx="0" cy="0"/>
+        </a:xfrm>
+      </p:grpSpPr>
+      <p:sp>
+        <p:nvSpPr>
+          <p:cNvPr id="2" name="Title 1">
+            <a:extLst>
+              <a:ext uri="{FF2B5EF4-FFF2-40B4-BE49-F238E27FC236}">
+                <a16:creationId xmlns:a16="http://schemas.microsoft.com/office/drawing/2014/main" id="{A550F962-D459-44E4-B5A2-EE2FB451235C}"/>
+              </a:ext>
+            </a:extLst>
+          </p:cNvPr>
+          <p:cNvSpPr>
+            <a:spLocks noGrp="1"/>
+          </p:cNvSpPr>
+          <p:nvPr>
+            <p:ph type="title"/>
+          </p:nvPr>
+        </p:nvSpPr>
+        <p:spPr/>
+        <p:txBody>
+          <a:bodyPr/>
+          <a:lstStyle/>
+          <a:p>
+            <a:r>
+              <a:rPr lang="en-US" dirty="0"/>
+              <a:t>Recap</a:t>
+            </a:r>
+          </a:p>
+        </p:txBody>
+      </p:sp>
+      <p:sp>
+        <p:nvSpPr>
+          <p:cNvPr id="3" name="Content Placeholder 2">
+            <a:extLst>
+              <a:ext uri="{FF2B5EF4-FFF2-40B4-BE49-F238E27FC236}">
+                <a16:creationId xmlns:a16="http://schemas.microsoft.com/office/drawing/2014/main" id="{E99873E6-BB1E-4AFF-89C5-F6497F044E44}"/>
+              </a:ext>
+            </a:extLst>
+          </p:cNvPr>
+          <p:cNvSpPr>
+            <a:spLocks noGrp="1"/>
+          </p:cNvSpPr>
+          <p:nvPr>
+            <p:ph idx="1"/>
+          </p:nvPr>
+        </p:nvSpPr>
+        <p:spPr/>
+        <p:txBody>
+          <a:bodyPr/>
+          <a:lstStyle/>
+          <a:p>
+            <a:r>
+              <a:rPr lang="en-US" dirty="0"/>
+              <a:t>Knobs</a:t>
+            </a:r>
+          </a:p>
+        </p:txBody>
+      </p:sp>
+    </p:spTree>
+    <p:extLst>
+      <p:ext uri="{BB962C8B-B14F-4D97-AF65-F5344CB8AC3E}">
+        <p14:creationId xmlns:p14="http://schemas.microsoft.com/office/powerpoint/2010/main" val="3097375391"/>
       </p:ext>
     </p:extLst>
   </p:cSld>
@@ -4511,7 +5652,7 @@
           <p:cNvPr id="2" name="Title 1">
             <a:extLst>
               <a:ext uri="{FF2B5EF4-FFF2-40B4-BE49-F238E27FC236}">
-                <a16:creationId xmlns:a16="http://schemas.microsoft.com/office/drawing/2014/main" id="{8CC04E9B-F8C2-481B-B472-4E07F60F4BBA}"/>
+                <a16:creationId xmlns:a16="http://schemas.microsoft.com/office/drawing/2014/main" id="{A4BC42CE-454E-48F0-B070-E8F709F6560F}"/>
               </a:ext>
             </a:extLst>
           </p:cNvPr>
@@ -4529,7 +5670,7 @@
           <a:p>
             <a:r>
               <a:rPr lang="en-US" dirty="0"/>
-              <a:t>Example</a:t>
+              <a:t>Zillow Prize</a:t>
             </a:r>
           </a:p>
         </p:txBody>
@@ -4539,7 +5680,7 @@
           <p:cNvPr id="3" name="Content Placeholder 2">
             <a:extLst>
               <a:ext uri="{FF2B5EF4-FFF2-40B4-BE49-F238E27FC236}">
-                <a16:creationId xmlns:a16="http://schemas.microsoft.com/office/drawing/2014/main" id="{668EF0E3-D0A6-44EE-B477-A92AD32DE819}"/>
+                <a16:creationId xmlns:a16="http://schemas.microsoft.com/office/drawing/2014/main" id="{18809FF8-CBFC-46D0-8F41-B87EAA22EC3F}"/>
               </a:ext>
             </a:extLst>
           </p:cNvPr>
@@ -4552,12 +5693,75 @@
         </p:nvSpPr>
         <p:spPr/>
         <p:txBody>
-          <a:bodyPr/>
-          <a:lstStyle/>
-          <a:p>
-            <a:r>
-              <a:rPr lang="en-US" dirty="0"/>
-              <a:t>Simple model</a:t>
+          <a:bodyPr>
+            <a:normAutofit lnSpcReduction="10000"/>
+          </a:bodyPr>
+          <a:lstStyle/>
+          <a:p>
+            <a:r>
+              <a:rPr lang="en-US" dirty="0"/>
+              <a:t>High-cost training</a:t>
+            </a:r>
+          </a:p>
+          <a:p>
+            <a:r>
+              <a:rPr lang="en-US" dirty="0"/>
+              <a:t>Started seeing a lot of chatter about a smarter automated tuning method</a:t>
+            </a:r>
+          </a:p>
+          <a:p>
+            <a:pPr lvl="1"/>
+            <a:r>
+              <a:rPr lang="en-US" dirty="0"/>
+              <a:t>Learning the hyperparameter space</a:t>
+            </a:r>
+          </a:p>
+          <a:p>
+            <a:r>
+              <a:rPr lang="en-US" dirty="0"/>
+              <a:t>A number of Python implementations</a:t>
+            </a:r>
+          </a:p>
+          <a:p>
+            <a:pPr lvl="1"/>
+            <a:r>
+              <a:rPr lang="en-US" dirty="0"/>
+              <a:t>Metric Optimization Engine (MOE)</a:t>
+            </a:r>
+          </a:p>
+          <a:p>
+            <a:pPr lvl="1"/>
+            <a:r>
+              <a:rPr lang="en-US" u="sng" dirty="0"/>
+              <a:t>Bayesian Optimization</a:t>
+            </a:r>
+          </a:p>
+          <a:p>
+            <a:pPr lvl="1"/>
+            <a:r>
+              <a:rPr lang="en-US" dirty="0" err="1"/>
+              <a:t>Hyperopt</a:t>
+            </a:r>
+            <a:endParaRPr lang="en-US" dirty="0"/>
+          </a:p>
+          <a:p>
+            <a:r>
+              <a:rPr lang="en-US" dirty="0"/>
+              <a:t>Relatively straightforward to implement in my code</a:t>
+            </a:r>
+          </a:p>
+          <a:p>
+            <a:pPr lvl="1"/>
+            <a:r>
+              <a:rPr lang="en-US" dirty="0"/>
+              <a:t>Still required a bounded range to search over</a:t>
+            </a:r>
+          </a:p>
+          <a:p>
+            <a:pPr lvl="1"/>
+            <a:r>
+              <a:rPr lang="en-US" dirty="0"/>
+              <a:t>Took less iterations, and new models performed better</a:t>
             </a:r>
           </a:p>
         </p:txBody>
@@ -4565,7 +5769,7 @@
     </p:spTree>
     <p:extLst>
       <p:ext uri="{BB962C8B-B14F-4D97-AF65-F5344CB8AC3E}">
-        <p14:creationId xmlns:p14="http://schemas.microsoft.com/office/powerpoint/2010/main" val="1590729896"/>
+        <p14:creationId xmlns:p14="http://schemas.microsoft.com/office/powerpoint/2010/main" val="3928882534"/>
       </p:ext>
     </p:extLst>
   </p:cSld>
@@ -4597,7 +5801,7 @@
           <p:cNvPr id="2" name="Title 1">
             <a:extLst>
               <a:ext uri="{FF2B5EF4-FFF2-40B4-BE49-F238E27FC236}">
-                <a16:creationId xmlns:a16="http://schemas.microsoft.com/office/drawing/2014/main" id="{A4BC42CE-454E-48F0-B070-E8F709F6560F}"/>
+                <a16:creationId xmlns:a16="http://schemas.microsoft.com/office/drawing/2014/main" id="{D55F2077-CEE8-435E-AF3D-5FFBF7DCDAC6}"/>
               </a:ext>
             </a:extLst>
           </p:cNvPr>
@@ -4615,7 +5819,7 @@
           <a:p>
             <a:r>
               <a:rPr lang="en-US" dirty="0"/>
-              <a:t>Zillow Prize</a:t>
+              <a:t>Objectives</a:t>
             </a:r>
           </a:p>
         </p:txBody>
@@ -4625,7 +5829,7 @@
           <p:cNvPr id="3" name="Content Placeholder 2">
             <a:extLst>
               <a:ext uri="{FF2B5EF4-FFF2-40B4-BE49-F238E27FC236}">
-                <a16:creationId xmlns:a16="http://schemas.microsoft.com/office/drawing/2014/main" id="{18809FF8-CBFC-46D0-8F41-B87EAA22EC3F}"/>
+                <a16:creationId xmlns:a16="http://schemas.microsoft.com/office/drawing/2014/main" id="{B3CAA105-DCF8-42B1-810E-AEFB5669E079}"/>
               </a:ext>
             </a:extLst>
           </p:cNvPr>
@@ -4638,75 +5842,46 @@
         </p:nvSpPr>
         <p:spPr/>
         <p:txBody>
-          <a:bodyPr>
-            <a:normAutofit lnSpcReduction="10000"/>
-          </a:bodyPr>
-          <a:lstStyle/>
-          <a:p>
-            <a:r>
-              <a:rPr lang="en-US" dirty="0"/>
-              <a:t>High-cost training</a:t>
-            </a:r>
-          </a:p>
-          <a:p>
-            <a:r>
-              <a:rPr lang="en-US" dirty="0"/>
-              <a:t>Started seeing a lot of chatter about a smarter automated tuning method</a:t>
-            </a:r>
-          </a:p>
-          <a:p>
-            <a:pPr lvl="1"/>
-            <a:r>
-              <a:rPr lang="en-US" dirty="0"/>
-              <a:t>Learning the hyperparameter space</a:t>
-            </a:r>
-          </a:p>
-          <a:p>
-            <a:r>
-              <a:rPr lang="en-US" dirty="0"/>
-              <a:t>A number of Python implementations</a:t>
-            </a:r>
-          </a:p>
-          <a:p>
-            <a:pPr lvl="1"/>
-            <a:r>
-              <a:rPr lang="en-US" dirty="0"/>
-              <a:t>Metric Optimization Engine (MOE)</a:t>
-            </a:r>
-          </a:p>
-          <a:p>
-            <a:pPr lvl="1"/>
-            <a:r>
-              <a:rPr lang="en-US" u="sng" dirty="0"/>
-              <a:t>Bayesian Optimization</a:t>
-            </a:r>
-          </a:p>
-          <a:p>
-            <a:pPr lvl="1"/>
-            <a:r>
-              <a:rPr lang="en-US" dirty="0" err="1"/>
-              <a:t>Hyperopt</a:t>
-            </a:r>
-            <a:endParaRPr lang="en-US" dirty="0"/>
-          </a:p>
-          <a:p>
-            <a:r>
-              <a:rPr lang="en-US" dirty="0"/>
-              <a:t>Relatively straightforward to implement in my code</a:t>
-            </a:r>
-          </a:p>
-          <a:p>
-            <a:pPr lvl="1"/>
-            <a:r>
-              <a:rPr lang="en-US" dirty="0"/>
-              <a:t>Still required a bounded range to search over</a:t>
-            </a:r>
-          </a:p>
-          <a:p>
-            <a:pPr lvl="1"/>
-            <a:r>
-              <a:rPr lang="en-US" dirty="0"/>
-              <a:t>Took less iterations, and new models performed better</a:t>
+          <a:bodyPr/>
+          <a:lstStyle/>
+          <a:p>
+            <a:pPr marL="514350" indent="-514350">
+              <a:buFont typeface="+mj-lt"/>
+              <a:buAutoNum type="arabicPeriod"/>
+            </a:pPr>
+            <a:r>
+              <a:rPr lang="en-US" dirty="0"/>
+              <a:t>Learn how to implement Bayesian Optimization in your code</a:t>
+            </a:r>
+          </a:p>
+          <a:p>
+            <a:pPr marL="514350" indent="-514350">
+              <a:buFont typeface="+mj-lt"/>
+              <a:buAutoNum type="arabicPeriod"/>
+            </a:pPr>
+            <a:r>
+              <a:rPr lang="en-US" dirty="0"/>
+              <a:t>Understand the underlying mechanism</a:t>
+            </a:r>
+          </a:p>
+          <a:p>
+            <a:pPr marL="514350" indent="-514350">
+              <a:buFont typeface="+mj-lt"/>
+              <a:buAutoNum type="arabicPeriod"/>
+            </a:pPr>
+            <a:r>
+              <a:rPr lang="en-US" dirty="0"/>
+              <a:t>Discuss the limitations of the technique</a:t>
+            </a:r>
+          </a:p>
+          <a:p>
+            <a:pPr marL="514350" indent="-514350">
+              <a:buFont typeface="+mj-lt"/>
+              <a:buAutoNum type="arabicPeriod"/>
+            </a:pPr>
+            <a:r>
+              <a:rPr lang="en-US" dirty="0"/>
+              <a:t>Explore some extended use cases</a:t>
             </a:r>
           </a:p>
         </p:txBody>
@@ -4714,7 +5889,7 @@
     </p:spTree>
     <p:extLst>
       <p:ext uri="{BB962C8B-B14F-4D97-AF65-F5344CB8AC3E}">
-        <p14:creationId xmlns:p14="http://schemas.microsoft.com/office/powerpoint/2010/main" val="3928882534"/>
+        <p14:creationId xmlns:p14="http://schemas.microsoft.com/office/powerpoint/2010/main" val="1087731631"/>
       </p:ext>
     </p:extLst>
   </p:cSld>
@@ -4746,7 +5921,7 @@
           <p:cNvPr id="2" name="Title 1">
             <a:extLst>
               <a:ext uri="{FF2B5EF4-FFF2-40B4-BE49-F238E27FC236}">
-                <a16:creationId xmlns:a16="http://schemas.microsoft.com/office/drawing/2014/main" id="{D55F2077-CEE8-435E-AF3D-5FFBF7DCDAC6}"/>
+                <a16:creationId xmlns:a16="http://schemas.microsoft.com/office/drawing/2014/main" id="{667A730E-90A1-4F9A-9A9F-74F2F3EDE3F9}"/>
               </a:ext>
             </a:extLst>
           </p:cNvPr>
@@ -4764,7 +5939,7 @@
           <a:p>
             <a:r>
               <a:rPr lang="en-US" dirty="0"/>
-              <a:t>Objectives</a:t>
+              <a:t>Simple Regression</a:t>
             </a:r>
           </a:p>
         </p:txBody>
@@ -4774,7 +5949,7 @@
           <p:cNvPr id="3" name="Content Placeholder 2">
             <a:extLst>
               <a:ext uri="{FF2B5EF4-FFF2-40B4-BE49-F238E27FC236}">
-                <a16:creationId xmlns:a16="http://schemas.microsoft.com/office/drawing/2014/main" id="{B3CAA105-DCF8-42B1-810E-AEFB5669E079}"/>
+                <a16:creationId xmlns:a16="http://schemas.microsoft.com/office/drawing/2014/main" id="{F93E3142-3D8D-445C-A435-2E59134311BA}"/>
               </a:ext>
             </a:extLst>
           </p:cNvPr>
@@ -4785,56 +5960,24 @@
             <p:ph idx="1"/>
           </p:nvPr>
         </p:nvSpPr>
-        <p:spPr/>
-        <p:txBody>
-          <a:bodyPr/>
-          <a:lstStyle/>
-          <a:p>
-            <a:pPr marL="514350" indent="-514350">
-              <a:buFont typeface="+mj-lt"/>
-              <a:buAutoNum type="arabicPeriod"/>
-            </a:pPr>
-            <a:r>
-              <a:rPr lang="en-US" dirty="0"/>
-              <a:t>Learn how to implement Bayesian Optimization in your code</a:t>
-            </a:r>
-          </a:p>
-          <a:p>
-            <a:pPr marL="514350" indent="-514350">
-              <a:buFont typeface="+mj-lt"/>
-              <a:buAutoNum type="arabicPeriod"/>
-            </a:pPr>
-            <a:r>
-              <a:rPr lang="en-US" dirty="0"/>
-              <a:t>Understand the underlying mechanism</a:t>
-            </a:r>
-          </a:p>
-          <a:p>
-            <a:pPr marL="514350" indent="-514350">
-              <a:buFont typeface="+mj-lt"/>
-              <a:buAutoNum type="arabicPeriod"/>
-            </a:pPr>
-            <a:r>
-              <a:rPr lang="en-US" dirty="0"/>
-              <a:t>Discuss the limitations of the technique</a:t>
-            </a:r>
-          </a:p>
-          <a:p>
-            <a:pPr marL="514350" indent="-514350">
-              <a:buFont typeface="+mj-lt"/>
-              <a:buAutoNum type="arabicPeriod"/>
-            </a:pPr>
-            <a:r>
-              <a:rPr lang="en-US" dirty="0"/>
-              <a:t>Explore some extended use cases</a:t>
-            </a:r>
+        <p:spPr>
+          <a:xfrm>
+            <a:off x="628650" y="1817236"/>
+            <a:ext cx="7886700" cy="4351338"/>
+          </a:xfrm>
+        </p:spPr>
+        <p:txBody>
+          <a:bodyPr/>
+          <a:lstStyle/>
+          <a:p>
+            <a:endParaRPr lang="en-US" dirty="0"/>
           </a:p>
         </p:txBody>
       </p:sp>
     </p:spTree>
     <p:extLst>
       <p:ext uri="{BB962C8B-B14F-4D97-AF65-F5344CB8AC3E}">
-        <p14:creationId xmlns:p14="http://schemas.microsoft.com/office/powerpoint/2010/main" val="1087731631"/>
+        <p14:creationId xmlns:p14="http://schemas.microsoft.com/office/powerpoint/2010/main" val="1872074075"/>
       </p:ext>
     </p:extLst>
   </p:cSld>
@@ -4866,7 +6009,7 @@
           <p:cNvPr id="2" name="Title 1">
             <a:extLst>
               <a:ext uri="{FF2B5EF4-FFF2-40B4-BE49-F238E27FC236}">
-                <a16:creationId xmlns:a16="http://schemas.microsoft.com/office/drawing/2014/main" id="{667A730E-90A1-4F9A-9A9F-74F2F3EDE3F9}"/>
+                <a16:creationId xmlns:a16="http://schemas.microsoft.com/office/drawing/2014/main" id="{B6E2BE2B-529F-4D96-B2E7-734665BD9FBB}"/>
               </a:ext>
             </a:extLst>
           </p:cNvPr>
@@ -4884,7 +6027,7 @@
           <a:p>
             <a:r>
               <a:rPr lang="en-US" dirty="0"/>
-              <a:t>Simple Regression</a:t>
+              <a:t>Simple Classification</a:t>
             </a:r>
           </a:p>
         </p:txBody>
@@ -4894,7 +6037,7 @@
           <p:cNvPr id="3" name="Content Placeholder 2">
             <a:extLst>
               <a:ext uri="{FF2B5EF4-FFF2-40B4-BE49-F238E27FC236}">
-                <a16:creationId xmlns:a16="http://schemas.microsoft.com/office/drawing/2014/main" id="{F93E3142-3D8D-445C-A435-2E59134311BA}"/>
+                <a16:creationId xmlns:a16="http://schemas.microsoft.com/office/drawing/2014/main" id="{3E0CA400-092D-4764-971C-E868F4D7C54E}"/>
               </a:ext>
             </a:extLst>
           </p:cNvPr>
@@ -4917,7 +6060,7 @@
     </p:spTree>
     <p:extLst>
       <p:ext uri="{BB962C8B-B14F-4D97-AF65-F5344CB8AC3E}">
-        <p14:creationId xmlns:p14="http://schemas.microsoft.com/office/powerpoint/2010/main" val="1872074075"/>
+        <p14:creationId xmlns:p14="http://schemas.microsoft.com/office/powerpoint/2010/main" val="2585097853"/>
       </p:ext>
     </p:extLst>
   </p:cSld>

</xml_diff>

<commit_message>
Added scaling notebook and new images for Powerpoint. Also updated to PPT.
</commit_message>
<xml_diff>
--- a/Data_science_nashville_jkk.pptx
+++ b/Data_science_nashville_jkk.pptx
@@ -9,25 +9,30 @@
     <p:sldId id="257" r:id="rId3"/>
     <p:sldId id="258" r:id="rId4"/>
     <p:sldId id="260" r:id="rId5"/>
-    <p:sldId id="259" r:id="rId6"/>
-    <p:sldId id="263" r:id="rId7"/>
+    <p:sldId id="263" r:id="rId6"/>
+    <p:sldId id="259" r:id="rId7"/>
     <p:sldId id="264" r:id="rId8"/>
     <p:sldId id="273" r:id="rId9"/>
     <p:sldId id="274" r:id="rId10"/>
     <p:sldId id="265" r:id="rId11"/>
     <p:sldId id="269" r:id="rId12"/>
-    <p:sldId id="270" r:id="rId13"/>
-    <p:sldId id="272" r:id="rId14"/>
-    <p:sldId id="271" r:id="rId15"/>
-    <p:sldId id="276" r:id="rId16"/>
-    <p:sldId id="277" r:id="rId17"/>
-    <p:sldId id="278" r:id="rId18"/>
-    <p:sldId id="279" r:id="rId19"/>
-    <p:sldId id="268" r:id="rId20"/>
-    <p:sldId id="267" r:id="rId21"/>
-    <p:sldId id="275" r:id="rId22"/>
-    <p:sldId id="266" r:id="rId23"/>
-    <p:sldId id="280" r:id="rId24"/>
+    <p:sldId id="284" r:id="rId13"/>
+    <p:sldId id="282" r:id="rId14"/>
+    <p:sldId id="283" r:id="rId15"/>
+    <p:sldId id="272" r:id="rId16"/>
+    <p:sldId id="271" r:id="rId17"/>
+    <p:sldId id="276" r:id="rId18"/>
+    <p:sldId id="277" r:id="rId19"/>
+    <p:sldId id="278" r:id="rId20"/>
+    <p:sldId id="279" r:id="rId21"/>
+    <p:sldId id="268" r:id="rId22"/>
+    <p:sldId id="267" r:id="rId23"/>
+    <p:sldId id="281" r:id="rId24"/>
+    <p:sldId id="275" r:id="rId25"/>
+    <p:sldId id="287" r:id="rId26"/>
+    <p:sldId id="266" r:id="rId27"/>
+    <p:sldId id="285" r:id="rId28"/>
+    <p:sldId id="286" r:id="rId29"/>
   </p:sldIdLst>
   <p:sldSz cx="9144000" cy="6858000" type="screen4x3"/>
   <p:notesSz cx="6858000" cy="9144000"/>
@@ -3285,7 +3290,7 @@
           <p:cNvPr id="2" name="Title 1">
             <a:extLst>
               <a:ext uri="{FF2B5EF4-FFF2-40B4-BE49-F238E27FC236}">
-                <a16:creationId xmlns:a16="http://schemas.microsoft.com/office/drawing/2014/main" id="{A05E5E2E-55E2-4D5D-B3BC-93807FDF7E6D}"/>
+                <a16:creationId xmlns:a16="http://schemas.microsoft.com/office/drawing/2014/main" id="{C7EF7884-E9DF-442A-A088-292308EBD28E}"/>
               </a:ext>
             </a:extLst>
           </p:cNvPr>
@@ -3313,7 +3318,7 @@
           <p:cNvPr id="3" name="Content Placeholder 2">
             <a:extLst>
               <a:ext uri="{FF2B5EF4-FFF2-40B4-BE49-F238E27FC236}">
-                <a16:creationId xmlns:a16="http://schemas.microsoft.com/office/drawing/2014/main" id="{001F46BF-8408-485B-B48D-8E09C69A08D4}"/>
+                <a16:creationId xmlns:a16="http://schemas.microsoft.com/office/drawing/2014/main" id="{E6FCB062-A044-40C4-8F7A-B9229E926F88}"/>
               </a:ext>
             </a:extLst>
           </p:cNvPr>
@@ -3336,7 +3341,7 @@
     </p:spTree>
     <p:extLst>
       <p:ext uri="{BB962C8B-B14F-4D97-AF65-F5344CB8AC3E}">
-        <p14:creationId xmlns:p14="http://schemas.microsoft.com/office/powerpoint/2010/main" val="3789290434"/>
+        <p14:creationId xmlns:p14="http://schemas.microsoft.com/office/powerpoint/2010/main" val="2154785185"/>
       </p:ext>
     </p:extLst>
   </p:cSld>
@@ -3368,7 +3373,7 @@
           <p:cNvPr id="2" name="Title 1">
             <a:extLst>
               <a:ext uri="{FF2B5EF4-FFF2-40B4-BE49-F238E27FC236}">
-                <a16:creationId xmlns:a16="http://schemas.microsoft.com/office/drawing/2014/main" id="{A05E5E2E-55E2-4D5D-B3BC-93807FDF7E6D}"/>
+                <a16:creationId xmlns:a16="http://schemas.microsoft.com/office/drawing/2014/main" id="{0888D31C-625A-496E-91E0-EDA1805176D3}"/>
               </a:ext>
             </a:extLst>
           </p:cNvPr>
@@ -3391,10 +3396,204 @@
           </a:p>
         </p:txBody>
       </p:sp>
+      <mc:AlternateContent xmlns:mc="http://schemas.openxmlformats.org/markup-compatibility/2006" xmlns:a14="http://schemas.microsoft.com/office/drawing/2010/main">
+        <mc:Choice Requires="a14">
+          <p:sp>
+            <p:nvSpPr>
+              <p:cNvPr id="3" name="Content Placeholder 2">
+                <a:extLst>
+                  <a:ext uri="{FF2B5EF4-FFF2-40B4-BE49-F238E27FC236}">
+                    <a16:creationId xmlns:a16="http://schemas.microsoft.com/office/drawing/2014/main" id="{CE1716C4-D721-4898-B7F1-DCB3D7F46C38}"/>
+                  </a:ext>
+                </a:extLst>
+              </p:cNvPr>
+              <p:cNvSpPr>
+                <a:spLocks noGrp="1"/>
+              </p:cNvSpPr>
+              <p:nvPr>
+                <p:ph idx="1"/>
+              </p:nvPr>
+            </p:nvSpPr>
+            <p:spPr/>
+            <p:txBody>
+              <a:bodyPr/>
+              <a:lstStyle/>
+              <a:p>
+                <a:r>
+                  <a:rPr lang="en-US" dirty="0"/>
+                  <a:t>Target function: </a:t>
+                </a:r>
+                <a14:m>
+                  <m:oMath xmlns:m="http://schemas.openxmlformats.org/officeDocument/2006/math">
+                    <m:r>
+                      <a:rPr lang="en-US" b="0" i="1" smtClean="0">
+                        <a:latin typeface="Cambria Math" panose="02040503050406030204" pitchFamily="18" charset="0"/>
+                      </a:rPr>
+                      <m:t>𝑥</m:t>
+                    </m:r>
+                    <m:func>
+                      <m:funcPr>
+                        <m:ctrlPr>
+                          <a:rPr lang="en-US" b="0" i="1" smtClean="0">
+                            <a:latin typeface="Cambria Math" panose="02040503050406030204" pitchFamily="18" charset="0"/>
+                          </a:rPr>
+                        </m:ctrlPr>
+                      </m:funcPr>
+                      <m:fName>
+                        <m:r>
+                          <m:rPr>
+                            <m:sty m:val="p"/>
+                          </m:rPr>
+                          <a:rPr lang="en-US" b="0" i="0" smtClean="0">
+                            <a:latin typeface="Cambria Math" panose="02040503050406030204" pitchFamily="18" charset="0"/>
+                          </a:rPr>
+                          <m:t>sin</m:t>
+                        </m:r>
+                      </m:fName>
+                      <m:e>
+                        <m:r>
+                          <a:rPr lang="en-US" b="0" i="1" smtClean="0">
+                            <a:latin typeface="Cambria Math" panose="02040503050406030204" pitchFamily="18" charset="0"/>
+                          </a:rPr>
+                          <m:t>𝑥</m:t>
+                        </m:r>
+                      </m:e>
+                    </m:func>
+                  </m:oMath>
+                </a14:m>
+                <a:r>
+                  <a:rPr lang="en-US" dirty="0"/>
+                  <a:t> for </a:t>
+                </a:r>
+                <a14:m>
+                  <m:oMath xmlns:m="http://schemas.openxmlformats.org/officeDocument/2006/math">
+                    <m:r>
+                      <a:rPr lang="en-US" b="0" i="1" smtClean="0">
+                        <a:latin typeface="Cambria Math" panose="02040503050406030204" pitchFamily="18" charset="0"/>
+                      </a:rPr>
+                      <m:t>𝑥</m:t>
+                    </m:r>
+                    <m:r>
+                      <a:rPr lang="en-US" b="0" i="1" smtClean="0">
+                        <a:latin typeface="Cambria Math" panose="02040503050406030204" pitchFamily="18" charset="0"/>
+                        <a:ea typeface="Cambria Math" panose="02040503050406030204" pitchFamily="18" charset="0"/>
+                      </a:rPr>
+                      <m:t>∈</m:t>
+                    </m:r>
+                    <m:d>
+                      <m:dPr>
+                        <m:begChr m:val="["/>
+                        <m:endChr m:val="]"/>
+                        <m:ctrlPr>
+                          <a:rPr lang="en-US" b="0" i="1" smtClean="0">
+                            <a:latin typeface="Cambria Math" panose="02040503050406030204" pitchFamily="18" charset="0"/>
+                            <a:ea typeface="Cambria Math" panose="02040503050406030204" pitchFamily="18" charset="0"/>
+                          </a:rPr>
+                        </m:ctrlPr>
+                      </m:dPr>
+                      <m:e>
+                        <m:r>
+                          <a:rPr lang="en-US" b="0" i="1" smtClean="0">
+                            <a:latin typeface="Cambria Math" panose="02040503050406030204" pitchFamily="18" charset="0"/>
+                            <a:ea typeface="Cambria Math" panose="02040503050406030204" pitchFamily="18" charset="0"/>
+                          </a:rPr>
+                          <m:t>−2,10</m:t>
+                        </m:r>
+                      </m:e>
+                    </m:d>
+                  </m:oMath>
+                </a14:m>
+                <a:r>
+                  <a:rPr lang="en-US" dirty="0"/>
+                  <a:t> </a:t>
+                </a:r>
+              </a:p>
+            </p:txBody>
+          </p:sp>
+        </mc:Choice>
+        <mc:Fallback xmlns="">
+          <p:sp>
+            <p:nvSpPr>
+              <p:cNvPr id="3" name="Content Placeholder 2">
+                <a:extLst>
+                  <a:ext uri="{FF2B5EF4-FFF2-40B4-BE49-F238E27FC236}">
+                    <a16:creationId xmlns:a16="http://schemas.microsoft.com/office/drawing/2014/main" id="{CE1716C4-D721-4898-B7F1-DCB3D7F46C38}"/>
+                  </a:ext>
+                </a:extLst>
+              </p:cNvPr>
+              <p:cNvSpPr>
+                <a:spLocks noGrp="1" noRot="1" noChangeAspect="1" noMove="1" noResize="1" noEditPoints="1" noAdjustHandles="1" noChangeArrowheads="1" noChangeShapeType="1" noTextEdit="1"/>
+              </p:cNvSpPr>
+              <p:nvPr>
+                <p:ph idx="1"/>
+              </p:nvPr>
+            </p:nvSpPr>
+            <p:spPr>
+              <a:blipFill>
+                <a:blip r:embed="rId2"/>
+                <a:stretch>
+                  <a:fillRect l="-1391" t="-2241"/>
+                </a:stretch>
+              </a:blipFill>
+            </p:spPr>
+            <p:txBody>
+              <a:bodyPr/>
+              <a:lstStyle/>
+              <a:p>
+                <a:r>
+                  <a:rPr lang="en-US">
+                    <a:noFill/>
+                  </a:rPr>
+                  <a:t> </a:t>
+                </a:r>
+              </a:p>
+            </p:txBody>
+          </p:sp>
+        </mc:Fallback>
+      </mc:AlternateContent>
+      <p:pic>
+        <p:nvPicPr>
+          <p:cNvPr id="5" name="Picture 4">
+            <a:extLst>
+              <a:ext uri="{FF2B5EF4-FFF2-40B4-BE49-F238E27FC236}">
+                <a16:creationId xmlns:a16="http://schemas.microsoft.com/office/drawing/2014/main" id="{FC6B3829-9D64-4E46-9FCD-93F32BA0D8BC}"/>
+              </a:ext>
+            </a:extLst>
+          </p:cNvPr>
+          <p:cNvPicPr>
+            <a:picLocks noChangeAspect="1"/>
+          </p:cNvPicPr>
+          <p:nvPr/>
+        </p:nvPicPr>
+        <p:blipFill>
+          <a:blip r:embed="rId3">
+            <a:extLst>
+              <a:ext uri="{28A0092B-C50C-407E-A947-70E740481C1C}">
+                <a14:useLocalDpi xmlns:a14="http://schemas.microsoft.com/office/drawing/2010/main" val="0"/>
+              </a:ext>
+            </a:extLst>
+          </a:blip>
+          <a:stretch>
+            <a:fillRect/>
+          </a:stretch>
+        </p:blipFill>
+        <p:spPr>
+          <a:xfrm>
+            <a:off x="1647776" y="2638338"/>
+            <a:ext cx="5848448" cy="4114800"/>
+          </a:xfrm>
+          <a:prstGeom prst="rect">
+            <a:avLst/>
+          </a:prstGeom>
+          <a:ln>
+            <a:noFill/>
+          </a:ln>
+        </p:spPr>
+      </p:pic>
     </p:spTree>
     <p:extLst>
       <p:ext uri="{BB962C8B-B14F-4D97-AF65-F5344CB8AC3E}">
-        <p14:creationId xmlns:p14="http://schemas.microsoft.com/office/powerpoint/2010/main" val="512079388"/>
+        <p14:creationId xmlns:p14="http://schemas.microsoft.com/office/powerpoint/2010/main" val="2884265908"/>
       </p:ext>
     </p:extLst>
   </p:cSld>
@@ -3426,6 +3625,189 @@
           <p:cNvPr id="2" name="Title 1">
             <a:extLst>
               <a:ext uri="{FF2B5EF4-FFF2-40B4-BE49-F238E27FC236}">
+                <a16:creationId xmlns:a16="http://schemas.microsoft.com/office/drawing/2014/main" id="{0888D31C-625A-496E-91E0-EDA1805176D3}"/>
+              </a:ext>
+            </a:extLst>
+          </p:cNvPr>
+          <p:cNvSpPr>
+            <a:spLocks noGrp="1"/>
+          </p:cNvSpPr>
+          <p:nvPr>
+            <p:ph type="title"/>
+          </p:nvPr>
+        </p:nvSpPr>
+        <p:spPr/>
+        <p:txBody>
+          <a:bodyPr/>
+          <a:lstStyle/>
+          <a:p>
+            <a:r>
+              <a:rPr lang="en-US" dirty="0"/>
+              <a:t>Gaussian Process</a:t>
+            </a:r>
+          </a:p>
+        </p:txBody>
+      </p:sp>
+      <p:sp>
+        <p:nvSpPr>
+          <p:cNvPr id="3" name="Content Placeholder 2">
+            <a:extLst>
+              <a:ext uri="{FF2B5EF4-FFF2-40B4-BE49-F238E27FC236}">
+                <a16:creationId xmlns:a16="http://schemas.microsoft.com/office/drawing/2014/main" id="{CE1716C4-D721-4898-B7F1-DCB3D7F46C38}"/>
+              </a:ext>
+            </a:extLst>
+          </p:cNvPr>
+          <p:cNvSpPr>
+            <a:spLocks noGrp="1"/>
+          </p:cNvSpPr>
+          <p:nvPr>
+            <p:ph idx="1"/>
+          </p:nvPr>
+        </p:nvSpPr>
+        <p:spPr/>
+        <p:txBody>
+          <a:bodyPr/>
+          <a:lstStyle/>
+          <a:p>
+            <a:r>
+              <a:rPr lang="en-US" dirty="0"/>
+              <a:t>Sample two points on x-interval and train GPR</a:t>
+            </a:r>
+          </a:p>
+        </p:txBody>
+      </p:sp>
+      <p:pic>
+        <p:nvPicPr>
+          <p:cNvPr id="5" name="Picture 4">
+            <a:extLst>
+              <a:ext uri="{FF2B5EF4-FFF2-40B4-BE49-F238E27FC236}">
+                <a16:creationId xmlns:a16="http://schemas.microsoft.com/office/drawing/2014/main" id="{FC6B3829-9D64-4E46-9FCD-93F32BA0D8BC}"/>
+              </a:ext>
+            </a:extLst>
+          </p:cNvPr>
+          <p:cNvPicPr>
+            <a:picLocks noChangeAspect="1"/>
+          </p:cNvPicPr>
+          <p:nvPr/>
+        </p:nvPicPr>
+        <p:blipFill>
+          <a:blip r:embed="rId2">
+            <a:extLst>
+              <a:ext uri="{28A0092B-C50C-407E-A947-70E740481C1C}">
+                <a14:useLocalDpi xmlns:a14="http://schemas.microsoft.com/office/drawing/2010/main" val="0"/>
+              </a:ext>
+            </a:extLst>
+          </a:blip>
+          <a:stretch>
+            <a:fillRect/>
+          </a:stretch>
+        </p:blipFill>
+        <p:spPr>
+          <a:xfrm>
+            <a:off x="1143000" y="2286000"/>
+            <a:ext cx="6858001" cy="4572000"/>
+          </a:xfrm>
+          <a:prstGeom prst="rect">
+            <a:avLst/>
+          </a:prstGeom>
+          <a:ln>
+            <a:noFill/>
+          </a:ln>
+        </p:spPr>
+      </p:pic>
+    </p:spTree>
+    <p:extLst>
+      <p:ext uri="{BB962C8B-B14F-4D97-AF65-F5344CB8AC3E}">
+        <p14:creationId xmlns:p14="http://schemas.microsoft.com/office/powerpoint/2010/main" val="2869446259"/>
+      </p:ext>
+    </p:extLst>
+  </p:cSld>
+  <p:clrMapOvr>
+    <a:masterClrMapping/>
+  </p:clrMapOvr>
+</p:sld>
+</file>
+
+<file path=ppt/slides/slide15.xml><?xml version="1.0" encoding="utf-8"?>
+<p:sld xmlns:a="http://schemas.openxmlformats.org/drawingml/2006/main" xmlns:r="http://schemas.openxmlformats.org/officeDocument/2006/relationships" xmlns:p="http://schemas.openxmlformats.org/presentationml/2006/main">
+  <p:cSld>
+    <p:spTree>
+      <p:nvGrpSpPr>
+        <p:cNvPr id="1" name=""/>
+        <p:cNvGrpSpPr/>
+        <p:nvPr/>
+      </p:nvGrpSpPr>
+      <p:grpSpPr>
+        <a:xfrm>
+          <a:off x="0" y="0"/>
+          <a:ext cx="0" cy="0"/>
+          <a:chOff x="0" y="0"/>
+          <a:chExt cx="0" cy="0"/>
+        </a:xfrm>
+      </p:grpSpPr>
+      <p:sp>
+        <p:nvSpPr>
+          <p:cNvPr id="2" name="Title 1">
+            <a:extLst>
+              <a:ext uri="{FF2B5EF4-FFF2-40B4-BE49-F238E27FC236}">
+                <a16:creationId xmlns:a16="http://schemas.microsoft.com/office/drawing/2014/main" id="{A05E5E2E-55E2-4D5D-B3BC-93807FDF7E6D}"/>
+              </a:ext>
+            </a:extLst>
+          </p:cNvPr>
+          <p:cNvSpPr>
+            <a:spLocks noGrp="1"/>
+          </p:cNvSpPr>
+          <p:nvPr>
+            <p:ph type="title"/>
+          </p:nvPr>
+        </p:nvSpPr>
+        <p:spPr/>
+        <p:txBody>
+          <a:bodyPr/>
+          <a:lstStyle/>
+          <a:p>
+            <a:r>
+              <a:rPr lang="en-US" dirty="0"/>
+              <a:t>Gaussian Process</a:t>
+            </a:r>
+          </a:p>
+        </p:txBody>
+      </p:sp>
+    </p:spTree>
+    <p:extLst>
+      <p:ext uri="{BB962C8B-B14F-4D97-AF65-F5344CB8AC3E}">
+        <p14:creationId xmlns:p14="http://schemas.microsoft.com/office/powerpoint/2010/main" val="512079388"/>
+      </p:ext>
+    </p:extLst>
+  </p:cSld>
+  <p:clrMapOvr>
+    <a:masterClrMapping/>
+  </p:clrMapOvr>
+</p:sld>
+</file>
+
+<file path=ppt/slides/slide16.xml><?xml version="1.0" encoding="utf-8"?>
+<p:sld xmlns:a="http://schemas.openxmlformats.org/drawingml/2006/main" xmlns:r="http://schemas.openxmlformats.org/officeDocument/2006/relationships" xmlns:p="http://schemas.openxmlformats.org/presentationml/2006/main">
+  <p:cSld>
+    <p:spTree>
+      <p:nvGrpSpPr>
+        <p:cNvPr id="1" name=""/>
+        <p:cNvGrpSpPr/>
+        <p:nvPr/>
+      </p:nvGrpSpPr>
+      <p:grpSpPr>
+        <a:xfrm>
+          <a:off x="0" y="0"/>
+          <a:ext cx="0" cy="0"/>
+          <a:chOff x="0" y="0"/>
+          <a:chExt cx="0" cy="0"/>
+        </a:xfrm>
+      </p:grpSpPr>
+      <p:sp>
+        <p:nvSpPr>
+          <p:cNvPr id="2" name="Title 1">
+            <a:extLst>
+              <a:ext uri="{FF2B5EF4-FFF2-40B4-BE49-F238E27FC236}">
                 <a16:creationId xmlns:a16="http://schemas.microsoft.com/office/drawing/2014/main" id="{BAC2B454-EDAC-4597-8F3B-7D9659B454FE}"/>
               </a:ext>
             </a:extLst>
@@ -3487,7 +3869,7 @@
 </p:sld>
 </file>
 
-<file path=ppt/slides/slide15.xml><?xml version="1.0" encoding="utf-8"?>
+<file path=ppt/slides/slide17.xml><?xml version="1.0" encoding="utf-8"?>
 <p:sld xmlns:a="http://schemas.openxmlformats.org/drawingml/2006/main" xmlns:r="http://schemas.openxmlformats.org/officeDocument/2006/relationships" xmlns:p="http://schemas.openxmlformats.org/presentationml/2006/main">
   <p:cSld>
     <p:spTree>
@@ -3633,14 +4015,7 @@
                         <a:latin typeface="Cambria Math" panose="02040503050406030204" pitchFamily="18" charset="0"/>
                         <a:ea typeface="Cambria Math" panose="02040503050406030204" pitchFamily="18" charset="0"/>
                       </a:rPr>
-                      <m:t>𝜅</m:t>
-                    </m:r>
-                    <m:r>
-                      <a:rPr lang="el-GR" i="1">
-                        <a:latin typeface="Cambria Math" panose="02040503050406030204" pitchFamily="18" charset="0"/>
-                        <a:ea typeface="Cambria Math" panose="02040503050406030204" pitchFamily="18" charset="0"/>
-                      </a:rPr>
-                      <m:t>𝜎</m:t>
+                      <m:t>𝜅𝜎</m:t>
                     </m:r>
                     <m:d>
                       <m:dPr>
@@ -4030,22 +4405,22 @@
                                 <m:sSup>
                                   <m:sSupPr>
                                     <m:ctrlPr>
-                                      <a:rPr lang="en-US" b="0" i="1" smtClean="0">
+                                      <a:rPr lang="en-US" b="1" i="1" smtClean="0">
                                         <a:latin typeface="Cambria Math" panose="02040503050406030204" pitchFamily="18" charset="0"/>
                                       </a:rPr>
                                     </m:ctrlPr>
                                   </m:sSupPr>
                                   <m:e>
                                     <m:r>
-                                      <a:rPr lang="en-US" b="0" i="1" smtClean="0">
+                                      <a:rPr lang="en-US" b="1" i="1" smtClean="0">
                                         <a:latin typeface="Cambria Math" panose="02040503050406030204" pitchFamily="18" charset="0"/>
                                       </a:rPr>
-                                      <m:t>𝑥</m:t>
+                                      <m:t>𝒙</m:t>
                                     </m:r>
                                   </m:e>
                                   <m:sup>
                                     <m:r>
-                                      <a:rPr lang="en-US" b="0" i="1" smtClean="0">
+                                      <a:rPr lang="en-US" b="1" i="1" smtClean="0">
                                         <a:latin typeface="Cambria Math" panose="02040503050406030204" pitchFamily="18" charset="0"/>
                                       </a:rPr>
                                       <m:t>+</m:t>
@@ -4167,7 +4542,7 @@
 </p:sld>
 </file>
 
-<file path=ppt/slides/slide16.xml><?xml version="1.0" encoding="utf-8"?>
+<file path=ppt/slides/slide18.xml><?xml version="1.0" encoding="utf-8"?>
 <p:sld xmlns:a="http://schemas.openxmlformats.org/drawingml/2006/main" xmlns:r="http://schemas.openxmlformats.org/officeDocument/2006/relationships" xmlns:p="http://schemas.openxmlformats.org/presentationml/2006/main">
   <p:cSld>
     <p:spTree>
@@ -4260,7 +4635,7 @@
 </p:sld>
 </file>
 
-<file path=ppt/slides/slide17.xml><?xml version="1.0" encoding="utf-8"?>
+<file path=ppt/slides/slide19.xml><?xml version="1.0" encoding="utf-8"?>
 <p:sld xmlns:a="http://schemas.openxmlformats.org/drawingml/2006/main" xmlns:r="http://schemas.openxmlformats.org/officeDocument/2006/relationships" xmlns:p="http://schemas.openxmlformats.org/presentationml/2006/main">
   <p:cSld>
     <p:spTree>
@@ -4353,7 +4728,105 @@
 </p:sld>
 </file>
 
-<file path=ppt/slides/slide18.xml><?xml version="1.0" encoding="utf-8"?>
+<file path=ppt/slides/slide2.xml><?xml version="1.0" encoding="utf-8"?>
+<p:sld xmlns:a="http://schemas.openxmlformats.org/drawingml/2006/main" xmlns:r="http://schemas.openxmlformats.org/officeDocument/2006/relationships" xmlns:p="http://schemas.openxmlformats.org/presentationml/2006/main">
+  <p:cSld>
+    <p:spTree>
+      <p:nvGrpSpPr>
+        <p:cNvPr id="1" name=""/>
+        <p:cNvGrpSpPr/>
+        <p:nvPr/>
+      </p:nvGrpSpPr>
+      <p:grpSpPr>
+        <a:xfrm>
+          <a:off x="0" y="0"/>
+          <a:ext cx="0" cy="0"/>
+          <a:chOff x="0" y="0"/>
+          <a:chExt cx="0" cy="0"/>
+        </a:xfrm>
+      </p:grpSpPr>
+      <p:sp>
+        <p:nvSpPr>
+          <p:cNvPr id="4" name="Title 3">
+            <a:extLst>
+              <a:ext uri="{FF2B5EF4-FFF2-40B4-BE49-F238E27FC236}">
+                <a16:creationId xmlns:a16="http://schemas.microsoft.com/office/drawing/2014/main" id="{824D6633-28F1-4DB1-B0D9-346036B465EE}"/>
+              </a:ext>
+            </a:extLst>
+          </p:cNvPr>
+          <p:cNvSpPr>
+            <a:spLocks noGrp="1"/>
+          </p:cNvSpPr>
+          <p:nvPr>
+            <p:ph type="title"/>
+          </p:nvPr>
+        </p:nvSpPr>
+        <p:spPr/>
+        <p:txBody>
+          <a:bodyPr/>
+          <a:lstStyle/>
+          <a:p>
+            <a:r>
+              <a:rPr lang="en-US" dirty="0"/>
+              <a:t>What led me to Bayesian Optimization?</a:t>
+            </a:r>
+          </a:p>
+        </p:txBody>
+      </p:sp>
+      <p:sp>
+        <p:nvSpPr>
+          <p:cNvPr id="5" name="Content Placeholder 4">
+            <a:extLst>
+              <a:ext uri="{FF2B5EF4-FFF2-40B4-BE49-F238E27FC236}">
+                <a16:creationId xmlns:a16="http://schemas.microsoft.com/office/drawing/2014/main" id="{66405E59-0BD8-4EE7-B41E-5C6C3FDC0709}"/>
+              </a:ext>
+            </a:extLst>
+          </p:cNvPr>
+          <p:cNvSpPr>
+            <a:spLocks noGrp="1"/>
+          </p:cNvSpPr>
+          <p:nvPr>
+            <p:ph idx="1"/>
+          </p:nvPr>
+        </p:nvSpPr>
+        <p:spPr/>
+        <p:txBody>
+          <a:bodyPr/>
+          <a:lstStyle/>
+          <a:p>
+            <a:r>
+              <a:rPr lang="en-US" dirty="0"/>
+              <a:t>Like many of you, I compete in Kaggle competitions</a:t>
+            </a:r>
+          </a:p>
+          <a:p>
+            <a:r>
+              <a:rPr lang="en-US" dirty="0"/>
+              <a:t>For whatever reason, GBMs tend to be the most popular model types</a:t>
+            </a:r>
+          </a:p>
+          <a:p>
+            <a:r>
+              <a:rPr lang="en-US" dirty="0"/>
+              <a:t>Significantly more hyperparameters to consider compared to GLMs</a:t>
+            </a:r>
+          </a:p>
+        </p:txBody>
+      </p:sp>
+    </p:spTree>
+    <p:extLst>
+      <p:ext uri="{BB962C8B-B14F-4D97-AF65-F5344CB8AC3E}">
+        <p14:creationId xmlns:p14="http://schemas.microsoft.com/office/powerpoint/2010/main" val="741182945"/>
+      </p:ext>
+    </p:extLst>
+  </p:cSld>
+  <p:clrMapOvr>
+    <a:masterClrMapping/>
+  </p:clrMapOvr>
+</p:sld>
+</file>
+
+<file path=ppt/slides/slide20.xml><?xml version="1.0" encoding="utf-8"?>
 <p:sld xmlns:a="http://schemas.openxmlformats.org/drawingml/2006/main" xmlns:r="http://schemas.openxmlformats.org/officeDocument/2006/relationships" xmlns:p="http://schemas.openxmlformats.org/presentationml/2006/main">
   <p:cSld>
     <p:spTree>
@@ -4446,7 +4919,7 @@
 </p:sld>
 </file>
 
-<file path=ppt/slides/slide19.xml><?xml version="1.0" encoding="utf-8"?>
+<file path=ppt/slides/slide21.xml><?xml version="1.0" encoding="utf-8"?>
 <p:sld xmlns:a="http://schemas.openxmlformats.org/drawingml/2006/main" xmlns:r="http://schemas.openxmlformats.org/officeDocument/2006/relationships" xmlns:p="http://schemas.openxmlformats.org/presentationml/2006/main">
   <p:cSld>
     <p:spTree>
@@ -4556,7 +5029,7 @@
           <a:p>
             <a:r>
               <a:rPr lang="en-US" dirty="0"/>
-              <a:t>Sequential</a:t>
+              <a:t>Sequential (traditionally)</a:t>
             </a:r>
           </a:p>
           <a:p>
@@ -4570,7 +5043,7 @@
             <a:pPr lvl="1"/>
             <a:r>
               <a:rPr lang="en-US" dirty="0"/>
-              <a:t>Parallel batches</a:t>
+              <a:t>Efficient sampling</a:t>
             </a:r>
           </a:p>
           <a:p>
@@ -4601,105 +5074,7 @@
 </p:sld>
 </file>
 
-<file path=ppt/slides/slide2.xml><?xml version="1.0" encoding="utf-8"?>
-<p:sld xmlns:a="http://schemas.openxmlformats.org/drawingml/2006/main" xmlns:r="http://schemas.openxmlformats.org/officeDocument/2006/relationships" xmlns:p="http://schemas.openxmlformats.org/presentationml/2006/main">
-  <p:cSld>
-    <p:spTree>
-      <p:nvGrpSpPr>
-        <p:cNvPr id="1" name=""/>
-        <p:cNvGrpSpPr/>
-        <p:nvPr/>
-      </p:nvGrpSpPr>
-      <p:grpSpPr>
-        <a:xfrm>
-          <a:off x="0" y="0"/>
-          <a:ext cx="0" cy="0"/>
-          <a:chOff x="0" y="0"/>
-          <a:chExt cx="0" cy="0"/>
-        </a:xfrm>
-      </p:grpSpPr>
-      <p:sp>
-        <p:nvSpPr>
-          <p:cNvPr id="4" name="Title 3">
-            <a:extLst>
-              <a:ext uri="{FF2B5EF4-FFF2-40B4-BE49-F238E27FC236}">
-                <a16:creationId xmlns:a16="http://schemas.microsoft.com/office/drawing/2014/main" id="{824D6633-28F1-4DB1-B0D9-346036B465EE}"/>
-              </a:ext>
-            </a:extLst>
-          </p:cNvPr>
-          <p:cNvSpPr>
-            <a:spLocks noGrp="1"/>
-          </p:cNvSpPr>
-          <p:nvPr>
-            <p:ph type="title"/>
-          </p:nvPr>
-        </p:nvSpPr>
-        <p:spPr/>
-        <p:txBody>
-          <a:bodyPr/>
-          <a:lstStyle/>
-          <a:p>
-            <a:r>
-              <a:rPr lang="en-US" dirty="0"/>
-              <a:t>What led me to Bayesian Optimization?</a:t>
-            </a:r>
-          </a:p>
-        </p:txBody>
-      </p:sp>
-      <p:sp>
-        <p:nvSpPr>
-          <p:cNvPr id="5" name="Content Placeholder 4">
-            <a:extLst>
-              <a:ext uri="{FF2B5EF4-FFF2-40B4-BE49-F238E27FC236}">
-                <a16:creationId xmlns:a16="http://schemas.microsoft.com/office/drawing/2014/main" id="{66405E59-0BD8-4EE7-B41E-5C6C3FDC0709}"/>
-              </a:ext>
-            </a:extLst>
-          </p:cNvPr>
-          <p:cNvSpPr>
-            <a:spLocks noGrp="1"/>
-          </p:cNvSpPr>
-          <p:nvPr>
-            <p:ph idx="1"/>
-          </p:nvPr>
-        </p:nvSpPr>
-        <p:spPr/>
-        <p:txBody>
-          <a:bodyPr/>
-          <a:lstStyle/>
-          <a:p>
-            <a:r>
-              <a:rPr lang="en-US" dirty="0"/>
-              <a:t>Like many of you, I compete in Kaggle competitions</a:t>
-            </a:r>
-          </a:p>
-          <a:p>
-            <a:r>
-              <a:rPr lang="en-US" dirty="0"/>
-              <a:t>For whatever reason, GBMs tend to be the most popular model types</a:t>
-            </a:r>
-          </a:p>
-          <a:p>
-            <a:r>
-              <a:rPr lang="en-US" dirty="0"/>
-              <a:t>Significantly more hyperparameters to consider compared to GLMs</a:t>
-            </a:r>
-          </a:p>
-        </p:txBody>
-      </p:sp>
-    </p:spTree>
-    <p:extLst>
-      <p:ext uri="{BB962C8B-B14F-4D97-AF65-F5344CB8AC3E}">
-        <p14:creationId xmlns:p14="http://schemas.microsoft.com/office/powerpoint/2010/main" val="741182945"/>
-      </p:ext>
-    </p:extLst>
-  </p:cSld>
-  <p:clrMapOvr>
-    <a:masterClrMapping/>
-  </p:clrMapOvr>
-</p:sld>
-</file>
-
-<file path=ppt/slides/slide20.xml><?xml version="1.0" encoding="utf-8"?>
+<file path=ppt/slides/slide22.xml><?xml version="1.0" encoding="utf-8"?>
 <p:sld xmlns:a="http://schemas.openxmlformats.org/drawingml/2006/main" xmlns:r="http://schemas.openxmlformats.org/officeDocument/2006/relationships" xmlns:p="http://schemas.openxmlformats.org/presentationml/2006/main">
   <p:cSld>
     <p:spTree>
@@ -4792,175 +5167,6 @@
 </p:sld>
 </file>
 
-<file path=ppt/slides/slide21.xml><?xml version="1.0" encoding="utf-8"?>
-<p:sld xmlns:a="http://schemas.openxmlformats.org/drawingml/2006/main" xmlns:r="http://schemas.openxmlformats.org/officeDocument/2006/relationships" xmlns:p="http://schemas.openxmlformats.org/presentationml/2006/main">
-  <p:cSld>
-    <p:spTree>
-      <p:nvGrpSpPr>
-        <p:cNvPr id="1" name=""/>
-        <p:cNvGrpSpPr/>
-        <p:nvPr/>
-      </p:nvGrpSpPr>
-      <p:grpSpPr>
-        <a:xfrm>
-          <a:off x="0" y="0"/>
-          <a:ext cx="0" cy="0"/>
-          <a:chOff x="0" y="0"/>
-          <a:chExt cx="0" cy="0"/>
-        </a:xfrm>
-      </p:grpSpPr>
-      <p:sp>
-        <p:nvSpPr>
-          <p:cNvPr id="2" name="Title 1">
-            <a:extLst>
-              <a:ext uri="{FF2B5EF4-FFF2-40B4-BE49-F238E27FC236}">
-                <a16:creationId xmlns:a16="http://schemas.microsoft.com/office/drawing/2014/main" id="{9592584F-B7D5-4727-97B4-4243AD36D413}"/>
-              </a:ext>
-            </a:extLst>
-          </p:cNvPr>
-          <p:cNvSpPr>
-            <a:spLocks noGrp="1"/>
-          </p:cNvSpPr>
-          <p:nvPr>
-            <p:ph type="title"/>
-          </p:nvPr>
-        </p:nvSpPr>
-        <p:spPr/>
-        <p:txBody>
-          <a:bodyPr/>
-          <a:lstStyle/>
-          <a:p>
-            <a:r>
-              <a:rPr lang="en-US" dirty="0"/>
-              <a:t>Target Scaling</a:t>
-            </a:r>
-          </a:p>
-        </p:txBody>
-      </p:sp>
-      <p:sp>
-        <p:nvSpPr>
-          <p:cNvPr id="3" name="Content Placeholder 2">
-            <a:extLst>
-              <a:ext uri="{FF2B5EF4-FFF2-40B4-BE49-F238E27FC236}">
-                <a16:creationId xmlns:a16="http://schemas.microsoft.com/office/drawing/2014/main" id="{26B72A78-823A-468F-807B-8C293B2D825E}"/>
-              </a:ext>
-            </a:extLst>
-          </p:cNvPr>
-          <p:cNvSpPr>
-            <a:spLocks noGrp="1"/>
-          </p:cNvSpPr>
-          <p:nvPr>
-            <p:ph idx="1"/>
-          </p:nvPr>
-        </p:nvSpPr>
-        <p:spPr/>
-        <p:txBody>
-          <a:bodyPr/>
-          <a:lstStyle/>
-          <a:p>
-            <a:endParaRPr lang="en-US"/>
-          </a:p>
-        </p:txBody>
-      </p:sp>
-    </p:spTree>
-    <p:extLst>
-      <p:ext uri="{BB962C8B-B14F-4D97-AF65-F5344CB8AC3E}">
-        <p14:creationId xmlns:p14="http://schemas.microsoft.com/office/powerpoint/2010/main" val="2556837754"/>
-      </p:ext>
-    </p:extLst>
-  </p:cSld>
-  <p:clrMapOvr>
-    <a:masterClrMapping/>
-  </p:clrMapOvr>
-</p:sld>
-</file>
-
-<file path=ppt/slides/slide22.xml><?xml version="1.0" encoding="utf-8"?>
-<p:sld xmlns:a="http://schemas.openxmlformats.org/drawingml/2006/main" xmlns:r="http://schemas.openxmlformats.org/officeDocument/2006/relationships" xmlns:p="http://schemas.openxmlformats.org/presentationml/2006/main">
-  <p:cSld>
-    <p:spTree>
-      <p:nvGrpSpPr>
-        <p:cNvPr id="1" name=""/>
-        <p:cNvGrpSpPr/>
-        <p:nvPr/>
-      </p:nvGrpSpPr>
-      <p:grpSpPr>
-        <a:xfrm>
-          <a:off x="0" y="0"/>
-          <a:ext cx="0" cy="0"/>
-          <a:chOff x="0" y="0"/>
-          <a:chExt cx="0" cy="0"/>
-        </a:xfrm>
-      </p:grpSpPr>
-      <p:sp>
-        <p:nvSpPr>
-          <p:cNvPr id="2" name="Title 1">
-            <a:extLst>
-              <a:ext uri="{FF2B5EF4-FFF2-40B4-BE49-F238E27FC236}">
-                <a16:creationId xmlns:a16="http://schemas.microsoft.com/office/drawing/2014/main" id="{0D102CFF-D46C-4B8C-80FA-E02FF3694FE9}"/>
-              </a:ext>
-            </a:extLst>
-          </p:cNvPr>
-          <p:cNvSpPr>
-            <a:spLocks noGrp="1"/>
-          </p:cNvSpPr>
-          <p:nvPr>
-            <p:ph type="title"/>
-          </p:nvPr>
-        </p:nvSpPr>
-        <p:spPr/>
-        <p:txBody>
-          <a:bodyPr/>
-          <a:lstStyle/>
-          <a:p>
-            <a:r>
-              <a:rPr lang="en-US" dirty="0"/>
-              <a:t>Modified utility functions</a:t>
-            </a:r>
-          </a:p>
-        </p:txBody>
-      </p:sp>
-      <p:sp>
-        <p:nvSpPr>
-          <p:cNvPr id="3" name="Content Placeholder 2">
-            <a:extLst>
-              <a:ext uri="{FF2B5EF4-FFF2-40B4-BE49-F238E27FC236}">
-                <a16:creationId xmlns:a16="http://schemas.microsoft.com/office/drawing/2014/main" id="{652A0362-F582-4AF7-84C6-52FFF2FEB8DF}"/>
-              </a:ext>
-            </a:extLst>
-          </p:cNvPr>
-          <p:cNvSpPr>
-            <a:spLocks noGrp="1"/>
-          </p:cNvSpPr>
-          <p:nvPr>
-            <p:ph idx="1"/>
-          </p:nvPr>
-        </p:nvSpPr>
-        <p:spPr/>
-        <p:txBody>
-          <a:bodyPr/>
-          <a:lstStyle/>
-          <a:p>
-            <a:r>
-              <a:rPr lang="en-US" dirty="0"/>
-              <a:t>Wrapper function for score to encompass additional constraints</a:t>
-            </a:r>
-          </a:p>
-        </p:txBody>
-      </p:sp>
-    </p:spTree>
-    <p:extLst>
-      <p:ext uri="{BB962C8B-B14F-4D97-AF65-F5344CB8AC3E}">
-        <p14:creationId xmlns:p14="http://schemas.microsoft.com/office/powerpoint/2010/main" val="3224000482"/>
-      </p:ext>
-    </p:extLst>
-  </p:cSld>
-  <p:clrMapOvr>
-    <a:masterClrMapping/>
-  </p:clrMapOvr>
-</p:sld>
-</file>
-
 <file path=ppt/slides/slide23.xml><?xml version="1.0" encoding="utf-8"?>
 <p:sld xmlns:a="http://schemas.openxmlformats.org/drawingml/2006/main" xmlns:r="http://schemas.openxmlformats.org/officeDocument/2006/relationships" xmlns:p="http://schemas.openxmlformats.org/presentationml/2006/main">
   <p:cSld>
@@ -4983,7 +5189,7 @@
           <p:cNvPr id="2" name="Title 1">
             <a:extLst>
               <a:ext uri="{FF2B5EF4-FFF2-40B4-BE49-F238E27FC236}">
-                <a16:creationId xmlns:a16="http://schemas.microsoft.com/office/drawing/2014/main" id="{A550F962-D459-44E4-B5A2-EE2FB451235C}"/>
+                <a16:creationId xmlns:a16="http://schemas.microsoft.com/office/drawing/2014/main" id="{51968D0D-4E70-4927-895B-C2DAF0D03B3C}"/>
               </a:ext>
             </a:extLst>
           </p:cNvPr>
@@ -5001,7 +5207,7 @@
           <a:p>
             <a:r>
               <a:rPr lang="en-US" dirty="0"/>
-              <a:t>Recap</a:t>
+              <a:t>Efficient Sampling</a:t>
             </a:r>
           </a:p>
         </p:txBody>
@@ -5011,7 +5217,7 @@
           <p:cNvPr id="3" name="Content Placeholder 2">
             <a:extLst>
               <a:ext uri="{FF2B5EF4-FFF2-40B4-BE49-F238E27FC236}">
-                <a16:creationId xmlns:a16="http://schemas.microsoft.com/office/drawing/2014/main" id="{E99873E6-BB1E-4AFF-89C5-F6497F044E44}"/>
+                <a16:creationId xmlns:a16="http://schemas.microsoft.com/office/drawing/2014/main" id="{5BD68C22-53FA-4C7D-9E99-7300D121CA08}"/>
               </a:ext>
             </a:extLst>
           </p:cNvPr>
@@ -5029,7 +5235,28 @@
           <a:p>
             <a:r>
               <a:rPr lang="en-US" dirty="0"/>
-              <a:t>Knobs</a:t>
+              <a:t>Batched parallel sampling</a:t>
+            </a:r>
+          </a:p>
+          <a:p>
+            <a:pPr lvl="1"/>
+            <a:r>
+              <a:rPr lang="en-US" dirty="0"/>
+              <a:t>Cost/benefit analysis</a:t>
+            </a:r>
+          </a:p>
+          <a:p>
+            <a:pPr lvl="1"/>
+            <a:r>
+              <a:rPr lang="en-US" dirty="0"/>
+              <a:t>Utility function type</a:t>
+            </a:r>
+          </a:p>
+          <a:p>
+            <a:pPr lvl="1"/>
+            <a:r>
+              <a:rPr lang="en-US" dirty="0"/>
+              <a:t>Utility function parameters</a:t>
             </a:r>
           </a:p>
         </p:txBody>
@@ -5037,7 +5264,783 @@
     </p:spTree>
     <p:extLst>
       <p:ext uri="{BB962C8B-B14F-4D97-AF65-F5344CB8AC3E}">
-        <p14:creationId xmlns:p14="http://schemas.microsoft.com/office/powerpoint/2010/main" val="3097375391"/>
+        <p14:creationId xmlns:p14="http://schemas.microsoft.com/office/powerpoint/2010/main" val="1258991738"/>
+      </p:ext>
+    </p:extLst>
+  </p:cSld>
+  <p:clrMapOvr>
+    <a:masterClrMapping/>
+  </p:clrMapOvr>
+</p:sld>
+</file>
+
+<file path=ppt/slides/slide24.xml><?xml version="1.0" encoding="utf-8"?>
+<p:sld xmlns:a="http://schemas.openxmlformats.org/drawingml/2006/main" xmlns:r="http://schemas.openxmlformats.org/officeDocument/2006/relationships" xmlns:p="http://schemas.openxmlformats.org/presentationml/2006/main">
+  <p:cSld>
+    <p:spTree>
+      <p:nvGrpSpPr>
+        <p:cNvPr id="1" name=""/>
+        <p:cNvGrpSpPr/>
+        <p:nvPr/>
+      </p:nvGrpSpPr>
+      <p:grpSpPr>
+        <a:xfrm>
+          <a:off x="0" y="0"/>
+          <a:ext cx="0" cy="0"/>
+          <a:chOff x="0" y="0"/>
+          <a:chExt cx="0" cy="0"/>
+        </a:xfrm>
+      </p:grpSpPr>
+      <p:sp>
+        <p:nvSpPr>
+          <p:cNvPr id="2" name="Title 1">
+            <a:extLst>
+              <a:ext uri="{FF2B5EF4-FFF2-40B4-BE49-F238E27FC236}">
+                <a16:creationId xmlns:a16="http://schemas.microsoft.com/office/drawing/2014/main" id="{9592584F-B7D5-4727-97B4-4243AD36D413}"/>
+              </a:ext>
+            </a:extLst>
+          </p:cNvPr>
+          <p:cNvSpPr>
+            <a:spLocks noGrp="1"/>
+          </p:cNvSpPr>
+          <p:nvPr>
+            <p:ph type="title"/>
+          </p:nvPr>
+        </p:nvSpPr>
+        <p:spPr/>
+        <p:txBody>
+          <a:bodyPr/>
+          <a:lstStyle/>
+          <a:p>
+            <a:r>
+              <a:rPr lang="en-US" dirty="0"/>
+              <a:t>Scaling issues</a:t>
+            </a:r>
+          </a:p>
+        </p:txBody>
+      </p:sp>
+      <p:sp>
+        <p:nvSpPr>
+          <p:cNvPr id="3" name="Content Placeholder 2">
+            <a:extLst>
+              <a:ext uri="{FF2B5EF4-FFF2-40B4-BE49-F238E27FC236}">
+                <a16:creationId xmlns:a16="http://schemas.microsoft.com/office/drawing/2014/main" id="{26B72A78-823A-468F-807B-8C293B2D825E}"/>
+              </a:ext>
+            </a:extLst>
+          </p:cNvPr>
+          <p:cNvSpPr>
+            <a:spLocks noGrp="1"/>
+          </p:cNvSpPr>
+          <p:nvPr>
+            <p:ph idx="1"/>
+          </p:nvPr>
+        </p:nvSpPr>
+        <p:spPr/>
+        <p:txBody>
+          <a:bodyPr/>
+          <a:lstStyle/>
+          <a:p>
+            <a:r>
+              <a:rPr lang="en-US" dirty="0"/>
+              <a:t>Large variances in target values greatly affect standard deviation estimates</a:t>
+            </a:r>
+          </a:p>
+        </p:txBody>
+      </p:sp>
+      <p:grpSp>
+        <p:nvGrpSpPr>
+          <p:cNvPr id="8" name="Group 7">
+            <a:extLst>
+              <a:ext uri="{FF2B5EF4-FFF2-40B4-BE49-F238E27FC236}">
+                <a16:creationId xmlns:a16="http://schemas.microsoft.com/office/drawing/2014/main" id="{AB9E7961-10C5-40E0-802A-F3E8BF7FFDA1}"/>
+              </a:ext>
+            </a:extLst>
+          </p:cNvPr>
+          <p:cNvGrpSpPr/>
+          <p:nvPr/>
+        </p:nvGrpSpPr>
+        <p:grpSpPr>
+          <a:xfrm>
+            <a:off x="675409" y="3228426"/>
+            <a:ext cx="7793182" cy="2743200"/>
+            <a:chOff x="-522017" y="2725086"/>
+            <a:chExt cx="7793182" cy="2743200"/>
+          </a:xfrm>
+        </p:grpSpPr>
+        <p:pic>
+          <p:nvPicPr>
+            <p:cNvPr id="5" name="Picture 4">
+              <a:extLst>
+                <a:ext uri="{FF2B5EF4-FFF2-40B4-BE49-F238E27FC236}">
+                  <a16:creationId xmlns:a16="http://schemas.microsoft.com/office/drawing/2014/main" id="{F2722D7E-9EA2-4EAA-8D56-C1B9AA13A78D}"/>
+                </a:ext>
+              </a:extLst>
+            </p:cNvPr>
+            <p:cNvPicPr>
+              <a:picLocks noChangeAspect="1"/>
+            </p:cNvPicPr>
+            <p:nvPr/>
+          </p:nvPicPr>
+          <p:blipFill>
+            <a:blip r:embed="rId2">
+              <a:extLst>
+                <a:ext uri="{28A0092B-C50C-407E-A947-70E740481C1C}">
+                  <a14:useLocalDpi xmlns:a14="http://schemas.microsoft.com/office/drawing/2010/main" val="0"/>
+                </a:ext>
+              </a:extLst>
+            </a:blip>
+            <a:stretch>
+              <a:fillRect/>
+            </a:stretch>
+          </p:blipFill>
+          <p:spPr>
+            <a:xfrm>
+              <a:off x="3336474" y="2725086"/>
+              <a:ext cx="3934691" cy="2743200"/>
+            </a:xfrm>
+            <a:prstGeom prst="rect">
+              <a:avLst/>
+            </a:prstGeom>
+          </p:spPr>
+        </p:pic>
+        <p:pic>
+          <p:nvPicPr>
+            <p:cNvPr id="7" name="Picture 6">
+              <a:extLst>
+                <a:ext uri="{FF2B5EF4-FFF2-40B4-BE49-F238E27FC236}">
+                  <a16:creationId xmlns:a16="http://schemas.microsoft.com/office/drawing/2014/main" id="{4A707AC4-CFF5-451B-A344-43A3E8FC1C87}"/>
+                </a:ext>
+              </a:extLst>
+            </p:cNvPr>
+            <p:cNvPicPr>
+              <a:picLocks noChangeAspect="1"/>
+            </p:cNvPicPr>
+            <p:nvPr/>
+          </p:nvPicPr>
+          <p:blipFill>
+            <a:blip r:embed="rId3">
+              <a:extLst>
+                <a:ext uri="{28A0092B-C50C-407E-A947-70E740481C1C}">
+                  <a14:useLocalDpi xmlns:a14="http://schemas.microsoft.com/office/drawing/2010/main" val="0"/>
+                </a:ext>
+              </a:extLst>
+            </a:blip>
+            <a:stretch>
+              <a:fillRect/>
+            </a:stretch>
+          </p:blipFill>
+          <p:spPr>
+            <a:xfrm>
+              <a:off x="-522017" y="2725086"/>
+              <a:ext cx="3858491" cy="2743200"/>
+            </a:xfrm>
+            <a:prstGeom prst="rect">
+              <a:avLst/>
+            </a:prstGeom>
+          </p:spPr>
+        </p:pic>
+      </p:grpSp>
+    </p:spTree>
+    <p:extLst>
+      <p:ext uri="{BB962C8B-B14F-4D97-AF65-F5344CB8AC3E}">
+        <p14:creationId xmlns:p14="http://schemas.microsoft.com/office/powerpoint/2010/main" val="2556837754"/>
+      </p:ext>
+    </p:extLst>
+  </p:cSld>
+  <p:clrMapOvr>
+    <a:masterClrMapping/>
+  </p:clrMapOvr>
+</p:sld>
+</file>
+
+<file path=ppt/slides/slide25.xml><?xml version="1.0" encoding="utf-8"?>
+<p:sld xmlns:a="http://schemas.openxmlformats.org/drawingml/2006/main" xmlns:r="http://schemas.openxmlformats.org/officeDocument/2006/relationships" xmlns:p="http://schemas.openxmlformats.org/presentationml/2006/main">
+  <p:cSld>
+    <p:spTree>
+      <p:nvGrpSpPr>
+        <p:cNvPr id="1" name=""/>
+        <p:cNvGrpSpPr/>
+        <p:nvPr/>
+      </p:nvGrpSpPr>
+      <p:grpSpPr>
+        <a:xfrm>
+          <a:off x="0" y="0"/>
+          <a:ext cx="0" cy="0"/>
+          <a:chOff x="0" y="0"/>
+          <a:chExt cx="0" cy="0"/>
+        </a:xfrm>
+      </p:grpSpPr>
+      <p:sp>
+        <p:nvSpPr>
+          <p:cNvPr id="2" name="Title 1">
+            <a:extLst>
+              <a:ext uri="{FF2B5EF4-FFF2-40B4-BE49-F238E27FC236}">
+                <a16:creationId xmlns:a16="http://schemas.microsoft.com/office/drawing/2014/main" id="{9592584F-B7D5-4727-97B4-4243AD36D413}"/>
+              </a:ext>
+            </a:extLst>
+          </p:cNvPr>
+          <p:cNvSpPr>
+            <a:spLocks noGrp="1"/>
+          </p:cNvSpPr>
+          <p:nvPr>
+            <p:ph type="title"/>
+          </p:nvPr>
+        </p:nvSpPr>
+        <p:spPr/>
+        <p:txBody>
+          <a:bodyPr/>
+          <a:lstStyle/>
+          <a:p>
+            <a:r>
+              <a:rPr lang="en-US" dirty="0"/>
+              <a:t>Scaling Issues</a:t>
+            </a:r>
+          </a:p>
+        </p:txBody>
+      </p:sp>
+      <p:sp>
+        <p:nvSpPr>
+          <p:cNvPr id="3" name="Content Placeholder 2">
+            <a:extLst>
+              <a:ext uri="{FF2B5EF4-FFF2-40B4-BE49-F238E27FC236}">
+                <a16:creationId xmlns:a16="http://schemas.microsoft.com/office/drawing/2014/main" id="{26B72A78-823A-468F-807B-8C293B2D825E}"/>
+              </a:ext>
+            </a:extLst>
+          </p:cNvPr>
+          <p:cNvSpPr>
+            <a:spLocks noGrp="1"/>
+          </p:cNvSpPr>
+          <p:nvPr>
+            <p:ph idx="1"/>
+          </p:nvPr>
+        </p:nvSpPr>
+        <p:spPr/>
+        <p:txBody>
+          <a:bodyPr anchor="ctr"/>
+          <a:lstStyle/>
+          <a:p>
+            <a:pPr marL="0" indent="0" algn="ctr">
+              <a:buNone/>
+            </a:pPr>
+            <a:r>
+              <a:rPr lang="en-US" dirty="0" err="1"/>
+              <a:t>gp_scaling.ipynb</a:t>
+            </a:r>
+            <a:endParaRPr lang="en-US" dirty="0"/>
+          </a:p>
+        </p:txBody>
+      </p:sp>
+    </p:spTree>
+    <p:extLst>
+      <p:ext uri="{BB962C8B-B14F-4D97-AF65-F5344CB8AC3E}">
+        <p14:creationId xmlns:p14="http://schemas.microsoft.com/office/powerpoint/2010/main" val="1246883091"/>
+      </p:ext>
+    </p:extLst>
+  </p:cSld>
+  <p:clrMapOvr>
+    <a:masterClrMapping/>
+  </p:clrMapOvr>
+</p:sld>
+</file>
+
+<file path=ppt/slides/slide26.xml><?xml version="1.0" encoding="utf-8"?>
+<p:sld xmlns:a="http://schemas.openxmlformats.org/drawingml/2006/main" xmlns:r="http://schemas.openxmlformats.org/officeDocument/2006/relationships" xmlns:p="http://schemas.openxmlformats.org/presentationml/2006/main">
+  <p:cSld>
+    <p:spTree>
+      <p:nvGrpSpPr>
+        <p:cNvPr id="1" name=""/>
+        <p:cNvGrpSpPr/>
+        <p:nvPr/>
+      </p:nvGrpSpPr>
+      <p:grpSpPr>
+        <a:xfrm>
+          <a:off x="0" y="0"/>
+          <a:ext cx="0" cy="0"/>
+          <a:chOff x="0" y="0"/>
+          <a:chExt cx="0" cy="0"/>
+        </a:xfrm>
+      </p:grpSpPr>
+      <p:sp>
+        <p:nvSpPr>
+          <p:cNvPr id="2" name="Title 1">
+            <a:extLst>
+              <a:ext uri="{FF2B5EF4-FFF2-40B4-BE49-F238E27FC236}">
+                <a16:creationId xmlns:a16="http://schemas.microsoft.com/office/drawing/2014/main" id="{0D102CFF-D46C-4B8C-80FA-E02FF3694FE9}"/>
+              </a:ext>
+            </a:extLst>
+          </p:cNvPr>
+          <p:cNvSpPr>
+            <a:spLocks noGrp="1"/>
+          </p:cNvSpPr>
+          <p:nvPr>
+            <p:ph type="title"/>
+          </p:nvPr>
+        </p:nvSpPr>
+        <p:spPr/>
+        <p:txBody>
+          <a:bodyPr/>
+          <a:lstStyle/>
+          <a:p>
+            <a:r>
+              <a:rPr lang="en-US" dirty="0"/>
+              <a:t>Modified Target Functions</a:t>
+            </a:r>
+          </a:p>
+        </p:txBody>
+      </p:sp>
+      <p:sp>
+        <p:nvSpPr>
+          <p:cNvPr id="3" name="Content Placeholder 2">
+            <a:extLst>
+              <a:ext uri="{FF2B5EF4-FFF2-40B4-BE49-F238E27FC236}">
+                <a16:creationId xmlns:a16="http://schemas.microsoft.com/office/drawing/2014/main" id="{652A0362-F582-4AF7-84C6-52FFF2FEB8DF}"/>
+              </a:ext>
+            </a:extLst>
+          </p:cNvPr>
+          <p:cNvSpPr>
+            <a:spLocks noGrp="1"/>
+          </p:cNvSpPr>
+          <p:nvPr>
+            <p:ph idx="1"/>
+          </p:nvPr>
+        </p:nvSpPr>
+        <p:spPr/>
+        <p:txBody>
+          <a:bodyPr/>
+          <a:lstStyle/>
+          <a:p>
+            <a:r>
+              <a:rPr lang="en-US" dirty="0"/>
+              <a:t>Add additional constraints to the scoring method (target)</a:t>
+            </a:r>
+          </a:p>
+          <a:p>
+            <a:r>
+              <a:rPr lang="en-US" dirty="0" err="1"/>
+              <a:t>Mercari</a:t>
+            </a:r>
+            <a:r>
+              <a:rPr lang="en-US" dirty="0"/>
+              <a:t> challenge limitation</a:t>
+            </a:r>
+          </a:p>
+          <a:p>
+            <a:pPr lvl="1"/>
+            <a:r>
+              <a:rPr lang="en-US" dirty="0"/>
+              <a:t>All training must be completed within a Kaggle kernel</a:t>
+            </a:r>
+          </a:p>
+        </p:txBody>
+      </p:sp>
+      <p:pic>
+        <p:nvPicPr>
+          <p:cNvPr id="5" name="Picture 4">
+            <a:extLst>
+              <a:ext uri="{FF2B5EF4-FFF2-40B4-BE49-F238E27FC236}">
+                <a16:creationId xmlns:a16="http://schemas.microsoft.com/office/drawing/2014/main" id="{F34AE72D-37C9-4A4A-97BF-3678E40B1E56}"/>
+              </a:ext>
+            </a:extLst>
+          </p:cNvPr>
+          <p:cNvPicPr>
+            <a:picLocks noChangeAspect="1"/>
+          </p:cNvPicPr>
+          <p:nvPr/>
+        </p:nvPicPr>
+        <p:blipFill>
+          <a:blip r:embed="rId2">
+            <a:extLst>
+              <a:ext uri="{28A0092B-C50C-407E-A947-70E740481C1C}">
+                <a14:useLocalDpi xmlns:a14="http://schemas.microsoft.com/office/drawing/2010/main" val="0"/>
+              </a:ext>
+            </a:extLst>
+          </a:blip>
+          <a:stretch>
+            <a:fillRect/>
+          </a:stretch>
+        </p:blipFill>
+        <p:spPr>
+          <a:xfrm>
+            <a:off x="1309232" y="3863632"/>
+            <a:ext cx="6525536" cy="2448267"/>
+          </a:xfrm>
+          <a:prstGeom prst="rect">
+            <a:avLst/>
+          </a:prstGeom>
+        </p:spPr>
+      </p:pic>
+    </p:spTree>
+    <p:extLst>
+      <p:ext uri="{BB962C8B-B14F-4D97-AF65-F5344CB8AC3E}">
+        <p14:creationId xmlns:p14="http://schemas.microsoft.com/office/powerpoint/2010/main" val="3224000482"/>
+      </p:ext>
+    </p:extLst>
+  </p:cSld>
+  <p:clrMapOvr>
+    <a:masterClrMapping/>
+  </p:clrMapOvr>
+</p:sld>
+</file>
+
+<file path=ppt/slides/slide27.xml><?xml version="1.0" encoding="utf-8"?>
+<p:sld xmlns:a="http://schemas.openxmlformats.org/drawingml/2006/main" xmlns:r="http://schemas.openxmlformats.org/officeDocument/2006/relationships" xmlns:p="http://schemas.openxmlformats.org/presentationml/2006/main">
+  <p:cSld>
+    <p:spTree>
+      <p:nvGrpSpPr>
+        <p:cNvPr id="1" name=""/>
+        <p:cNvGrpSpPr/>
+        <p:nvPr/>
+      </p:nvGrpSpPr>
+      <p:grpSpPr>
+        <a:xfrm>
+          <a:off x="0" y="0"/>
+          <a:ext cx="0" cy="0"/>
+          <a:chOff x="0" y="0"/>
+          <a:chExt cx="0" cy="0"/>
+        </a:xfrm>
+      </p:grpSpPr>
+      <p:sp>
+        <p:nvSpPr>
+          <p:cNvPr id="4" name="Title 3">
+            <a:extLst>
+              <a:ext uri="{FF2B5EF4-FFF2-40B4-BE49-F238E27FC236}">
+                <a16:creationId xmlns:a16="http://schemas.microsoft.com/office/drawing/2014/main" id="{C28DE33C-C105-4E28-9734-994F77A3627B}"/>
+              </a:ext>
+            </a:extLst>
+          </p:cNvPr>
+          <p:cNvSpPr>
+            <a:spLocks noGrp="1"/>
+          </p:cNvSpPr>
+          <p:nvPr>
+            <p:ph type="title"/>
+          </p:nvPr>
+        </p:nvSpPr>
+        <p:spPr/>
+        <p:txBody>
+          <a:bodyPr/>
+          <a:lstStyle/>
+          <a:p>
+            <a:r>
+              <a:rPr lang="en-US" dirty="0"/>
+              <a:t>Questions?</a:t>
+            </a:r>
+          </a:p>
+        </p:txBody>
+      </p:sp>
+      <p:sp>
+        <p:nvSpPr>
+          <p:cNvPr id="5" name="Text Placeholder 4">
+            <a:extLst>
+              <a:ext uri="{FF2B5EF4-FFF2-40B4-BE49-F238E27FC236}">
+                <a16:creationId xmlns:a16="http://schemas.microsoft.com/office/drawing/2014/main" id="{F8B6EB62-247F-442B-B627-1B6A8D03FAC1}"/>
+              </a:ext>
+            </a:extLst>
+          </p:cNvPr>
+          <p:cNvSpPr>
+            <a:spLocks noGrp="1"/>
+          </p:cNvSpPr>
+          <p:nvPr>
+            <p:ph type="body" idx="1"/>
+          </p:nvPr>
+        </p:nvSpPr>
+        <p:spPr/>
+        <p:txBody>
+          <a:bodyPr/>
+          <a:lstStyle/>
+          <a:p>
+            <a:r>
+              <a:rPr lang="en-US" dirty="0"/>
+              <a:t>Jason King</a:t>
+            </a:r>
+          </a:p>
+          <a:p>
+            <a:r>
+              <a:rPr lang="en-US" dirty="0"/>
+              <a:t>jkkphys@gmail.com</a:t>
+            </a:r>
+          </a:p>
+        </p:txBody>
+      </p:sp>
+      <p:grpSp>
+        <p:nvGrpSpPr>
+          <p:cNvPr id="10" name="Group 9">
+            <a:extLst>
+              <a:ext uri="{FF2B5EF4-FFF2-40B4-BE49-F238E27FC236}">
+                <a16:creationId xmlns:a16="http://schemas.microsoft.com/office/drawing/2014/main" id="{F6D371F2-301C-46A7-8A49-B370486F0C14}"/>
+              </a:ext>
+            </a:extLst>
+          </p:cNvPr>
+          <p:cNvGrpSpPr/>
+          <p:nvPr/>
+        </p:nvGrpSpPr>
+        <p:grpSpPr>
+          <a:xfrm>
+            <a:off x="1847435" y="1204345"/>
+            <a:ext cx="5449130" cy="1905000"/>
+            <a:chOff x="1804988" y="1204345"/>
+            <a:chExt cx="5449130" cy="1905000"/>
+          </a:xfrm>
+        </p:grpSpPr>
+        <p:pic>
+          <p:nvPicPr>
+            <p:cNvPr id="7" name="Picture 6">
+              <a:extLst>
+                <a:ext uri="{FF2B5EF4-FFF2-40B4-BE49-F238E27FC236}">
+                  <a16:creationId xmlns:a16="http://schemas.microsoft.com/office/drawing/2014/main" id="{772F0CB8-EEA0-40A5-9034-BF3023CB4BC9}"/>
+                </a:ext>
+              </a:extLst>
+            </p:cNvPr>
+            <p:cNvPicPr>
+              <a:picLocks noChangeAspect="1"/>
+            </p:cNvPicPr>
+            <p:nvPr/>
+          </p:nvPicPr>
+          <p:blipFill>
+            <a:blip r:embed="rId2">
+              <a:extLst>
+                <a:ext uri="{28A0092B-C50C-407E-A947-70E740481C1C}">
+                  <a14:useLocalDpi xmlns:a14="http://schemas.microsoft.com/office/drawing/2010/main" val="0"/>
+                </a:ext>
+              </a:extLst>
+            </a:blip>
+            <a:stretch>
+              <a:fillRect/>
+            </a:stretch>
+          </p:blipFill>
+          <p:spPr>
+            <a:xfrm>
+              <a:off x="1804988" y="1337695"/>
+              <a:ext cx="2762250" cy="1638300"/>
+            </a:xfrm>
+            <a:prstGeom prst="rect">
+              <a:avLst/>
+            </a:prstGeom>
+          </p:spPr>
+        </p:pic>
+        <p:pic>
+          <p:nvPicPr>
+            <p:cNvPr id="9" name="Picture 8">
+              <a:extLst>
+                <a:ext uri="{FF2B5EF4-FFF2-40B4-BE49-F238E27FC236}">
+                  <a16:creationId xmlns:a16="http://schemas.microsoft.com/office/drawing/2014/main" id="{5CF73DFE-D06F-404D-9589-23DD36ED56B2}"/>
+                </a:ext>
+              </a:extLst>
+            </p:cNvPr>
+            <p:cNvPicPr>
+              <a:picLocks noChangeAspect="1"/>
+            </p:cNvPicPr>
+            <p:nvPr/>
+          </p:nvPicPr>
+          <p:blipFill>
+            <a:blip r:embed="rId3">
+              <a:extLst>
+                <a:ext uri="{28A0092B-C50C-407E-A947-70E740481C1C}">
+                  <a14:useLocalDpi xmlns:a14="http://schemas.microsoft.com/office/drawing/2010/main" val="0"/>
+                </a:ext>
+              </a:extLst>
+            </a:blip>
+            <a:stretch>
+              <a:fillRect/>
+            </a:stretch>
+          </p:blipFill>
+          <p:spPr>
+            <a:xfrm>
+              <a:off x="5349118" y="1204345"/>
+              <a:ext cx="1905000" cy="1905000"/>
+            </a:xfrm>
+            <a:prstGeom prst="rect">
+              <a:avLst/>
+            </a:prstGeom>
+          </p:spPr>
+        </p:pic>
+      </p:grpSp>
+    </p:spTree>
+    <p:extLst>
+      <p:ext uri="{BB962C8B-B14F-4D97-AF65-F5344CB8AC3E}">
+        <p14:creationId xmlns:p14="http://schemas.microsoft.com/office/powerpoint/2010/main" val="1919098301"/>
+      </p:ext>
+    </p:extLst>
+  </p:cSld>
+  <p:clrMapOvr>
+    <a:masterClrMapping/>
+  </p:clrMapOvr>
+</p:sld>
+</file>
+
+<file path=ppt/slides/slide28.xml><?xml version="1.0" encoding="utf-8"?>
+<p:sld xmlns:a="http://schemas.openxmlformats.org/drawingml/2006/main" xmlns:r="http://schemas.openxmlformats.org/officeDocument/2006/relationships" xmlns:p="http://schemas.openxmlformats.org/presentationml/2006/main">
+  <p:cSld>
+    <p:spTree>
+      <p:nvGrpSpPr>
+        <p:cNvPr id="1" name=""/>
+        <p:cNvGrpSpPr/>
+        <p:nvPr/>
+      </p:nvGrpSpPr>
+      <p:grpSpPr>
+        <a:xfrm>
+          <a:off x="0" y="0"/>
+          <a:ext cx="0" cy="0"/>
+          <a:chOff x="0" y="0"/>
+          <a:chExt cx="0" cy="0"/>
+        </a:xfrm>
+      </p:grpSpPr>
+      <p:sp>
+        <p:nvSpPr>
+          <p:cNvPr id="5" name="Title 4">
+            <a:extLst>
+              <a:ext uri="{FF2B5EF4-FFF2-40B4-BE49-F238E27FC236}">
+                <a16:creationId xmlns:a16="http://schemas.microsoft.com/office/drawing/2014/main" id="{B49DCFCA-05AD-46F2-9511-D98BB7692DC2}"/>
+              </a:ext>
+            </a:extLst>
+          </p:cNvPr>
+          <p:cNvSpPr>
+            <a:spLocks noGrp="1"/>
+          </p:cNvSpPr>
+          <p:nvPr>
+            <p:ph type="title"/>
+          </p:nvPr>
+        </p:nvSpPr>
+        <p:spPr/>
+        <p:txBody>
+          <a:bodyPr/>
+          <a:lstStyle/>
+          <a:p>
+            <a:r>
+              <a:rPr lang="en-US" dirty="0"/>
+              <a:t>Resources</a:t>
+            </a:r>
+          </a:p>
+        </p:txBody>
+      </p:sp>
+      <p:sp>
+        <p:nvSpPr>
+          <p:cNvPr id="6" name="Content Placeholder 5">
+            <a:extLst>
+              <a:ext uri="{FF2B5EF4-FFF2-40B4-BE49-F238E27FC236}">
+                <a16:creationId xmlns:a16="http://schemas.microsoft.com/office/drawing/2014/main" id="{A56A40AB-2F81-4F4B-9834-6D5177D13CA3}"/>
+              </a:ext>
+            </a:extLst>
+          </p:cNvPr>
+          <p:cNvSpPr>
+            <a:spLocks noGrp="1"/>
+          </p:cNvSpPr>
+          <p:nvPr>
+            <p:ph idx="1"/>
+          </p:nvPr>
+        </p:nvSpPr>
+        <p:spPr/>
+        <p:txBody>
+          <a:bodyPr>
+            <a:normAutofit lnSpcReduction="10000"/>
+          </a:bodyPr>
+          <a:lstStyle/>
+          <a:p>
+            <a:r>
+              <a:rPr lang="en-US" dirty="0"/>
+              <a:t>Machine Learning: Nando de Freitas @ UBC</a:t>
+            </a:r>
+          </a:p>
+          <a:p>
+            <a:pPr lvl="1"/>
+            <a:r>
+              <a:rPr lang="en-US" dirty="0">
+                <a:hlinkClick r:id="rId2"/>
+              </a:rPr>
+              <a:t>Introduction to Gaussian processes</a:t>
+            </a:r>
+            <a:endParaRPr lang="en-US" dirty="0"/>
+          </a:p>
+          <a:p>
+            <a:pPr lvl="1"/>
+            <a:r>
+              <a:rPr lang="en-US" dirty="0">
+                <a:hlinkClick r:id="rId3"/>
+              </a:rPr>
+              <a:t>Regression with Gaussian processes</a:t>
+            </a:r>
+            <a:endParaRPr lang="en-US" dirty="0"/>
+          </a:p>
+          <a:p>
+            <a:pPr lvl="1"/>
+            <a:r>
+              <a:rPr lang="en-US" dirty="0">
+                <a:hlinkClick r:id="rId4"/>
+              </a:rPr>
+              <a:t>Bayesian optimization and multi-armed bandits</a:t>
+            </a:r>
+            <a:endParaRPr lang="en-US" dirty="0"/>
+          </a:p>
+          <a:p>
+            <a:r>
+              <a:rPr lang="en-US" dirty="0">
+                <a:hlinkClick r:id="rId5"/>
+              </a:rPr>
+              <a:t>Gaussian Processes for Machine Learning</a:t>
+            </a:r>
+            <a:endParaRPr lang="en-US" dirty="0"/>
+          </a:p>
+          <a:p>
+            <a:pPr lvl="1"/>
+            <a:r>
+              <a:rPr lang="en-US" dirty="0"/>
+              <a:t>Carl Edward Rasmussen and Christopher K. I. Williams</a:t>
+            </a:r>
+          </a:p>
+          <a:p>
+            <a:r>
+              <a:rPr lang="en-US" dirty="0">
+                <a:hlinkClick r:id="rId6"/>
+              </a:rPr>
+              <a:t>A Tutorial on Bayesian Optimization of Expensive Cost Functions, with Application to Active User Modeling and Hierarchical Reinforcement Learning</a:t>
+            </a:r>
+            <a:endParaRPr lang="en-US" dirty="0"/>
+          </a:p>
+          <a:p>
+            <a:pPr lvl="1"/>
+            <a:r>
+              <a:rPr lang="en-US" dirty="0"/>
+              <a:t>Eric </a:t>
+            </a:r>
+            <a:r>
+              <a:rPr lang="en-US" dirty="0" err="1"/>
+              <a:t>Brochu</a:t>
+            </a:r>
+            <a:r>
+              <a:rPr lang="en-US" dirty="0"/>
+              <a:t>, Vlad M. Cora, and Nando de Freitas</a:t>
+            </a:r>
+          </a:p>
+          <a:p>
+            <a:r>
+              <a:rPr lang="en-US" dirty="0" err="1"/>
+              <a:t>Scikit</a:t>
+            </a:r>
+            <a:r>
+              <a:rPr lang="en-US" dirty="0"/>
+              <a:t>-learn: </a:t>
+            </a:r>
+            <a:r>
+              <a:rPr lang="en-US" dirty="0">
+                <a:hlinkClick r:id="rId7"/>
+              </a:rPr>
+              <a:t>Gaussian Processes</a:t>
+            </a:r>
+            <a:endParaRPr lang="en-US" dirty="0"/>
+          </a:p>
+          <a:p>
+            <a:pPr lvl="1"/>
+            <a:endParaRPr lang="en-US" dirty="0"/>
+          </a:p>
+          <a:p>
+            <a:pPr lvl="1"/>
+            <a:endParaRPr lang="en-US" dirty="0"/>
+          </a:p>
+        </p:txBody>
+      </p:sp>
+    </p:spTree>
+    <p:extLst>
+      <p:ext uri="{BB962C8B-B14F-4D97-AF65-F5344CB8AC3E}">
+        <p14:creationId xmlns:p14="http://schemas.microsoft.com/office/powerpoint/2010/main" val="4222968470"/>
       </p:ext>
     </p:extLst>
   </p:cSld>
@@ -5533,7 +6536,7 @@
           <p:cNvPr id="2" name="Title 1">
             <a:extLst>
               <a:ext uri="{FF2B5EF4-FFF2-40B4-BE49-F238E27FC236}">
-                <a16:creationId xmlns:a16="http://schemas.microsoft.com/office/drawing/2014/main" id="{01F1DA10-7481-4AC8-9556-8DF50115DF4E}"/>
+                <a16:creationId xmlns:a16="http://schemas.microsoft.com/office/drawing/2014/main" id="{A4BC42CE-454E-48F0-B070-E8F709F6560F}"/>
               </a:ext>
             </a:extLst>
           </p:cNvPr>
@@ -5551,7 +6554,7 @@
           <a:p>
             <a:r>
               <a:rPr lang="en-US" dirty="0"/>
-              <a:t>Hyperparameter tuning strategies</a:t>
+              <a:t>Zillow Prize</a:t>
             </a:r>
           </a:p>
         </p:txBody>
@@ -5561,7 +6564,7 @@
           <p:cNvPr id="3" name="Content Placeholder 2">
             <a:extLst>
               <a:ext uri="{FF2B5EF4-FFF2-40B4-BE49-F238E27FC236}">
-                <a16:creationId xmlns:a16="http://schemas.microsoft.com/office/drawing/2014/main" id="{D6C1ABA4-497E-4D72-9A71-7608CBF83FF4}"/>
+                <a16:creationId xmlns:a16="http://schemas.microsoft.com/office/drawing/2014/main" id="{18809FF8-CBFC-46D0-8F41-B87EAA22EC3F}"/>
               </a:ext>
             </a:extLst>
           </p:cNvPr>
@@ -5574,45 +6577,75 @@
         </p:nvSpPr>
         <p:spPr/>
         <p:txBody>
-          <a:bodyPr/>
-          <a:lstStyle/>
-          <a:p>
-            <a:r>
-              <a:rPr lang="en-US" dirty="0"/>
-              <a:t>Grid (naïve)</a:t>
+          <a:bodyPr>
+            <a:normAutofit fontScale="92500" lnSpcReduction="10000"/>
+          </a:bodyPr>
+          <a:lstStyle/>
+          <a:p>
+            <a:r>
+              <a:rPr lang="en-US" dirty="0"/>
+              <a:t>High-cost training</a:t>
+            </a:r>
+          </a:p>
+          <a:p>
+            <a:r>
+              <a:rPr lang="en-US" dirty="0"/>
+              <a:t>Started seeing a lot of chatter about a smarter automated tuning method</a:t>
             </a:r>
           </a:p>
           <a:p>
             <a:pPr lvl="1"/>
             <a:r>
               <a:rPr lang="en-US" dirty="0"/>
-              <a:t>Insert image here</a:t>
-            </a:r>
-          </a:p>
-          <a:p>
-            <a:r>
-              <a:rPr lang="en-US" dirty="0"/>
-              <a:t>Random</a:t>
+              <a:t>Learning the hyperparameter space</a:t>
+            </a:r>
+          </a:p>
+          <a:p>
+            <a:r>
+              <a:rPr lang="en-US" dirty="0"/>
+              <a:t>A number of Python implementations</a:t>
             </a:r>
           </a:p>
           <a:p>
             <a:pPr lvl="1"/>
             <a:r>
               <a:rPr lang="en-US" dirty="0"/>
-              <a:t>Insert image here</a:t>
-            </a:r>
-          </a:p>
-          <a:p>
-            <a:r>
-              <a:rPr lang="en-US" dirty="0"/>
-              <a:t>Subsampling</a:t>
+              <a:t>Metric Optimization Engine (MOE)</a:t>
             </a:r>
           </a:p>
           <a:p>
             <a:pPr lvl="1"/>
             <a:r>
-              <a:rPr lang="en-US" dirty="0"/>
-              <a:t>Insert image here</a:t>
+              <a:rPr lang="en-US" u="sng" dirty="0"/>
+              <a:t>Bayesian Optimization</a:t>
+            </a:r>
+          </a:p>
+          <a:p>
+            <a:pPr lvl="1"/>
+            <a:r>
+              <a:rPr lang="en-US" dirty="0" err="1"/>
+              <a:t>Hyperopt</a:t>
+            </a:r>
+            <a:endParaRPr lang="en-US" dirty="0"/>
+          </a:p>
+          <a:p>
+            <a:r>
+              <a:rPr lang="en-US" dirty="0"/>
+              <a:t>Relatively straightforward to implement in my code</a:t>
+            </a:r>
+          </a:p>
+          <a:p>
+            <a:pPr lvl="1"/>
+            <a:r>
+              <a:rPr lang="en-US" dirty="0"/>
+              <a:t>Still required a bounded range to search over</a:t>
+            </a:r>
+          </a:p>
+          <a:p>
+            <a:pPr lvl="1"/>
+            <a:r>
+              <a:rPr lang="en-US" dirty="0"/>
+              <a:t>Took less iterations, and new models performed better</a:t>
             </a:r>
           </a:p>
         </p:txBody>
@@ -5620,7 +6653,7 @@
     </p:spTree>
     <p:extLst>
       <p:ext uri="{BB962C8B-B14F-4D97-AF65-F5344CB8AC3E}">
-        <p14:creationId xmlns:p14="http://schemas.microsoft.com/office/powerpoint/2010/main" val="2364840420"/>
+        <p14:creationId xmlns:p14="http://schemas.microsoft.com/office/powerpoint/2010/main" val="3928882534"/>
       </p:ext>
     </p:extLst>
   </p:cSld>
@@ -5652,7 +6685,7 @@
           <p:cNvPr id="2" name="Title 1">
             <a:extLst>
               <a:ext uri="{FF2B5EF4-FFF2-40B4-BE49-F238E27FC236}">
-                <a16:creationId xmlns:a16="http://schemas.microsoft.com/office/drawing/2014/main" id="{A4BC42CE-454E-48F0-B070-E8F709F6560F}"/>
+                <a16:creationId xmlns:a16="http://schemas.microsoft.com/office/drawing/2014/main" id="{01F1DA10-7481-4AC8-9556-8DF50115DF4E}"/>
               </a:ext>
             </a:extLst>
           </p:cNvPr>
@@ -5670,7 +6703,7 @@
           <a:p>
             <a:r>
               <a:rPr lang="en-US" dirty="0"/>
-              <a:t>Zillow Prize</a:t>
+              <a:t>Hyperparameter tuning strategies</a:t>
             </a:r>
           </a:p>
         </p:txBody>
@@ -5680,7 +6713,7 @@
           <p:cNvPr id="3" name="Content Placeholder 2">
             <a:extLst>
               <a:ext uri="{FF2B5EF4-FFF2-40B4-BE49-F238E27FC236}">
-                <a16:creationId xmlns:a16="http://schemas.microsoft.com/office/drawing/2014/main" id="{18809FF8-CBFC-46D0-8F41-B87EAA22EC3F}"/>
+                <a16:creationId xmlns:a16="http://schemas.microsoft.com/office/drawing/2014/main" id="{D6C1ABA4-497E-4D72-9A71-7608CBF83FF4}"/>
               </a:ext>
             </a:extLst>
           </p:cNvPr>
@@ -5693,75 +6726,45 @@
         </p:nvSpPr>
         <p:spPr/>
         <p:txBody>
-          <a:bodyPr>
-            <a:normAutofit lnSpcReduction="10000"/>
-          </a:bodyPr>
-          <a:lstStyle/>
-          <a:p>
-            <a:r>
-              <a:rPr lang="en-US" dirty="0"/>
-              <a:t>High-cost training</a:t>
-            </a:r>
-          </a:p>
-          <a:p>
-            <a:r>
-              <a:rPr lang="en-US" dirty="0"/>
-              <a:t>Started seeing a lot of chatter about a smarter automated tuning method</a:t>
+          <a:bodyPr/>
+          <a:lstStyle/>
+          <a:p>
+            <a:r>
+              <a:rPr lang="en-US" dirty="0"/>
+              <a:t>Grid (naïve)</a:t>
             </a:r>
           </a:p>
           <a:p>
             <a:pPr lvl="1"/>
             <a:r>
               <a:rPr lang="en-US" dirty="0"/>
-              <a:t>Learning the hyperparameter space</a:t>
-            </a:r>
-          </a:p>
-          <a:p>
-            <a:r>
-              <a:rPr lang="en-US" dirty="0"/>
-              <a:t>A number of Python implementations</a:t>
+              <a:t>Insert image here</a:t>
+            </a:r>
+          </a:p>
+          <a:p>
+            <a:r>
+              <a:rPr lang="en-US" dirty="0"/>
+              <a:t>Random</a:t>
             </a:r>
           </a:p>
           <a:p>
             <a:pPr lvl="1"/>
             <a:r>
               <a:rPr lang="en-US" dirty="0"/>
-              <a:t>Metric Optimization Engine (MOE)</a:t>
+              <a:t>Insert image here</a:t>
+            </a:r>
+          </a:p>
+          <a:p>
+            <a:r>
+              <a:rPr lang="en-US" dirty="0"/>
+              <a:t>Subsampling</a:t>
             </a:r>
           </a:p>
           <a:p>
             <a:pPr lvl="1"/>
             <a:r>
-              <a:rPr lang="en-US" u="sng" dirty="0"/>
-              <a:t>Bayesian Optimization</a:t>
-            </a:r>
-          </a:p>
-          <a:p>
-            <a:pPr lvl="1"/>
-            <a:r>
-              <a:rPr lang="en-US" dirty="0" err="1"/>
-              <a:t>Hyperopt</a:t>
-            </a:r>
-            <a:endParaRPr lang="en-US" dirty="0"/>
-          </a:p>
-          <a:p>
-            <a:r>
-              <a:rPr lang="en-US" dirty="0"/>
-              <a:t>Relatively straightforward to implement in my code</a:t>
-            </a:r>
-          </a:p>
-          <a:p>
-            <a:pPr lvl="1"/>
-            <a:r>
-              <a:rPr lang="en-US" dirty="0"/>
-              <a:t>Still required a bounded range to search over</a:t>
-            </a:r>
-          </a:p>
-          <a:p>
-            <a:pPr lvl="1"/>
-            <a:r>
-              <a:rPr lang="en-US" dirty="0"/>
-              <a:t>Took less iterations, and new models performed better</a:t>
+              <a:rPr lang="en-US" dirty="0"/>
+              <a:t>Insert image here</a:t>
             </a:r>
           </a:p>
         </p:txBody>
@@ -5769,7 +6772,7 @@
     </p:spTree>
     <p:extLst>
       <p:ext uri="{BB962C8B-B14F-4D97-AF65-F5344CB8AC3E}">
-        <p14:creationId xmlns:p14="http://schemas.microsoft.com/office/powerpoint/2010/main" val="3928882534"/>
+        <p14:creationId xmlns:p14="http://schemas.microsoft.com/office/powerpoint/2010/main" val="2364840420"/>
       </p:ext>
     </p:extLst>
   </p:cSld>

</xml_diff>

<commit_message>
Added simple regression example. Made small changes to PPT. Added some images of code from utility function calculations.
</commit_message>
<xml_diff>
--- a/Data_science_nashville_jkk.pptx
+++ b/Data_science_nashville_jkk.pptx
@@ -12,27 +12,28 @@
     <p:sldId id="263" r:id="rId6"/>
     <p:sldId id="259" r:id="rId7"/>
     <p:sldId id="264" r:id="rId8"/>
-    <p:sldId id="273" r:id="rId9"/>
-    <p:sldId id="274" r:id="rId10"/>
-    <p:sldId id="265" r:id="rId11"/>
-    <p:sldId id="269" r:id="rId12"/>
-    <p:sldId id="284" r:id="rId13"/>
-    <p:sldId id="282" r:id="rId14"/>
-    <p:sldId id="283" r:id="rId15"/>
-    <p:sldId id="272" r:id="rId16"/>
-    <p:sldId id="271" r:id="rId17"/>
-    <p:sldId id="276" r:id="rId18"/>
-    <p:sldId id="277" r:id="rId19"/>
-    <p:sldId id="278" r:id="rId20"/>
-    <p:sldId id="279" r:id="rId21"/>
-    <p:sldId id="268" r:id="rId22"/>
-    <p:sldId id="267" r:id="rId23"/>
-    <p:sldId id="281" r:id="rId24"/>
-    <p:sldId id="275" r:id="rId25"/>
-    <p:sldId id="287" r:id="rId26"/>
-    <p:sldId id="266" r:id="rId27"/>
-    <p:sldId id="285" r:id="rId28"/>
-    <p:sldId id="286" r:id="rId29"/>
+    <p:sldId id="289" r:id="rId9"/>
+    <p:sldId id="273" r:id="rId10"/>
+    <p:sldId id="274" r:id="rId11"/>
+    <p:sldId id="265" r:id="rId12"/>
+    <p:sldId id="269" r:id="rId13"/>
+    <p:sldId id="284" r:id="rId14"/>
+    <p:sldId id="282" r:id="rId15"/>
+    <p:sldId id="283" r:id="rId16"/>
+    <p:sldId id="272" r:id="rId17"/>
+    <p:sldId id="271" r:id="rId18"/>
+    <p:sldId id="276" r:id="rId19"/>
+    <p:sldId id="277" r:id="rId20"/>
+    <p:sldId id="278" r:id="rId21"/>
+    <p:sldId id="279" r:id="rId22"/>
+    <p:sldId id="268" r:id="rId23"/>
+    <p:sldId id="267" r:id="rId24"/>
+    <p:sldId id="281" r:id="rId25"/>
+    <p:sldId id="275" r:id="rId26"/>
+    <p:sldId id="288" r:id="rId27"/>
+    <p:sldId id="266" r:id="rId28"/>
+    <p:sldId id="285" r:id="rId29"/>
+    <p:sldId id="286" r:id="rId30"/>
   </p:sldIdLst>
   <p:sldSz cx="9144000" cy="6858000" type="screen4x3"/>
   <p:notesSz cx="6858000" cy="9144000"/>
@@ -3099,7 +3100,7 @@
           <p:cNvPr id="2" name="Title 1">
             <a:extLst>
               <a:ext uri="{FF2B5EF4-FFF2-40B4-BE49-F238E27FC236}">
-                <a16:creationId xmlns:a16="http://schemas.microsoft.com/office/drawing/2014/main" id="{099C73DE-7C62-47BD-B10C-49495AE01BC6}"/>
+                <a16:creationId xmlns:a16="http://schemas.microsoft.com/office/drawing/2014/main" id="{B6E2BE2B-529F-4D96-B2E7-734665BD9FBB}"/>
               </a:ext>
             </a:extLst>
           </p:cNvPr>
@@ -3116,12 +3117,8 @@
           <a:lstStyle/>
           <a:p>
             <a:r>
-              <a:rPr lang="en-US" dirty="0" err="1"/>
-              <a:t>Mercari</a:t>
-            </a:r>
-            <a:r>
-              <a:rPr lang="en-US" dirty="0"/>
-              <a:t> Price Suggestion</a:t>
+              <a:rPr lang="en-US" dirty="0"/>
+              <a:t>Example 2</a:t>
             </a:r>
           </a:p>
         </p:txBody>
@@ -3131,7 +3128,7 @@
           <p:cNvPr id="3" name="Content Placeholder 2">
             <a:extLst>
               <a:ext uri="{FF2B5EF4-FFF2-40B4-BE49-F238E27FC236}">
-                <a16:creationId xmlns:a16="http://schemas.microsoft.com/office/drawing/2014/main" id="{E665780C-D867-4A26-9AE6-0DF97772AB2A}"/>
+                <a16:creationId xmlns:a16="http://schemas.microsoft.com/office/drawing/2014/main" id="{3E0CA400-092D-4764-971C-E868F4D7C54E}"/>
               </a:ext>
             </a:extLst>
           </p:cNvPr>
@@ -3144,9 +3141,16 @@
         </p:nvSpPr>
         <p:spPr/>
         <p:txBody>
-          <a:bodyPr/>
-          <a:lstStyle/>
-          <a:p>
+          <a:bodyPr anchor="ctr"/>
+          <a:lstStyle/>
+          <a:p>
+            <a:pPr marL="0" indent="0" algn="ctr">
+              <a:buNone/>
+            </a:pPr>
+            <a:r>
+              <a:rPr lang="en-US" dirty="0" err="1"/>
+              <a:t>simple_classification.ipynb</a:t>
+            </a:r>
             <a:endParaRPr lang="en-US" dirty="0"/>
           </a:p>
         </p:txBody>
@@ -3154,7 +3158,7 @@
     </p:spTree>
     <p:extLst>
       <p:ext uri="{BB962C8B-B14F-4D97-AF65-F5344CB8AC3E}">
-        <p14:creationId xmlns:p14="http://schemas.microsoft.com/office/powerpoint/2010/main" val="3956650337"/>
+        <p14:creationId xmlns:p14="http://schemas.microsoft.com/office/powerpoint/2010/main" val="2585097853"/>
       </p:ext>
     </p:extLst>
   </p:cSld>
@@ -3186,7 +3190,7 @@
           <p:cNvPr id="2" name="Title 1">
             <a:extLst>
               <a:ext uri="{FF2B5EF4-FFF2-40B4-BE49-F238E27FC236}">
-                <a16:creationId xmlns:a16="http://schemas.microsoft.com/office/drawing/2014/main" id="{CB0681ED-DB00-42F1-A829-90E28ACB4F89}"/>
+                <a16:creationId xmlns:a16="http://schemas.microsoft.com/office/drawing/2014/main" id="{099C73DE-7C62-47BD-B10C-49495AE01BC6}"/>
               </a:ext>
             </a:extLst>
           </p:cNvPr>
@@ -3204,7 +3208,7 @@
           <a:p>
             <a:r>
               <a:rPr lang="en-US" dirty="0"/>
-              <a:t>Gaussian Process</a:t>
+              <a:t>Example 3</a:t>
             </a:r>
           </a:p>
         </p:txBody>
@@ -3214,7 +3218,7 @@
           <p:cNvPr id="3" name="Content Placeholder 2">
             <a:extLst>
               <a:ext uri="{FF2B5EF4-FFF2-40B4-BE49-F238E27FC236}">
-                <a16:creationId xmlns:a16="http://schemas.microsoft.com/office/drawing/2014/main" id="{53449CA3-7648-4B94-9A69-55CDE66B774D}"/>
+                <a16:creationId xmlns:a16="http://schemas.microsoft.com/office/drawing/2014/main" id="{E665780C-D867-4A26-9AE6-0DF97772AB2A}"/>
               </a:ext>
             </a:extLst>
           </p:cNvPr>
@@ -3230,35 +3234,14 @@
           <a:bodyPr/>
           <a:lstStyle/>
           <a:p>
-            <a:r>
-              <a:rPr lang="en-US" dirty="0"/>
-              <a:t>A gaussian process uses lazy learning and a measure of similarity between points (kernel function) to predict the value for unseen points</a:t>
-            </a:r>
-          </a:p>
-          <a:p>
-            <a:r>
-              <a:rPr lang="en-US" dirty="0"/>
-              <a:t>Given a black box function/process, we can obtain a few samples and generate a predicted function with uncertainty</a:t>
-            </a:r>
-          </a:p>
-          <a:p>
-            <a:r>
-              <a:rPr lang="en-US" dirty="0"/>
-              <a:t>This enables derivative-free optimization</a:t>
-            </a:r>
-          </a:p>
-          <a:p>
-            <a:r>
-              <a:rPr lang="en-US" dirty="0"/>
-              <a:t>More importantly, if sampling the target function is expensive, we can reduce overall cost</a:t>
-            </a:r>
+            <a:endParaRPr lang="en-US" dirty="0"/>
           </a:p>
         </p:txBody>
       </p:sp>
     </p:spTree>
     <p:extLst>
       <p:ext uri="{BB962C8B-B14F-4D97-AF65-F5344CB8AC3E}">
-        <p14:creationId xmlns:p14="http://schemas.microsoft.com/office/powerpoint/2010/main" val="3638626496"/>
+        <p14:creationId xmlns:p14="http://schemas.microsoft.com/office/powerpoint/2010/main" val="3956650337"/>
       </p:ext>
     </p:extLst>
   </p:cSld>
@@ -3290,6 +3273,110 @@
           <p:cNvPr id="2" name="Title 1">
             <a:extLst>
               <a:ext uri="{FF2B5EF4-FFF2-40B4-BE49-F238E27FC236}">
+                <a16:creationId xmlns:a16="http://schemas.microsoft.com/office/drawing/2014/main" id="{CB0681ED-DB00-42F1-A829-90E28ACB4F89}"/>
+              </a:ext>
+            </a:extLst>
+          </p:cNvPr>
+          <p:cNvSpPr>
+            <a:spLocks noGrp="1"/>
+          </p:cNvSpPr>
+          <p:nvPr>
+            <p:ph type="title"/>
+          </p:nvPr>
+        </p:nvSpPr>
+        <p:spPr/>
+        <p:txBody>
+          <a:bodyPr/>
+          <a:lstStyle/>
+          <a:p>
+            <a:r>
+              <a:rPr lang="en-US" dirty="0"/>
+              <a:t>Gaussian Process</a:t>
+            </a:r>
+          </a:p>
+        </p:txBody>
+      </p:sp>
+      <p:sp>
+        <p:nvSpPr>
+          <p:cNvPr id="3" name="Content Placeholder 2">
+            <a:extLst>
+              <a:ext uri="{FF2B5EF4-FFF2-40B4-BE49-F238E27FC236}">
+                <a16:creationId xmlns:a16="http://schemas.microsoft.com/office/drawing/2014/main" id="{53449CA3-7648-4B94-9A69-55CDE66B774D}"/>
+              </a:ext>
+            </a:extLst>
+          </p:cNvPr>
+          <p:cNvSpPr>
+            <a:spLocks noGrp="1"/>
+          </p:cNvSpPr>
+          <p:nvPr>
+            <p:ph idx="1"/>
+          </p:nvPr>
+        </p:nvSpPr>
+        <p:spPr/>
+        <p:txBody>
+          <a:bodyPr/>
+          <a:lstStyle/>
+          <a:p>
+            <a:r>
+              <a:rPr lang="en-US" dirty="0"/>
+              <a:t>A gaussian process uses lazy learning and a measure of similarity between points (kernel function) to predict the value for unseen points</a:t>
+            </a:r>
+          </a:p>
+          <a:p>
+            <a:r>
+              <a:rPr lang="en-US" dirty="0"/>
+              <a:t>Given a black box function/process, we can obtain a few samples and generate a predicted function with uncertainty</a:t>
+            </a:r>
+          </a:p>
+          <a:p>
+            <a:r>
+              <a:rPr lang="en-US" dirty="0"/>
+              <a:t>This enables derivative-free optimization</a:t>
+            </a:r>
+          </a:p>
+          <a:p>
+            <a:r>
+              <a:rPr lang="en-US" dirty="0"/>
+              <a:t>More importantly, if sampling the target function is expensive, we can reduce overall cost</a:t>
+            </a:r>
+          </a:p>
+        </p:txBody>
+      </p:sp>
+    </p:spTree>
+    <p:extLst>
+      <p:ext uri="{BB962C8B-B14F-4D97-AF65-F5344CB8AC3E}">
+        <p14:creationId xmlns:p14="http://schemas.microsoft.com/office/powerpoint/2010/main" val="3638626496"/>
+      </p:ext>
+    </p:extLst>
+  </p:cSld>
+  <p:clrMapOvr>
+    <a:masterClrMapping/>
+  </p:clrMapOvr>
+</p:sld>
+</file>
+
+<file path=ppt/slides/slide13.xml><?xml version="1.0" encoding="utf-8"?>
+<p:sld xmlns:a="http://schemas.openxmlformats.org/drawingml/2006/main" xmlns:r="http://schemas.openxmlformats.org/officeDocument/2006/relationships" xmlns:p="http://schemas.openxmlformats.org/presentationml/2006/main">
+  <p:cSld>
+    <p:spTree>
+      <p:nvGrpSpPr>
+        <p:cNvPr id="1" name=""/>
+        <p:cNvGrpSpPr/>
+        <p:nvPr/>
+      </p:nvGrpSpPr>
+      <p:grpSpPr>
+        <a:xfrm>
+          <a:off x="0" y="0"/>
+          <a:ext cx="0" cy="0"/>
+          <a:chOff x="0" y="0"/>
+          <a:chExt cx="0" cy="0"/>
+        </a:xfrm>
+      </p:grpSpPr>
+      <p:sp>
+        <p:nvSpPr>
+          <p:cNvPr id="2" name="Title 1">
+            <a:extLst>
+              <a:ext uri="{FF2B5EF4-FFF2-40B4-BE49-F238E27FC236}">
                 <a16:creationId xmlns:a16="http://schemas.microsoft.com/office/drawing/2014/main" id="{C7EF7884-E9DF-442A-A088-292308EBD28E}"/>
               </a:ext>
             </a:extLst>
@@ -3351,7 +3438,7 @@
 </p:sld>
 </file>
 
-<file path=ppt/slides/slide13.xml><?xml version="1.0" encoding="utf-8"?>
+<file path=ppt/slides/slide14.xml><?xml version="1.0" encoding="utf-8"?>
 <p:sld xmlns:a="http://schemas.openxmlformats.org/drawingml/2006/main" xmlns:r="http://schemas.openxmlformats.org/officeDocument/2006/relationships" xmlns:p="http://schemas.openxmlformats.org/presentationml/2006/main">
   <p:cSld>
     <p:spTree>
@@ -3603,7 +3690,7 @@
 </p:sld>
 </file>
 
-<file path=ppt/slides/slide14.xml><?xml version="1.0" encoding="utf-8"?>
+<file path=ppt/slides/slide15.xml><?xml version="1.0" encoding="utf-8"?>
 <p:sld xmlns:a="http://schemas.openxmlformats.org/drawingml/2006/main" xmlns:r="http://schemas.openxmlformats.org/officeDocument/2006/relationships" xmlns:p="http://schemas.openxmlformats.org/presentationml/2006/main">
   <p:cSld>
     <p:spTree>
@@ -3728,64 +3815,6 @@
 </p:sld>
 </file>
 
-<file path=ppt/slides/slide15.xml><?xml version="1.0" encoding="utf-8"?>
-<p:sld xmlns:a="http://schemas.openxmlformats.org/drawingml/2006/main" xmlns:r="http://schemas.openxmlformats.org/officeDocument/2006/relationships" xmlns:p="http://schemas.openxmlformats.org/presentationml/2006/main">
-  <p:cSld>
-    <p:spTree>
-      <p:nvGrpSpPr>
-        <p:cNvPr id="1" name=""/>
-        <p:cNvGrpSpPr/>
-        <p:nvPr/>
-      </p:nvGrpSpPr>
-      <p:grpSpPr>
-        <a:xfrm>
-          <a:off x="0" y="0"/>
-          <a:ext cx="0" cy="0"/>
-          <a:chOff x="0" y="0"/>
-          <a:chExt cx="0" cy="0"/>
-        </a:xfrm>
-      </p:grpSpPr>
-      <p:sp>
-        <p:nvSpPr>
-          <p:cNvPr id="2" name="Title 1">
-            <a:extLst>
-              <a:ext uri="{FF2B5EF4-FFF2-40B4-BE49-F238E27FC236}">
-                <a16:creationId xmlns:a16="http://schemas.microsoft.com/office/drawing/2014/main" id="{A05E5E2E-55E2-4D5D-B3BC-93807FDF7E6D}"/>
-              </a:ext>
-            </a:extLst>
-          </p:cNvPr>
-          <p:cNvSpPr>
-            <a:spLocks noGrp="1"/>
-          </p:cNvSpPr>
-          <p:nvPr>
-            <p:ph type="title"/>
-          </p:nvPr>
-        </p:nvSpPr>
-        <p:spPr/>
-        <p:txBody>
-          <a:bodyPr/>
-          <a:lstStyle/>
-          <a:p>
-            <a:r>
-              <a:rPr lang="en-US" dirty="0"/>
-              <a:t>Gaussian Process</a:t>
-            </a:r>
-          </a:p>
-        </p:txBody>
-      </p:sp>
-    </p:spTree>
-    <p:extLst>
-      <p:ext uri="{BB962C8B-B14F-4D97-AF65-F5344CB8AC3E}">
-        <p14:creationId xmlns:p14="http://schemas.microsoft.com/office/powerpoint/2010/main" val="512079388"/>
-      </p:ext>
-    </p:extLst>
-  </p:cSld>
-  <p:clrMapOvr>
-    <a:masterClrMapping/>
-  </p:clrMapOvr>
-</p:sld>
-</file>
-
 <file path=ppt/slides/slide16.xml><?xml version="1.0" encoding="utf-8"?>
 <p:sld xmlns:a="http://schemas.openxmlformats.org/drawingml/2006/main" xmlns:r="http://schemas.openxmlformats.org/officeDocument/2006/relationships" xmlns:p="http://schemas.openxmlformats.org/presentationml/2006/main">
   <p:cSld>
@@ -3808,6 +3837,64 @@
           <p:cNvPr id="2" name="Title 1">
             <a:extLst>
               <a:ext uri="{FF2B5EF4-FFF2-40B4-BE49-F238E27FC236}">
+                <a16:creationId xmlns:a16="http://schemas.microsoft.com/office/drawing/2014/main" id="{A05E5E2E-55E2-4D5D-B3BC-93807FDF7E6D}"/>
+              </a:ext>
+            </a:extLst>
+          </p:cNvPr>
+          <p:cNvSpPr>
+            <a:spLocks noGrp="1"/>
+          </p:cNvSpPr>
+          <p:nvPr>
+            <p:ph type="title"/>
+          </p:nvPr>
+        </p:nvSpPr>
+        <p:spPr/>
+        <p:txBody>
+          <a:bodyPr/>
+          <a:lstStyle/>
+          <a:p>
+            <a:r>
+              <a:rPr lang="en-US" dirty="0"/>
+              <a:t>Gaussian Process</a:t>
+            </a:r>
+          </a:p>
+        </p:txBody>
+      </p:sp>
+    </p:spTree>
+    <p:extLst>
+      <p:ext uri="{BB962C8B-B14F-4D97-AF65-F5344CB8AC3E}">
+        <p14:creationId xmlns:p14="http://schemas.microsoft.com/office/powerpoint/2010/main" val="512079388"/>
+      </p:ext>
+    </p:extLst>
+  </p:cSld>
+  <p:clrMapOvr>
+    <a:masterClrMapping/>
+  </p:clrMapOvr>
+</p:sld>
+</file>
+
+<file path=ppt/slides/slide17.xml><?xml version="1.0" encoding="utf-8"?>
+<p:sld xmlns:a="http://schemas.openxmlformats.org/drawingml/2006/main" xmlns:r="http://schemas.openxmlformats.org/officeDocument/2006/relationships" xmlns:p="http://schemas.openxmlformats.org/presentationml/2006/main">
+  <p:cSld>
+    <p:spTree>
+      <p:nvGrpSpPr>
+        <p:cNvPr id="1" name=""/>
+        <p:cNvGrpSpPr/>
+        <p:nvPr/>
+      </p:nvGrpSpPr>
+      <p:grpSpPr>
+        <a:xfrm>
+          <a:off x="0" y="0"/>
+          <a:ext cx="0" cy="0"/>
+          <a:chOff x="0" y="0"/>
+          <a:chExt cx="0" cy="0"/>
+        </a:xfrm>
+      </p:grpSpPr>
+      <p:sp>
+        <p:nvSpPr>
+          <p:cNvPr id="2" name="Title 1">
+            <a:extLst>
+              <a:ext uri="{FF2B5EF4-FFF2-40B4-BE49-F238E27FC236}">
                 <a16:creationId xmlns:a16="http://schemas.microsoft.com/office/drawing/2014/main" id="{BAC2B454-EDAC-4597-8F3B-7D9659B454FE}"/>
               </a:ext>
             </a:extLst>
@@ -3849,9 +3936,18 @@
         </p:nvSpPr>
         <p:spPr/>
         <p:txBody>
-          <a:bodyPr/>
-          <a:lstStyle/>
-          <a:p>
+          <a:bodyPr anchor="ctr"/>
+          <a:lstStyle/>
+          <a:p>
+            <a:pPr marL="0" indent="0" algn="ctr">
+              <a:buNone/>
+            </a:pPr>
+            <a:r>
+              <a:rPr lang="en-US" dirty="0">
+                <a:hlinkClick r:id="rId2"/>
+              </a:rPr>
+              <a:t>bayes_opt_example.ipynb</a:t>
+            </a:r>
             <a:endParaRPr lang="en-US" dirty="0"/>
           </a:p>
         </p:txBody>
@@ -3869,7 +3965,7 @@
 </p:sld>
 </file>
 
-<file path=ppt/slides/slide17.xml><?xml version="1.0" encoding="utf-8"?>
+<file path=ppt/slides/slide18.xml><?xml version="1.0" encoding="utf-8"?>
 <p:sld xmlns:a="http://schemas.openxmlformats.org/drawingml/2006/main" xmlns:r="http://schemas.openxmlformats.org/officeDocument/2006/relationships" xmlns:p="http://schemas.openxmlformats.org/presentationml/2006/main">
   <p:cSld>
     <p:spTree>
@@ -4038,6 +4134,10 @@
                     </m:d>
                   </m:oMath>
                 </a14:m>
+                <a:endParaRPr lang="en-US" dirty="0"/>
+              </a:p>
+              <a:p>
+                <a:pPr lvl="1"/>
                 <a:endParaRPr lang="en-US" dirty="0"/>
               </a:p>
               <a:p>
@@ -4278,6 +4378,10 @@
                   <a:rPr lang="en-US" dirty="0"/>
                   <a:t>is the current max</a:t>
                 </a:r>
+              </a:p>
+              <a:p>
+                <a:pPr lvl="1"/>
+                <a:endParaRPr lang="en-US" dirty="0"/>
               </a:p>
               <a:p>
                 <a:r>
@@ -4529,6 +4633,129 @@
           </p:sp>
         </mc:Fallback>
       </mc:AlternateContent>
+      <p:pic>
+        <p:nvPicPr>
+          <p:cNvPr id="5" name="Picture 4">
+            <a:extLst>
+              <a:ext uri="{FF2B5EF4-FFF2-40B4-BE49-F238E27FC236}">
+                <a16:creationId xmlns:a16="http://schemas.microsoft.com/office/drawing/2014/main" id="{2DE7B382-EDF5-4C8C-B1F0-7ED3CC58502D}"/>
+              </a:ext>
+            </a:extLst>
+          </p:cNvPr>
+          <p:cNvPicPr>
+            <a:picLocks noChangeAspect="1"/>
+          </p:cNvPicPr>
+          <p:nvPr/>
+        </p:nvPicPr>
+        <p:blipFill>
+          <a:blip r:embed="rId3">
+            <a:extLst>
+              <a:ext uri="{28A0092B-C50C-407E-A947-70E740481C1C}">
+                <a14:useLocalDpi xmlns:a14="http://schemas.microsoft.com/office/drawing/2010/main" val="0"/>
+              </a:ext>
+            </a:extLst>
+          </a:blip>
+          <a:stretch>
+            <a:fillRect/>
+          </a:stretch>
+        </p:blipFill>
+        <p:spPr>
+          <a:xfrm>
+            <a:off x="1397217" y="2712456"/>
+            <a:ext cx="2943636" cy="409632"/>
+          </a:xfrm>
+          <a:prstGeom prst="rect">
+            <a:avLst/>
+          </a:prstGeom>
+          <a:ln>
+            <a:solidFill>
+              <a:schemeClr val="tx1"/>
+            </a:solidFill>
+          </a:ln>
+        </p:spPr>
+      </p:pic>
+      <p:pic>
+        <p:nvPicPr>
+          <p:cNvPr id="7" name="Picture 6">
+            <a:extLst>
+              <a:ext uri="{FF2B5EF4-FFF2-40B4-BE49-F238E27FC236}">
+                <a16:creationId xmlns:a16="http://schemas.microsoft.com/office/drawing/2014/main" id="{FA2B8CE3-BACA-4966-8B23-51C7F962C821}"/>
+              </a:ext>
+            </a:extLst>
+          </p:cNvPr>
+          <p:cNvPicPr>
+            <a:picLocks noChangeAspect="1"/>
+          </p:cNvPicPr>
+          <p:nvPr/>
+        </p:nvPicPr>
+        <p:blipFill>
+          <a:blip r:embed="rId4">
+            <a:extLst>
+              <a:ext uri="{28A0092B-C50C-407E-A947-70E740481C1C}">
+                <a14:useLocalDpi xmlns:a14="http://schemas.microsoft.com/office/drawing/2010/main" val="0"/>
+              </a:ext>
+            </a:extLst>
+          </a:blip>
+          <a:stretch>
+            <a:fillRect/>
+          </a:stretch>
+        </p:blipFill>
+        <p:spPr>
+          <a:xfrm>
+            <a:off x="1397217" y="4418405"/>
+            <a:ext cx="4191585" cy="428685"/>
+          </a:xfrm>
+          <a:prstGeom prst="rect">
+            <a:avLst/>
+          </a:prstGeom>
+          <a:ln>
+            <a:solidFill>
+              <a:schemeClr val="tx1"/>
+            </a:solidFill>
+          </a:ln>
+        </p:spPr>
+      </p:pic>
+      <p:pic>
+        <p:nvPicPr>
+          <p:cNvPr id="9" name="Picture 8">
+            <a:extLst>
+              <a:ext uri="{FF2B5EF4-FFF2-40B4-BE49-F238E27FC236}">
+                <a16:creationId xmlns:a16="http://schemas.microsoft.com/office/drawing/2014/main" id="{86BABEF8-312D-428F-B984-F141536C11EF}"/>
+              </a:ext>
+            </a:extLst>
+          </p:cNvPr>
+          <p:cNvPicPr>
+            <a:picLocks noChangeAspect="1"/>
+          </p:cNvPicPr>
+          <p:nvPr/>
+        </p:nvPicPr>
+        <p:blipFill>
+          <a:blip r:embed="rId5">
+            <a:extLst>
+              <a:ext uri="{28A0092B-C50C-407E-A947-70E740481C1C}">
+                <a14:useLocalDpi xmlns:a14="http://schemas.microsoft.com/office/drawing/2010/main" val="0"/>
+              </a:ext>
+            </a:extLst>
+          </a:blip>
+          <a:stretch>
+            <a:fillRect/>
+          </a:stretch>
+        </p:blipFill>
+        <p:spPr>
+          <a:xfrm>
+            <a:off x="1397217" y="5699512"/>
+            <a:ext cx="5649113" cy="562053"/>
+          </a:xfrm>
+          <a:prstGeom prst="rect">
+            <a:avLst/>
+          </a:prstGeom>
+          <a:ln>
+            <a:solidFill>
+              <a:schemeClr val="tx1"/>
+            </a:solidFill>
+          </a:ln>
+        </p:spPr>
+      </p:pic>
     </p:spTree>
     <p:extLst>
       <p:ext uri="{BB962C8B-B14F-4D97-AF65-F5344CB8AC3E}">
@@ -4542,7 +4769,7 @@
 </p:sld>
 </file>
 
-<file path=ppt/slides/slide18.xml><?xml version="1.0" encoding="utf-8"?>
+<file path=ppt/slides/slide19.xml><?xml version="1.0" encoding="utf-8"?>
 <p:sld xmlns:a="http://schemas.openxmlformats.org/drawingml/2006/main" xmlns:r="http://schemas.openxmlformats.org/officeDocument/2006/relationships" xmlns:p="http://schemas.openxmlformats.org/presentationml/2006/main">
   <p:cSld>
     <p:spTree>
@@ -4635,7 +4862,105 @@
 </p:sld>
 </file>
 
-<file path=ppt/slides/slide19.xml><?xml version="1.0" encoding="utf-8"?>
+<file path=ppt/slides/slide2.xml><?xml version="1.0" encoding="utf-8"?>
+<p:sld xmlns:a="http://schemas.openxmlformats.org/drawingml/2006/main" xmlns:r="http://schemas.openxmlformats.org/officeDocument/2006/relationships" xmlns:p="http://schemas.openxmlformats.org/presentationml/2006/main">
+  <p:cSld>
+    <p:spTree>
+      <p:nvGrpSpPr>
+        <p:cNvPr id="1" name=""/>
+        <p:cNvGrpSpPr/>
+        <p:nvPr/>
+      </p:nvGrpSpPr>
+      <p:grpSpPr>
+        <a:xfrm>
+          <a:off x="0" y="0"/>
+          <a:ext cx="0" cy="0"/>
+          <a:chOff x="0" y="0"/>
+          <a:chExt cx="0" cy="0"/>
+        </a:xfrm>
+      </p:grpSpPr>
+      <p:sp>
+        <p:nvSpPr>
+          <p:cNvPr id="4" name="Title 3">
+            <a:extLst>
+              <a:ext uri="{FF2B5EF4-FFF2-40B4-BE49-F238E27FC236}">
+                <a16:creationId xmlns:a16="http://schemas.microsoft.com/office/drawing/2014/main" id="{824D6633-28F1-4DB1-B0D9-346036B465EE}"/>
+              </a:ext>
+            </a:extLst>
+          </p:cNvPr>
+          <p:cNvSpPr>
+            <a:spLocks noGrp="1"/>
+          </p:cNvSpPr>
+          <p:nvPr>
+            <p:ph type="title"/>
+          </p:nvPr>
+        </p:nvSpPr>
+        <p:spPr/>
+        <p:txBody>
+          <a:bodyPr/>
+          <a:lstStyle/>
+          <a:p>
+            <a:r>
+              <a:rPr lang="en-US" dirty="0"/>
+              <a:t>What led me to Bayesian Optimization?</a:t>
+            </a:r>
+          </a:p>
+        </p:txBody>
+      </p:sp>
+      <p:sp>
+        <p:nvSpPr>
+          <p:cNvPr id="5" name="Content Placeholder 4">
+            <a:extLst>
+              <a:ext uri="{FF2B5EF4-FFF2-40B4-BE49-F238E27FC236}">
+                <a16:creationId xmlns:a16="http://schemas.microsoft.com/office/drawing/2014/main" id="{66405E59-0BD8-4EE7-B41E-5C6C3FDC0709}"/>
+              </a:ext>
+            </a:extLst>
+          </p:cNvPr>
+          <p:cNvSpPr>
+            <a:spLocks noGrp="1"/>
+          </p:cNvSpPr>
+          <p:nvPr>
+            <p:ph idx="1"/>
+          </p:nvPr>
+        </p:nvSpPr>
+        <p:spPr/>
+        <p:txBody>
+          <a:bodyPr/>
+          <a:lstStyle/>
+          <a:p>
+            <a:r>
+              <a:rPr lang="en-US" dirty="0"/>
+              <a:t>Like many of you, I compete in Kaggle competitions</a:t>
+            </a:r>
+          </a:p>
+          <a:p>
+            <a:r>
+              <a:rPr lang="en-US" dirty="0"/>
+              <a:t>For whatever reason, GBMs tend to be the most popular model types</a:t>
+            </a:r>
+          </a:p>
+          <a:p>
+            <a:r>
+              <a:rPr lang="en-US" dirty="0"/>
+              <a:t>Significantly more hyperparameters to consider compared to GLMs</a:t>
+            </a:r>
+          </a:p>
+        </p:txBody>
+      </p:sp>
+    </p:spTree>
+    <p:extLst>
+      <p:ext uri="{BB962C8B-B14F-4D97-AF65-F5344CB8AC3E}">
+        <p14:creationId xmlns:p14="http://schemas.microsoft.com/office/powerpoint/2010/main" val="741182945"/>
+      </p:ext>
+    </p:extLst>
+  </p:cSld>
+  <p:clrMapOvr>
+    <a:masterClrMapping/>
+  </p:clrMapOvr>
+</p:sld>
+</file>
+
+<file path=ppt/slides/slide20.xml><?xml version="1.0" encoding="utf-8"?>
 <p:sld xmlns:a="http://schemas.openxmlformats.org/drawingml/2006/main" xmlns:r="http://schemas.openxmlformats.org/officeDocument/2006/relationships" xmlns:p="http://schemas.openxmlformats.org/presentationml/2006/main">
   <p:cSld>
     <p:spTree>
@@ -4728,105 +5053,7 @@
 </p:sld>
 </file>
 
-<file path=ppt/slides/slide2.xml><?xml version="1.0" encoding="utf-8"?>
-<p:sld xmlns:a="http://schemas.openxmlformats.org/drawingml/2006/main" xmlns:r="http://schemas.openxmlformats.org/officeDocument/2006/relationships" xmlns:p="http://schemas.openxmlformats.org/presentationml/2006/main">
-  <p:cSld>
-    <p:spTree>
-      <p:nvGrpSpPr>
-        <p:cNvPr id="1" name=""/>
-        <p:cNvGrpSpPr/>
-        <p:nvPr/>
-      </p:nvGrpSpPr>
-      <p:grpSpPr>
-        <a:xfrm>
-          <a:off x="0" y="0"/>
-          <a:ext cx="0" cy="0"/>
-          <a:chOff x="0" y="0"/>
-          <a:chExt cx="0" cy="0"/>
-        </a:xfrm>
-      </p:grpSpPr>
-      <p:sp>
-        <p:nvSpPr>
-          <p:cNvPr id="4" name="Title 3">
-            <a:extLst>
-              <a:ext uri="{FF2B5EF4-FFF2-40B4-BE49-F238E27FC236}">
-                <a16:creationId xmlns:a16="http://schemas.microsoft.com/office/drawing/2014/main" id="{824D6633-28F1-4DB1-B0D9-346036B465EE}"/>
-              </a:ext>
-            </a:extLst>
-          </p:cNvPr>
-          <p:cNvSpPr>
-            <a:spLocks noGrp="1"/>
-          </p:cNvSpPr>
-          <p:nvPr>
-            <p:ph type="title"/>
-          </p:nvPr>
-        </p:nvSpPr>
-        <p:spPr/>
-        <p:txBody>
-          <a:bodyPr/>
-          <a:lstStyle/>
-          <a:p>
-            <a:r>
-              <a:rPr lang="en-US" dirty="0"/>
-              <a:t>What led me to Bayesian Optimization?</a:t>
-            </a:r>
-          </a:p>
-        </p:txBody>
-      </p:sp>
-      <p:sp>
-        <p:nvSpPr>
-          <p:cNvPr id="5" name="Content Placeholder 4">
-            <a:extLst>
-              <a:ext uri="{FF2B5EF4-FFF2-40B4-BE49-F238E27FC236}">
-                <a16:creationId xmlns:a16="http://schemas.microsoft.com/office/drawing/2014/main" id="{66405E59-0BD8-4EE7-B41E-5C6C3FDC0709}"/>
-              </a:ext>
-            </a:extLst>
-          </p:cNvPr>
-          <p:cNvSpPr>
-            <a:spLocks noGrp="1"/>
-          </p:cNvSpPr>
-          <p:nvPr>
-            <p:ph idx="1"/>
-          </p:nvPr>
-        </p:nvSpPr>
-        <p:spPr/>
-        <p:txBody>
-          <a:bodyPr/>
-          <a:lstStyle/>
-          <a:p>
-            <a:r>
-              <a:rPr lang="en-US" dirty="0"/>
-              <a:t>Like many of you, I compete in Kaggle competitions</a:t>
-            </a:r>
-          </a:p>
-          <a:p>
-            <a:r>
-              <a:rPr lang="en-US" dirty="0"/>
-              <a:t>For whatever reason, GBMs tend to be the most popular model types</a:t>
-            </a:r>
-          </a:p>
-          <a:p>
-            <a:r>
-              <a:rPr lang="en-US" dirty="0"/>
-              <a:t>Significantly more hyperparameters to consider compared to GLMs</a:t>
-            </a:r>
-          </a:p>
-        </p:txBody>
-      </p:sp>
-    </p:spTree>
-    <p:extLst>
-      <p:ext uri="{BB962C8B-B14F-4D97-AF65-F5344CB8AC3E}">
-        <p14:creationId xmlns:p14="http://schemas.microsoft.com/office/powerpoint/2010/main" val="741182945"/>
-      </p:ext>
-    </p:extLst>
-  </p:cSld>
-  <p:clrMapOvr>
-    <a:masterClrMapping/>
-  </p:clrMapOvr>
-</p:sld>
-</file>
-
-<file path=ppt/slides/slide20.xml><?xml version="1.0" encoding="utf-8"?>
+<file path=ppt/slides/slide21.xml><?xml version="1.0" encoding="utf-8"?>
 <p:sld xmlns:a="http://schemas.openxmlformats.org/drawingml/2006/main" xmlns:r="http://schemas.openxmlformats.org/officeDocument/2006/relationships" xmlns:p="http://schemas.openxmlformats.org/presentationml/2006/main">
   <p:cSld>
     <p:spTree>
@@ -4919,161 +5146,6 @@
 </p:sld>
 </file>
 
-<file path=ppt/slides/slide21.xml><?xml version="1.0" encoding="utf-8"?>
-<p:sld xmlns:a="http://schemas.openxmlformats.org/drawingml/2006/main" xmlns:r="http://schemas.openxmlformats.org/officeDocument/2006/relationships" xmlns:p="http://schemas.openxmlformats.org/presentationml/2006/main">
-  <p:cSld>
-    <p:spTree>
-      <p:nvGrpSpPr>
-        <p:cNvPr id="1" name=""/>
-        <p:cNvGrpSpPr/>
-        <p:nvPr/>
-      </p:nvGrpSpPr>
-      <p:grpSpPr>
-        <a:xfrm>
-          <a:off x="0" y="0"/>
-          <a:ext cx="0" cy="0"/>
-          <a:chOff x="0" y="0"/>
-          <a:chExt cx="0" cy="0"/>
-        </a:xfrm>
-      </p:grpSpPr>
-      <p:sp>
-        <p:nvSpPr>
-          <p:cNvPr id="2" name="Title 1">
-            <a:extLst>
-              <a:ext uri="{FF2B5EF4-FFF2-40B4-BE49-F238E27FC236}">
-                <a16:creationId xmlns:a16="http://schemas.microsoft.com/office/drawing/2014/main" id="{D69990CD-FFC3-458B-AFD0-940D78C85BF2}"/>
-              </a:ext>
-            </a:extLst>
-          </p:cNvPr>
-          <p:cNvSpPr>
-            <a:spLocks noGrp="1"/>
-          </p:cNvSpPr>
-          <p:nvPr>
-            <p:ph type="title"/>
-          </p:nvPr>
-        </p:nvSpPr>
-        <p:spPr/>
-        <p:txBody>
-          <a:bodyPr/>
-          <a:lstStyle/>
-          <a:p>
-            <a:r>
-              <a:rPr lang="en-US" dirty="0"/>
-              <a:t>Limitations</a:t>
-            </a:r>
-          </a:p>
-        </p:txBody>
-      </p:sp>
-      <p:sp>
-        <p:nvSpPr>
-          <p:cNvPr id="3" name="Content Placeholder 2">
-            <a:extLst>
-              <a:ext uri="{FF2B5EF4-FFF2-40B4-BE49-F238E27FC236}">
-                <a16:creationId xmlns:a16="http://schemas.microsoft.com/office/drawing/2014/main" id="{6B762A61-FCBB-47FB-BB0F-82FE5520D3D0}"/>
-              </a:ext>
-            </a:extLst>
-          </p:cNvPr>
-          <p:cNvSpPr>
-            <a:spLocks noGrp="1"/>
-          </p:cNvSpPr>
-          <p:nvPr>
-            <p:ph idx="1"/>
-          </p:nvPr>
-        </p:nvSpPr>
-        <p:spPr/>
-        <p:txBody>
-          <a:bodyPr>
-            <a:normAutofit lnSpcReduction="10000"/>
-          </a:bodyPr>
-          <a:lstStyle/>
-          <a:p>
-            <a:r>
-              <a:rPr lang="en-US" dirty="0"/>
-              <a:t>Overhead</a:t>
-            </a:r>
-          </a:p>
-          <a:p>
-            <a:pPr lvl="1"/>
-            <a:r>
-              <a:rPr lang="en-US" dirty="0"/>
-              <a:t>Lazy learner</a:t>
-            </a:r>
-          </a:p>
-          <a:p>
-            <a:pPr lvl="1"/>
-            <a:r>
-              <a:rPr lang="en-US" dirty="0"/>
-              <a:t>Retrain Gaussian process regressor every iteration</a:t>
-            </a:r>
-          </a:p>
-          <a:p>
-            <a:r>
-              <a:rPr lang="en-US" dirty="0"/>
-              <a:t>(Hyper)-Hyperparameters</a:t>
-            </a:r>
-          </a:p>
-          <a:p>
-            <a:pPr lvl="1"/>
-            <a:r>
-              <a:rPr lang="en-US" dirty="0"/>
-              <a:t>Kernel choice</a:t>
-            </a:r>
-          </a:p>
-          <a:p>
-            <a:pPr lvl="1"/>
-            <a:r>
-              <a:rPr lang="en-US" dirty="0"/>
-              <a:t>Scaling</a:t>
-            </a:r>
-          </a:p>
-          <a:p>
-            <a:r>
-              <a:rPr lang="en-US" dirty="0"/>
-              <a:t>Sequential (traditionally)</a:t>
-            </a:r>
-          </a:p>
-          <a:p>
-            <a:pPr lvl="1"/>
-            <a:r>
-              <a:rPr lang="en-US" dirty="0"/>
-              <a:t>Smarter initialization</a:t>
-            </a:r>
-          </a:p>
-          <a:p>
-            <a:pPr lvl="1"/>
-            <a:r>
-              <a:rPr lang="en-US" dirty="0"/>
-              <a:t>Efficient sampling</a:t>
-            </a:r>
-          </a:p>
-          <a:p>
-            <a:r>
-              <a:rPr lang="en-US" dirty="0"/>
-              <a:t>Bounds</a:t>
-            </a:r>
-          </a:p>
-          <a:p>
-            <a:pPr lvl="1"/>
-            <a:r>
-              <a:rPr lang="en-US" dirty="0"/>
-              <a:t>Not unique to Bayesian Optimization</a:t>
-            </a:r>
-          </a:p>
-        </p:txBody>
-      </p:sp>
-    </p:spTree>
-    <p:extLst>
-      <p:ext uri="{BB962C8B-B14F-4D97-AF65-F5344CB8AC3E}">
-        <p14:creationId xmlns:p14="http://schemas.microsoft.com/office/powerpoint/2010/main" val="2916254856"/>
-      </p:ext>
-    </p:extLst>
-  </p:cSld>
-  <p:clrMapOvr>
-    <a:masterClrMapping/>
-  </p:clrMapOvr>
-</p:sld>
-</file>
-
 <file path=ppt/slides/slide22.xml><?xml version="1.0" encoding="utf-8"?>
 <p:sld xmlns:a="http://schemas.openxmlformats.org/drawingml/2006/main" xmlns:r="http://schemas.openxmlformats.org/officeDocument/2006/relationships" xmlns:p="http://schemas.openxmlformats.org/presentationml/2006/main">
   <p:cSld>
@@ -5096,7 +5168,7 @@
           <p:cNvPr id="2" name="Title 1">
             <a:extLst>
               <a:ext uri="{FF2B5EF4-FFF2-40B4-BE49-F238E27FC236}">
-                <a16:creationId xmlns:a16="http://schemas.microsoft.com/office/drawing/2014/main" id="{5A175BAD-6DB8-4755-85F5-B6CAA8F1418F}"/>
+                <a16:creationId xmlns:a16="http://schemas.microsoft.com/office/drawing/2014/main" id="{D69990CD-FFC3-458B-AFD0-940D78C85BF2}"/>
               </a:ext>
             </a:extLst>
           </p:cNvPr>
@@ -5114,50 +5186,112 @@
           <a:p>
             <a:r>
               <a:rPr lang="en-US" dirty="0"/>
-              <a:t>Efficient Initialization</a:t>
-            </a:r>
-          </a:p>
-        </p:txBody>
-      </p:sp>
-      <p:pic>
-        <p:nvPicPr>
-          <p:cNvPr id="5" name="Content Placeholder 4">
+              <a:t>Limitations</a:t>
+            </a:r>
+          </a:p>
+        </p:txBody>
+      </p:sp>
+      <p:sp>
+        <p:nvSpPr>
+          <p:cNvPr id="3" name="Content Placeholder 2">
             <a:extLst>
               <a:ext uri="{FF2B5EF4-FFF2-40B4-BE49-F238E27FC236}">
-                <a16:creationId xmlns:a16="http://schemas.microsoft.com/office/drawing/2014/main" id="{9DD3D007-1BA8-41F3-A825-95498023AD01}"/>
+                <a16:creationId xmlns:a16="http://schemas.microsoft.com/office/drawing/2014/main" id="{6B762A61-FCBB-47FB-BB0F-82FE5520D3D0}"/>
               </a:ext>
             </a:extLst>
           </p:cNvPr>
-          <p:cNvPicPr>
-            <a:picLocks noGrp="1" noChangeAspect="1"/>
-          </p:cNvPicPr>
+          <p:cNvSpPr>
+            <a:spLocks noGrp="1"/>
+          </p:cNvSpPr>
           <p:nvPr>
             <p:ph idx="1"/>
           </p:nvPr>
-        </p:nvPicPr>
-        <p:blipFill>
-          <a:blip r:embed="rId2">
-            <a:extLst>
-              <a:ext uri="{28A0092B-C50C-407E-A947-70E740481C1C}">
-                <a14:useLocalDpi xmlns:a14="http://schemas.microsoft.com/office/drawing/2010/main" val="0"/>
-              </a:ext>
-            </a:extLst>
-          </a:blip>
-          <a:stretch>
-            <a:fillRect/>
-          </a:stretch>
-        </p:blipFill>
-        <p:spPr>
-          <a:xfrm>
-            <a:off x="1385105" y="1825625"/>
-            <a:ext cx="6373790" cy="4351338"/>
-          </a:xfrm>
-        </p:spPr>
-      </p:pic>
+        </p:nvSpPr>
+        <p:spPr/>
+        <p:txBody>
+          <a:bodyPr>
+            <a:normAutofit lnSpcReduction="10000"/>
+          </a:bodyPr>
+          <a:lstStyle/>
+          <a:p>
+            <a:r>
+              <a:rPr lang="en-US" dirty="0"/>
+              <a:t>Overhead</a:t>
+            </a:r>
+          </a:p>
+          <a:p>
+            <a:pPr lvl="1"/>
+            <a:r>
+              <a:rPr lang="en-US" dirty="0"/>
+              <a:t>Lazy learner</a:t>
+            </a:r>
+          </a:p>
+          <a:p>
+            <a:pPr lvl="1"/>
+            <a:r>
+              <a:rPr lang="en-US" dirty="0"/>
+              <a:t>Retrain Gaussian process regressor every iteration</a:t>
+            </a:r>
+          </a:p>
+          <a:p>
+            <a:r>
+              <a:rPr lang="en-US" dirty="0"/>
+              <a:t>(Hyper)-Hyperparameters</a:t>
+            </a:r>
+          </a:p>
+          <a:p>
+            <a:pPr lvl="1"/>
+            <a:r>
+              <a:rPr lang="en-US" dirty="0"/>
+              <a:t>Kernel choice</a:t>
+            </a:r>
+          </a:p>
+          <a:p>
+            <a:pPr lvl="1"/>
+            <a:r>
+              <a:rPr lang="en-US" dirty="0"/>
+              <a:t>Scaling</a:t>
+            </a:r>
+          </a:p>
+          <a:p>
+            <a:r>
+              <a:rPr lang="en-US" dirty="0"/>
+              <a:t>Sequential (traditionally)</a:t>
+            </a:r>
+          </a:p>
+          <a:p>
+            <a:pPr lvl="1"/>
+            <a:r>
+              <a:rPr lang="en-US" dirty="0"/>
+              <a:t>Smarter initialization</a:t>
+            </a:r>
+          </a:p>
+          <a:p>
+            <a:pPr lvl="1"/>
+            <a:r>
+              <a:rPr lang="en-US" dirty="0"/>
+              <a:t>Efficient sampling</a:t>
+            </a:r>
+          </a:p>
+          <a:p>
+            <a:r>
+              <a:rPr lang="en-US" dirty="0"/>
+              <a:t>Bounds</a:t>
+            </a:r>
+          </a:p>
+          <a:p>
+            <a:pPr lvl="1"/>
+            <a:r>
+              <a:rPr lang="en-US" dirty="0"/>
+              <a:t>Not unique to Bayesian Optimization</a:t>
+            </a:r>
+          </a:p>
+        </p:txBody>
+      </p:sp>
     </p:spTree>
     <p:extLst>
       <p:ext uri="{BB962C8B-B14F-4D97-AF65-F5344CB8AC3E}">
-        <p14:creationId xmlns:p14="http://schemas.microsoft.com/office/powerpoint/2010/main" val="2246093920"/>
+        <p14:creationId xmlns:p14="http://schemas.microsoft.com/office/powerpoint/2010/main" val="2916254856"/>
       </p:ext>
     </p:extLst>
   </p:cSld>
@@ -5189,7 +5323,7 @@
           <p:cNvPr id="2" name="Title 1">
             <a:extLst>
               <a:ext uri="{FF2B5EF4-FFF2-40B4-BE49-F238E27FC236}">
-                <a16:creationId xmlns:a16="http://schemas.microsoft.com/office/drawing/2014/main" id="{51968D0D-4E70-4927-895B-C2DAF0D03B3C}"/>
+                <a16:creationId xmlns:a16="http://schemas.microsoft.com/office/drawing/2014/main" id="{5A175BAD-6DB8-4755-85F5-B6CAA8F1418F}"/>
               </a:ext>
             </a:extLst>
           </p:cNvPr>
@@ -5207,64 +5341,170 @@
           <a:p>
             <a:r>
               <a:rPr lang="en-US" dirty="0"/>
-              <a:t>Efficient Sampling</a:t>
-            </a:r>
-          </a:p>
-        </p:txBody>
-      </p:sp>
-      <p:sp>
-        <p:nvSpPr>
-          <p:cNvPr id="3" name="Content Placeholder 2">
+              <a:t>Efficient Initialization</a:t>
+            </a:r>
+          </a:p>
+        </p:txBody>
+      </p:sp>
+      <p:pic>
+        <p:nvPicPr>
+          <p:cNvPr id="5" name="Content Placeholder 4">
             <a:extLst>
               <a:ext uri="{FF2B5EF4-FFF2-40B4-BE49-F238E27FC236}">
-                <a16:creationId xmlns:a16="http://schemas.microsoft.com/office/drawing/2014/main" id="{5BD68C22-53FA-4C7D-9E99-7300D121CA08}"/>
+                <a16:creationId xmlns:a16="http://schemas.microsoft.com/office/drawing/2014/main" id="{9DD3D007-1BA8-41F3-A825-95498023AD01}"/>
               </a:ext>
             </a:extLst>
           </p:cNvPr>
-          <p:cNvSpPr>
-            <a:spLocks noGrp="1"/>
-          </p:cNvSpPr>
+          <p:cNvPicPr>
+            <a:picLocks noGrp="1" noChangeAspect="1"/>
+          </p:cNvPicPr>
           <p:nvPr>
             <p:ph idx="1"/>
           </p:nvPr>
-        </p:nvSpPr>
-        <p:spPr/>
-        <p:txBody>
-          <a:bodyPr/>
-          <a:lstStyle/>
-          <a:p>
-            <a:r>
-              <a:rPr lang="en-US" dirty="0"/>
-              <a:t>Batched parallel sampling</a:t>
-            </a:r>
-          </a:p>
-          <a:p>
-            <a:pPr lvl="1"/>
-            <a:r>
-              <a:rPr lang="en-US" dirty="0"/>
-              <a:t>Cost/benefit analysis</a:t>
-            </a:r>
-          </a:p>
-          <a:p>
-            <a:pPr lvl="1"/>
-            <a:r>
-              <a:rPr lang="en-US" dirty="0"/>
-              <a:t>Utility function type</a:t>
-            </a:r>
-          </a:p>
-          <a:p>
-            <a:pPr lvl="1"/>
-            <a:r>
-              <a:rPr lang="en-US" dirty="0"/>
-              <a:t>Utility function parameters</a:t>
-            </a:r>
-          </a:p>
-        </p:txBody>
-      </p:sp>
+        </p:nvPicPr>
+        <p:blipFill>
+          <a:blip r:embed="rId2">
+            <a:extLst>
+              <a:ext uri="{28A0092B-C50C-407E-A947-70E740481C1C}">
+                <a14:useLocalDpi xmlns:a14="http://schemas.microsoft.com/office/drawing/2010/main" val="0"/>
+              </a:ext>
+            </a:extLst>
+          </a:blip>
+          <a:stretch>
+            <a:fillRect/>
+          </a:stretch>
+        </p:blipFill>
+        <p:spPr>
+          <a:xfrm>
+            <a:off x="1385105" y="1825625"/>
+            <a:ext cx="6373790" cy="4351338"/>
+          </a:xfrm>
+        </p:spPr>
+      </p:pic>
+      <p:grpSp>
+        <p:nvGrpSpPr>
+          <p:cNvPr id="8" name="Group 7">
+            <a:extLst>
+              <a:ext uri="{FF2B5EF4-FFF2-40B4-BE49-F238E27FC236}">
+                <a16:creationId xmlns:a16="http://schemas.microsoft.com/office/drawing/2014/main" id="{014B2B71-85B2-4BC2-9DA1-885D0FF8901B}"/>
+              </a:ext>
+            </a:extLst>
+          </p:cNvPr>
+          <p:cNvGrpSpPr/>
+          <p:nvPr/>
+        </p:nvGrpSpPr>
+        <p:grpSpPr>
+          <a:xfrm>
+            <a:off x="1385105" y="1761689"/>
+            <a:ext cx="6373789" cy="3724711"/>
+            <a:chOff x="1385105" y="1761689"/>
+            <a:chExt cx="6373789" cy="3724711"/>
+          </a:xfrm>
+        </p:grpSpPr>
+        <p:sp>
+          <p:nvSpPr>
+            <p:cNvPr id="3" name="Rectangle 2">
+              <a:extLst>
+                <a:ext uri="{FF2B5EF4-FFF2-40B4-BE49-F238E27FC236}">
+                  <a16:creationId xmlns:a16="http://schemas.microsoft.com/office/drawing/2014/main" id="{A8219966-172D-42B8-883D-7E5CF7FDAF20}"/>
+                </a:ext>
+              </a:extLst>
+            </p:cNvPr>
+            <p:cNvSpPr/>
+            <p:nvPr/>
+          </p:nvSpPr>
+          <p:spPr>
+            <a:xfrm>
+              <a:off x="1385105" y="1761689"/>
+              <a:ext cx="6373789" cy="2491530"/>
+            </a:xfrm>
+            <a:prstGeom prst="rect">
+              <a:avLst/>
+            </a:prstGeom>
+            <a:noFill/>
+            <a:ln>
+              <a:solidFill>
+                <a:srgbClr val="FF0000"/>
+              </a:solidFill>
+            </a:ln>
+          </p:spPr>
+          <p:style>
+            <a:lnRef idx="2">
+              <a:schemeClr val="accent1">
+                <a:shade val="50000"/>
+              </a:schemeClr>
+            </a:lnRef>
+            <a:fillRef idx="1">
+              <a:schemeClr val="accent1"/>
+            </a:fillRef>
+            <a:effectRef idx="0">
+              <a:schemeClr val="accent1"/>
+            </a:effectRef>
+            <a:fontRef idx="minor">
+              <a:schemeClr val="lt1"/>
+            </a:fontRef>
+          </p:style>
+          <p:txBody>
+            <a:bodyPr rtlCol="0" anchor="ctr"/>
+            <a:lstStyle/>
+            <a:p>
+              <a:pPr algn="ctr"/>
+              <a:endParaRPr lang="en-US"/>
+            </a:p>
+          </p:txBody>
+        </p:sp>
+        <p:cxnSp>
+          <p:nvCxnSpPr>
+            <p:cNvPr id="6" name="Connector: Elbow 5">
+              <a:extLst>
+                <a:ext uri="{FF2B5EF4-FFF2-40B4-BE49-F238E27FC236}">
+                  <a16:creationId xmlns:a16="http://schemas.microsoft.com/office/drawing/2014/main" id="{59F9D8BC-46F6-469E-ABEF-6DFE84B46EE0}"/>
+                </a:ext>
+              </a:extLst>
+            </p:cNvPr>
+            <p:cNvCxnSpPr>
+              <a:cxnSpLocks/>
+              <a:stCxn id="3" idx="3"/>
+            </p:cNvCxnSpPr>
+            <p:nvPr/>
+          </p:nvCxnSpPr>
+          <p:spPr>
+            <a:xfrm flipH="1">
+              <a:off x="3330432" y="3007454"/>
+              <a:ext cx="4428462" cy="2478946"/>
+            </a:xfrm>
+            <a:prstGeom prst="bentConnector3">
+              <a:avLst>
+                <a:gd name="adj1" fmla="val -5162"/>
+              </a:avLst>
+            </a:prstGeom>
+            <a:ln w="12700">
+              <a:solidFill>
+                <a:srgbClr val="FF0000"/>
+              </a:solidFill>
+              <a:tailEnd type="triangle"/>
+            </a:ln>
+          </p:spPr>
+          <p:style>
+            <a:lnRef idx="1">
+              <a:schemeClr val="accent1"/>
+            </a:lnRef>
+            <a:fillRef idx="0">
+              <a:schemeClr val="accent1"/>
+            </a:fillRef>
+            <a:effectRef idx="0">
+              <a:schemeClr val="accent1"/>
+            </a:effectRef>
+            <a:fontRef idx="minor">
+              <a:schemeClr val="tx1"/>
+            </a:fontRef>
+          </p:style>
+        </p:cxnSp>
+      </p:grpSp>
     </p:spTree>
     <p:extLst>
       <p:ext uri="{BB962C8B-B14F-4D97-AF65-F5344CB8AC3E}">
-        <p14:creationId xmlns:p14="http://schemas.microsoft.com/office/powerpoint/2010/main" val="1258991738"/>
+        <p14:creationId xmlns:p14="http://schemas.microsoft.com/office/powerpoint/2010/main" val="2246093920"/>
       </p:ext>
     </p:extLst>
   </p:cSld>
@@ -5296,6 +5536,113 @@
           <p:cNvPr id="2" name="Title 1">
             <a:extLst>
               <a:ext uri="{FF2B5EF4-FFF2-40B4-BE49-F238E27FC236}">
+                <a16:creationId xmlns:a16="http://schemas.microsoft.com/office/drawing/2014/main" id="{51968D0D-4E70-4927-895B-C2DAF0D03B3C}"/>
+              </a:ext>
+            </a:extLst>
+          </p:cNvPr>
+          <p:cNvSpPr>
+            <a:spLocks noGrp="1"/>
+          </p:cNvSpPr>
+          <p:nvPr>
+            <p:ph type="title"/>
+          </p:nvPr>
+        </p:nvSpPr>
+        <p:spPr/>
+        <p:txBody>
+          <a:bodyPr/>
+          <a:lstStyle/>
+          <a:p>
+            <a:r>
+              <a:rPr lang="en-US" dirty="0"/>
+              <a:t>Efficient Sampling</a:t>
+            </a:r>
+          </a:p>
+        </p:txBody>
+      </p:sp>
+      <p:sp>
+        <p:nvSpPr>
+          <p:cNvPr id="3" name="Content Placeholder 2">
+            <a:extLst>
+              <a:ext uri="{FF2B5EF4-FFF2-40B4-BE49-F238E27FC236}">
+                <a16:creationId xmlns:a16="http://schemas.microsoft.com/office/drawing/2014/main" id="{5BD68C22-53FA-4C7D-9E99-7300D121CA08}"/>
+              </a:ext>
+            </a:extLst>
+          </p:cNvPr>
+          <p:cNvSpPr>
+            <a:spLocks noGrp="1"/>
+          </p:cNvSpPr>
+          <p:nvPr>
+            <p:ph idx="1"/>
+          </p:nvPr>
+        </p:nvSpPr>
+        <p:spPr/>
+        <p:txBody>
+          <a:bodyPr/>
+          <a:lstStyle/>
+          <a:p>
+            <a:r>
+              <a:rPr lang="en-US" dirty="0"/>
+              <a:t>Batched parallel sampling</a:t>
+            </a:r>
+          </a:p>
+          <a:p>
+            <a:pPr lvl="1"/>
+            <a:r>
+              <a:rPr lang="en-US" dirty="0"/>
+              <a:t>Cost/benefit analysis</a:t>
+            </a:r>
+          </a:p>
+          <a:p>
+            <a:pPr lvl="1"/>
+            <a:r>
+              <a:rPr lang="en-US" dirty="0"/>
+              <a:t>Utility function type</a:t>
+            </a:r>
+          </a:p>
+          <a:p>
+            <a:pPr lvl="1"/>
+            <a:r>
+              <a:rPr lang="en-US" dirty="0"/>
+              <a:t>Utility function parameters</a:t>
+            </a:r>
+          </a:p>
+        </p:txBody>
+      </p:sp>
+    </p:spTree>
+    <p:extLst>
+      <p:ext uri="{BB962C8B-B14F-4D97-AF65-F5344CB8AC3E}">
+        <p14:creationId xmlns:p14="http://schemas.microsoft.com/office/powerpoint/2010/main" val="1258991738"/>
+      </p:ext>
+    </p:extLst>
+  </p:cSld>
+  <p:clrMapOvr>
+    <a:masterClrMapping/>
+  </p:clrMapOvr>
+</p:sld>
+</file>
+
+<file path=ppt/slides/slide25.xml><?xml version="1.0" encoding="utf-8"?>
+<p:sld xmlns:a="http://schemas.openxmlformats.org/drawingml/2006/main" xmlns:r="http://schemas.openxmlformats.org/officeDocument/2006/relationships" xmlns:p="http://schemas.openxmlformats.org/presentationml/2006/main">
+  <p:cSld>
+    <p:spTree>
+      <p:nvGrpSpPr>
+        <p:cNvPr id="1" name=""/>
+        <p:cNvGrpSpPr/>
+        <p:nvPr/>
+      </p:nvGrpSpPr>
+      <p:grpSpPr>
+        <a:xfrm>
+          <a:off x="0" y="0"/>
+          <a:ext cx="0" cy="0"/>
+          <a:chOff x="0" y="0"/>
+          <a:chExt cx="0" cy="0"/>
+        </a:xfrm>
+      </p:grpSpPr>
+      <p:sp>
+        <p:nvSpPr>
+          <p:cNvPr id="2" name="Title 1">
+            <a:extLst>
+              <a:ext uri="{FF2B5EF4-FFF2-40B4-BE49-F238E27FC236}">
                 <a16:creationId xmlns:a16="http://schemas.microsoft.com/office/drawing/2014/main" id="{9592584F-B7D5-4727-97B4-4243AD36D413}"/>
               </a:ext>
             </a:extLst>
@@ -5361,10 +5708,10 @@
         </p:nvGrpSpPr>
         <p:grpSpPr>
           <a:xfrm>
-            <a:off x="675409" y="3228426"/>
-            <a:ext cx="7793182" cy="2743200"/>
-            <a:chOff x="-522017" y="2725086"/>
-            <a:chExt cx="7793182" cy="2743200"/>
+            <a:off x="675409" y="3243043"/>
+            <a:ext cx="7793182" cy="2713965"/>
+            <a:chOff x="-522017" y="2739703"/>
+            <a:chExt cx="7793182" cy="2713965"/>
           </a:xfrm>
         </p:grpSpPr>
         <p:pic>
@@ -5395,8 +5742,8 @@
           </p:blipFill>
           <p:spPr>
             <a:xfrm>
-              <a:off x="3336474" y="2725086"/>
-              <a:ext cx="3934691" cy="2743200"/>
+              <a:off x="3336474" y="2744136"/>
+              <a:ext cx="3934691" cy="2705100"/>
             </a:xfrm>
             <a:prstGeom prst="rect">
               <a:avLst/>
@@ -5431,8 +5778,8 @@
           </p:blipFill>
           <p:spPr>
             <a:xfrm>
-              <a:off x="-522017" y="2725086"/>
-              <a:ext cx="3858491" cy="2743200"/>
+              <a:off x="-522017" y="2739703"/>
+              <a:ext cx="3858491" cy="2713965"/>
             </a:xfrm>
             <a:prstGeom prst="rect">
               <a:avLst/>
@@ -5453,7 +5800,7 @@
 </p:sld>
 </file>
 
-<file path=ppt/slides/slide25.xml><?xml version="1.0" encoding="utf-8"?>
+<file path=ppt/slides/slide26.xml><?xml version="1.0" encoding="utf-8"?>
 <p:sld xmlns:a="http://schemas.openxmlformats.org/drawingml/2006/main" xmlns:r="http://schemas.openxmlformats.org/officeDocument/2006/relationships" xmlns:p="http://schemas.openxmlformats.org/presentationml/2006/main">
   <p:cSld>
     <p:spTree>
@@ -5493,7 +5840,7 @@
           <a:p>
             <a:r>
               <a:rPr lang="en-US" dirty="0"/>
-              <a:t>Scaling Issues</a:t>
+              <a:t>Scaling issues</a:t>
             </a:r>
           </a:p>
         </p:txBody>
@@ -5516,24 +5863,127 @@
         </p:nvSpPr>
         <p:spPr/>
         <p:txBody>
-          <a:bodyPr anchor="ctr"/>
-          <a:lstStyle/>
-          <a:p>
-            <a:pPr marL="0" indent="0" algn="ctr">
-              <a:buNone/>
-            </a:pPr>
-            <a:r>
-              <a:rPr lang="en-US" dirty="0" err="1"/>
-              <a:t>gp_scaling.ipynb</a:t>
-            </a:r>
-            <a:endParaRPr lang="en-US" dirty="0"/>
-          </a:p>
-        </p:txBody>
-      </p:sp>
+          <a:bodyPr/>
+          <a:lstStyle/>
+          <a:p>
+            <a:r>
+              <a:rPr lang="en-US" dirty="0"/>
+              <a:t>Two methods</a:t>
+            </a:r>
+          </a:p>
+          <a:p>
+            <a:pPr lvl="1"/>
+            <a:r>
+              <a:rPr lang="en-US" dirty="0"/>
+              <a:t>Modify the kernel</a:t>
+            </a:r>
+          </a:p>
+          <a:p>
+            <a:pPr lvl="1"/>
+            <a:r>
+              <a:rPr lang="en-US" dirty="0"/>
+              <a:t>Transform the input (normalize)</a:t>
+            </a:r>
+          </a:p>
+        </p:txBody>
+      </p:sp>
+      <p:grpSp>
+        <p:nvGrpSpPr>
+          <p:cNvPr id="8" name="Group 7">
+            <a:extLst>
+              <a:ext uri="{FF2B5EF4-FFF2-40B4-BE49-F238E27FC236}">
+                <a16:creationId xmlns:a16="http://schemas.microsoft.com/office/drawing/2014/main" id="{AB9E7961-10C5-40E0-802A-F3E8BF7FFDA1}"/>
+              </a:ext>
+            </a:extLst>
+          </p:cNvPr>
+          <p:cNvGrpSpPr/>
+          <p:nvPr/>
+        </p:nvGrpSpPr>
+        <p:grpSpPr>
+          <a:xfrm>
+            <a:off x="675409" y="3247476"/>
+            <a:ext cx="7793182" cy="2705100"/>
+            <a:chOff x="-522017" y="2744136"/>
+            <a:chExt cx="7793182" cy="2705100"/>
+          </a:xfrm>
+        </p:grpSpPr>
+        <p:pic>
+          <p:nvPicPr>
+            <p:cNvPr id="5" name="Picture 4">
+              <a:extLst>
+                <a:ext uri="{FF2B5EF4-FFF2-40B4-BE49-F238E27FC236}">
+                  <a16:creationId xmlns:a16="http://schemas.microsoft.com/office/drawing/2014/main" id="{F2722D7E-9EA2-4EAA-8D56-C1B9AA13A78D}"/>
+                </a:ext>
+              </a:extLst>
+            </p:cNvPr>
+            <p:cNvPicPr>
+              <a:picLocks noChangeAspect="1"/>
+            </p:cNvPicPr>
+            <p:nvPr/>
+          </p:nvPicPr>
+          <p:blipFill>
+            <a:blip r:embed="rId2">
+              <a:extLst>
+                <a:ext uri="{28A0092B-C50C-407E-A947-70E740481C1C}">
+                  <a14:useLocalDpi xmlns:a14="http://schemas.microsoft.com/office/drawing/2010/main" val="0"/>
+                </a:ext>
+              </a:extLst>
+            </a:blip>
+            <a:stretch>
+              <a:fillRect/>
+            </a:stretch>
+          </p:blipFill>
+          <p:spPr>
+            <a:xfrm>
+              <a:off x="3336474" y="2744136"/>
+              <a:ext cx="3934691" cy="2705100"/>
+            </a:xfrm>
+            <a:prstGeom prst="rect">
+              <a:avLst/>
+            </a:prstGeom>
+          </p:spPr>
+        </p:pic>
+        <p:pic>
+          <p:nvPicPr>
+            <p:cNvPr id="7" name="Picture 6">
+              <a:extLst>
+                <a:ext uri="{FF2B5EF4-FFF2-40B4-BE49-F238E27FC236}">
+                  <a16:creationId xmlns:a16="http://schemas.microsoft.com/office/drawing/2014/main" id="{4A707AC4-CFF5-451B-A344-43A3E8FC1C87}"/>
+                </a:ext>
+              </a:extLst>
+            </p:cNvPr>
+            <p:cNvPicPr>
+              <a:picLocks noChangeAspect="1"/>
+            </p:cNvPicPr>
+            <p:nvPr/>
+          </p:nvPicPr>
+          <p:blipFill>
+            <a:blip r:embed="rId3">
+              <a:extLst>
+                <a:ext uri="{28A0092B-C50C-407E-A947-70E740481C1C}">
+                  <a14:useLocalDpi xmlns:a14="http://schemas.microsoft.com/office/drawing/2010/main" val="0"/>
+                </a:ext>
+              </a:extLst>
+            </a:blip>
+            <a:stretch>
+              <a:fillRect/>
+            </a:stretch>
+          </p:blipFill>
+          <p:spPr>
+            <a:xfrm>
+              <a:off x="-522017" y="2770330"/>
+              <a:ext cx="3858491" cy="2652712"/>
+            </a:xfrm>
+            <a:prstGeom prst="rect">
+              <a:avLst/>
+            </a:prstGeom>
+          </p:spPr>
+        </p:pic>
+      </p:grpSp>
     </p:spTree>
     <p:extLst>
       <p:ext uri="{BB962C8B-B14F-4D97-AF65-F5344CB8AC3E}">
-        <p14:creationId xmlns:p14="http://schemas.microsoft.com/office/powerpoint/2010/main" val="1246883091"/>
+        <p14:creationId xmlns:p14="http://schemas.microsoft.com/office/powerpoint/2010/main" val="2388840515"/>
       </p:ext>
     </p:extLst>
   </p:cSld>
@@ -5543,7 +5993,7 @@
 </p:sld>
 </file>
 
-<file path=ppt/slides/slide26.xml><?xml version="1.0" encoding="utf-8"?>
+<file path=ppt/slides/slide27.xml><?xml version="1.0" encoding="utf-8"?>
 <p:sld xmlns:a="http://schemas.openxmlformats.org/drawingml/2006/main" xmlns:r="http://schemas.openxmlformats.org/officeDocument/2006/relationships" xmlns:p="http://schemas.openxmlformats.org/presentationml/2006/main">
   <p:cSld>
     <p:spTree>
@@ -5682,7 +6132,7 @@
 </p:sld>
 </file>
 
-<file path=ppt/slides/slide27.xml><?xml version="1.0" encoding="utf-8"?>
+<file path=ppt/slides/slide28.xml><?xml version="1.0" encoding="utf-8"?>
 <p:sld xmlns:a="http://schemas.openxmlformats.org/drawingml/2006/main" xmlns:r="http://schemas.openxmlformats.org/officeDocument/2006/relationships" xmlns:p="http://schemas.openxmlformats.org/presentationml/2006/main">
   <p:cSld>
     <p:spTree>
@@ -5867,7 +6317,7 @@
 </p:sld>
 </file>
 
-<file path=ppt/slides/slide28.xml><?xml version="1.0" encoding="utf-8"?>
+<file path=ppt/slides/slide29.xml><?xml version="1.0" encoding="utf-8"?>
 <p:sld xmlns:a="http://schemas.openxmlformats.org/drawingml/2006/main" xmlns:r="http://schemas.openxmlformats.org/officeDocument/2006/relationships" xmlns:p="http://schemas.openxmlformats.org/presentationml/2006/main">
   <p:cSld>
     <p:spTree>
@@ -6924,7 +7374,7 @@
           <p:cNvPr id="2" name="Title 1">
             <a:extLst>
               <a:ext uri="{FF2B5EF4-FFF2-40B4-BE49-F238E27FC236}">
-                <a16:creationId xmlns:a16="http://schemas.microsoft.com/office/drawing/2014/main" id="{667A730E-90A1-4F9A-9A9F-74F2F3EDE3F9}"/>
+                <a16:creationId xmlns:a16="http://schemas.microsoft.com/office/drawing/2014/main" id="{C9DA81FC-EA64-49FB-810C-9368D0B124BB}"/>
               </a:ext>
             </a:extLst>
           </p:cNvPr>
@@ -6942,7 +7392,7 @@
           <a:p>
             <a:r>
               <a:rPr lang="en-US" dirty="0"/>
-              <a:t>Simple Regression</a:t>
+              <a:t>Installation</a:t>
             </a:r>
           </a:p>
         </p:txBody>
@@ -6952,7 +7402,7 @@
           <p:cNvPr id="3" name="Content Placeholder 2">
             <a:extLst>
               <a:ext uri="{FF2B5EF4-FFF2-40B4-BE49-F238E27FC236}">
-                <a16:creationId xmlns:a16="http://schemas.microsoft.com/office/drawing/2014/main" id="{F93E3142-3D8D-445C-A435-2E59134311BA}"/>
+                <a16:creationId xmlns:a16="http://schemas.microsoft.com/office/drawing/2014/main" id="{EDBE9FDB-664D-4A5D-BF6A-F6BAAB5D6AB1}"/>
               </a:ext>
             </a:extLst>
           </p:cNvPr>
@@ -6965,7 +7415,7 @@
         </p:nvSpPr>
         <p:spPr>
           <a:xfrm>
-            <a:off x="628650" y="1817236"/>
+            <a:off x="628650" y="1825625"/>
             <a:ext cx="7886700" cy="4351338"/>
           </a:xfrm>
         </p:spPr>
@@ -6973,14 +7423,43 @@
           <a:bodyPr/>
           <a:lstStyle/>
           <a:p>
+            <a:pPr marL="0" indent="0">
+              <a:buNone/>
+            </a:pPr>
+            <a:r>
+              <a:rPr lang="en-US" dirty="0"/>
+              <a:t>&gt;pip install </a:t>
+            </a:r>
+            <a:r>
+              <a:rPr lang="en-US" dirty="0" err="1"/>
+              <a:t>bayesian</a:t>
+            </a:r>
+            <a:r>
+              <a:rPr lang="en-US" dirty="0"/>
+              <a:t>-optimization</a:t>
+            </a:r>
+          </a:p>
+          <a:p>
+            <a:pPr marL="0" indent="0">
+              <a:buNone/>
+            </a:pPr>
             <a:endParaRPr lang="en-US" dirty="0"/>
+          </a:p>
+          <a:p>
+            <a:pPr marL="0" indent="0" algn="r">
+              <a:buNone/>
+            </a:pPr>
+            <a:r>
+              <a:rPr lang="en-US" dirty="0"/>
+              <a:t>…that’s it.</a:t>
+            </a:r>
           </a:p>
         </p:txBody>
       </p:sp>
     </p:spTree>
     <p:extLst>
       <p:ext uri="{BB962C8B-B14F-4D97-AF65-F5344CB8AC3E}">
-        <p14:creationId xmlns:p14="http://schemas.microsoft.com/office/powerpoint/2010/main" val="1872074075"/>
+        <p14:creationId xmlns:p14="http://schemas.microsoft.com/office/powerpoint/2010/main" val="2896999339"/>
       </p:ext>
     </p:extLst>
   </p:cSld>
@@ -7012,7 +7491,7 @@
           <p:cNvPr id="2" name="Title 1">
             <a:extLst>
               <a:ext uri="{FF2B5EF4-FFF2-40B4-BE49-F238E27FC236}">
-                <a16:creationId xmlns:a16="http://schemas.microsoft.com/office/drawing/2014/main" id="{B6E2BE2B-529F-4D96-B2E7-734665BD9FBB}"/>
+                <a16:creationId xmlns:a16="http://schemas.microsoft.com/office/drawing/2014/main" id="{667A730E-90A1-4F9A-9A9F-74F2F3EDE3F9}"/>
               </a:ext>
             </a:extLst>
           </p:cNvPr>
@@ -7030,7 +7509,7 @@
           <a:p>
             <a:r>
               <a:rPr lang="en-US" dirty="0"/>
-              <a:t>Simple Classification</a:t>
+              <a:t>Example 1</a:t>
             </a:r>
           </a:p>
         </p:txBody>
@@ -7040,7 +7519,7 @@
           <p:cNvPr id="3" name="Content Placeholder 2">
             <a:extLst>
               <a:ext uri="{FF2B5EF4-FFF2-40B4-BE49-F238E27FC236}">
-                <a16:creationId xmlns:a16="http://schemas.microsoft.com/office/drawing/2014/main" id="{3E0CA400-092D-4764-971C-E868F4D7C54E}"/>
+                <a16:creationId xmlns:a16="http://schemas.microsoft.com/office/drawing/2014/main" id="{F93E3142-3D8D-445C-A435-2E59134311BA}"/>
               </a:ext>
             </a:extLst>
           </p:cNvPr>
@@ -7051,19 +7530,32 @@
             <p:ph idx="1"/>
           </p:nvPr>
         </p:nvSpPr>
-        <p:spPr/>
-        <p:txBody>
-          <a:bodyPr/>
-          <a:lstStyle/>
-          <a:p>
-            <a:endParaRPr lang="en-US" dirty="0"/>
+        <p:spPr>
+          <a:xfrm>
+            <a:off x="628650" y="1817236"/>
+            <a:ext cx="7886700" cy="4351338"/>
+          </a:xfrm>
+        </p:spPr>
+        <p:txBody>
+          <a:bodyPr anchor="ctr">
+            <a:normAutofit/>
+          </a:bodyPr>
+          <a:lstStyle/>
+          <a:p>
+            <a:pPr marL="0" indent="0" algn="ctr">
+              <a:buNone/>
+            </a:pPr>
+            <a:r>
+              <a:rPr lang="en-US" dirty="0"/>
+              <a:t>simple_regression.ipynb</a:t>
+            </a:r>
           </a:p>
         </p:txBody>
       </p:sp>
     </p:spTree>
     <p:extLst>
       <p:ext uri="{BB962C8B-B14F-4D97-AF65-F5344CB8AC3E}">
-        <p14:creationId xmlns:p14="http://schemas.microsoft.com/office/powerpoint/2010/main" val="2585097853"/>
+        <p14:creationId xmlns:p14="http://schemas.microsoft.com/office/powerpoint/2010/main" val="1872074075"/>
       </p:ext>
     </p:extLst>
   </p:cSld>

</xml_diff>

<commit_message>
Changes to PPT and added simple classification example.
</commit_message>
<xml_diff>
--- a/Data_science_nashville_jkk.pptx
+++ b/Data_science_nashville_jkk.pptx
@@ -7546,9 +7546,12 @@
               <a:buNone/>
             </a:pPr>
             <a:r>
-              <a:rPr lang="en-US" dirty="0"/>
+              <a:rPr lang="en-US" dirty="0">
+                <a:hlinkClick r:id="rId2"/>
+              </a:rPr>
               <a:t>simple_regression.ipynb</a:t>
             </a:r>
+            <a:endParaRPr lang="en-US" dirty="0"/>
           </a:p>
         </p:txBody>
       </p:sp>

</xml_diff>

<commit_message>
Added some slide content and rearranged some elements.
</commit_message>
<xml_diff>
--- a/Data_science_nashville_jkk.pptx
+++ b/Data_science_nashville_jkk.pptx
@@ -3148,7 +3148,9 @@
               <a:buNone/>
             </a:pPr>
             <a:r>
-              <a:rPr lang="en-US" dirty="0" err="1"/>
+              <a:rPr lang="en-US" dirty="0">
+                <a:hlinkClick r:id="rId2"/>
+              </a:rPr>
               <a:t>simple_classification.ipynb</a:t>
             </a:r>
             <a:endParaRPr lang="en-US" dirty="0"/>
@@ -3231,9 +3233,44 @@
         </p:nvSpPr>
         <p:spPr/>
         <p:txBody>
-          <a:bodyPr/>
-          <a:lstStyle/>
-          <a:p>
+          <a:bodyPr anchor="ctr"/>
+          <a:lstStyle/>
+          <a:p>
+            <a:pPr marL="0" indent="0" algn="ctr">
+              <a:buNone/>
+            </a:pPr>
+            <a:r>
+              <a:rPr lang="en-US" dirty="0" err="1"/>
+              <a:t>process_mercari.ipynb</a:t>
+            </a:r>
+            <a:endParaRPr lang="en-US" dirty="0"/>
+          </a:p>
+          <a:p>
+            <a:pPr marL="0" indent="0" algn="ctr">
+              <a:buNone/>
+            </a:pPr>
+            <a:r>
+              <a:rPr lang="en-US" dirty="0"/>
+              <a:t>bayes_opt_mercari_sub.py</a:t>
+            </a:r>
+          </a:p>
+          <a:p>
+            <a:pPr marL="0" indent="0" algn="ctr">
+              <a:buNone/>
+            </a:pPr>
+            <a:r>
+              <a:rPr lang="en-US" dirty="0"/>
+              <a:t>bayes_opt_mercari_full.py</a:t>
+            </a:r>
+          </a:p>
+          <a:p>
+            <a:pPr marL="0" indent="0" algn="ctr">
+              <a:buNone/>
+            </a:pPr>
+            <a:r>
+              <a:rPr lang="en-US" dirty="0" err="1"/>
+              <a:t>bayes_opt_mercari_analysis.ipynb</a:t>
+            </a:r>
             <a:endParaRPr lang="en-US" dirty="0"/>
           </a:p>
         </p:txBody>
@@ -4925,7 +4962,9 @@
         </p:nvSpPr>
         <p:spPr/>
         <p:txBody>
-          <a:bodyPr/>
+          <a:bodyPr>
+            <a:normAutofit lnSpcReduction="10000"/>
+          </a:bodyPr>
           <a:lstStyle/>
           <a:p>
             <a:r>
@@ -4936,13 +4975,58 @@
           <a:p>
             <a:r>
               <a:rPr lang="en-US" dirty="0"/>
-              <a:t>For whatever reason, GBMs tend to be the most popular model types</a:t>
-            </a:r>
-          </a:p>
-          <a:p>
+              <a:t>For whatever reason, GBMs tend to be the most popular (single) model types</a:t>
+            </a:r>
+          </a:p>
+          <a:p>
+            <a:pPr lvl="1"/>
             <a:r>
               <a:rPr lang="en-US" dirty="0"/>
               <a:t>Significantly more hyperparameters to consider compared to GLMs</a:t>
+            </a:r>
+          </a:p>
+          <a:p>
+            <a:r>
+              <a:rPr lang="en-US" dirty="0"/>
+              <a:t>Most competitive teams use </a:t>
+            </a:r>
+            <a:r>
+              <a:rPr lang="en-US" dirty="0" err="1"/>
+              <a:t>ensembling</a:t>
+            </a:r>
+            <a:r>
+              <a:rPr lang="en-US" dirty="0"/>
+              <a:t> and/or stacking</a:t>
+            </a:r>
+          </a:p>
+          <a:p>
+            <a:pPr lvl="1"/>
+            <a:r>
+              <a:rPr lang="en-US" dirty="0"/>
+              <a:t>Zillow entry was a stacked model: </a:t>
+            </a:r>
+            <a:r>
+              <a:rPr lang="en-US" dirty="0" err="1"/>
+              <a:t>XGBoost</a:t>
+            </a:r>
+            <a:r>
+              <a:rPr lang="en-US" dirty="0"/>
+              <a:t>, Light GBM, Random Forest, Extra Trees, </a:t>
+            </a:r>
+            <a:r>
+              <a:rPr lang="en-US" dirty="0" err="1"/>
+              <a:t>AdaBoost</a:t>
+            </a:r>
+            <a:r>
+              <a:rPr lang="en-US" dirty="0"/>
+              <a:t> (tree-based), two Neural Networks, and a K-Nearest-Neighbor.</a:t>
+            </a:r>
+          </a:p>
+          <a:p>
+            <a:pPr lvl="1"/>
+            <a:r>
+              <a:rPr lang="en-US" dirty="0"/>
+              <a:t>Linear Regression meta-learner</a:t>
             </a:r>
           </a:p>
         </p:txBody>
@@ -7181,7 +7265,7 @@
           <a:p>
             <a:r>
               <a:rPr lang="en-US" dirty="0"/>
-              <a:t>Grid (naïve)</a:t>
+              <a:t>Grid</a:t>
             </a:r>
           </a:p>
           <a:p>

</xml_diff>

<commit_message>
Adding image to powerpoint and made some additional structural changes.
</commit_message>
<xml_diff>
--- a/Data_science_nashville_jkk.pptx
+++ b/Data_science_nashville_jkk.pptx
@@ -4,6 +4,9 @@
   <p:sldMasterIdLst>
     <p:sldMasterId id="2147483660" r:id="rId1"/>
   </p:sldMasterIdLst>
+  <p:handoutMasterIdLst>
+    <p:handoutMasterId r:id="rId31"/>
+  </p:handoutMasterIdLst>
   <p:sldIdLst>
     <p:sldId id="256" r:id="rId2"/>
     <p:sldId id="257" r:id="rId3"/>
@@ -20,7 +23,7 @@
     <p:sldId id="284" r:id="rId14"/>
     <p:sldId id="282" r:id="rId15"/>
     <p:sldId id="283" r:id="rId16"/>
-    <p:sldId id="272" r:id="rId17"/>
+    <p:sldId id="290" r:id="rId17"/>
     <p:sldId id="271" r:id="rId18"/>
     <p:sldId id="276" r:id="rId19"/>
     <p:sldId id="277" r:id="rId20"/>
@@ -144,6 +147,195 @@
 <p1510:revInfo xmlns:a="http://schemas.openxmlformats.org/drawingml/2006/main" xmlns:r="http://schemas.openxmlformats.org/officeDocument/2006/relationships" xmlns:p1510="http://schemas.microsoft.com/office/powerpoint/2015/10/main"/>
 </file>
 
+<file path=ppt/handoutMasters/handoutMaster1.xml><?xml version="1.0" encoding="utf-8"?>
+<p:handoutMaster xmlns:a="http://schemas.openxmlformats.org/drawingml/2006/main" xmlns:r="http://schemas.openxmlformats.org/officeDocument/2006/relationships" xmlns:p="http://schemas.openxmlformats.org/presentationml/2006/main">
+  <p:cSld>
+    <p:bg>
+      <p:bgRef idx="1001">
+        <a:schemeClr val="bg1"/>
+      </p:bgRef>
+    </p:bg>
+    <p:spTree>
+      <p:nvGrpSpPr>
+        <p:cNvPr id="1" name=""/>
+        <p:cNvGrpSpPr/>
+        <p:nvPr/>
+      </p:nvGrpSpPr>
+      <p:grpSpPr>
+        <a:xfrm>
+          <a:off x="0" y="0"/>
+          <a:ext cx="0" cy="0"/>
+          <a:chOff x="0" y="0"/>
+          <a:chExt cx="0" cy="0"/>
+        </a:xfrm>
+      </p:grpSpPr>
+      <p:sp>
+        <p:nvSpPr>
+          <p:cNvPr id="2" name="Header Placeholder 1">
+            <a:extLst>
+              <a:ext uri="{FF2B5EF4-FFF2-40B4-BE49-F238E27FC236}">
+                <a16:creationId xmlns:a16="http://schemas.microsoft.com/office/drawing/2014/main" id="{BDBCD9EE-9D35-4B75-9B4D-779332E72513}"/>
+              </a:ext>
+            </a:extLst>
+          </p:cNvPr>
+          <p:cNvSpPr>
+            <a:spLocks noGrp="1"/>
+          </p:cNvSpPr>
+          <p:nvPr>
+            <p:ph type="hdr" sz="quarter"/>
+          </p:nvPr>
+        </p:nvSpPr>
+        <p:spPr>
+          <a:xfrm>
+            <a:off x="0" y="0"/>
+            <a:ext cx="2971800" cy="458788"/>
+          </a:xfrm>
+          <a:prstGeom prst="rect">
+            <a:avLst/>
+          </a:prstGeom>
+        </p:spPr>
+        <p:txBody>
+          <a:bodyPr vert="horz" lIns="91440" tIns="45720" rIns="91440" bIns="45720" rtlCol="0"/>
+          <a:lstStyle>
+            <a:lvl1pPr algn="l">
+              <a:defRPr sz="1200"/>
+            </a:lvl1pPr>
+          </a:lstStyle>
+          <a:p>
+            <a:endParaRPr lang="en-US"/>
+          </a:p>
+        </p:txBody>
+      </p:sp>
+      <p:sp>
+        <p:nvSpPr>
+          <p:cNvPr id="3" name="Date Placeholder 2">
+            <a:extLst>
+              <a:ext uri="{FF2B5EF4-FFF2-40B4-BE49-F238E27FC236}">
+                <a16:creationId xmlns:a16="http://schemas.microsoft.com/office/drawing/2014/main" id="{DDEB8CAE-70F8-4D92-A1A1-0915ED2F4FF2}"/>
+              </a:ext>
+            </a:extLst>
+          </p:cNvPr>
+          <p:cNvSpPr>
+            <a:spLocks noGrp="1"/>
+          </p:cNvSpPr>
+          <p:nvPr>
+            <p:ph type="dt" sz="quarter" idx="1"/>
+          </p:nvPr>
+        </p:nvSpPr>
+        <p:spPr>
+          <a:xfrm>
+            <a:off x="3884613" y="0"/>
+            <a:ext cx="2971800" cy="458788"/>
+          </a:xfrm>
+          <a:prstGeom prst="rect">
+            <a:avLst/>
+          </a:prstGeom>
+        </p:spPr>
+        <p:txBody>
+          <a:bodyPr vert="horz" lIns="91440" tIns="45720" rIns="91440" bIns="45720" rtlCol="0"/>
+          <a:lstStyle>
+            <a:lvl1pPr algn="r">
+              <a:defRPr sz="1200"/>
+            </a:lvl1pPr>
+          </a:lstStyle>
+          <a:p>
+            <a:fld id="{F7690C9E-9892-4905-B5B0-5746785E07FC}" type="datetimeFigureOut">
+              <a:rPr lang="en-US" smtClean="0"/>
+              <a:t>1/22/2018</a:t>
+            </a:fld>
+            <a:endParaRPr lang="en-US"/>
+          </a:p>
+        </p:txBody>
+      </p:sp>
+      <p:sp>
+        <p:nvSpPr>
+          <p:cNvPr id="4" name="Footer Placeholder 3">
+            <a:extLst>
+              <a:ext uri="{FF2B5EF4-FFF2-40B4-BE49-F238E27FC236}">
+                <a16:creationId xmlns:a16="http://schemas.microsoft.com/office/drawing/2014/main" id="{D80AAEFC-EC3C-4A4D-BC92-FBC71BCB13CE}"/>
+              </a:ext>
+            </a:extLst>
+          </p:cNvPr>
+          <p:cNvSpPr>
+            <a:spLocks noGrp="1"/>
+          </p:cNvSpPr>
+          <p:nvPr>
+            <p:ph type="ftr" sz="quarter" idx="2"/>
+          </p:nvPr>
+        </p:nvSpPr>
+        <p:spPr>
+          <a:xfrm>
+            <a:off x="0" y="8685213"/>
+            <a:ext cx="2971800" cy="458787"/>
+          </a:xfrm>
+          <a:prstGeom prst="rect">
+            <a:avLst/>
+          </a:prstGeom>
+        </p:spPr>
+        <p:txBody>
+          <a:bodyPr vert="horz" lIns="91440" tIns="45720" rIns="91440" bIns="45720" rtlCol="0" anchor="b"/>
+          <a:lstStyle>
+            <a:lvl1pPr algn="l">
+              <a:defRPr sz="1200"/>
+            </a:lvl1pPr>
+          </a:lstStyle>
+          <a:p>
+            <a:endParaRPr lang="en-US"/>
+          </a:p>
+        </p:txBody>
+      </p:sp>
+      <p:sp>
+        <p:nvSpPr>
+          <p:cNvPr id="5" name="Slide Number Placeholder 4">
+            <a:extLst>
+              <a:ext uri="{FF2B5EF4-FFF2-40B4-BE49-F238E27FC236}">
+                <a16:creationId xmlns:a16="http://schemas.microsoft.com/office/drawing/2014/main" id="{A3ECFF19-41BD-407C-9ABF-8434A14B3D0D}"/>
+              </a:ext>
+            </a:extLst>
+          </p:cNvPr>
+          <p:cNvSpPr>
+            <a:spLocks noGrp="1"/>
+          </p:cNvSpPr>
+          <p:nvPr>
+            <p:ph type="sldNum" sz="quarter" idx="3"/>
+          </p:nvPr>
+        </p:nvSpPr>
+        <p:spPr>
+          <a:xfrm>
+            <a:off x="3884613" y="8685213"/>
+            <a:ext cx="2971800" cy="458787"/>
+          </a:xfrm>
+          <a:prstGeom prst="rect">
+            <a:avLst/>
+          </a:prstGeom>
+        </p:spPr>
+        <p:txBody>
+          <a:bodyPr vert="horz" lIns="91440" tIns="45720" rIns="91440" bIns="45720" rtlCol="0" anchor="b"/>
+          <a:lstStyle>
+            <a:lvl1pPr algn="r">
+              <a:defRPr sz="1200"/>
+            </a:lvl1pPr>
+          </a:lstStyle>
+          <a:p>
+            <a:fld id="{C10CF69A-3471-40A3-9240-61BDD7CBBC53}" type="slidenum">
+              <a:rPr lang="en-US" smtClean="0"/>
+              <a:t>‹#›</a:t>
+            </a:fld>
+            <a:endParaRPr lang="en-US"/>
+          </a:p>
+        </p:txBody>
+      </p:sp>
+    </p:spTree>
+    <p:extLst>
+      <p:ext uri="{BB962C8B-B14F-4D97-AF65-F5344CB8AC3E}">
+        <p14:creationId xmlns:p14="http://schemas.microsoft.com/office/powerpoint/2010/main" val="1373001781"/>
+      </p:ext>
+    </p:extLst>
+  </p:cSld>
+  <p:clrMap bg1="lt1" tx1="dk1" bg2="lt2" tx2="dk2" accent1="accent1" accent2="accent2" accent3="accent3" accent4="accent4" accent5="accent5" accent6="accent6" hlink="hlink" folHlink="folHlink"/>
+</p:handoutMaster>
+</file>
+
 <file path=ppt/slideLayouts/slideLayout1.xml><?xml version="1.0" encoding="utf-8"?>
 <p:sldLayout xmlns:a="http://schemas.openxmlformats.org/drawingml/2006/main" xmlns:r="http://schemas.openxmlformats.org/officeDocument/2006/relationships" xmlns:p="http://schemas.openxmlformats.org/presentationml/2006/main" type="title" preserve="1">
   <p:cSld name="Title Slide">
@@ -275,7 +467,7 @@
           <a:p>
             <a:fld id="{446A68C1-49B4-4B53-A4B5-FD8CED86E0B5}" type="datetimeFigureOut">
               <a:rPr lang="en-US" smtClean="0"/>
-              <a:t>1/21/2018</a:t>
+              <a:t>1/22/2018</a:t>
             </a:fld>
             <a:endParaRPr lang="en-US"/>
           </a:p>
@@ -445,7 +637,7 @@
           <a:p>
             <a:fld id="{446A68C1-49B4-4B53-A4B5-FD8CED86E0B5}" type="datetimeFigureOut">
               <a:rPr lang="en-US" smtClean="0"/>
-              <a:t>1/21/2018</a:t>
+              <a:t>1/22/2018</a:t>
             </a:fld>
             <a:endParaRPr lang="en-US"/>
           </a:p>
@@ -625,7 +817,7 @@
           <a:p>
             <a:fld id="{446A68C1-49B4-4B53-A4B5-FD8CED86E0B5}" type="datetimeFigureOut">
               <a:rPr lang="en-US" smtClean="0"/>
-              <a:t>1/21/2018</a:t>
+              <a:t>1/22/2018</a:t>
             </a:fld>
             <a:endParaRPr lang="en-US"/>
           </a:p>
@@ -795,7 +987,7 @@
           <a:p>
             <a:fld id="{446A68C1-49B4-4B53-A4B5-FD8CED86E0B5}" type="datetimeFigureOut">
               <a:rPr lang="en-US" smtClean="0"/>
-              <a:t>1/21/2018</a:t>
+              <a:t>1/22/2018</a:t>
             </a:fld>
             <a:endParaRPr lang="en-US"/>
           </a:p>
@@ -1039,7 +1231,7 @@
           <a:p>
             <a:fld id="{446A68C1-49B4-4B53-A4B5-FD8CED86E0B5}" type="datetimeFigureOut">
               <a:rPr lang="en-US" smtClean="0"/>
-              <a:t>1/21/2018</a:t>
+              <a:t>1/22/2018</a:t>
             </a:fld>
             <a:endParaRPr lang="en-US"/>
           </a:p>
@@ -1271,7 +1463,7 @@
           <a:p>
             <a:fld id="{446A68C1-49B4-4B53-A4B5-FD8CED86E0B5}" type="datetimeFigureOut">
               <a:rPr lang="en-US" smtClean="0"/>
-              <a:t>1/21/2018</a:t>
+              <a:t>1/22/2018</a:t>
             </a:fld>
             <a:endParaRPr lang="en-US"/>
           </a:p>
@@ -1638,7 +1830,7 @@
           <a:p>
             <a:fld id="{446A68C1-49B4-4B53-A4B5-FD8CED86E0B5}" type="datetimeFigureOut">
               <a:rPr lang="en-US" smtClean="0"/>
-              <a:t>1/21/2018</a:t>
+              <a:t>1/22/2018</a:t>
             </a:fld>
             <a:endParaRPr lang="en-US"/>
           </a:p>
@@ -1756,7 +1948,7 @@
           <a:p>
             <a:fld id="{446A68C1-49B4-4B53-A4B5-FD8CED86E0B5}" type="datetimeFigureOut">
               <a:rPr lang="en-US" smtClean="0"/>
-              <a:t>1/21/2018</a:t>
+              <a:t>1/22/2018</a:t>
             </a:fld>
             <a:endParaRPr lang="en-US"/>
           </a:p>
@@ -1851,7 +2043,7 @@
           <a:p>
             <a:fld id="{446A68C1-49B4-4B53-A4B5-FD8CED86E0B5}" type="datetimeFigureOut">
               <a:rPr lang="en-US" smtClean="0"/>
-              <a:t>1/21/2018</a:t>
+              <a:t>1/22/2018</a:t>
             </a:fld>
             <a:endParaRPr lang="en-US"/>
           </a:p>
@@ -2128,7 +2320,7 @@
           <a:p>
             <a:fld id="{446A68C1-49B4-4B53-A4B5-FD8CED86E0B5}" type="datetimeFigureOut">
               <a:rPr lang="en-US" smtClean="0"/>
-              <a:t>1/21/2018</a:t>
+              <a:t>1/22/2018</a:t>
             </a:fld>
             <a:endParaRPr lang="en-US"/>
           </a:p>
@@ -2385,7 +2577,7 @@
           <a:p>
             <a:fld id="{446A68C1-49B4-4B53-A4B5-FD8CED86E0B5}" type="datetimeFigureOut">
               <a:rPr lang="en-US" smtClean="0"/>
-              <a:t>1/21/2018</a:t>
+              <a:t>1/22/2018</a:t>
             </a:fld>
             <a:endParaRPr lang="en-US"/>
           </a:p>
@@ -2598,7 +2790,7 @@
           <a:p>
             <a:fld id="{446A68C1-49B4-4B53-A4B5-FD8CED86E0B5}" type="datetimeFigureOut">
               <a:rPr lang="en-US" smtClean="0"/>
-              <a:t>1/21/2018</a:t>
+              <a:t>1/22/2018</a:t>
             </a:fld>
             <a:endParaRPr lang="en-US"/>
           </a:p>
@@ -3458,7 +3650,14 @@
           <a:bodyPr/>
           <a:lstStyle/>
           <a:p>
-            <a:endParaRPr lang="en-US" dirty="0"/>
+            <a:r>
+              <a:rPr lang="en-US" dirty="0" err="1"/>
+              <a:t>Xsinx</a:t>
+            </a:r>
+            <a:r>
+              <a:rPr lang="en-US" dirty="0"/>
+              <a:t> with 2 points and code to generate regressor/range</a:t>
+            </a:r>
           </a:p>
         </p:txBody>
       </p:sp>
@@ -3520,200 +3719,38 @@
           </a:p>
         </p:txBody>
       </p:sp>
-      <mc:AlternateContent xmlns:mc="http://schemas.openxmlformats.org/markup-compatibility/2006" xmlns:a14="http://schemas.microsoft.com/office/drawing/2010/main">
-        <mc:Choice Requires="a14">
-          <p:sp>
-            <p:nvSpPr>
-              <p:cNvPr id="3" name="Content Placeholder 2">
-                <a:extLst>
-                  <a:ext uri="{FF2B5EF4-FFF2-40B4-BE49-F238E27FC236}">
-                    <a16:creationId xmlns:a16="http://schemas.microsoft.com/office/drawing/2014/main" id="{CE1716C4-D721-4898-B7F1-DCB3D7F46C38}"/>
-                  </a:ext>
-                </a:extLst>
-              </p:cNvPr>
-              <p:cNvSpPr>
-                <a:spLocks noGrp="1"/>
-              </p:cNvSpPr>
-              <p:nvPr>
-                <p:ph idx="1"/>
-              </p:nvPr>
-            </p:nvSpPr>
-            <p:spPr/>
-            <p:txBody>
-              <a:bodyPr/>
-              <a:lstStyle/>
-              <a:p>
-                <a:r>
-                  <a:rPr lang="en-US" dirty="0"/>
-                  <a:t>Target function: </a:t>
-                </a:r>
-                <a14:m>
-                  <m:oMath xmlns:m="http://schemas.openxmlformats.org/officeDocument/2006/math">
-                    <m:r>
-                      <a:rPr lang="en-US" b="0" i="1" smtClean="0">
-                        <a:latin typeface="Cambria Math" panose="02040503050406030204" pitchFamily="18" charset="0"/>
-                      </a:rPr>
-                      <m:t>𝑥</m:t>
-                    </m:r>
-                    <m:func>
-                      <m:funcPr>
-                        <m:ctrlPr>
-                          <a:rPr lang="en-US" b="0" i="1" smtClean="0">
-                            <a:latin typeface="Cambria Math" panose="02040503050406030204" pitchFamily="18" charset="0"/>
-                          </a:rPr>
-                        </m:ctrlPr>
-                      </m:funcPr>
-                      <m:fName>
-                        <m:r>
-                          <m:rPr>
-                            <m:sty m:val="p"/>
-                          </m:rPr>
-                          <a:rPr lang="en-US" b="0" i="0" smtClean="0">
-                            <a:latin typeface="Cambria Math" panose="02040503050406030204" pitchFamily="18" charset="0"/>
-                          </a:rPr>
-                          <m:t>sin</m:t>
-                        </m:r>
-                      </m:fName>
-                      <m:e>
-                        <m:r>
-                          <a:rPr lang="en-US" b="0" i="1" smtClean="0">
-                            <a:latin typeface="Cambria Math" panose="02040503050406030204" pitchFamily="18" charset="0"/>
-                          </a:rPr>
-                          <m:t>𝑥</m:t>
-                        </m:r>
-                      </m:e>
-                    </m:func>
-                  </m:oMath>
-                </a14:m>
-                <a:r>
-                  <a:rPr lang="en-US" dirty="0"/>
-                  <a:t> for </a:t>
-                </a:r>
-                <a14:m>
-                  <m:oMath xmlns:m="http://schemas.openxmlformats.org/officeDocument/2006/math">
-                    <m:r>
-                      <a:rPr lang="en-US" b="0" i="1" smtClean="0">
-                        <a:latin typeface="Cambria Math" panose="02040503050406030204" pitchFamily="18" charset="0"/>
-                      </a:rPr>
-                      <m:t>𝑥</m:t>
-                    </m:r>
-                    <m:r>
-                      <a:rPr lang="en-US" b="0" i="1" smtClean="0">
-                        <a:latin typeface="Cambria Math" panose="02040503050406030204" pitchFamily="18" charset="0"/>
-                        <a:ea typeface="Cambria Math" panose="02040503050406030204" pitchFamily="18" charset="0"/>
-                      </a:rPr>
-                      <m:t>∈</m:t>
-                    </m:r>
-                    <m:d>
-                      <m:dPr>
-                        <m:begChr m:val="["/>
-                        <m:endChr m:val="]"/>
-                        <m:ctrlPr>
-                          <a:rPr lang="en-US" b="0" i="1" smtClean="0">
-                            <a:latin typeface="Cambria Math" panose="02040503050406030204" pitchFamily="18" charset="0"/>
-                            <a:ea typeface="Cambria Math" panose="02040503050406030204" pitchFamily="18" charset="0"/>
-                          </a:rPr>
-                        </m:ctrlPr>
-                      </m:dPr>
-                      <m:e>
-                        <m:r>
-                          <a:rPr lang="en-US" b="0" i="1" smtClean="0">
-                            <a:latin typeface="Cambria Math" panose="02040503050406030204" pitchFamily="18" charset="0"/>
-                            <a:ea typeface="Cambria Math" panose="02040503050406030204" pitchFamily="18" charset="0"/>
-                          </a:rPr>
-                          <m:t>−2,10</m:t>
-                        </m:r>
-                      </m:e>
-                    </m:d>
-                  </m:oMath>
-                </a14:m>
-                <a:r>
-                  <a:rPr lang="en-US" dirty="0"/>
-                  <a:t> </a:t>
-                </a:r>
-              </a:p>
-            </p:txBody>
-          </p:sp>
-        </mc:Choice>
-        <mc:Fallback xmlns="">
-          <p:sp>
-            <p:nvSpPr>
-              <p:cNvPr id="3" name="Content Placeholder 2">
-                <a:extLst>
-                  <a:ext uri="{FF2B5EF4-FFF2-40B4-BE49-F238E27FC236}">
-                    <a16:creationId xmlns:a16="http://schemas.microsoft.com/office/drawing/2014/main" id="{CE1716C4-D721-4898-B7F1-DCB3D7F46C38}"/>
-                  </a:ext>
-                </a:extLst>
-              </p:cNvPr>
-              <p:cNvSpPr>
-                <a:spLocks noGrp="1" noRot="1" noChangeAspect="1" noMove="1" noResize="1" noEditPoints="1" noAdjustHandles="1" noChangeArrowheads="1" noChangeShapeType="1" noTextEdit="1"/>
-              </p:cNvSpPr>
-              <p:nvPr>
-                <p:ph idx="1"/>
-              </p:nvPr>
-            </p:nvSpPr>
-            <p:spPr>
-              <a:blipFill>
-                <a:blip r:embed="rId2"/>
-                <a:stretch>
-                  <a:fillRect l="-1391" t="-2241"/>
-                </a:stretch>
-              </a:blipFill>
-            </p:spPr>
-            <p:txBody>
-              <a:bodyPr/>
-              <a:lstStyle/>
-              <a:p>
-                <a:r>
-                  <a:rPr lang="en-US">
-                    <a:noFill/>
-                  </a:rPr>
-                  <a:t> </a:t>
-                </a:r>
-              </a:p>
-            </p:txBody>
-          </p:sp>
-        </mc:Fallback>
-      </mc:AlternateContent>
-      <p:pic>
-        <p:nvPicPr>
-          <p:cNvPr id="5" name="Picture 4">
+      <p:sp>
+        <p:nvSpPr>
+          <p:cNvPr id="3" name="Content Placeholder 2">
             <a:extLst>
               <a:ext uri="{FF2B5EF4-FFF2-40B4-BE49-F238E27FC236}">
-                <a16:creationId xmlns:a16="http://schemas.microsoft.com/office/drawing/2014/main" id="{FC6B3829-9D64-4E46-9FCD-93F32BA0D8BC}"/>
+                <a16:creationId xmlns:a16="http://schemas.microsoft.com/office/drawing/2014/main" id="{CE1716C4-D721-4898-B7F1-DCB3D7F46C38}"/>
               </a:ext>
             </a:extLst>
           </p:cNvPr>
-          <p:cNvPicPr>
-            <a:picLocks noChangeAspect="1"/>
-          </p:cNvPicPr>
-          <p:nvPr/>
-        </p:nvPicPr>
-        <p:blipFill>
-          <a:blip r:embed="rId3">
-            <a:extLst>
-              <a:ext uri="{28A0092B-C50C-407E-A947-70E740481C1C}">
-                <a14:useLocalDpi xmlns:a14="http://schemas.microsoft.com/office/drawing/2010/main" val="0"/>
-              </a:ext>
-            </a:extLst>
-          </a:blip>
-          <a:stretch>
-            <a:fillRect/>
-          </a:stretch>
-        </p:blipFill>
-        <p:spPr>
-          <a:xfrm>
-            <a:off x="1647776" y="2638338"/>
-            <a:ext cx="5848448" cy="4114800"/>
-          </a:xfrm>
-          <a:prstGeom prst="rect">
-            <a:avLst/>
-          </a:prstGeom>
-          <a:ln>
-            <a:noFill/>
-          </a:ln>
-        </p:spPr>
-      </p:pic>
+          <p:cNvSpPr>
+            <a:spLocks noGrp="1"/>
+          </p:cNvSpPr>
+          <p:nvPr>
+            <p:ph idx="1"/>
+          </p:nvPr>
+        </p:nvSpPr>
+        <p:spPr/>
+        <p:txBody>
+          <a:bodyPr/>
+          <a:lstStyle/>
+          <a:p>
+            <a:r>
+              <a:rPr lang="en-US" dirty="0" err="1"/>
+              <a:t>Xsinx</a:t>
+            </a:r>
+            <a:r>
+              <a:rPr lang="en-US" dirty="0"/>
+              <a:t> with 5 points and code to generate regressor/range</a:t>
+            </a:r>
+          </a:p>
+        </p:txBody>
+      </p:sp>
     </p:spTree>
     <p:extLst>
       <p:ext uri="{BB962C8B-B14F-4D97-AF65-F5344CB8AC3E}">
@@ -3795,50 +3832,11 @@
           <a:p>
             <a:r>
               <a:rPr lang="en-US" dirty="0"/>
-              <a:t>Sample two points on x-interval and train GPR</a:t>
-            </a:r>
-          </a:p>
-        </p:txBody>
-      </p:sp>
-      <p:pic>
-        <p:nvPicPr>
-          <p:cNvPr id="5" name="Picture 4">
-            <a:extLst>
-              <a:ext uri="{FF2B5EF4-FFF2-40B4-BE49-F238E27FC236}">
-                <a16:creationId xmlns:a16="http://schemas.microsoft.com/office/drawing/2014/main" id="{FC6B3829-9D64-4E46-9FCD-93F32BA0D8BC}"/>
-              </a:ext>
-            </a:extLst>
-          </p:cNvPr>
-          <p:cNvPicPr>
-            <a:picLocks noChangeAspect="1"/>
-          </p:cNvPicPr>
-          <p:nvPr/>
-        </p:nvPicPr>
-        <p:blipFill>
-          <a:blip r:embed="rId2">
-            <a:extLst>
-              <a:ext uri="{28A0092B-C50C-407E-A947-70E740481C1C}">
-                <a14:useLocalDpi xmlns:a14="http://schemas.microsoft.com/office/drawing/2010/main" val="0"/>
-              </a:ext>
-            </a:extLst>
-          </a:blip>
-          <a:stretch>
-            <a:fillRect/>
-          </a:stretch>
-        </p:blipFill>
-        <p:spPr>
-          <a:xfrm>
-            <a:off x="1143000" y="2286000"/>
-            <a:ext cx="6858001" cy="4572000"/>
-          </a:xfrm>
-          <a:prstGeom prst="rect">
-            <a:avLst/>
-          </a:prstGeom>
-          <a:ln>
-            <a:noFill/>
-          </a:ln>
-        </p:spPr>
-      </p:pic>
+              <a:t>Two-dimensional gaussian process regressor</a:t>
+            </a:r>
+          </a:p>
+        </p:txBody>
+      </p:sp>
     </p:spTree>
     <p:extLst>
       <p:ext uri="{BB962C8B-B14F-4D97-AF65-F5344CB8AC3E}">
@@ -3874,7 +3872,7 @@
           <p:cNvPr id="2" name="Title 1">
             <a:extLst>
               <a:ext uri="{FF2B5EF4-FFF2-40B4-BE49-F238E27FC236}">
-                <a16:creationId xmlns:a16="http://schemas.microsoft.com/office/drawing/2014/main" id="{A05E5E2E-55E2-4D5D-B3BC-93807FDF7E6D}"/>
+                <a16:creationId xmlns:a16="http://schemas.microsoft.com/office/drawing/2014/main" id="{0888D31C-625A-496E-91E0-EDA1805176D3}"/>
               </a:ext>
             </a:extLst>
           </p:cNvPr>
@@ -3892,15 +3890,50 @@
           <a:p>
             <a:r>
               <a:rPr lang="en-US" dirty="0"/>
-              <a:t>Gaussian Process</a:t>
-            </a:r>
-          </a:p>
-        </p:txBody>
-      </p:sp>
+              <a:t>Gaussian Process - Kernels</a:t>
+            </a:r>
+          </a:p>
+        </p:txBody>
+      </p:sp>
+      <p:pic>
+        <p:nvPicPr>
+          <p:cNvPr id="5" name="Content Placeholder 4">
+            <a:extLst>
+              <a:ext uri="{FF2B5EF4-FFF2-40B4-BE49-F238E27FC236}">
+                <a16:creationId xmlns:a16="http://schemas.microsoft.com/office/drawing/2014/main" id="{0D8E1FF1-80EE-4C16-8E9B-993B85AD0C04}"/>
+              </a:ext>
+            </a:extLst>
+          </p:cNvPr>
+          <p:cNvPicPr>
+            <a:picLocks noGrp="1" noChangeAspect="1"/>
+          </p:cNvPicPr>
+          <p:nvPr>
+            <p:ph idx="1"/>
+          </p:nvPr>
+        </p:nvPicPr>
+        <p:blipFill>
+          <a:blip r:embed="rId2">
+            <a:extLst>
+              <a:ext uri="{28A0092B-C50C-407E-A947-70E740481C1C}">
+                <a14:useLocalDpi xmlns:a14="http://schemas.microsoft.com/office/drawing/2010/main" val="0"/>
+              </a:ext>
+            </a:extLst>
+          </a:blip>
+          <a:stretch>
+            <a:fillRect/>
+          </a:stretch>
+        </p:blipFill>
+        <p:spPr>
+          <a:xfrm>
+            <a:off x="1144960" y="1516439"/>
+            <a:ext cx="6854081" cy="5029200"/>
+          </a:xfrm>
+        </p:spPr>
+      </p:pic>
     </p:spTree>
     <p:extLst>
       <p:ext uri="{BB962C8B-B14F-4D97-AF65-F5344CB8AC3E}">
-        <p14:creationId xmlns:p14="http://schemas.microsoft.com/office/powerpoint/2010/main" val="512079388"/>
+        <p14:creationId xmlns:p14="http://schemas.microsoft.com/office/powerpoint/2010/main" val="4174830690"/>
       </p:ext>
     </p:extLst>
   </p:cSld>
@@ -4047,8 +4080,8 @@
           </a:p>
         </p:txBody>
       </p:sp>
-      <mc:AlternateContent xmlns:mc="http://schemas.openxmlformats.org/markup-compatibility/2006">
-        <mc:Choice xmlns:a14="http://schemas.microsoft.com/office/drawing/2010/main" Requires="a14">
+      <mc:AlternateContent xmlns:mc="http://schemas.openxmlformats.org/markup-compatibility/2006" xmlns:a14="http://schemas.microsoft.com/office/drawing/2010/main">
+        <mc:Choice Requires="a14">
           <p:sp>
             <p:nvSpPr>
               <p:cNvPr id="3" name="Content Placeholder 2">
@@ -4630,7 +4663,7 @@
             </p:txBody>
           </p:sp>
         </mc:Choice>
-        <mc:Fallback>
+        <mc:Fallback xmlns="">
           <p:sp>
             <p:nvSpPr>
               <p:cNvPr id="3" name="Content Placeholder 2">
@@ -7291,7 +7324,7 @@
           <a:p>
             <a:r>
               <a:rPr lang="en-US" dirty="0"/>
-              <a:t>Subsampling</a:t>
+              <a:t>Iterative subsampling</a:t>
             </a:r>
           </a:p>
           <a:p>
@@ -7911,4 +7944,299 @@
     </a:ext>
   </a:extLst>
 </a:theme>
+</file>
+
+<file path=ppt/theme/theme2.xml><?xml version="1.0" encoding="utf-8"?>
+<a:theme xmlns:a="http://schemas.openxmlformats.org/drawingml/2006/main" name="Office Theme">
+  <a:themeElements>
+    <a:clrScheme name="Office">
+      <a:dk1>
+        <a:sysClr val="windowText" lastClr="000000"/>
+      </a:dk1>
+      <a:lt1>
+        <a:sysClr val="window" lastClr="FFFFFF"/>
+      </a:lt1>
+      <a:dk2>
+        <a:srgbClr val="44546A"/>
+      </a:dk2>
+      <a:lt2>
+        <a:srgbClr val="E7E6E6"/>
+      </a:lt2>
+      <a:accent1>
+        <a:srgbClr val="4472C4"/>
+      </a:accent1>
+      <a:accent2>
+        <a:srgbClr val="ED7D31"/>
+      </a:accent2>
+      <a:accent3>
+        <a:srgbClr val="A5A5A5"/>
+      </a:accent3>
+      <a:accent4>
+        <a:srgbClr val="FFC000"/>
+      </a:accent4>
+      <a:accent5>
+        <a:srgbClr val="5B9BD5"/>
+      </a:accent5>
+      <a:accent6>
+        <a:srgbClr val="70AD47"/>
+      </a:accent6>
+      <a:hlink>
+        <a:srgbClr val="0563C1"/>
+      </a:hlink>
+      <a:folHlink>
+        <a:srgbClr val="954F72"/>
+      </a:folHlink>
+    </a:clrScheme>
+    <a:fontScheme name="Office">
+      <a:majorFont>
+        <a:latin typeface="Calibri Light" panose="020F0302020204030204"/>
+        <a:ea typeface=""/>
+        <a:cs typeface=""/>
+        <a:font script="Jpan" typeface="游ゴシック Light"/>
+        <a:font script="Hang" typeface="맑은 고딕"/>
+        <a:font script="Hans" typeface="等线 Light"/>
+        <a:font script="Hant" typeface="新細明體"/>
+        <a:font script="Arab" typeface="Times New Roman"/>
+        <a:font script="Hebr" typeface="Times New Roman"/>
+        <a:font script="Thai" typeface="Angsana New"/>
+        <a:font script="Ethi" typeface="Nyala"/>
+        <a:font script="Beng" typeface="Vrinda"/>
+        <a:font script="Gujr" typeface="Shruti"/>
+        <a:font script="Khmr" typeface="MoolBoran"/>
+        <a:font script="Knda" typeface="Tunga"/>
+        <a:font script="Guru" typeface="Raavi"/>
+        <a:font script="Cans" typeface="Euphemia"/>
+        <a:font script="Cher" typeface="Plantagenet Cherokee"/>
+        <a:font script="Yiii" typeface="Microsoft Yi Baiti"/>
+        <a:font script="Tibt" typeface="Microsoft Himalaya"/>
+        <a:font script="Thaa" typeface="MV Boli"/>
+        <a:font script="Deva" typeface="Mangal"/>
+        <a:font script="Telu" typeface="Gautami"/>
+        <a:font script="Taml" typeface="Latha"/>
+        <a:font script="Syrc" typeface="Estrangelo Edessa"/>
+        <a:font script="Orya" typeface="Kalinga"/>
+        <a:font script="Mlym" typeface="Kartika"/>
+        <a:font script="Laoo" typeface="DokChampa"/>
+        <a:font script="Sinh" typeface="Iskoola Pota"/>
+        <a:font script="Mong" typeface="Mongolian Baiti"/>
+        <a:font script="Viet" typeface="Times New Roman"/>
+        <a:font script="Uigh" typeface="Microsoft Uighur"/>
+        <a:font script="Geor" typeface="Sylfaen"/>
+        <a:font script="Armn" typeface="Arial"/>
+        <a:font script="Bugi" typeface="Leelawadee UI"/>
+        <a:font script="Bopo" typeface="Microsoft JhengHei"/>
+        <a:font script="Java" typeface="Javanese Text"/>
+        <a:font script="Lisu" typeface="Segoe UI"/>
+        <a:font script="Mymr" typeface="Myanmar Text"/>
+        <a:font script="Nkoo" typeface="Ebrima"/>
+        <a:font script="Olck" typeface="Nirmala UI"/>
+        <a:font script="Osma" typeface="Ebrima"/>
+        <a:font script="Phag" typeface="Phagspa"/>
+        <a:font script="Syrn" typeface="Estrangelo Edessa"/>
+        <a:font script="Syrj" typeface="Estrangelo Edessa"/>
+        <a:font script="Syre" typeface="Estrangelo Edessa"/>
+        <a:font script="Sora" typeface="Nirmala UI"/>
+        <a:font script="Tale" typeface="Microsoft Tai Le"/>
+        <a:font script="Talu" typeface="Microsoft New Tai Lue"/>
+        <a:font script="Tfng" typeface="Ebrima"/>
+      </a:majorFont>
+      <a:minorFont>
+        <a:latin typeface="Calibri" panose="020F0502020204030204"/>
+        <a:ea typeface=""/>
+        <a:cs typeface=""/>
+        <a:font script="Jpan" typeface="游ゴシック"/>
+        <a:font script="Hang" typeface="맑은 고딕"/>
+        <a:font script="Hans" typeface="等线"/>
+        <a:font script="Hant" typeface="新細明體"/>
+        <a:font script="Arab" typeface="Arial"/>
+        <a:font script="Hebr" typeface="Arial"/>
+        <a:font script="Thai" typeface="Cordia New"/>
+        <a:font script="Ethi" typeface="Nyala"/>
+        <a:font script="Beng" typeface="Vrinda"/>
+        <a:font script="Gujr" typeface="Shruti"/>
+        <a:font script="Khmr" typeface="DaunPenh"/>
+        <a:font script="Knda" typeface="Tunga"/>
+        <a:font script="Guru" typeface="Raavi"/>
+        <a:font script="Cans" typeface="Euphemia"/>
+        <a:font script="Cher" typeface="Plantagenet Cherokee"/>
+        <a:font script="Yiii" typeface="Microsoft Yi Baiti"/>
+        <a:font script="Tibt" typeface="Microsoft Himalaya"/>
+        <a:font script="Thaa" typeface="MV Boli"/>
+        <a:font script="Deva" typeface="Mangal"/>
+        <a:font script="Telu" typeface="Gautami"/>
+        <a:font script="Taml" typeface="Latha"/>
+        <a:font script="Syrc" typeface="Estrangelo Edessa"/>
+        <a:font script="Orya" typeface="Kalinga"/>
+        <a:font script="Mlym" typeface="Kartika"/>
+        <a:font script="Laoo" typeface="DokChampa"/>
+        <a:font script="Sinh" typeface="Iskoola Pota"/>
+        <a:font script="Mong" typeface="Mongolian Baiti"/>
+        <a:font script="Viet" typeface="Arial"/>
+        <a:font script="Uigh" typeface="Microsoft Uighur"/>
+        <a:font script="Geor" typeface="Sylfaen"/>
+        <a:font script="Armn" typeface="Arial"/>
+        <a:font script="Bugi" typeface="Leelawadee UI"/>
+        <a:font script="Bopo" typeface="Microsoft JhengHei"/>
+        <a:font script="Java" typeface="Javanese Text"/>
+        <a:font script="Lisu" typeface="Segoe UI"/>
+        <a:font script="Mymr" typeface="Myanmar Text"/>
+        <a:font script="Nkoo" typeface="Ebrima"/>
+        <a:font script="Olck" typeface="Nirmala UI"/>
+        <a:font script="Osma" typeface="Ebrima"/>
+        <a:font script="Phag" typeface="Phagspa"/>
+        <a:font script="Syrn" typeface="Estrangelo Edessa"/>
+        <a:font script="Syrj" typeface="Estrangelo Edessa"/>
+        <a:font script="Syre" typeface="Estrangelo Edessa"/>
+        <a:font script="Sora" typeface="Nirmala UI"/>
+        <a:font script="Tale" typeface="Microsoft Tai Le"/>
+        <a:font script="Talu" typeface="Microsoft New Tai Lue"/>
+        <a:font script="Tfng" typeface="Ebrima"/>
+      </a:minorFont>
+    </a:fontScheme>
+    <a:fmtScheme name="Office">
+      <a:fillStyleLst>
+        <a:solidFill>
+          <a:schemeClr val="phClr"/>
+        </a:solidFill>
+        <a:gradFill rotWithShape="1">
+          <a:gsLst>
+            <a:gs pos="0">
+              <a:schemeClr val="phClr">
+                <a:lumMod val="110000"/>
+                <a:satMod val="105000"/>
+                <a:tint val="67000"/>
+              </a:schemeClr>
+            </a:gs>
+            <a:gs pos="50000">
+              <a:schemeClr val="phClr">
+                <a:lumMod val="105000"/>
+                <a:satMod val="103000"/>
+                <a:tint val="73000"/>
+              </a:schemeClr>
+            </a:gs>
+            <a:gs pos="100000">
+              <a:schemeClr val="phClr">
+                <a:lumMod val="105000"/>
+                <a:satMod val="109000"/>
+                <a:tint val="81000"/>
+              </a:schemeClr>
+            </a:gs>
+          </a:gsLst>
+          <a:lin ang="5400000" scaled="0"/>
+        </a:gradFill>
+        <a:gradFill rotWithShape="1">
+          <a:gsLst>
+            <a:gs pos="0">
+              <a:schemeClr val="phClr">
+                <a:satMod val="103000"/>
+                <a:lumMod val="102000"/>
+                <a:tint val="94000"/>
+              </a:schemeClr>
+            </a:gs>
+            <a:gs pos="50000">
+              <a:schemeClr val="phClr">
+                <a:satMod val="110000"/>
+                <a:lumMod val="100000"/>
+                <a:shade val="100000"/>
+              </a:schemeClr>
+            </a:gs>
+            <a:gs pos="100000">
+              <a:schemeClr val="phClr">
+                <a:lumMod val="99000"/>
+                <a:satMod val="120000"/>
+                <a:shade val="78000"/>
+              </a:schemeClr>
+            </a:gs>
+          </a:gsLst>
+          <a:lin ang="5400000" scaled="0"/>
+        </a:gradFill>
+      </a:fillStyleLst>
+      <a:lnStyleLst>
+        <a:ln w="6350" cap="flat" cmpd="sng" algn="ctr">
+          <a:solidFill>
+            <a:schemeClr val="phClr"/>
+          </a:solidFill>
+          <a:prstDash val="solid"/>
+          <a:miter lim="800000"/>
+        </a:ln>
+        <a:ln w="12700" cap="flat" cmpd="sng" algn="ctr">
+          <a:solidFill>
+            <a:schemeClr val="phClr"/>
+          </a:solidFill>
+          <a:prstDash val="solid"/>
+          <a:miter lim="800000"/>
+        </a:ln>
+        <a:ln w="19050" cap="flat" cmpd="sng" algn="ctr">
+          <a:solidFill>
+            <a:schemeClr val="phClr"/>
+          </a:solidFill>
+          <a:prstDash val="solid"/>
+          <a:miter lim="800000"/>
+        </a:ln>
+      </a:lnStyleLst>
+      <a:effectStyleLst>
+        <a:effectStyle>
+          <a:effectLst/>
+        </a:effectStyle>
+        <a:effectStyle>
+          <a:effectLst/>
+        </a:effectStyle>
+        <a:effectStyle>
+          <a:effectLst>
+            <a:outerShdw blurRad="57150" dist="19050" dir="5400000" algn="ctr" rotWithShape="0">
+              <a:srgbClr val="000000">
+                <a:alpha val="63000"/>
+              </a:srgbClr>
+            </a:outerShdw>
+          </a:effectLst>
+        </a:effectStyle>
+      </a:effectStyleLst>
+      <a:bgFillStyleLst>
+        <a:solidFill>
+          <a:schemeClr val="phClr"/>
+        </a:solidFill>
+        <a:solidFill>
+          <a:schemeClr val="phClr">
+            <a:tint val="95000"/>
+            <a:satMod val="170000"/>
+          </a:schemeClr>
+        </a:solidFill>
+        <a:gradFill rotWithShape="1">
+          <a:gsLst>
+            <a:gs pos="0">
+              <a:schemeClr val="phClr">
+                <a:tint val="93000"/>
+                <a:satMod val="150000"/>
+                <a:shade val="98000"/>
+                <a:lumMod val="102000"/>
+              </a:schemeClr>
+            </a:gs>
+            <a:gs pos="50000">
+              <a:schemeClr val="phClr">
+                <a:tint val="98000"/>
+                <a:satMod val="130000"/>
+                <a:shade val="90000"/>
+                <a:lumMod val="103000"/>
+              </a:schemeClr>
+            </a:gs>
+            <a:gs pos="100000">
+              <a:schemeClr val="phClr">
+                <a:shade val="63000"/>
+                <a:satMod val="120000"/>
+              </a:schemeClr>
+            </a:gs>
+          </a:gsLst>
+          <a:lin ang="5400000" scaled="0"/>
+        </a:gradFill>
+      </a:bgFillStyleLst>
+    </a:fmtScheme>
+  </a:themeElements>
+  <a:objectDefaults/>
+  <a:extraClrSchemeLst/>
+  <a:extLst>
+    <a:ext uri="{05A4C25C-085E-4340-85A3-A5531E510DB2}">
+      <thm15:themeFamily xmlns:thm15="http://schemas.microsoft.com/office/thememl/2012/main" name="Office Theme" id="{62F939B6-93AF-4DB8-9C6B-D6C7DFDC589F}" vid="{4A3C46E8-61CC-4603-A589-7422A47A8E4A}"/>
+    </a:ext>
+  </a:extLst>
+</a:theme>
 </file>
</xml_diff>

<commit_message>
Added figures for tuning strategies slide. Also created a jupyter notebook to generate these features and made a few small PPT edits.
</commit_message>
<xml_diff>
--- a/Data_science_nashville_jkk.pptx
+++ b/Data_science_nashville_jkk.pptx
@@ -27,8 +27,8 @@
     <p:sldId id="271" r:id="rId18"/>
     <p:sldId id="276" r:id="rId19"/>
     <p:sldId id="277" r:id="rId20"/>
-    <p:sldId id="278" r:id="rId21"/>
-    <p:sldId id="279" r:id="rId22"/>
+    <p:sldId id="291" r:id="rId21"/>
+    <p:sldId id="292" r:id="rId22"/>
     <p:sldId id="268" r:id="rId23"/>
     <p:sldId id="267" r:id="rId24"/>
     <p:sldId id="281" r:id="rId25"/>
@@ -4914,8 +4914,8 @@
         </p:blipFill>
         <p:spPr>
           <a:xfrm>
-            <a:off x="2368890" y="1825625"/>
-            <a:ext cx="4406219" cy="4351338"/>
+            <a:off x="2025685" y="1488841"/>
+            <a:ext cx="5092630" cy="5029200"/>
           </a:xfrm>
         </p:spPr>
       </p:pic>
@@ -5152,15 +5152,15 @@
         </p:blipFill>
         <p:spPr>
           <a:xfrm>
-            <a:off x="2368890" y="1829490"/>
-            <a:ext cx="4406219" cy="4343608"/>
+            <a:off x="2025685" y="1493308"/>
+            <a:ext cx="5092630" cy="5020265"/>
           </a:xfrm>
         </p:spPr>
       </p:pic>
     </p:spTree>
     <p:extLst>
       <p:ext uri="{BB962C8B-B14F-4D97-AF65-F5344CB8AC3E}">
-        <p14:creationId xmlns:p14="http://schemas.microsoft.com/office/powerpoint/2010/main" val="1933316888"/>
+        <p14:creationId xmlns:p14="http://schemas.microsoft.com/office/powerpoint/2010/main" val="3065491919"/>
       </p:ext>
     </p:extLst>
   </p:cSld>
@@ -5245,15 +5245,15 @@
         </p:blipFill>
         <p:spPr>
           <a:xfrm>
-            <a:off x="2368890" y="1856161"/>
-            <a:ext cx="4406219" cy="4290265"/>
+            <a:off x="2025685" y="1524134"/>
+            <a:ext cx="5092630" cy="4958613"/>
           </a:xfrm>
         </p:spPr>
       </p:pic>
     </p:spTree>
     <p:extLst>
       <p:ext uri="{BB962C8B-B14F-4D97-AF65-F5344CB8AC3E}">
-        <p14:creationId xmlns:p14="http://schemas.microsoft.com/office/powerpoint/2010/main" val="4069320446"/>
+        <p14:creationId xmlns:p14="http://schemas.microsoft.com/office/powerpoint/2010/main" val="3417688013"/>
       </p:ext>
     </p:extLst>
   </p:cSld>
@@ -7293,7 +7293,9 @@
         </p:nvSpPr>
         <p:spPr/>
         <p:txBody>
-          <a:bodyPr/>
+          <a:bodyPr>
+            <a:normAutofit lnSpcReduction="10000"/>
+          </a:bodyPr>
           <a:lstStyle/>
           <a:p>
             <a:r>
@@ -7302,11 +7304,13 @@
             </a:r>
           </a:p>
           <a:p>
-            <a:pPr lvl="1"/>
-            <a:r>
-              <a:rPr lang="en-US" dirty="0"/>
-              <a:t>Insert image here</a:t>
-            </a:r>
+            <a:endParaRPr lang="en-US" dirty="0"/>
+          </a:p>
+          <a:p>
+            <a:endParaRPr lang="en-US" dirty="0"/>
+          </a:p>
+          <a:p>
+            <a:endParaRPr lang="en-US" dirty="0"/>
           </a:p>
           <a:p>
             <a:r>
@@ -7315,11 +7319,13 @@
             </a:r>
           </a:p>
           <a:p>
-            <a:pPr lvl="1"/>
-            <a:r>
-              <a:rPr lang="en-US" dirty="0"/>
-              <a:t>Insert image here</a:t>
-            </a:r>
+            <a:endParaRPr lang="en-US" dirty="0"/>
+          </a:p>
+          <a:p>
+            <a:endParaRPr lang="en-US" dirty="0"/>
+          </a:p>
+          <a:p>
+            <a:endParaRPr lang="en-US" dirty="0"/>
           </a:p>
           <a:p>
             <a:r>
@@ -7327,15 +7333,116 @@
               <a:t>Iterative subsampling</a:t>
             </a:r>
           </a:p>
-          <a:p>
-            <a:pPr lvl="1"/>
-            <a:r>
-              <a:rPr lang="en-US" dirty="0"/>
-              <a:t>Insert image here</a:t>
-            </a:r>
-          </a:p>
-        </p:txBody>
-      </p:sp>
+        </p:txBody>
+      </p:sp>
+      <p:pic>
+        <p:nvPicPr>
+          <p:cNvPr id="7" name="Picture 6">
+            <a:extLst>
+              <a:ext uri="{FF2B5EF4-FFF2-40B4-BE49-F238E27FC236}">
+                <a16:creationId xmlns:a16="http://schemas.microsoft.com/office/drawing/2014/main" id="{5DBB7FB9-374B-47B3-A89F-825CC3B895B5}"/>
+              </a:ext>
+            </a:extLst>
+          </p:cNvPr>
+          <p:cNvPicPr>
+            <a:picLocks noChangeAspect="1"/>
+          </p:cNvPicPr>
+          <p:nvPr/>
+        </p:nvPicPr>
+        <p:blipFill>
+          <a:blip r:embed="rId2">
+            <a:extLst>
+              <a:ext uri="{28A0092B-C50C-407E-A947-70E740481C1C}">
+                <a14:useLocalDpi xmlns:a14="http://schemas.microsoft.com/office/drawing/2010/main" val="0"/>
+              </a:ext>
+            </a:extLst>
+          </a:blip>
+          <a:stretch>
+            <a:fillRect/>
+          </a:stretch>
+        </p:blipFill>
+        <p:spPr>
+          <a:xfrm>
+            <a:off x="5189208" y="4942318"/>
+            <a:ext cx="3160294" cy="1828800"/>
+          </a:xfrm>
+          <a:prstGeom prst="rect">
+            <a:avLst/>
+          </a:prstGeom>
+        </p:spPr>
+      </p:pic>
+      <p:pic>
+        <p:nvPicPr>
+          <p:cNvPr id="9" name="Picture 8">
+            <a:extLst>
+              <a:ext uri="{FF2B5EF4-FFF2-40B4-BE49-F238E27FC236}">
+                <a16:creationId xmlns:a16="http://schemas.microsoft.com/office/drawing/2014/main" id="{2FCB14E9-4AF3-48CC-8BFA-B5A5BD8A36FD}"/>
+              </a:ext>
+            </a:extLst>
+          </p:cNvPr>
+          <p:cNvPicPr>
+            <a:picLocks noChangeAspect="1"/>
+          </p:cNvPicPr>
+          <p:nvPr/>
+        </p:nvPicPr>
+        <p:blipFill>
+          <a:blip r:embed="rId3">
+            <a:extLst>
+              <a:ext uri="{28A0092B-C50C-407E-A947-70E740481C1C}">
+                <a14:useLocalDpi xmlns:a14="http://schemas.microsoft.com/office/drawing/2010/main" val="0"/>
+              </a:ext>
+            </a:extLst>
+          </a:blip>
+          <a:stretch>
+            <a:fillRect/>
+          </a:stretch>
+        </p:blipFill>
+        <p:spPr>
+          <a:xfrm>
+            <a:off x="2028915" y="1280524"/>
+            <a:ext cx="3160294" cy="1828799"/>
+          </a:xfrm>
+          <a:prstGeom prst="rect">
+            <a:avLst/>
+          </a:prstGeom>
+        </p:spPr>
+      </p:pic>
+      <p:pic>
+        <p:nvPicPr>
+          <p:cNvPr id="11" name="Picture 10">
+            <a:extLst>
+              <a:ext uri="{FF2B5EF4-FFF2-40B4-BE49-F238E27FC236}">
+                <a16:creationId xmlns:a16="http://schemas.microsoft.com/office/drawing/2014/main" id="{C880CF35-5E68-487A-84E5-05F3C00817D4}"/>
+              </a:ext>
+            </a:extLst>
+          </p:cNvPr>
+          <p:cNvPicPr>
+            <a:picLocks noChangeAspect="1"/>
+          </p:cNvPicPr>
+          <p:nvPr/>
+        </p:nvPicPr>
+        <p:blipFill>
+          <a:blip r:embed="rId4">
+            <a:extLst>
+              <a:ext uri="{28A0092B-C50C-407E-A947-70E740481C1C}">
+                <a14:useLocalDpi xmlns:a14="http://schemas.microsoft.com/office/drawing/2010/main" val="0"/>
+              </a:ext>
+            </a:extLst>
+          </a:blip>
+          <a:stretch>
+            <a:fillRect/>
+          </a:stretch>
+        </p:blipFill>
+        <p:spPr>
+          <a:xfrm>
+            <a:off x="3609061" y="3111421"/>
+            <a:ext cx="3160294" cy="1828799"/>
+          </a:xfrm>
+          <a:prstGeom prst="rect">
+            <a:avLst/>
+          </a:prstGeom>
+        </p:spPr>
+      </p:pic>
     </p:spTree>
     <p:extLst>
       <p:ext uri="{BB962C8B-B14F-4D97-AF65-F5344CB8AC3E}">

</xml_diff>

<commit_message>
Added exploration of gp regression in 1d and 2d. Created animated gif of mean prediction of a 2d gaussian. Updated PPT.
</commit_message>
<xml_diff>
--- a/Data_science_nashville_jkk.pptx
+++ b/Data_science_nashville_jkk.pptx
@@ -5,7 +5,7 @@
     <p:sldMasterId id="2147483660" r:id="rId1"/>
   </p:sldMasterIdLst>
   <p:handoutMasterIdLst>
-    <p:handoutMasterId r:id="rId31"/>
+    <p:handoutMasterId r:id="rId32"/>
   </p:handoutMasterIdLst>
   <p:sldIdLst>
     <p:sldId id="256" r:id="rId2"/>
@@ -21,22 +21,23 @@
     <p:sldId id="265" r:id="rId12"/>
     <p:sldId id="269" r:id="rId13"/>
     <p:sldId id="284" r:id="rId14"/>
-    <p:sldId id="282" r:id="rId15"/>
+    <p:sldId id="294" r:id="rId15"/>
     <p:sldId id="283" r:id="rId16"/>
-    <p:sldId id="290" r:id="rId17"/>
-    <p:sldId id="271" r:id="rId18"/>
-    <p:sldId id="276" r:id="rId19"/>
-    <p:sldId id="277" r:id="rId20"/>
-    <p:sldId id="291" r:id="rId21"/>
-    <p:sldId id="292" r:id="rId22"/>
-    <p:sldId id="268" r:id="rId23"/>
-    <p:sldId id="267" r:id="rId24"/>
-    <p:sldId id="281" r:id="rId25"/>
-    <p:sldId id="275" r:id="rId26"/>
-    <p:sldId id="288" r:id="rId27"/>
-    <p:sldId id="266" r:id="rId28"/>
-    <p:sldId id="285" r:id="rId29"/>
-    <p:sldId id="286" r:id="rId30"/>
+    <p:sldId id="295" r:id="rId17"/>
+    <p:sldId id="290" r:id="rId18"/>
+    <p:sldId id="271" r:id="rId19"/>
+    <p:sldId id="276" r:id="rId20"/>
+    <p:sldId id="277" r:id="rId21"/>
+    <p:sldId id="291" r:id="rId22"/>
+    <p:sldId id="292" r:id="rId23"/>
+    <p:sldId id="268" r:id="rId24"/>
+    <p:sldId id="267" r:id="rId25"/>
+    <p:sldId id="281" r:id="rId26"/>
+    <p:sldId id="275" r:id="rId27"/>
+    <p:sldId id="288" r:id="rId28"/>
+    <p:sldId id="266" r:id="rId29"/>
+    <p:sldId id="285" r:id="rId30"/>
+    <p:sldId id="286" r:id="rId31"/>
   </p:sldIdLst>
   <p:sldSz cx="9144000" cy="6858000" type="screen4x3"/>
   <p:notesSz cx="6858000" cy="9144000"/>
@@ -3624,43 +3625,95 @@
           <a:p>
             <a:r>
               <a:rPr lang="en-US" dirty="0"/>
-              <a:t>Gaussian Process</a:t>
-            </a:r>
-          </a:p>
-        </p:txBody>
-      </p:sp>
-      <p:sp>
-        <p:nvSpPr>
-          <p:cNvPr id="3" name="Content Placeholder 2">
+              <a:t>Gaussian Process Regression</a:t>
+            </a:r>
+          </a:p>
+        </p:txBody>
+      </p:sp>
+      <p:pic>
+        <p:nvPicPr>
+          <p:cNvPr id="9" name="Picture 8">
             <a:extLst>
               <a:ext uri="{FF2B5EF4-FFF2-40B4-BE49-F238E27FC236}">
-                <a16:creationId xmlns:a16="http://schemas.microsoft.com/office/drawing/2014/main" id="{E6FCB062-A044-40C4-8F7A-B9229E926F88}"/>
+                <a16:creationId xmlns:a16="http://schemas.microsoft.com/office/drawing/2014/main" id="{AE80CF40-050F-43DA-8959-8EED3C10DC20}"/>
               </a:ext>
             </a:extLst>
           </p:cNvPr>
-          <p:cNvSpPr>
-            <a:spLocks noGrp="1"/>
-          </p:cNvSpPr>
-          <p:nvPr>
-            <p:ph idx="1"/>
-          </p:nvPr>
-        </p:nvSpPr>
-        <p:spPr/>
-        <p:txBody>
-          <a:bodyPr/>
-          <a:lstStyle/>
-          <a:p>
-            <a:r>
-              <a:rPr lang="en-US" dirty="0" err="1"/>
-              <a:t>Xsinx</a:t>
-            </a:r>
-            <a:r>
-              <a:rPr lang="en-US" dirty="0"/>
-              <a:t> with 2 points and code to generate regressor/range</a:t>
-            </a:r>
-          </a:p>
-        </p:txBody>
-      </p:sp>
+          <p:cNvPicPr>
+            <a:picLocks noChangeAspect="1"/>
+          </p:cNvPicPr>
+          <p:nvPr/>
+        </p:nvPicPr>
+        <p:blipFill>
+          <a:blip r:embed="rId2">
+            <a:extLst>
+              <a:ext uri="{28A0092B-C50C-407E-A947-70E740481C1C}">
+                <a14:useLocalDpi xmlns:a14="http://schemas.microsoft.com/office/drawing/2010/main" val="0"/>
+              </a:ext>
+            </a:extLst>
+          </a:blip>
+          <a:stretch>
+            <a:fillRect/>
+          </a:stretch>
+        </p:blipFill>
+        <p:spPr>
+          <a:xfrm>
+            <a:off x="1008838" y="1515011"/>
+            <a:ext cx="7126324" cy="4801694"/>
+          </a:xfrm>
+          <a:prstGeom prst="rect">
+            <a:avLst/>
+          </a:prstGeom>
+        </p:spPr>
+      </p:pic>
+      <p:pic>
+        <p:nvPicPr>
+          <p:cNvPr id="7" name="Picture 6">
+            <a:extLst>
+              <a:ext uri="{FF2B5EF4-FFF2-40B4-BE49-F238E27FC236}">
+                <a16:creationId xmlns:a16="http://schemas.microsoft.com/office/drawing/2014/main" id="{CBB8B886-0F81-4190-905A-7E15DC98D0AA}"/>
+              </a:ext>
+            </a:extLst>
+          </p:cNvPr>
+          <p:cNvPicPr>
+            <a:picLocks noChangeAspect="1"/>
+          </p:cNvPicPr>
+          <p:nvPr/>
+        </p:nvPicPr>
+        <p:blipFill>
+          <a:blip r:embed="rId3">
+            <a:extLst>
+              <a:ext uri="{28A0092B-C50C-407E-A947-70E740481C1C}">
+                <a14:useLocalDpi xmlns:a14="http://schemas.microsoft.com/office/drawing/2010/main" val="0"/>
+              </a:ext>
+            </a:extLst>
+          </a:blip>
+          <a:stretch>
+            <a:fillRect/>
+          </a:stretch>
+        </p:blipFill>
+        <p:spPr>
+          <a:xfrm>
+            <a:off x="399265" y="5597398"/>
+            <a:ext cx="4182894" cy="914400"/>
+          </a:xfrm>
+          <a:prstGeom prst="rect">
+            <a:avLst/>
+          </a:prstGeom>
+          <a:ln>
+            <a:solidFill>
+              <a:schemeClr val="tx1"/>
+            </a:solidFill>
+          </a:ln>
+          <a:effectLst>
+            <a:outerShdw blurRad="50800" dist="38100" dir="2700000" algn="tl" rotWithShape="0">
+              <a:prstClr val="black">
+                <a:alpha val="40000"/>
+              </a:prstClr>
+            </a:outerShdw>
+          </a:effectLst>
+        </p:spPr>
+      </p:pic>
     </p:spTree>
     <p:extLst>
       <p:ext uri="{BB962C8B-B14F-4D97-AF65-F5344CB8AC3E}">
@@ -3696,7 +3749,7 @@
           <p:cNvPr id="2" name="Title 1">
             <a:extLst>
               <a:ext uri="{FF2B5EF4-FFF2-40B4-BE49-F238E27FC236}">
-                <a16:creationId xmlns:a16="http://schemas.microsoft.com/office/drawing/2014/main" id="{0888D31C-625A-496E-91E0-EDA1805176D3}"/>
+                <a16:creationId xmlns:a16="http://schemas.microsoft.com/office/drawing/2014/main" id="{C7EF7884-E9DF-442A-A088-292308EBD28E}"/>
               </a:ext>
             </a:extLst>
           </p:cNvPr>
@@ -3714,47 +3767,99 @@
           <a:p>
             <a:r>
               <a:rPr lang="en-US" dirty="0"/>
-              <a:t>Gaussian Process</a:t>
-            </a:r>
-          </a:p>
-        </p:txBody>
-      </p:sp>
-      <p:sp>
-        <p:nvSpPr>
-          <p:cNvPr id="3" name="Content Placeholder 2">
+              <a:t>Gaussian Process Regression</a:t>
+            </a:r>
+          </a:p>
+        </p:txBody>
+      </p:sp>
+      <p:pic>
+        <p:nvPicPr>
+          <p:cNvPr id="9" name="Picture 8">
             <a:extLst>
               <a:ext uri="{FF2B5EF4-FFF2-40B4-BE49-F238E27FC236}">
-                <a16:creationId xmlns:a16="http://schemas.microsoft.com/office/drawing/2014/main" id="{CE1716C4-D721-4898-B7F1-DCB3D7F46C38}"/>
+                <a16:creationId xmlns:a16="http://schemas.microsoft.com/office/drawing/2014/main" id="{AE80CF40-050F-43DA-8959-8EED3C10DC20}"/>
               </a:ext>
             </a:extLst>
           </p:cNvPr>
-          <p:cNvSpPr>
-            <a:spLocks noGrp="1"/>
-          </p:cNvSpPr>
-          <p:nvPr>
-            <p:ph idx="1"/>
-          </p:nvPr>
-        </p:nvSpPr>
-        <p:spPr/>
-        <p:txBody>
-          <a:bodyPr/>
-          <a:lstStyle/>
-          <a:p>
-            <a:r>
-              <a:rPr lang="en-US" dirty="0" err="1"/>
-              <a:t>Xsinx</a:t>
-            </a:r>
-            <a:r>
-              <a:rPr lang="en-US" dirty="0"/>
-              <a:t> with 5 points and code to generate regressor/range</a:t>
-            </a:r>
-          </a:p>
-        </p:txBody>
-      </p:sp>
+          <p:cNvPicPr>
+            <a:picLocks noChangeAspect="1"/>
+          </p:cNvPicPr>
+          <p:nvPr/>
+        </p:nvPicPr>
+        <p:blipFill>
+          <a:blip r:embed="rId2">
+            <a:extLst>
+              <a:ext uri="{28A0092B-C50C-407E-A947-70E740481C1C}">
+                <a14:useLocalDpi xmlns:a14="http://schemas.microsoft.com/office/drawing/2010/main" val="0"/>
+              </a:ext>
+            </a:extLst>
+          </a:blip>
+          <a:stretch>
+            <a:fillRect/>
+          </a:stretch>
+        </p:blipFill>
+        <p:spPr>
+          <a:xfrm>
+            <a:off x="1008838" y="1515011"/>
+            <a:ext cx="7126324" cy="4801694"/>
+          </a:xfrm>
+          <a:prstGeom prst="rect">
+            <a:avLst/>
+          </a:prstGeom>
+        </p:spPr>
+      </p:pic>
+      <p:pic>
+        <p:nvPicPr>
+          <p:cNvPr id="7" name="Picture 6">
+            <a:extLst>
+              <a:ext uri="{FF2B5EF4-FFF2-40B4-BE49-F238E27FC236}">
+                <a16:creationId xmlns:a16="http://schemas.microsoft.com/office/drawing/2014/main" id="{CBB8B886-0F81-4190-905A-7E15DC98D0AA}"/>
+              </a:ext>
+            </a:extLst>
+          </p:cNvPr>
+          <p:cNvPicPr>
+            <a:picLocks noChangeAspect="1"/>
+          </p:cNvPicPr>
+          <p:nvPr/>
+        </p:nvPicPr>
+        <p:blipFill>
+          <a:blip r:embed="rId3">
+            <a:extLst>
+              <a:ext uri="{28A0092B-C50C-407E-A947-70E740481C1C}">
+                <a14:useLocalDpi xmlns:a14="http://schemas.microsoft.com/office/drawing/2010/main" val="0"/>
+              </a:ext>
+            </a:extLst>
+          </a:blip>
+          <a:stretch>
+            <a:fillRect/>
+          </a:stretch>
+        </p:blipFill>
+        <p:spPr>
+          <a:xfrm>
+            <a:off x="399265" y="5578474"/>
+            <a:ext cx="5707785" cy="914400"/>
+          </a:xfrm>
+          <a:prstGeom prst="rect">
+            <a:avLst/>
+          </a:prstGeom>
+          <a:ln>
+            <a:solidFill>
+              <a:schemeClr val="tx1"/>
+            </a:solidFill>
+          </a:ln>
+          <a:effectLst>
+            <a:outerShdw blurRad="50800" dist="38100" dir="2700000" algn="tl" rotWithShape="0">
+              <a:prstClr val="black">
+                <a:alpha val="40000"/>
+              </a:prstClr>
+            </a:outerShdw>
+          </a:effectLst>
+        </p:spPr>
+      </p:pic>
     </p:spTree>
     <p:extLst>
       <p:ext uri="{BB962C8B-B14F-4D97-AF65-F5344CB8AC3E}">
-        <p14:creationId xmlns:p14="http://schemas.microsoft.com/office/powerpoint/2010/main" val="2884265908"/>
+        <p14:creationId xmlns:p14="http://schemas.microsoft.com/office/powerpoint/2010/main" val="2106982006"/>
       </p:ext>
     </p:extLst>
   </p:cSld>
@@ -3804,39 +3909,143 @@
           <a:p>
             <a:r>
               <a:rPr lang="en-US" dirty="0"/>
-              <a:t>Gaussian Process</a:t>
-            </a:r>
-          </a:p>
-        </p:txBody>
-      </p:sp>
-      <p:sp>
-        <p:nvSpPr>
-          <p:cNvPr id="3" name="Content Placeholder 2">
+              <a:t>Gaussian Process Regression</a:t>
+            </a:r>
+          </a:p>
+        </p:txBody>
+      </p:sp>
+      <p:pic>
+        <p:nvPicPr>
+          <p:cNvPr id="9" name="Picture 8">
             <a:extLst>
               <a:ext uri="{FF2B5EF4-FFF2-40B4-BE49-F238E27FC236}">
-                <a16:creationId xmlns:a16="http://schemas.microsoft.com/office/drawing/2014/main" id="{CE1716C4-D721-4898-B7F1-DCB3D7F46C38}"/>
+                <a16:creationId xmlns:a16="http://schemas.microsoft.com/office/drawing/2014/main" id="{D1332D0F-9515-4D32-AD77-4EDA2510D4DA}"/>
               </a:ext>
             </a:extLst>
           </p:cNvPr>
-          <p:cNvSpPr>
-            <a:spLocks noGrp="1"/>
-          </p:cNvSpPr>
-          <p:nvPr>
-            <p:ph idx="1"/>
-          </p:nvPr>
-        </p:nvSpPr>
-        <p:spPr/>
-        <p:txBody>
-          <a:bodyPr/>
-          <a:lstStyle/>
-          <a:p>
-            <a:r>
-              <a:rPr lang="en-US" dirty="0"/>
-              <a:t>Two-dimensional gaussian process regressor</a:t>
-            </a:r>
-          </a:p>
-        </p:txBody>
-      </p:sp>
+          <p:cNvPicPr>
+            <a:picLocks noChangeAspect="1"/>
+          </p:cNvPicPr>
+          <p:nvPr/>
+        </p:nvPicPr>
+        <p:blipFill>
+          <a:blip r:embed="rId2">
+            <a:extLst>
+              <a:ext uri="{28A0092B-C50C-407E-A947-70E740481C1C}">
+                <a14:useLocalDpi xmlns:a14="http://schemas.microsoft.com/office/drawing/2010/main" val="0"/>
+              </a:ext>
+            </a:extLst>
+          </a:blip>
+          <a:stretch>
+            <a:fillRect/>
+          </a:stretch>
+        </p:blipFill>
+        <p:spPr>
+          <a:xfrm>
+            <a:off x="628650" y="1690689"/>
+            <a:ext cx="4782217" cy="1076475"/>
+          </a:xfrm>
+          <a:prstGeom prst="rect">
+            <a:avLst/>
+          </a:prstGeom>
+          <a:ln>
+            <a:solidFill>
+              <a:schemeClr val="tx1"/>
+            </a:solidFill>
+          </a:ln>
+          <a:effectLst>
+            <a:outerShdw blurRad="50800" dist="38100" dir="2700000" algn="tl" rotWithShape="0">
+              <a:prstClr val="black">
+                <a:alpha val="40000"/>
+              </a:prstClr>
+            </a:outerShdw>
+          </a:effectLst>
+        </p:spPr>
+      </p:pic>
+      <p:pic>
+        <p:nvPicPr>
+          <p:cNvPr id="13" name="Picture 12">
+            <a:extLst>
+              <a:ext uri="{FF2B5EF4-FFF2-40B4-BE49-F238E27FC236}">
+                <a16:creationId xmlns:a16="http://schemas.microsoft.com/office/drawing/2014/main" id="{7AEBBF37-AD13-40A7-8CE7-73B93569D4B6}"/>
+              </a:ext>
+            </a:extLst>
+          </p:cNvPr>
+          <p:cNvPicPr>
+            <a:picLocks noChangeAspect="1"/>
+          </p:cNvPicPr>
+          <p:nvPr/>
+        </p:nvPicPr>
+        <p:blipFill>
+          <a:blip r:embed="rId3">
+            <a:extLst>
+              <a:ext uri="{28A0092B-C50C-407E-A947-70E740481C1C}">
+                <a14:useLocalDpi xmlns:a14="http://schemas.microsoft.com/office/drawing/2010/main" val="0"/>
+              </a:ext>
+            </a:extLst>
+          </a:blip>
+          <a:stretch>
+            <a:fillRect/>
+          </a:stretch>
+        </p:blipFill>
+        <p:spPr>
+          <a:xfrm>
+            <a:off x="628650" y="2963353"/>
+            <a:ext cx="6230219" cy="1228896"/>
+          </a:xfrm>
+          <a:prstGeom prst="rect">
+            <a:avLst/>
+          </a:prstGeom>
+          <a:ln>
+            <a:solidFill>
+              <a:schemeClr val="tx1"/>
+            </a:solidFill>
+          </a:ln>
+          <a:effectLst>
+            <a:outerShdw blurRad="50800" dist="38100" dir="2700000" algn="tl" rotWithShape="0">
+              <a:prstClr val="black">
+                <a:alpha val="40000"/>
+              </a:prstClr>
+            </a:outerShdw>
+          </a:effectLst>
+        </p:spPr>
+      </p:pic>
+      <p:pic>
+        <p:nvPicPr>
+          <p:cNvPr id="17" name="Picture 16">
+            <a:extLst>
+              <a:ext uri="{FF2B5EF4-FFF2-40B4-BE49-F238E27FC236}">
+                <a16:creationId xmlns:a16="http://schemas.microsoft.com/office/drawing/2014/main" id="{4FBFA521-F242-42AA-A814-EC0B242074F6}"/>
+              </a:ext>
+            </a:extLst>
+          </p:cNvPr>
+          <p:cNvPicPr>
+            <a:picLocks noChangeAspect="1"/>
+          </p:cNvPicPr>
+          <p:nvPr/>
+        </p:nvPicPr>
+        <p:blipFill>
+          <a:blip r:embed="rId4">
+            <a:extLst>
+              <a:ext uri="{28A0092B-C50C-407E-A947-70E740481C1C}">
+                <a14:useLocalDpi xmlns:a14="http://schemas.microsoft.com/office/drawing/2010/main" val="0"/>
+              </a:ext>
+            </a:extLst>
+          </a:blip>
+          <a:stretch>
+            <a:fillRect/>
+          </a:stretch>
+        </p:blipFill>
+        <p:spPr>
+          <a:xfrm>
+            <a:off x="1046947" y="4338752"/>
+            <a:ext cx="7050106" cy="2502470"/>
+          </a:xfrm>
+          <a:prstGeom prst="rect">
+            <a:avLst/>
+          </a:prstGeom>
+        </p:spPr>
+      </p:pic>
     </p:spTree>
     <p:extLst>
       <p:ext uri="{BB962C8B-B14F-4D97-AF65-F5344CB8AC3E}">
@@ -3872,7 +4081,7 @@
           <p:cNvPr id="2" name="Title 1">
             <a:extLst>
               <a:ext uri="{FF2B5EF4-FFF2-40B4-BE49-F238E27FC236}">
-                <a16:creationId xmlns:a16="http://schemas.microsoft.com/office/drawing/2014/main" id="{0888D31C-625A-496E-91E0-EDA1805176D3}"/>
+                <a16:creationId xmlns:a16="http://schemas.microsoft.com/office/drawing/2014/main" id="{B2D8B04C-8D2B-4C12-8C87-85E5B584C253}"/>
               </a:ext>
             </a:extLst>
           </p:cNvPr>
@@ -3890,17 +4099,17 @@
           <a:p>
             <a:r>
               <a:rPr lang="en-US" dirty="0"/>
-              <a:t>Gaussian Process - Kernels</a:t>
+              <a:t>Gaussian Process Regression</a:t>
             </a:r>
           </a:p>
         </p:txBody>
       </p:sp>
       <p:pic>
         <p:nvPicPr>
-          <p:cNvPr id="5" name="Content Placeholder 4">
+          <p:cNvPr id="6" name="Content Placeholder 5">
             <a:extLst>
               <a:ext uri="{FF2B5EF4-FFF2-40B4-BE49-F238E27FC236}">
-                <a16:creationId xmlns:a16="http://schemas.microsoft.com/office/drawing/2014/main" id="{0D8E1FF1-80EE-4C16-8E9B-993B85AD0C04}"/>
+                <a16:creationId xmlns:a16="http://schemas.microsoft.com/office/drawing/2014/main" id="{7C0A74A7-66B3-4EFA-9B33-CA127D12841D}"/>
               </a:ext>
             </a:extLst>
           </p:cNvPr>
@@ -3925,15 +4134,15 @@
         </p:blipFill>
         <p:spPr>
           <a:xfrm>
-            <a:off x="1144960" y="1516439"/>
-            <a:ext cx="6854081" cy="5029200"/>
+            <a:off x="1035844" y="1655172"/>
+            <a:ext cx="7072313" cy="4572000"/>
           </a:xfrm>
         </p:spPr>
       </p:pic>
     </p:spTree>
     <p:extLst>
       <p:ext uri="{BB962C8B-B14F-4D97-AF65-F5344CB8AC3E}">
-        <p14:creationId xmlns:p14="http://schemas.microsoft.com/office/powerpoint/2010/main" val="4174830690"/>
+        <p14:creationId xmlns:p14="http://schemas.microsoft.com/office/powerpoint/2010/main" val="2204336628"/>
       </p:ext>
     </p:extLst>
   </p:cSld>
@@ -3965,6 +4174,99 @@
           <p:cNvPr id="2" name="Title 1">
             <a:extLst>
               <a:ext uri="{FF2B5EF4-FFF2-40B4-BE49-F238E27FC236}">
+                <a16:creationId xmlns:a16="http://schemas.microsoft.com/office/drawing/2014/main" id="{0888D31C-625A-496E-91E0-EDA1805176D3}"/>
+              </a:ext>
+            </a:extLst>
+          </p:cNvPr>
+          <p:cNvSpPr>
+            <a:spLocks noGrp="1"/>
+          </p:cNvSpPr>
+          <p:nvPr>
+            <p:ph type="title"/>
+          </p:nvPr>
+        </p:nvSpPr>
+        <p:spPr/>
+        <p:txBody>
+          <a:bodyPr/>
+          <a:lstStyle/>
+          <a:p>
+            <a:r>
+              <a:rPr lang="en-US" dirty="0"/>
+              <a:t>Gaussian Process - Kernels</a:t>
+            </a:r>
+          </a:p>
+        </p:txBody>
+      </p:sp>
+      <p:pic>
+        <p:nvPicPr>
+          <p:cNvPr id="5" name="Content Placeholder 4">
+            <a:extLst>
+              <a:ext uri="{FF2B5EF4-FFF2-40B4-BE49-F238E27FC236}">
+                <a16:creationId xmlns:a16="http://schemas.microsoft.com/office/drawing/2014/main" id="{0D8E1FF1-80EE-4C16-8E9B-993B85AD0C04}"/>
+              </a:ext>
+            </a:extLst>
+          </p:cNvPr>
+          <p:cNvPicPr>
+            <a:picLocks noGrp="1" noChangeAspect="1"/>
+          </p:cNvPicPr>
+          <p:nvPr>
+            <p:ph idx="1"/>
+          </p:nvPr>
+        </p:nvPicPr>
+        <p:blipFill>
+          <a:blip r:embed="rId2">
+            <a:extLst>
+              <a:ext uri="{28A0092B-C50C-407E-A947-70E740481C1C}">
+                <a14:useLocalDpi xmlns:a14="http://schemas.microsoft.com/office/drawing/2010/main" val="0"/>
+              </a:ext>
+            </a:extLst>
+          </a:blip>
+          <a:stretch>
+            <a:fillRect/>
+          </a:stretch>
+        </p:blipFill>
+        <p:spPr>
+          <a:xfrm>
+            <a:off x="1144960" y="1516439"/>
+            <a:ext cx="6854081" cy="5029200"/>
+          </a:xfrm>
+        </p:spPr>
+      </p:pic>
+    </p:spTree>
+    <p:extLst>
+      <p:ext uri="{BB962C8B-B14F-4D97-AF65-F5344CB8AC3E}">
+        <p14:creationId xmlns:p14="http://schemas.microsoft.com/office/powerpoint/2010/main" val="4174830690"/>
+      </p:ext>
+    </p:extLst>
+  </p:cSld>
+  <p:clrMapOvr>
+    <a:masterClrMapping/>
+  </p:clrMapOvr>
+</p:sld>
+</file>
+
+<file path=ppt/slides/slide18.xml><?xml version="1.0" encoding="utf-8"?>
+<p:sld xmlns:a="http://schemas.openxmlformats.org/drawingml/2006/main" xmlns:r="http://schemas.openxmlformats.org/officeDocument/2006/relationships" xmlns:p="http://schemas.openxmlformats.org/presentationml/2006/main">
+  <p:cSld>
+    <p:spTree>
+      <p:nvGrpSpPr>
+        <p:cNvPr id="1" name=""/>
+        <p:cNvGrpSpPr/>
+        <p:nvPr/>
+      </p:nvGrpSpPr>
+      <p:grpSpPr>
+        <a:xfrm>
+          <a:off x="0" y="0"/>
+          <a:ext cx="0" cy="0"/>
+          <a:chOff x="0" y="0"/>
+          <a:chExt cx="0" cy="0"/>
+        </a:xfrm>
+      </p:grpSpPr>
+      <p:sp>
+        <p:nvSpPr>
+          <p:cNvPr id="2" name="Title 1">
+            <a:extLst>
+              <a:ext uri="{FF2B5EF4-FFF2-40B4-BE49-F238E27FC236}">
                 <a16:creationId xmlns:a16="http://schemas.microsoft.com/office/drawing/2014/main" id="{BAC2B454-EDAC-4597-8F3B-7D9659B454FE}"/>
               </a:ext>
             </a:extLst>
@@ -4035,7 +4337,7 @@
 </p:sld>
 </file>
 
-<file path=ppt/slides/slide18.xml><?xml version="1.0" encoding="utf-8"?>
+<file path=ppt/slides/slide19.xml><?xml version="1.0" encoding="utf-8"?>
 <p:sld xmlns:a="http://schemas.openxmlformats.org/drawingml/2006/main" xmlns:r="http://schemas.openxmlformats.org/officeDocument/2006/relationships" xmlns:p="http://schemas.openxmlformats.org/presentationml/2006/main">
   <p:cSld>
     <p:spTree>
@@ -4839,99 +5141,6 @@
 </p:sld>
 </file>
 
-<file path=ppt/slides/slide19.xml><?xml version="1.0" encoding="utf-8"?>
-<p:sld xmlns:a="http://schemas.openxmlformats.org/drawingml/2006/main" xmlns:r="http://schemas.openxmlformats.org/officeDocument/2006/relationships" xmlns:p="http://schemas.openxmlformats.org/presentationml/2006/main">
-  <p:cSld>
-    <p:spTree>
-      <p:nvGrpSpPr>
-        <p:cNvPr id="1" name=""/>
-        <p:cNvGrpSpPr/>
-        <p:nvPr/>
-      </p:nvGrpSpPr>
-      <p:grpSpPr>
-        <a:xfrm>
-          <a:off x="0" y="0"/>
-          <a:ext cx="0" cy="0"/>
-          <a:chOff x="0" y="0"/>
-          <a:chExt cx="0" cy="0"/>
-        </a:xfrm>
-      </p:grpSpPr>
-      <p:sp>
-        <p:nvSpPr>
-          <p:cNvPr id="2" name="Title 1">
-            <a:extLst>
-              <a:ext uri="{FF2B5EF4-FFF2-40B4-BE49-F238E27FC236}">
-                <a16:creationId xmlns:a16="http://schemas.microsoft.com/office/drawing/2014/main" id="{E425E6F5-5447-4F3A-B5B4-0F669676A794}"/>
-              </a:ext>
-            </a:extLst>
-          </p:cNvPr>
-          <p:cNvSpPr>
-            <a:spLocks noGrp="1"/>
-          </p:cNvSpPr>
-          <p:nvPr>
-            <p:ph type="title"/>
-          </p:nvPr>
-        </p:nvSpPr>
-        <p:spPr/>
-        <p:txBody>
-          <a:bodyPr/>
-          <a:lstStyle/>
-          <a:p>
-            <a:r>
-              <a:rPr lang="en-US" dirty="0"/>
-              <a:t>Utility Functions</a:t>
-            </a:r>
-          </a:p>
-        </p:txBody>
-      </p:sp>
-      <p:pic>
-        <p:nvPicPr>
-          <p:cNvPr id="7" name="Content Placeholder 6">
-            <a:extLst>
-              <a:ext uri="{FF2B5EF4-FFF2-40B4-BE49-F238E27FC236}">
-                <a16:creationId xmlns:a16="http://schemas.microsoft.com/office/drawing/2014/main" id="{F4680150-0DC8-4F84-9E73-65FBD5E45FA2}"/>
-              </a:ext>
-            </a:extLst>
-          </p:cNvPr>
-          <p:cNvPicPr>
-            <a:picLocks noGrp="1" noChangeAspect="1"/>
-          </p:cNvPicPr>
-          <p:nvPr>
-            <p:ph idx="1"/>
-          </p:nvPr>
-        </p:nvPicPr>
-        <p:blipFill>
-          <a:blip r:embed="rId2">
-            <a:extLst>
-              <a:ext uri="{28A0092B-C50C-407E-A947-70E740481C1C}">
-                <a14:useLocalDpi xmlns:a14="http://schemas.microsoft.com/office/drawing/2010/main" val="0"/>
-              </a:ext>
-            </a:extLst>
-          </a:blip>
-          <a:stretch>
-            <a:fillRect/>
-          </a:stretch>
-        </p:blipFill>
-        <p:spPr>
-          <a:xfrm>
-            <a:off x="2025685" y="1488841"/>
-            <a:ext cx="5092630" cy="5029200"/>
-          </a:xfrm>
-        </p:spPr>
-      </p:pic>
-    </p:spTree>
-    <p:extLst>
-      <p:ext uri="{BB962C8B-B14F-4D97-AF65-F5344CB8AC3E}">
-        <p14:creationId xmlns:p14="http://schemas.microsoft.com/office/powerpoint/2010/main" val="4119882280"/>
-      </p:ext>
-    </p:extLst>
-  </p:cSld>
-  <p:clrMapOvr>
-    <a:masterClrMapping/>
-  </p:clrMapOvr>
-</p:sld>
-</file>
-
 <file path=ppt/slides/slide2.xml><?xml version="1.0" encoding="utf-8"?>
 <p:sld xmlns:a="http://schemas.openxmlformats.org/drawingml/2006/main" xmlns:r="http://schemas.openxmlformats.org/officeDocument/2006/relationships" xmlns:p="http://schemas.openxmlformats.org/presentationml/2006/main">
   <p:cSld>
@@ -5152,15 +5361,15 @@
         </p:blipFill>
         <p:spPr>
           <a:xfrm>
-            <a:off x="2025685" y="1493308"/>
-            <a:ext cx="5092630" cy="5020265"/>
+            <a:off x="2025685" y="1488841"/>
+            <a:ext cx="5092630" cy="5029200"/>
           </a:xfrm>
         </p:spPr>
       </p:pic>
     </p:spTree>
     <p:extLst>
       <p:ext uri="{BB962C8B-B14F-4D97-AF65-F5344CB8AC3E}">
-        <p14:creationId xmlns:p14="http://schemas.microsoft.com/office/powerpoint/2010/main" val="3065491919"/>
+        <p14:creationId xmlns:p14="http://schemas.microsoft.com/office/powerpoint/2010/main" val="4119882280"/>
       </p:ext>
     </p:extLst>
   </p:cSld>
@@ -5245,15 +5454,15 @@
         </p:blipFill>
         <p:spPr>
           <a:xfrm>
-            <a:off x="2025685" y="1524134"/>
-            <a:ext cx="5092630" cy="4958613"/>
+            <a:off x="2025685" y="1493308"/>
+            <a:ext cx="5092630" cy="5020265"/>
           </a:xfrm>
         </p:spPr>
       </p:pic>
     </p:spTree>
     <p:extLst>
       <p:ext uri="{BB962C8B-B14F-4D97-AF65-F5344CB8AC3E}">
-        <p14:creationId xmlns:p14="http://schemas.microsoft.com/office/powerpoint/2010/main" val="3417688013"/>
+        <p14:creationId xmlns:p14="http://schemas.microsoft.com/office/powerpoint/2010/main" val="3065491919"/>
       </p:ext>
     </p:extLst>
   </p:cSld>
@@ -5285,6 +5494,99 @@
           <p:cNvPr id="2" name="Title 1">
             <a:extLst>
               <a:ext uri="{FF2B5EF4-FFF2-40B4-BE49-F238E27FC236}">
+                <a16:creationId xmlns:a16="http://schemas.microsoft.com/office/drawing/2014/main" id="{E425E6F5-5447-4F3A-B5B4-0F669676A794}"/>
+              </a:ext>
+            </a:extLst>
+          </p:cNvPr>
+          <p:cNvSpPr>
+            <a:spLocks noGrp="1"/>
+          </p:cNvSpPr>
+          <p:nvPr>
+            <p:ph type="title"/>
+          </p:nvPr>
+        </p:nvSpPr>
+        <p:spPr/>
+        <p:txBody>
+          <a:bodyPr/>
+          <a:lstStyle/>
+          <a:p>
+            <a:r>
+              <a:rPr lang="en-US" dirty="0"/>
+              <a:t>Utility Functions</a:t>
+            </a:r>
+          </a:p>
+        </p:txBody>
+      </p:sp>
+      <p:pic>
+        <p:nvPicPr>
+          <p:cNvPr id="7" name="Content Placeholder 6">
+            <a:extLst>
+              <a:ext uri="{FF2B5EF4-FFF2-40B4-BE49-F238E27FC236}">
+                <a16:creationId xmlns:a16="http://schemas.microsoft.com/office/drawing/2014/main" id="{F4680150-0DC8-4F84-9E73-65FBD5E45FA2}"/>
+              </a:ext>
+            </a:extLst>
+          </p:cNvPr>
+          <p:cNvPicPr>
+            <a:picLocks noGrp="1" noChangeAspect="1"/>
+          </p:cNvPicPr>
+          <p:nvPr>
+            <p:ph idx="1"/>
+          </p:nvPr>
+        </p:nvPicPr>
+        <p:blipFill>
+          <a:blip r:embed="rId2">
+            <a:extLst>
+              <a:ext uri="{28A0092B-C50C-407E-A947-70E740481C1C}">
+                <a14:useLocalDpi xmlns:a14="http://schemas.microsoft.com/office/drawing/2010/main" val="0"/>
+              </a:ext>
+            </a:extLst>
+          </a:blip>
+          <a:stretch>
+            <a:fillRect/>
+          </a:stretch>
+        </p:blipFill>
+        <p:spPr>
+          <a:xfrm>
+            <a:off x="2025685" y="1524134"/>
+            <a:ext cx="5092630" cy="4958613"/>
+          </a:xfrm>
+        </p:spPr>
+      </p:pic>
+    </p:spTree>
+    <p:extLst>
+      <p:ext uri="{BB962C8B-B14F-4D97-AF65-F5344CB8AC3E}">
+        <p14:creationId xmlns:p14="http://schemas.microsoft.com/office/powerpoint/2010/main" val="3417688013"/>
+      </p:ext>
+    </p:extLst>
+  </p:cSld>
+  <p:clrMapOvr>
+    <a:masterClrMapping/>
+  </p:clrMapOvr>
+</p:sld>
+</file>
+
+<file path=ppt/slides/slide23.xml><?xml version="1.0" encoding="utf-8"?>
+<p:sld xmlns:a="http://schemas.openxmlformats.org/drawingml/2006/main" xmlns:r="http://schemas.openxmlformats.org/officeDocument/2006/relationships" xmlns:p="http://schemas.openxmlformats.org/presentationml/2006/main">
+  <p:cSld>
+    <p:spTree>
+      <p:nvGrpSpPr>
+        <p:cNvPr id="1" name=""/>
+        <p:cNvGrpSpPr/>
+        <p:nvPr/>
+      </p:nvGrpSpPr>
+      <p:grpSpPr>
+        <a:xfrm>
+          <a:off x="0" y="0"/>
+          <a:ext cx="0" cy="0"/>
+          <a:chOff x="0" y="0"/>
+          <a:chExt cx="0" cy="0"/>
+        </a:xfrm>
+      </p:grpSpPr>
+      <p:sp>
+        <p:nvSpPr>
+          <p:cNvPr id="2" name="Title 1">
+            <a:extLst>
+              <a:ext uri="{FF2B5EF4-FFF2-40B4-BE49-F238E27FC236}">
                 <a16:creationId xmlns:a16="http://schemas.microsoft.com/office/drawing/2014/main" id="{D69990CD-FFC3-458B-AFD0-940D78C85BF2}"/>
               </a:ext>
             </a:extLst>
@@ -5418,7 +5720,7 @@
 </p:sld>
 </file>
 
-<file path=ppt/slides/slide23.xml><?xml version="1.0" encoding="utf-8"?>
+<file path=ppt/slides/slide24.xml><?xml version="1.0" encoding="utf-8"?>
 <p:sld xmlns:a="http://schemas.openxmlformats.org/drawingml/2006/main" xmlns:r="http://schemas.openxmlformats.org/officeDocument/2006/relationships" xmlns:p="http://schemas.openxmlformats.org/presentationml/2006/main">
   <p:cSld>
     <p:spTree>
@@ -5631,7 +5933,7 @@
 </p:sld>
 </file>
 
-<file path=ppt/slides/slide24.xml><?xml version="1.0" encoding="utf-8"?>
+<file path=ppt/slides/slide25.xml><?xml version="1.0" encoding="utf-8"?>
 <p:sld xmlns:a="http://schemas.openxmlformats.org/drawingml/2006/main" xmlns:r="http://schemas.openxmlformats.org/officeDocument/2006/relationships" xmlns:p="http://schemas.openxmlformats.org/presentationml/2006/main">
   <p:cSld>
     <p:spTree>
@@ -5738,7 +6040,7 @@
 </p:sld>
 </file>
 
-<file path=ppt/slides/slide25.xml><?xml version="1.0" encoding="utf-8"?>
+<file path=ppt/slides/slide26.xml><?xml version="1.0" encoding="utf-8"?>
 <p:sld xmlns:a="http://schemas.openxmlformats.org/drawingml/2006/main" xmlns:r="http://schemas.openxmlformats.org/officeDocument/2006/relationships" xmlns:p="http://schemas.openxmlformats.org/presentationml/2006/main">
   <p:cSld>
     <p:spTree>
@@ -5917,7 +6219,7 @@
 </p:sld>
 </file>
 
-<file path=ppt/slides/slide26.xml><?xml version="1.0" encoding="utf-8"?>
+<file path=ppt/slides/slide27.xml><?xml version="1.0" encoding="utf-8"?>
 <p:sld xmlns:a="http://schemas.openxmlformats.org/drawingml/2006/main" xmlns:r="http://schemas.openxmlformats.org/officeDocument/2006/relationships" xmlns:p="http://schemas.openxmlformats.org/presentationml/2006/main">
   <p:cSld>
     <p:spTree>
@@ -6110,7 +6412,7 @@
 </p:sld>
 </file>
 
-<file path=ppt/slides/slide27.xml><?xml version="1.0" encoding="utf-8"?>
+<file path=ppt/slides/slide28.xml><?xml version="1.0" encoding="utf-8"?>
 <p:sld xmlns:a="http://schemas.openxmlformats.org/drawingml/2006/main" xmlns:r="http://schemas.openxmlformats.org/officeDocument/2006/relationships" xmlns:p="http://schemas.openxmlformats.org/presentationml/2006/main">
   <p:cSld>
     <p:spTree>
@@ -6249,7 +6551,7 @@
 </p:sld>
 </file>
 
-<file path=ppt/slides/slide28.xml><?xml version="1.0" encoding="utf-8"?>
+<file path=ppt/slides/slide29.xml><?xml version="1.0" encoding="utf-8"?>
 <p:sld xmlns:a="http://schemas.openxmlformats.org/drawingml/2006/main" xmlns:r="http://schemas.openxmlformats.org/officeDocument/2006/relationships" xmlns:p="http://schemas.openxmlformats.org/presentationml/2006/main">
   <p:cSld>
     <p:spTree>
@@ -6434,189 +6736,6 @@
 </p:sld>
 </file>
 
-<file path=ppt/slides/slide29.xml><?xml version="1.0" encoding="utf-8"?>
-<p:sld xmlns:a="http://schemas.openxmlformats.org/drawingml/2006/main" xmlns:r="http://schemas.openxmlformats.org/officeDocument/2006/relationships" xmlns:p="http://schemas.openxmlformats.org/presentationml/2006/main">
-  <p:cSld>
-    <p:spTree>
-      <p:nvGrpSpPr>
-        <p:cNvPr id="1" name=""/>
-        <p:cNvGrpSpPr/>
-        <p:nvPr/>
-      </p:nvGrpSpPr>
-      <p:grpSpPr>
-        <a:xfrm>
-          <a:off x="0" y="0"/>
-          <a:ext cx="0" cy="0"/>
-          <a:chOff x="0" y="0"/>
-          <a:chExt cx="0" cy="0"/>
-        </a:xfrm>
-      </p:grpSpPr>
-      <p:sp>
-        <p:nvSpPr>
-          <p:cNvPr id="5" name="Title 4">
-            <a:extLst>
-              <a:ext uri="{FF2B5EF4-FFF2-40B4-BE49-F238E27FC236}">
-                <a16:creationId xmlns:a16="http://schemas.microsoft.com/office/drawing/2014/main" id="{B49DCFCA-05AD-46F2-9511-D98BB7692DC2}"/>
-              </a:ext>
-            </a:extLst>
-          </p:cNvPr>
-          <p:cNvSpPr>
-            <a:spLocks noGrp="1"/>
-          </p:cNvSpPr>
-          <p:nvPr>
-            <p:ph type="title"/>
-          </p:nvPr>
-        </p:nvSpPr>
-        <p:spPr/>
-        <p:txBody>
-          <a:bodyPr/>
-          <a:lstStyle/>
-          <a:p>
-            <a:r>
-              <a:rPr lang="en-US" dirty="0"/>
-              <a:t>Resources</a:t>
-            </a:r>
-          </a:p>
-        </p:txBody>
-      </p:sp>
-      <p:sp>
-        <p:nvSpPr>
-          <p:cNvPr id="6" name="Content Placeholder 5">
-            <a:extLst>
-              <a:ext uri="{FF2B5EF4-FFF2-40B4-BE49-F238E27FC236}">
-                <a16:creationId xmlns:a16="http://schemas.microsoft.com/office/drawing/2014/main" id="{A56A40AB-2F81-4F4B-9834-6D5177D13CA3}"/>
-              </a:ext>
-            </a:extLst>
-          </p:cNvPr>
-          <p:cNvSpPr>
-            <a:spLocks noGrp="1"/>
-          </p:cNvSpPr>
-          <p:nvPr>
-            <p:ph idx="1"/>
-          </p:nvPr>
-        </p:nvSpPr>
-        <p:spPr/>
-        <p:txBody>
-          <a:bodyPr>
-            <a:normAutofit lnSpcReduction="10000"/>
-          </a:bodyPr>
-          <a:lstStyle/>
-          <a:p>
-            <a:r>
-              <a:rPr lang="en-US" dirty="0"/>
-              <a:t>Machine Learning: Nando de Freitas @ UBC</a:t>
-            </a:r>
-          </a:p>
-          <a:p>
-            <a:pPr lvl="1"/>
-            <a:r>
-              <a:rPr lang="en-US" dirty="0">
-                <a:hlinkClick r:id="rId2"/>
-              </a:rPr>
-              <a:t>Introduction to Gaussian processes</a:t>
-            </a:r>
-            <a:endParaRPr lang="en-US" dirty="0"/>
-          </a:p>
-          <a:p>
-            <a:pPr lvl="1"/>
-            <a:r>
-              <a:rPr lang="en-US" dirty="0">
-                <a:hlinkClick r:id="rId3"/>
-              </a:rPr>
-              <a:t>Regression with Gaussian processes</a:t>
-            </a:r>
-            <a:endParaRPr lang="en-US" dirty="0"/>
-          </a:p>
-          <a:p>
-            <a:pPr lvl="1"/>
-            <a:r>
-              <a:rPr lang="en-US" dirty="0">
-                <a:hlinkClick r:id="rId4"/>
-              </a:rPr>
-              <a:t>Bayesian optimization and multi-armed bandits</a:t>
-            </a:r>
-            <a:endParaRPr lang="en-US" dirty="0"/>
-          </a:p>
-          <a:p>
-            <a:r>
-              <a:rPr lang="en-US" dirty="0">
-                <a:hlinkClick r:id="rId5"/>
-              </a:rPr>
-              <a:t>Gaussian Processes for Machine Learning</a:t>
-            </a:r>
-            <a:endParaRPr lang="en-US" dirty="0"/>
-          </a:p>
-          <a:p>
-            <a:pPr lvl="1"/>
-            <a:r>
-              <a:rPr lang="en-US" dirty="0"/>
-              <a:t>Carl Edward Rasmussen and Christopher K. I. Williams</a:t>
-            </a:r>
-          </a:p>
-          <a:p>
-            <a:r>
-              <a:rPr lang="en-US" dirty="0">
-                <a:hlinkClick r:id="rId6"/>
-              </a:rPr>
-              <a:t>A Tutorial on Bayesian Optimization of Expensive Cost Functions, with Application to Active User Modeling and Hierarchical Reinforcement Learning</a:t>
-            </a:r>
-            <a:endParaRPr lang="en-US" dirty="0"/>
-          </a:p>
-          <a:p>
-            <a:pPr lvl="1"/>
-            <a:r>
-              <a:rPr lang="en-US" dirty="0"/>
-              <a:t>Eric </a:t>
-            </a:r>
-            <a:r>
-              <a:rPr lang="en-US" dirty="0" err="1"/>
-              <a:t>Brochu</a:t>
-            </a:r>
-            <a:r>
-              <a:rPr lang="en-US" dirty="0"/>
-              <a:t>, Vlad M. Cora, and Nando de Freitas</a:t>
-            </a:r>
-          </a:p>
-          <a:p>
-            <a:r>
-              <a:rPr lang="en-US" dirty="0" err="1"/>
-              <a:t>Scikit</a:t>
-            </a:r>
-            <a:r>
-              <a:rPr lang="en-US" dirty="0"/>
-              <a:t>-learn: </a:t>
-            </a:r>
-            <a:r>
-              <a:rPr lang="en-US" dirty="0">
-                <a:hlinkClick r:id="rId7"/>
-              </a:rPr>
-              <a:t>Gaussian Processes</a:t>
-            </a:r>
-            <a:endParaRPr lang="en-US" dirty="0"/>
-          </a:p>
-          <a:p>
-            <a:pPr lvl="1"/>
-            <a:endParaRPr lang="en-US" dirty="0"/>
-          </a:p>
-          <a:p>
-            <a:pPr lvl="1"/>
-            <a:endParaRPr lang="en-US" dirty="0"/>
-          </a:p>
-        </p:txBody>
-      </p:sp>
-    </p:spTree>
-    <p:extLst>
-      <p:ext uri="{BB962C8B-B14F-4D97-AF65-F5344CB8AC3E}">
-        <p14:creationId xmlns:p14="http://schemas.microsoft.com/office/powerpoint/2010/main" val="4222968470"/>
-      </p:ext>
-    </p:extLst>
-  </p:cSld>
-  <p:clrMapOvr>
-    <a:masterClrMapping/>
-  </p:clrMapOvr>
-</p:sld>
-</file>
-
 <file path=ppt/slides/slide3.xml><?xml version="1.0" encoding="utf-8"?>
 <p:sld xmlns:a="http://schemas.openxmlformats.org/drawingml/2006/main" xmlns:r="http://schemas.openxmlformats.org/officeDocument/2006/relationships" xmlns:p="http://schemas.openxmlformats.org/presentationml/2006/main">
   <p:cSld>
@@ -6847,6 +6966,189 @@
     <p:extLst>
       <p:ext uri="{BB962C8B-B14F-4D97-AF65-F5344CB8AC3E}">
         <p14:creationId xmlns:p14="http://schemas.microsoft.com/office/powerpoint/2010/main" val="292934350"/>
+      </p:ext>
+    </p:extLst>
+  </p:cSld>
+  <p:clrMapOvr>
+    <a:masterClrMapping/>
+  </p:clrMapOvr>
+</p:sld>
+</file>
+
+<file path=ppt/slides/slide30.xml><?xml version="1.0" encoding="utf-8"?>
+<p:sld xmlns:a="http://schemas.openxmlformats.org/drawingml/2006/main" xmlns:r="http://schemas.openxmlformats.org/officeDocument/2006/relationships" xmlns:p="http://schemas.openxmlformats.org/presentationml/2006/main">
+  <p:cSld>
+    <p:spTree>
+      <p:nvGrpSpPr>
+        <p:cNvPr id="1" name=""/>
+        <p:cNvGrpSpPr/>
+        <p:nvPr/>
+      </p:nvGrpSpPr>
+      <p:grpSpPr>
+        <a:xfrm>
+          <a:off x="0" y="0"/>
+          <a:ext cx="0" cy="0"/>
+          <a:chOff x="0" y="0"/>
+          <a:chExt cx="0" cy="0"/>
+        </a:xfrm>
+      </p:grpSpPr>
+      <p:sp>
+        <p:nvSpPr>
+          <p:cNvPr id="5" name="Title 4">
+            <a:extLst>
+              <a:ext uri="{FF2B5EF4-FFF2-40B4-BE49-F238E27FC236}">
+                <a16:creationId xmlns:a16="http://schemas.microsoft.com/office/drawing/2014/main" id="{B49DCFCA-05AD-46F2-9511-D98BB7692DC2}"/>
+              </a:ext>
+            </a:extLst>
+          </p:cNvPr>
+          <p:cNvSpPr>
+            <a:spLocks noGrp="1"/>
+          </p:cNvSpPr>
+          <p:nvPr>
+            <p:ph type="title"/>
+          </p:nvPr>
+        </p:nvSpPr>
+        <p:spPr/>
+        <p:txBody>
+          <a:bodyPr/>
+          <a:lstStyle/>
+          <a:p>
+            <a:r>
+              <a:rPr lang="en-US" dirty="0"/>
+              <a:t>Resources</a:t>
+            </a:r>
+          </a:p>
+        </p:txBody>
+      </p:sp>
+      <p:sp>
+        <p:nvSpPr>
+          <p:cNvPr id="6" name="Content Placeholder 5">
+            <a:extLst>
+              <a:ext uri="{FF2B5EF4-FFF2-40B4-BE49-F238E27FC236}">
+                <a16:creationId xmlns:a16="http://schemas.microsoft.com/office/drawing/2014/main" id="{A56A40AB-2F81-4F4B-9834-6D5177D13CA3}"/>
+              </a:ext>
+            </a:extLst>
+          </p:cNvPr>
+          <p:cNvSpPr>
+            <a:spLocks noGrp="1"/>
+          </p:cNvSpPr>
+          <p:nvPr>
+            <p:ph idx="1"/>
+          </p:nvPr>
+        </p:nvSpPr>
+        <p:spPr/>
+        <p:txBody>
+          <a:bodyPr>
+            <a:normAutofit lnSpcReduction="10000"/>
+          </a:bodyPr>
+          <a:lstStyle/>
+          <a:p>
+            <a:r>
+              <a:rPr lang="en-US" dirty="0"/>
+              <a:t>Machine Learning: Nando de Freitas @ UBC</a:t>
+            </a:r>
+          </a:p>
+          <a:p>
+            <a:pPr lvl="1"/>
+            <a:r>
+              <a:rPr lang="en-US" dirty="0">
+                <a:hlinkClick r:id="rId2"/>
+              </a:rPr>
+              <a:t>Introduction to Gaussian processes</a:t>
+            </a:r>
+            <a:endParaRPr lang="en-US" dirty="0"/>
+          </a:p>
+          <a:p>
+            <a:pPr lvl="1"/>
+            <a:r>
+              <a:rPr lang="en-US" dirty="0">
+                <a:hlinkClick r:id="rId3"/>
+              </a:rPr>
+              <a:t>Regression with Gaussian processes</a:t>
+            </a:r>
+            <a:endParaRPr lang="en-US" dirty="0"/>
+          </a:p>
+          <a:p>
+            <a:pPr lvl="1"/>
+            <a:r>
+              <a:rPr lang="en-US" dirty="0">
+                <a:hlinkClick r:id="rId4"/>
+              </a:rPr>
+              <a:t>Bayesian optimization and multi-armed bandits</a:t>
+            </a:r>
+            <a:endParaRPr lang="en-US" dirty="0"/>
+          </a:p>
+          <a:p>
+            <a:r>
+              <a:rPr lang="en-US" dirty="0">
+                <a:hlinkClick r:id="rId5"/>
+              </a:rPr>
+              <a:t>Gaussian Processes for Machine Learning</a:t>
+            </a:r>
+            <a:endParaRPr lang="en-US" dirty="0"/>
+          </a:p>
+          <a:p>
+            <a:pPr lvl="1"/>
+            <a:r>
+              <a:rPr lang="en-US" dirty="0"/>
+              <a:t>Carl Edward Rasmussen and Christopher K. I. Williams</a:t>
+            </a:r>
+          </a:p>
+          <a:p>
+            <a:r>
+              <a:rPr lang="en-US" dirty="0">
+                <a:hlinkClick r:id="rId6"/>
+              </a:rPr>
+              <a:t>A Tutorial on Bayesian Optimization of Expensive Cost Functions, with Application to Active User Modeling and Hierarchical Reinforcement Learning</a:t>
+            </a:r>
+            <a:endParaRPr lang="en-US" dirty="0"/>
+          </a:p>
+          <a:p>
+            <a:pPr lvl="1"/>
+            <a:r>
+              <a:rPr lang="en-US" dirty="0"/>
+              <a:t>Eric </a:t>
+            </a:r>
+            <a:r>
+              <a:rPr lang="en-US" dirty="0" err="1"/>
+              <a:t>Brochu</a:t>
+            </a:r>
+            <a:r>
+              <a:rPr lang="en-US" dirty="0"/>
+              <a:t>, Vlad M. Cora, and Nando de Freitas</a:t>
+            </a:r>
+          </a:p>
+          <a:p>
+            <a:r>
+              <a:rPr lang="en-US" dirty="0" err="1"/>
+              <a:t>Scikit</a:t>
+            </a:r>
+            <a:r>
+              <a:rPr lang="en-US" dirty="0"/>
+              <a:t>-learn: </a:t>
+            </a:r>
+            <a:r>
+              <a:rPr lang="en-US" dirty="0">
+                <a:hlinkClick r:id="rId7"/>
+              </a:rPr>
+              <a:t>Gaussian Processes</a:t>
+            </a:r>
+            <a:endParaRPr lang="en-US" dirty="0"/>
+          </a:p>
+          <a:p>
+            <a:pPr lvl="1"/>
+            <a:endParaRPr lang="en-US" dirty="0"/>
+          </a:p>
+          <a:p>
+            <a:pPr lvl="1"/>
+            <a:endParaRPr lang="en-US" dirty="0"/>
+          </a:p>
+        </p:txBody>
+      </p:sp>
+    </p:spTree>
+    <p:extLst>
+      <p:ext uri="{BB962C8B-B14F-4D97-AF65-F5344CB8AC3E}">
+        <p14:creationId xmlns:p14="http://schemas.microsoft.com/office/powerpoint/2010/main" val="4222968470"/>
       </p:ext>
     </p:extLst>
   </p:cSld>

</xml_diff>

<commit_message>
Added GP theory and code for scaling to PPT. Small changes to gp_scale notebook.
</commit_message>
<xml_diff>
--- a/Data_science_nashville_jkk.pptx
+++ b/Data_science_nashville_jkk.pptx
@@ -5,7 +5,7 @@
     <p:sldMasterId id="2147483660" r:id="rId1"/>
   </p:sldMasterIdLst>
   <p:handoutMasterIdLst>
-    <p:handoutMasterId r:id="rId32"/>
+    <p:handoutMasterId r:id="rId34"/>
   </p:handoutMasterIdLst>
   <p:sldIdLst>
     <p:sldId id="256" r:id="rId2"/>
@@ -20,24 +20,26 @@
     <p:sldId id="274" r:id="rId11"/>
     <p:sldId id="265" r:id="rId12"/>
     <p:sldId id="269" r:id="rId13"/>
-    <p:sldId id="284" r:id="rId14"/>
-    <p:sldId id="294" r:id="rId15"/>
-    <p:sldId id="283" r:id="rId16"/>
-    <p:sldId id="295" r:id="rId17"/>
-    <p:sldId id="290" r:id="rId18"/>
-    <p:sldId id="271" r:id="rId19"/>
-    <p:sldId id="276" r:id="rId20"/>
-    <p:sldId id="277" r:id="rId21"/>
-    <p:sldId id="291" r:id="rId22"/>
-    <p:sldId id="292" r:id="rId23"/>
-    <p:sldId id="268" r:id="rId24"/>
-    <p:sldId id="267" r:id="rId25"/>
-    <p:sldId id="281" r:id="rId26"/>
-    <p:sldId id="275" r:id="rId27"/>
-    <p:sldId id="288" r:id="rId28"/>
-    <p:sldId id="266" r:id="rId29"/>
-    <p:sldId id="285" r:id="rId30"/>
-    <p:sldId id="286" r:id="rId31"/>
+    <p:sldId id="297" r:id="rId14"/>
+    <p:sldId id="284" r:id="rId15"/>
+    <p:sldId id="294" r:id="rId16"/>
+    <p:sldId id="283" r:id="rId17"/>
+    <p:sldId id="295" r:id="rId18"/>
+    <p:sldId id="290" r:id="rId19"/>
+    <p:sldId id="271" r:id="rId20"/>
+    <p:sldId id="276" r:id="rId21"/>
+    <p:sldId id="277" r:id="rId22"/>
+    <p:sldId id="291" r:id="rId23"/>
+    <p:sldId id="292" r:id="rId24"/>
+    <p:sldId id="268" r:id="rId25"/>
+    <p:sldId id="267" r:id="rId26"/>
+    <p:sldId id="281" r:id="rId27"/>
+    <p:sldId id="275" r:id="rId28"/>
+    <p:sldId id="298" r:id="rId29"/>
+    <p:sldId id="299" r:id="rId30"/>
+    <p:sldId id="266" r:id="rId31"/>
+    <p:sldId id="285" r:id="rId32"/>
+    <p:sldId id="286" r:id="rId33"/>
   </p:sldIdLst>
   <p:sldSz cx="9144000" cy="6858000" type="screen4x3"/>
   <p:notesSz cx="6858000" cy="9144000"/>
@@ -242,7 +244,7 @@
           <a:p>
             <a:fld id="{F7690C9E-9892-4905-B5B0-5746785E07FC}" type="datetimeFigureOut">
               <a:rPr lang="en-US" smtClean="0"/>
-              <a:t>1/22/2018</a:t>
+              <a:t>1/23/2018</a:t>
             </a:fld>
             <a:endParaRPr lang="en-US"/>
           </a:p>
@@ -468,7 +470,7 @@
           <a:p>
             <a:fld id="{446A68C1-49B4-4B53-A4B5-FD8CED86E0B5}" type="datetimeFigureOut">
               <a:rPr lang="en-US" smtClean="0"/>
-              <a:t>1/22/2018</a:t>
+              <a:t>1/23/2018</a:t>
             </a:fld>
             <a:endParaRPr lang="en-US"/>
           </a:p>
@@ -638,7 +640,7 @@
           <a:p>
             <a:fld id="{446A68C1-49B4-4B53-A4B5-FD8CED86E0B5}" type="datetimeFigureOut">
               <a:rPr lang="en-US" smtClean="0"/>
-              <a:t>1/22/2018</a:t>
+              <a:t>1/23/2018</a:t>
             </a:fld>
             <a:endParaRPr lang="en-US"/>
           </a:p>
@@ -818,7 +820,7 @@
           <a:p>
             <a:fld id="{446A68C1-49B4-4B53-A4B5-FD8CED86E0B5}" type="datetimeFigureOut">
               <a:rPr lang="en-US" smtClean="0"/>
-              <a:t>1/22/2018</a:t>
+              <a:t>1/23/2018</a:t>
             </a:fld>
             <a:endParaRPr lang="en-US"/>
           </a:p>
@@ -988,7 +990,7 @@
           <a:p>
             <a:fld id="{446A68C1-49B4-4B53-A4B5-FD8CED86E0B5}" type="datetimeFigureOut">
               <a:rPr lang="en-US" smtClean="0"/>
-              <a:t>1/22/2018</a:t>
+              <a:t>1/23/2018</a:t>
             </a:fld>
             <a:endParaRPr lang="en-US"/>
           </a:p>
@@ -1232,7 +1234,7 @@
           <a:p>
             <a:fld id="{446A68C1-49B4-4B53-A4B5-FD8CED86E0B5}" type="datetimeFigureOut">
               <a:rPr lang="en-US" smtClean="0"/>
-              <a:t>1/22/2018</a:t>
+              <a:t>1/23/2018</a:t>
             </a:fld>
             <a:endParaRPr lang="en-US"/>
           </a:p>
@@ -1464,7 +1466,7 @@
           <a:p>
             <a:fld id="{446A68C1-49B4-4B53-A4B5-FD8CED86E0B5}" type="datetimeFigureOut">
               <a:rPr lang="en-US" smtClean="0"/>
-              <a:t>1/22/2018</a:t>
+              <a:t>1/23/2018</a:t>
             </a:fld>
             <a:endParaRPr lang="en-US"/>
           </a:p>
@@ -1831,7 +1833,7 @@
           <a:p>
             <a:fld id="{446A68C1-49B4-4B53-A4B5-FD8CED86E0B5}" type="datetimeFigureOut">
               <a:rPr lang="en-US" smtClean="0"/>
-              <a:t>1/22/2018</a:t>
+              <a:t>1/23/2018</a:t>
             </a:fld>
             <a:endParaRPr lang="en-US"/>
           </a:p>
@@ -1949,7 +1951,7 @@
           <a:p>
             <a:fld id="{446A68C1-49B4-4B53-A4B5-FD8CED86E0B5}" type="datetimeFigureOut">
               <a:rPr lang="en-US" smtClean="0"/>
-              <a:t>1/22/2018</a:t>
+              <a:t>1/23/2018</a:t>
             </a:fld>
             <a:endParaRPr lang="en-US"/>
           </a:p>
@@ -2044,7 +2046,7 @@
           <a:p>
             <a:fld id="{446A68C1-49B4-4B53-A4B5-FD8CED86E0B5}" type="datetimeFigureOut">
               <a:rPr lang="en-US" smtClean="0"/>
-              <a:t>1/22/2018</a:t>
+              <a:t>1/23/2018</a:t>
             </a:fld>
             <a:endParaRPr lang="en-US"/>
           </a:p>
@@ -2321,7 +2323,7 @@
           <a:p>
             <a:fld id="{446A68C1-49B4-4B53-A4B5-FD8CED86E0B5}" type="datetimeFigureOut">
               <a:rPr lang="en-US" smtClean="0"/>
-              <a:t>1/22/2018</a:t>
+              <a:t>1/23/2018</a:t>
             </a:fld>
             <a:endParaRPr lang="en-US"/>
           </a:p>
@@ -2578,7 +2580,7 @@
           <a:p>
             <a:fld id="{446A68C1-49B4-4B53-A4B5-FD8CED86E0B5}" type="datetimeFigureOut">
               <a:rPr lang="en-US" smtClean="0"/>
-              <a:t>1/22/2018</a:t>
+              <a:t>1/23/2018</a:t>
             </a:fld>
             <a:endParaRPr lang="en-US"/>
           </a:p>
@@ -2791,7 +2793,7 @@
           <a:p>
             <a:fld id="{446A68C1-49B4-4B53-A4B5-FD8CED86E0B5}" type="datetimeFigureOut">
               <a:rPr lang="en-US" smtClean="0"/>
-              <a:t>1/22/2018</a:t>
+              <a:t>1/23/2018</a:t>
             </a:fld>
             <a:endParaRPr lang="en-US"/>
           </a:p>
@@ -3607,6 +3609,1312 @@
           <p:cNvPr id="2" name="Title 1">
             <a:extLst>
               <a:ext uri="{FF2B5EF4-FFF2-40B4-BE49-F238E27FC236}">
+                <a16:creationId xmlns:a16="http://schemas.microsoft.com/office/drawing/2014/main" id="{3179AB93-FF72-43F3-94F5-CAB15555EEA6}"/>
+              </a:ext>
+            </a:extLst>
+          </p:cNvPr>
+          <p:cNvSpPr>
+            <a:spLocks noGrp="1"/>
+          </p:cNvSpPr>
+          <p:nvPr>
+            <p:ph type="title"/>
+          </p:nvPr>
+        </p:nvSpPr>
+        <p:spPr/>
+        <p:txBody>
+          <a:bodyPr/>
+          <a:lstStyle/>
+          <a:p>
+            <a:r>
+              <a:rPr lang="en-US" dirty="0"/>
+              <a:t>Gaussian Process</a:t>
+            </a:r>
+          </a:p>
+        </p:txBody>
+      </p:sp>
+      <mc:AlternateContent xmlns:mc="http://schemas.openxmlformats.org/markup-compatibility/2006">
+        <mc:Choice xmlns:a14="http://schemas.microsoft.com/office/drawing/2010/main" Requires="a14">
+          <p:sp>
+            <p:nvSpPr>
+              <p:cNvPr id="4" name="Content Placeholder 3">
+                <a:extLst>
+                  <a:ext uri="{FF2B5EF4-FFF2-40B4-BE49-F238E27FC236}">
+                    <a16:creationId xmlns:a16="http://schemas.microsoft.com/office/drawing/2014/main" id="{354BB4C5-3B14-4FFD-B5CB-DEF062819067}"/>
+                  </a:ext>
+                </a:extLst>
+              </p:cNvPr>
+              <p:cNvSpPr>
+                <a:spLocks noGrp="1"/>
+              </p:cNvSpPr>
+              <p:nvPr>
+                <p:ph idx="1"/>
+              </p:nvPr>
+            </p:nvSpPr>
+            <p:spPr/>
+            <p:txBody>
+              <a:bodyPr>
+                <a:normAutofit fontScale="92500"/>
+              </a:bodyPr>
+              <a:lstStyle/>
+              <a:p>
+                <a:r>
+                  <a:rPr lang="en-US" dirty="0"/>
+                  <a:t>Noiseless GP Regression</a:t>
+                </a:r>
+              </a:p>
+              <a:p>
+                <a:pPr marL="0" indent="0">
+                  <a:buNone/>
+                </a:pPr>
+                <a:endParaRPr lang="en-US" dirty="0"/>
+              </a:p>
+              <a:p>
+                <a:pPr marL="0" indent="0">
+                  <a:buNone/>
+                </a:pPr>
+                <a14:m>
+                  <m:oMathPara xmlns:m="http://schemas.openxmlformats.org/officeDocument/2006/math">
+                    <m:oMathParaPr>
+                      <m:jc m:val="centerGroup"/>
+                    </m:oMathParaPr>
+                    <m:oMath xmlns:m="http://schemas.openxmlformats.org/officeDocument/2006/math">
+                      <m:d>
+                        <m:dPr>
+                          <m:ctrlPr>
+                            <a:rPr lang="en-US" i="1" smtClean="0">
+                              <a:latin typeface="Cambria Math" panose="02040503050406030204" pitchFamily="18" charset="0"/>
+                            </a:rPr>
+                          </m:ctrlPr>
+                        </m:dPr>
+                        <m:e>
+                          <m:m>
+                            <m:mPr>
+                              <m:mcs>
+                                <m:mc>
+                                  <m:mcPr>
+                                    <m:count m:val="1"/>
+                                    <m:mcJc m:val="center"/>
+                                  </m:mcPr>
+                                </m:mc>
+                              </m:mcs>
+                              <m:ctrlPr>
+                                <a:rPr lang="en-US" i="1" smtClean="0">
+                                  <a:latin typeface="Cambria Math" panose="02040503050406030204" pitchFamily="18" charset="0"/>
+                                </a:rPr>
+                              </m:ctrlPr>
+                            </m:mPr>
+                            <m:mr>
+                              <m:e>
+                                <m:r>
+                                  <m:rPr>
+                                    <m:brk m:alnAt="7"/>
+                                  </m:rPr>
+                                  <a:rPr lang="en-US" b="0" i="1" smtClean="0">
+                                    <a:latin typeface="Cambria Math" panose="02040503050406030204" pitchFamily="18" charset="0"/>
+                                  </a:rPr>
+                                  <m:t>𝑓</m:t>
+                                </m:r>
+                              </m:e>
+                            </m:mr>
+                            <m:mr>
+                              <m:e>
+                                <m:sSub>
+                                  <m:sSubPr>
+                                    <m:ctrlPr>
+                                      <a:rPr lang="en-US" i="1" smtClean="0">
+                                        <a:latin typeface="Cambria Math" panose="02040503050406030204" pitchFamily="18" charset="0"/>
+                                      </a:rPr>
+                                    </m:ctrlPr>
+                                  </m:sSubPr>
+                                  <m:e>
+                                    <m:r>
+                                      <a:rPr lang="en-US" b="0" i="1" smtClean="0">
+                                        <a:latin typeface="Cambria Math" panose="02040503050406030204" pitchFamily="18" charset="0"/>
+                                      </a:rPr>
+                                      <m:t>𝑓</m:t>
+                                    </m:r>
+                                  </m:e>
+                                  <m:sub>
+                                    <m:r>
+                                      <a:rPr lang="en-US" b="0" i="1" smtClean="0">
+                                        <a:latin typeface="Cambria Math" panose="02040503050406030204" pitchFamily="18" charset="0"/>
+                                      </a:rPr>
+                                      <m:t>∗</m:t>
+                                    </m:r>
+                                  </m:sub>
+                                </m:sSub>
+                              </m:e>
+                            </m:mr>
+                          </m:m>
+                        </m:e>
+                      </m:d>
+                      <m:r>
+                        <a:rPr lang="en-US" i="1" smtClean="0">
+                          <a:latin typeface="Cambria Math" panose="02040503050406030204" pitchFamily="18" charset="0"/>
+                          <a:ea typeface="Cambria Math" panose="02040503050406030204" pitchFamily="18" charset="0"/>
+                        </a:rPr>
+                        <m:t>~</m:t>
+                      </m:r>
+                      <m:r>
+                        <a:rPr lang="en-US" b="0" i="1" smtClean="0">
+                          <a:latin typeface="Cambria Math" panose="02040503050406030204" pitchFamily="18" charset="0"/>
+                          <a:ea typeface="Cambria Math" panose="02040503050406030204" pitchFamily="18" charset="0"/>
+                        </a:rPr>
+                        <m:t>𝑁</m:t>
+                      </m:r>
+                      <m:d>
+                        <m:dPr>
+                          <m:ctrlPr>
+                            <a:rPr lang="en-US" b="0" i="1" smtClean="0">
+                              <a:latin typeface="Cambria Math" panose="02040503050406030204" pitchFamily="18" charset="0"/>
+                              <a:ea typeface="Cambria Math" panose="02040503050406030204" pitchFamily="18" charset="0"/>
+                            </a:rPr>
+                          </m:ctrlPr>
+                        </m:dPr>
+                        <m:e>
+                          <m:d>
+                            <m:dPr>
+                              <m:ctrlPr>
+                                <a:rPr lang="en-US" b="0" i="1" smtClean="0">
+                                  <a:latin typeface="Cambria Math" panose="02040503050406030204" pitchFamily="18" charset="0"/>
+                                  <a:ea typeface="Cambria Math" panose="02040503050406030204" pitchFamily="18" charset="0"/>
+                                </a:rPr>
+                              </m:ctrlPr>
+                            </m:dPr>
+                            <m:e>
+                              <m:m>
+                                <m:mPr>
+                                  <m:mcs>
+                                    <m:mc>
+                                      <m:mcPr>
+                                        <m:count m:val="1"/>
+                                        <m:mcJc m:val="center"/>
+                                      </m:mcPr>
+                                    </m:mc>
+                                  </m:mcs>
+                                  <m:ctrlPr>
+                                    <a:rPr lang="en-US" b="0" i="1" smtClean="0">
+                                      <a:latin typeface="Cambria Math" panose="02040503050406030204" pitchFamily="18" charset="0"/>
+                                      <a:ea typeface="Cambria Math" panose="02040503050406030204" pitchFamily="18" charset="0"/>
+                                    </a:rPr>
+                                  </m:ctrlPr>
+                                </m:mPr>
+                                <m:mr>
+                                  <m:e>
+                                    <m:r>
+                                      <m:rPr>
+                                        <m:brk m:alnAt="7"/>
+                                      </m:rPr>
+                                      <a:rPr lang="en-US" b="0" i="1" smtClean="0">
+                                        <a:latin typeface="Cambria Math" panose="02040503050406030204" pitchFamily="18" charset="0"/>
+                                        <a:ea typeface="Cambria Math" panose="02040503050406030204" pitchFamily="18" charset="0"/>
+                                      </a:rPr>
+                                      <m:t>𝜇</m:t>
+                                    </m:r>
+                                  </m:e>
+                                </m:mr>
+                                <m:mr>
+                                  <m:e>
+                                    <m:sSub>
+                                      <m:sSubPr>
+                                        <m:ctrlPr>
+                                          <a:rPr lang="en-US" b="0" i="1" smtClean="0">
+                                            <a:latin typeface="Cambria Math" panose="02040503050406030204" pitchFamily="18" charset="0"/>
+                                            <a:ea typeface="Cambria Math" panose="02040503050406030204" pitchFamily="18" charset="0"/>
+                                          </a:rPr>
+                                        </m:ctrlPr>
+                                      </m:sSubPr>
+                                      <m:e>
+                                        <m:r>
+                                          <a:rPr lang="en-US" b="0" i="1" smtClean="0">
+                                            <a:latin typeface="Cambria Math" panose="02040503050406030204" pitchFamily="18" charset="0"/>
+                                            <a:ea typeface="Cambria Math" panose="02040503050406030204" pitchFamily="18" charset="0"/>
+                                          </a:rPr>
+                                          <m:t>𝜇</m:t>
+                                        </m:r>
+                                      </m:e>
+                                      <m:sub>
+                                        <m:r>
+                                          <a:rPr lang="en-US" b="0" i="1" smtClean="0">
+                                            <a:latin typeface="Cambria Math" panose="02040503050406030204" pitchFamily="18" charset="0"/>
+                                            <a:ea typeface="Cambria Math" panose="02040503050406030204" pitchFamily="18" charset="0"/>
+                                          </a:rPr>
+                                          <m:t>∗</m:t>
+                                        </m:r>
+                                      </m:sub>
+                                    </m:sSub>
+                                  </m:e>
+                                </m:mr>
+                              </m:m>
+                            </m:e>
+                          </m:d>
+                          <m:r>
+                            <a:rPr lang="en-US" b="0" i="1" smtClean="0">
+                              <a:latin typeface="Cambria Math" panose="02040503050406030204" pitchFamily="18" charset="0"/>
+                              <a:ea typeface="Cambria Math" panose="02040503050406030204" pitchFamily="18" charset="0"/>
+                            </a:rPr>
+                            <m:t>∙</m:t>
+                          </m:r>
+                          <m:d>
+                            <m:dPr>
+                              <m:ctrlPr>
+                                <a:rPr lang="en-US" b="0" i="1" smtClean="0">
+                                  <a:latin typeface="Cambria Math" panose="02040503050406030204" pitchFamily="18" charset="0"/>
+                                  <a:ea typeface="Cambria Math" panose="02040503050406030204" pitchFamily="18" charset="0"/>
+                                </a:rPr>
+                              </m:ctrlPr>
+                            </m:dPr>
+                            <m:e>
+                              <m:m>
+                                <m:mPr>
+                                  <m:mcs>
+                                    <m:mc>
+                                      <m:mcPr>
+                                        <m:count m:val="2"/>
+                                        <m:mcJc m:val="center"/>
+                                      </m:mcPr>
+                                    </m:mc>
+                                  </m:mcs>
+                                  <m:ctrlPr>
+                                    <a:rPr lang="en-US" b="0" i="1" smtClean="0">
+                                      <a:latin typeface="Cambria Math" panose="02040503050406030204" pitchFamily="18" charset="0"/>
+                                      <a:ea typeface="Cambria Math" panose="02040503050406030204" pitchFamily="18" charset="0"/>
+                                    </a:rPr>
+                                  </m:ctrlPr>
+                                </m:mPr>
+                                <m:mr>
+                                  <m:e>
+                                    <m:r>
+                                      <m:rPr>
+                                        <m:nor/>
+                                      </m:rPr>
+                                      <a:rPr lang="en-US" b="0" i="0" smtClean="0">
+                                        <a:latin typeface="Cambria Math" panose="02040503050406030204" pitchFamily="18" charset="0"/>
+                                        <a:ea typeface="Cambria Math" panose="02040503050406030204" pitchFamily="18" charset="0"/>
+                                      </a:rPr>
+                                      <m:t>K</m:t>
+                                    </m:r>
+                                  </m:e>
+                                  <m:e>
+                                    <m:sSub>
+                                      <m:sSubPr>
+                                        <m:ctrlPr>
+                                          <a:rPr lang="en-US" b="0" i="1" smtClean="0">
+                                            <a:latin typeface="Cambria Math" panose="02040503050406030204" pitchFamily="18" charset="0"/>
+                                            <a:ea typeface="Cambria Math" panose="02040503050406030204" pitchFamily="18" charset="0"/>
+                                          </a:rPr>
+                                        </m:ctrlPr>
+                                      </m:sSubPr>
+                                      <m:e>
+                                        <m:r>
+                                          <a:rPr lang="en-US" b="0" i="1" smtClean="0">
+                                            <a:latin typeface="Cambria Math" panose="02040503050406030204" pitchFamily="18" charset="0"/>
+                                            <a:ea typeface="Cambria Math" panose="02040503050406030204" pitchFamily="18" charset="0"/>
+                                          </a:rPr>
+                                          <m:t>𝐾</m:t>
+                                        </m:r>
+                                      </m:e>
+                                      <m:sub>
+                                        <m:r>
+                                          <a:rPr lang="en-US" b="0" i="1" smtClean="0">
+                                            <a:latin typeface="Cambria Math" panose="02040503050406030204" pitchFamily="18" charset="0"/>
+                                            <a:ea typeface="Cambria Math" panose="02040503050406030204" pitchFamily="18" charset="0"/>
+                                          </a:rPr>
+                                          <m:t>∗</m:t>
+                                        </m:r>
+                                      </m:sub>
+                                    </m:sSub>
+                                  </m:e>
+                                </m:mr>
+                                <m:mr>
+                                  <m:e>
+                                    <m:sSubSup>
+                                      <m:sSubSupPr>
+                                        <m:ctrlPr>
+                                          <a:rPr lang="en-US" b="0" i="1" smtClean="0">
+                                            <a:latin typeface="Cambria Math" panose="02040503050406030204" pitchFamily="18" charset="0"/>
+                                            <a:ea typeface="Cambria Math" panose="02040503050406030204" pitchFamily="18" charset="0"/>
+                                          </a:rPr>
+                                        </m:ctrlPr>
+                                      </m:sSubSupPr>
+                                      <m:e>
+                                        <m:r>
+                                          <a:rPr lang="en-US" b="0" i="1" smtClean="0">
+                                            <a:latin typeface="Cambria Math" panose="02040503050406030204" pitchFamily="18" charset="0"/>
+                                            <a:ea typeface="Cambria Math" panose="02040503050406030204" pitchFamily="18" charset="0"/>
+                                          </a:rPr>
+                                          <m:t>𝐾</m:t>
+                                        </m:r>
+                                      </m:e>
+                                      <m:sub>
+                                        <m:r>
+                                          <a:rPr lang="en-US" b="0" i="1" smtClean="0">
+                                            <a:latin typeface="Cambria Math" panose="02040503050406030204" pitchFamily="18" charset="0"/>
+                                            <a:ea typeface="Cambria Math" panose="02040503050406030204" pitchFamily="18" charset="0"/>
+                                          </a:rPr>
+                                          <m:t>∗</m:t>
+                                        </m:r>
+                                      </m:sub>
+                                      <m:sup>
+                                        <m:r>
+                                          <a:rPr lang="en-US" b="0" i="1" smtClean="0">
+                                            <a:latin typeface="Cambria Math" panose="02040503050406030204" pitchFamily="18" charset="0"/>
+                                            <a:ea typeface="Cambria Math" panose="02040503050406030204" pitchFamily="18" charset="0"/>
+                                          </a:rPr>
+                                          <m:t>𝑇</m:t>
+                                        </m:r>
+                                      </m:sup>
+                                    </m:sSubSup>
+                                  </m:e>
+                                  <m:e>
+                                    <m:sSub>
+                                      <m:sSubPr>
+                                        <m:ctrlPr>
+                                          <a:rPr lang="en-US" b="0" i="1" smtClean="0">
+                                            <a:latin typeface="Cambria Math" panose="02040503050406030204" pitchFamily="18" charset="0"/>
+                                            <a:ea typeface="Cambria Math" panose="02040503050406030204" pitchFamily="18" charset="0"/>
+                                          </a:rPr>
+                                        </m:ctrlPr>
+                                      </m:sSubPr>
+                                      <m:e>
+                                        <m:r>
+                                          <a:rPr lang="en-US" b="0" i="1" smtClean="0">
+                                            <a:latin typeface="Cambria Math" panose="02040503050406030204" pitchFamily="18" charset="0"/>
+                                            <a:ea typeface="Cambria Math" panose="02040503050406030204" pitchFamily="18" charset="0"/>
+                                          </a:rPr>
+                                          <m:t>𝐾</m:t>
+                                        </m:r>
+                                      </m:e>
+                                      <m:sub>
+                                        <m:r>
+                                          <a:rPr lang="en-US" b="0" i="1" smtClean="0">
+                                            <a:latin typeface="Cambria Math" panose="02040503050406030204" pitchFamily="18" charset="0"/>
+                                            <a:ea typeface="Cambria Math" panose="02040503050406030204" pitchFamily="18" charset="0"/>
+                                          </a:rPr>
+                                          <m:t>∗∗</m:t>
+                                        </m:r>
+                                      </m:sub>
+                                    </m:sSub>
+                                  </m:e>
+                                </m:mr>
+                              </m:m>
+                            </m:e>
+                          </m:d>
+                        </m:e>
+                      </m:d>
+                    </m:oMath>
+                  </m:oMathPara>
+                </a14:m>
+                <a:endParaRPr lang="en-US" dirty="0"/>
+              </a:p>
+              <a:p>
+                <a:pPr marL="0" indent="0">
+                  <a:buNone/>
+                </a:pPr>
+                <a:endParaRPr lang="en-US" dirty="0"/>
+              </a:p>
+              <a:p>
+                <a:pPr marL="0" indent="0">
+                  <a:buNone/>
+                </a:pPr>
+                <a14:m>
+                  <m:oMathPara xmlns:m="http://schemas.openxmlformats.org/officeDocument/2006/math">
+                    <m:oMathParaPr>
+                      <m:jc m:val="centerGroup"/>
+                    </m:oMathParaPr>
+                    <m:oMath xmlns:m="http://schemas.openxmlformats.org/officeDocument/2006/math">
+                      <m:r>
+                        <a:rPr lang="en-US" b="0" i="1" smtClean="0">
+                          <a:latin typeface="Cambria Math" panose="02040503050406030204" pitchFamily="18" charset="0"/>
+                        </a:rPr>
+                        <m:t>𝑝</m:t>
+                      </m:r>
+                      <m:d>
+                        <m:dPr>
+                          <m:ctrlPr>
+                            <a:rPr lang="en-US" b="0" i="1" smtClean="0">
+                              <a:latin typeface="Cambria Math" panose="02040503050406030204" pitchFamily="18" charset="0"/>
+                            </a:rPr>
+                          </m:ctrlPr>
+                        </m:dPr>
+                        <m:e>
+                          <m:sSub>
+                            <m:sSubPr>
+                              <m:ctrlPr>
+                                <a:rPr lang="en-US" b="0" i="1" smtClean="0">
+                                  <a:latin typeface="Cambria Math" panose="02040503050406030204" pitchFamily="18" charset="0"/>
+                                </a:rPr>
+                              </m:ctrlPr>
+                            </m:sSubPr>
+                            <m:e>
+                              <m:r>
+                                <a:rPr lang="en-US" b="0" i="1" smtClean="0">
+                                  <a:latin typeface="Cambria Math" panose="02040503050406030204" pitchFamily="18" charset="0"/>
+                                </a:rPr>
+                                <m:t>𝑓</m:t>
+                              </m:r>
+                            </m:e>
+                            <m:sub>
+                              <m:r>
+                                <a:rPr lang="en-US" b="0" i="1" smtClean="0">
+                                  <a:latin typeface="Cambria Math" panose="02040503050406030204" pitchFamily="18" charset="0"/>
+                                </a:rPr>
+                                <m:t>∗</m:t>
+                              </m:r>
+                            </m:sub>
+                          </m:sSub>
+                          <m:r>
+                            <a:rPr lang="en-US" b="0" i="1" smtClean="0">
+                              <a:latin typeface="Cambria Math" panose="02040503050406030204" pitchFamily="18" charset="0"/>
+                            </a:rPr>
+                            <m:t>|</m:t>
+                          </m:r>
+                          <m:sSub>
+                            <m:sSubPr>
+                              <m:ctrlPr>
+                                <a:rPr lang="en-US" b="0" i="1" smtClean="0">
+                                  <a:latin typeface="Cambria Math" panose="02040503050406030204" pitchFamily="18" charset="0"/>
+                                </a:rPr>
+                              </m:ctrlPr>
+                            </m:sSubPr>
+                            <m:e>
+                              <m:r>
+                                <a:rPr lang="en-US" b="0" i="1" smtClean="0">
+                                  <a:latin typeface="Cambria Math" panose="02040503050406030204" pitchFamily="18" charset="0"/>
+                                </a:rPr>
+                                <m:t>𝑋</m:t>
+                              </m:r>
+                            </m:e>
+                            <m:sub>
+                              <m:r>
+                                <a:rPr lang="en-US" b="0" i="1" smtClean="0">
+                                  <a:latin typeface="Cambria Math" panose="02040503050406030204" pitchFamily="18" charset="0"/>
+                                </a:rPr>
+                                <m:t>∗</m:t>
+                              </m:r>
+                            </m:sub>
+                          </m:sSub>
+                          <m:r>
+                            <a:rPr lang="en-US" b="0" i="1" smtClean="0">
+                              <a:latin typeface="Cambria Math" panose="02040503050406030204" pitchFamily="18" charset="0"/>
+                            </a:rPr>
+                            <m:t>,</m:t>
+                          </m:r>
+                          <m:r>
+                            <a:rPr lang="en-US" b="0" i="1" smtClean="0">
+                              <a:latin typeface="Cambria Math" panose="02040503050406030204" pitchFamily="18" charset="0"/>
+                            </a:rPr>
+                            <m:t>𝑋</m:t>
+                          </m:r>
+                          <m:r>
+                            <a:rPr lang="en-US" b="0" i="1" smtClean="0">
+                              <a:latin typeface="Cambria Math" panose="02040503050406030204" pitchFamily="18" charset="0"/>
+                            </a:rPr>
+                            <m:t>,</m:t>
+                          </m:r>
+                          <m:r>
+                            <a:rPr lang="en-US" b="0" i="1" smtClean="0">
+                              <a:latin typeface="Cambria Math" panose="02040503050406030204" pitchFamily="18" charset="0"/>
+                            </a:rPr>
+                            <m:t>𝑓</m:t>
+                          </m:r>
+                        </m:e>
+                      </m:d>
+                      <m:r>
+                        <a:rPr lang="en-US" b="0" i="1" smtClean="0">
+                          <a:latin typeface="Cambria Math" panose="02040503050406030204" pitchFamily="18" charset="0"/>
+                        </a:rPr>
+                        <m:t>=</m:t>
+                      </m:r>
+                      <m:r>
+                        <a:rPr lang="en-US" b="0" i="1" smtClean="0">
+                          <a:latin typeface="Cambria Math" panose="02040503050406030204" pitchFamily="18" charset="0"/>
+                        </a:rPr>
+                        <m:t>𝑁</m:t>
+                      </m:r>
+                      <m:d>
+                        <m:dPr>
+                          <m:ctrlPr>
+                            <a:rPr lang="en-US" b="0" i="1" smtClean="0">
+                              <a:latin typeface="Cambria Math" panose="02040503050406030204" pitchFamily="18" charset="0"/>
+                            </a:rPr>
+                          </m:ctrlPr>
+                        </m:dPr>
+                        <m:e>
+                          <m:sSub>
+                            <m:sSubPr>
+                              <m:ctrlPr>
+                                <a:rPr lang="en-US" b="0" i="1" smtClean="0">
+                                  <a:latin typeface="Cambria Math" panose="02040503050406030204" pitchFamily="18" charset="0"/>
+                                </a:rPr>
+                              </m:ctrlPr>
+                            </m:sSubPr>
+                            <m:e>
+                              <m:r>
+                                <a:rPr lang="en-US" b="0" i="1" smtClean="0">
+                                  <a:latin typeface="Cambria Math" panose="02040503050406030204" pitchFamily="18" charset="0"/>
+                                </a:rPr>
+                                <m:t>𝑓</m:t>
+                              </m:r>
+                            </m:e>
+                            <m:sub>
+                              <m:r>
+                                <a:rPr lang="en-US" b="0" i="1" smtClean="0">
+                                  <a:latin typeface="Cambria Math" panose="02040503050406030204" pitchFamily="18" charset="0"/>
+                                </a:rPr>
+                                <m:t>∗</m:t>
+                              </m:r>
+                            </m:sub>
+                          </m:sSub>
+                          <m:r>
+                            <a:rPr lang="en-US" b="0" i="1" smtClean="0">
+                              <a:latin typeface="Cambria Math" panose="02040503050406030204" pitchFamily="18" charset="0"/>
+                            </a:rPr>
+                            <m:t>|</m:t>
+                          </m:r>
+                          <m:sSub>
+                            <m:sSubPr>
+                              <m:ctrlPr>
+                                <a:rPr lang="en-US" b="0" i="1" smtClean="0">
+                                  <a:latin typeface="Cambria Math" panose="02040503050406030204" pitchFamily="18" charset="0"/>
+                                </a:rPr>
+                              </m:ctrlPr>
+                            </m:sSubPr>
+                            <m:e>
+                              <m:r>
+                                <a:rPr lang="en-US" b="0" i="1" smtClean="0">
+                                  <a:latin typeface="Cambria Math" panose="02040503050406030204" pitchFamily="18" charset="0"/>
+                                  <a:ea typeface="Cambria Math" panose="02040503050406030204" pitchFamily="18" charset="0"/>
+                                </a:rPr>
+                                <m:t>𝜇</m:t>
+                              </m:r>
+                            </m:e>
+                            <m:sub>
+                              <m:r>
+                                <a:rPr lang="en-US" b="0" i="1" smtClean="0">
+                                  <a:latin typeface="Cambria Math" panose="02040503050406030204" pitchFamily="18" charset="0"/>
+                                </a:rPr>
+                                <m:t>∗</m:t>
+                              </m:r>
+                            </m:sub>
+                          </m:sSub>
+                          <m:r>
+                            <a:rPr lang="en-US" b="0" i="1" smtClean="0">
+                              <a:latin typeface="Cambria Math" panose="02040503050406030204" pitchFamily="18" charset="0"/>
+                            </a:rPr>
+                            <m:t>,</m:t>
+                          </m:r>
+                          <m:sSub>
+                            <m:sSubPr>
+                              <m:ctrlPr>
+                                <a:rPr lang="en-US" b="0" i="1" smtClean="0">
+                                  <a:latin typeface="Cambria Math" panose="02040503050406030204" pitchFamily="18" charset="0"/>
+                                </a:rPr>
+                              </m:ctrlPr>
+                            </m:sSubPr>
+                            <m:e>
+                              <m:r>
+                                <a:rPr lang="el-GR" i="1">
+                                  <a:latin typeface="Cambria Math" panose="02040503050406030204" pitchFamily="18" charset="0"/>
+                                </a:rPr>
+                                <m:t>𝛴</m:t>
+                              </m:r>
+                            </m:e>
+                            <m:sub>
+                              <m:r>
+                                <a:rPr lang="en-US" b="0" i="1" smtClean="0">
+                                  <a:latin typeface="Cambria Math" panose="02040503050406030204" pitchFamily="18" charset="0"/>
+                                </a:rPr>
+                                <m:t>∗</m:t>
+                              </m:r>
+                            </m:sub>
+                          </m:sSub>
+                        </m:e>
+                      </m:d>
+                    </m:oMath>
+                  </m:oMathPara>
+                </a14:m>
+                <a:endParaRPr lang="en-US" dirty="0"/>
+              </a:p>
+              <a:p>
+                <a:pPr marL="0" indent="0">
+                  <a:buNone/>
+                </a:pPr>
+                <a14:m>
+                  <m:oMathPara xmlns:m="http://schemas.openxmlformats.org/officeDocument/2006/math">
+                    <m:oMathParaPr>
+                      <m:jc m:val="centerGroup"/>
+                    </m:oMathParaPr>
+                    <m:oMath xmlns:m="http://schemas.openxmlformats.org/officeDocument/2006/math">
+                      <m:sSub>
+                        <m:sSubPr>
+                          <m:ctrlPr>
+                            <a:rPr lang="en-US" i="1" smtClean="0">
+                              <a:latin typeface="Cambria Math" panose="02040503050406030204" pitchFamily="18" charset="0"/>
+                            </a:rPr>
+                          </m:ctrlPr>
+                        </m:sSubPr>
+                        <m:e>
+                          <m:r>
+                            <a:rPr lang="en-US" i="1" smtClean="0">
+                              <a:latin typeface="Cambria Math" panose="02040503050406030204" pitchFamily="18" charset="0"/>
+                              <a:ea typeface="Cambria Math" panose="02040503050406030204" pitchFamily="18" charset="0"/>
+                            </a:rPr>
+                            <m:t>𝜇</m:t>
+                          </m:r>
+                        </m:e>
+                        <m:sub>
+                          <m:r>
+                            <a:rPr lang="en-US" b="0" i="1" smtClean="0">
+                              <a:latin typeface="Cambria Math" panose="02040503050406030204" pitchFamily="18" charset="0"/>
+                            </a:rPr>
+                            <m:t>∗</m:t>
+                          </m:r>
+                        </m:sub>
+                      </m:sSub>
+                      <m:r>
+                        <a:rPr lang="en-US" b="0" i="1" smtClean="0">
+                          <a:latin typeface="Cambria Math" panose="02040503050406030204" pitchFamily="18" charset="0"/>
+                        </a:rPr>
+                        <m:t>=</m:t>
+                      </m:r>
+                      <m:r>
+                        <a:rPr lang="en-US" b="0" i="1" smtClean="0">
+                          <a:latin typeface="Cambria Math" panose="02040503050406030204" pitchFamily="18" charset="0"/>
+                          <a:ea typeface="Cambria Math" panose="02040503050406030204" pitchFamily="18" charset="0"/>
+                        </a:rPr>
+                        <m:t>𝜇</m:t>
+                      </m:r>
+                      <m:d>
+                        <m:dPr>
+                          <m:ctrlPr>
+                            <a:rPr lang="en-US" b="0" i="1" smtClean="0">
+                              <a:latin typeface="Cambria Math" panose="02040503050406030204" pitchFamily="18" charset="0"/>
+                              <a:ea typeface="Cambria Math" panose="02040503050406030204" pitchFamily="18" charset="0"/>
+                            </a:rPr>
+                          </m:ctrlPr>
+                        </m:dPr>
+                        <m:e>
+                          <m:sSub>
+                            <m:sSubPr>
+                              <m:ctrlPr>
+                                <a:rPr lang="en-US" b="0" i="1" smtClean="0">
+                                  <a:latin typeface="Cambria Math" panose="02040503050406030204" pitchFamily="18" charset="0"/>
+                                  <a:ea typeface="Cambria Math" panose="02040503050406030204" pitchFamily="18" charset="0"/>
+                                </a:rPr>
+                              </m:ctrlPr>
+                            </m:sSubPr>
+                            <m:e>
+                              <m:r>
+                                <a:rPr lang="en-US" b="0" i="1" smtClean="0">
+                                  <a:latin typeface="Cambria Math" panose="02040503050406030204" pitchFamily="18" charset="0"/>
+                                  <a:ea typeface="Cambria Math" panose="02040503050406030204" pitchFamily="18" charset="0"/>
+                                </a:rPr>
+                                <m:t>𝑋</m:t>
+                              </m:r>
+                            </m:e>
+                            <m:sub>
+                              <m:r>
+                                <a:rPr lang="en-US" b="0" i="1" smtClean="0">
+                                  <a:latin typeface="Cambria Math" panose="02040503050406030204" pitchFamily="18" charset="0"/>
+                                  <a:ea typeface="Cambria Math" panose="02040503050406030204" pitchFamily="18" charset="0"/>
+                                </a:rPr>
+                                <m:t>∗</m:t>
+                              </m:r>
+                            </m:sub>
+                          </m:sSub>
+                        </m:e>
+                      </m:d>
+                      <m:r>
+                        <a:rPr lang="en-US" b="0" i="1" smtClean="0">
+                          <a:latin typeface="Cambria Math" panose="02040503050406030204" pitchFamily="18" charset="0"/>
+                          <a:ea typeface="Cambria Math" panose="02040503050406030204" pitchFamily="18" charset="0"/>
+                        </a:rPr>
+                        <m:t>+</m:t>
+                      </m:r>
+                      <m:sSubSup>
+                        <m:sSubSupPr>
+                          <m:ctrlPr>
+                            <a:rPr lang="en-US" b="0" i="1" smtClean="0">
+                              <a:latin typeface="Cambria Math" panose="02040503050406030204" pitchFamily="18" charset="0"/>
+                              <a:ea typeface="Cambria Math" panose="02040503050406030204" pitchFamily="18" charset="0"/>
+                            </a:rPr>
+                          </m:ctrlPr>
+                        </m:sSubSupPr>
+                        <m:e>
+                          <m:r>
+                            <a:rPr lang="en-US" b="0" i="1" smtClean="0">
+                              <a:latin typeface="Cambria Math" panose="02040503050406030204" pitchFamily="18" charset="0"/>
+                              <a:ea typeface="Cambria Math" panose="02040503050406030204" pitchFamily="18" charset="0"/>
+                            </a:rPr>
+                            <m:t>𝐾</m:t>
+                          </m:r>
+                        </m:e>
+                        <m:sub>
+                          <m:r>
+                            <a:rPr lang="en-US" b="0" i="1" smtClean="0">
+                              <a:latin typeface="Cambria Math" panose="02040503050406030204" pitchFamily="18" charset="0"/>
+                              <a:ea typeface="Cambria Math" panose="02040503050406030204" pitchFamily="18" charset="0"/>
+                            </a:rPr>
+                            <m:t>∗</m:t>
+                          </m:r>
+                        </m:sub>
+                        <m:sup>
+                          <m:r>
+                            <a:rPr lang="en-US" b="0" i="1" smtClean="0">
+                              <a:latin typeface="Cambria Math" panose="02040503050406030204" pitchFamily="18" charset="0"/>
+                              <a:ea typeface="Cambria Math" panose="02040503050406030204" pitchFamily="18" charset="0"/>
+                            </a:rPr>
+                            <m:t>𝑇</m:t>
+                          </m:r>
+                        </m:sup>
+                      </m:sSubSup>
+                      <m:sSup>
+                        <m:sSupPr>
+                          <m:ctrlPr>
+                            <a:rPr lang="en-US" b="0" i="1" smtClean="0">
+                              <a:latin typeface="Cambria Math" panose="02040503050406030204" pitchFamily="18" charset="0"/>
+                              <a:ea typeface="Cambria Math" panose="02040503050406030204" pitchFamily="18" charset="0"/>
+                            </a:rPr>
+                          </m:ctrlPr>
+                        </m:sSupPr>
+                        <m:e>
+                          <m:r>
+                            <a:rPr lang="en-US" b="0" i="1" smtClean="0">
+                              <a:latin typeface="Cambria Math" panose="02040503050406030204" pitchFamily="18" charset="0"/>
+                              <a:ea typeface="Cambria Math" panose="02040503050406030204" pitchFamily="18" charset="0"/>
+                            </a:rPr>
+                            <m:t>𝐾</m:t>
+                          </m:r>
+                        </m:e>
+                        <m:sup>
+                          <m:r>
+                            <a:rPr lang="en-US" b="0" i="1" smtClean="0">
+                              <a:latin typeface="Cambria Math" panose="02040503050406030204" pitchFamily="18" charset="0"/>
+                              <a:ea typeface="Cambria Math" panose="02040503050406030204" pitchFamily="18" charset="0"/>
+                            </a:rPr>
+                            <m:t>−1</m:t>
+                          </m:r>
+                        </m:sup>
+                      </m:sSup>
+                      <m:d>
+                        <m:dPr>
+                          <m:ctrlPr>
+                            <a:rPr lang="en-US" b="0" i="1" smtClean="0">
+                              <a:latin typeface="Cambria Math" panose="02040503050406030204" pitchFamily="18" charset="0"/>
+                              <a:ea typeface="Cambria Math" panose="02040503050406030204" pitchFamily="18" charset="0"/>
+                            </a:rPr>
+                          </m:ctrlPr>
+                        </m:dPr>
+                        <m:e>
+                          <m:r>
+                            <a:rPr lang="en-US" b="0" i="1" smtClean="0">
+                              <a:latin typeface="Cambria Math" panose="02040503050406030204" pitchFamily="18" charset="0"/>
+                              <a:ea typeface="Cambria Math" panose="02040503050406030204" pitchFamily="18" charset="0"/>
+                            </a:rPr>
+                            <m:t>𝑓</m:t>
+                          </m:r>
+                          <m:r>
+                            <a:rPr lang="en-US" b="0" i="1" smtClean="0">
+                              <a:latin typeface="Cambria Math" panose="02040503050406030204" pitchFamily="18" charset="0"/>
+                              <a:ea typeface="Cambria Math" panose="02040503050406030204" pitchFamily="18" charset="0"/>
+                            </a:rPr>
+                            <m:t>−</m:t>
+                          </m:r>
+                          <m:r>
+                            <a:rPr lang="en-US" b="0" i="1" smtClean="0">
+                              <a:latin typeface="Cambria Math" panose="02040503050406030204" pitchFamily="18" charset="0"/>
+                              <a:ea typeface="Cambria Math" panose="02040503050406030204" pitchFamily="18" charset="0"/>
+                            </a:rPr>
+                            <m:t>𝜇</m:t>
+                          </m:r>
+                          <m:d>
+                            <m:dPr>
+                              <m:ctrlPr>
+                                <a:rPr lang="en-US" b="0" i="1" smtClean="0">
+                                  <a:latin typeface="Cambria Math" panose="02040503050406030204" pitchFamily="18" charset="0"/>
+                                  <a:ea typeface="Cambria Math" panose="02040503050406030204" pitchFamily="18" charset="0"/>
+                                </a:rPr>
+                              </m:ctrlPr>
+                            </m:dPr>
+                            <m:e>
+                              <m:r>
+                                <a:rPr lang="en-US" b="0" i="1" smtClean="0">
+                                  <a:latin typeface="Cambria Math" panose="02040503050406030204" pitchFamily="18" charset="0"/>
+                                  <a:ea typeface="Cambria Math" panose="02040503050406030204" pitchFamily="18" charset="0"/>
+                                </a:rPr>
+                                <m:t>𝑋</m:t>
+                              </m:r>
+                            </m:e>
+                          </m:d>
+                        </m:e>
+                      </m:d>
+                    </m:oMath>
+                  </m:oMathPara>
+                </a14:m>
+                <a:endParaRPr lang="en-US" dirty="0"/>
+              </a:p>
+              <a:p>
+                <a:pPr marL="0" indent="0">
+                  <a:buNone/>
+                </a:pPr>
+                <a14:m>
+                  <m:oMathPara xmlns:m="http://schemas.openxmlformats.org/officeDocument/2006/math">
+                    <m:oMathParaPr>
+                      <m:jc m:val="centerGroup"/>
+                    </m:oMathParaPr>
+                    <m:oMath xmlns:m="http://schemas.openxmlformats.org/officeDocument/2006/math">
+                      <m:sSub>
+                        <m:sSubPr>
+                          <m:ctrlPr>
+                            <a:rPr lang="en-US" i="1">
+                              <a:latin typeface="Cambria Math" panose="02040503050406030204" pitchFamily="18" charset="0"/>
+                            </a:rPr>
+                          </m:ctrlPr>
+                        </m:sSubPr>
+                        <m:e>
+                          <m:r>
+                            <a:rPr lang="el-GR" i="1">
+                              <a:latin typeface="Cambria Math" panose="02040503050406030204" pitchFamily="18" charset="0"/>
+                            </a:rPr>
+                            <m:t>𝛴</m:t>
+                          </m:r>
+                        </m:e>
+                        <m:sub>
+                          <m:r>
+                            <a:rPr lang="en-US" i="1">
+                              <a:latin typeface="Cambria Math" panose="02040503050406030204" pitchFamily="18" charset="0"/>
+                            </a:rPr>
+                            <m:t>∗</m:t>
+                          </m:r>
+                        </m:sub>
+                      </m:sSub>
+                      <m:r>
+                        <a:rPr lang="en-US" b="0" i="1" smtClean="0">
+                          <a:latin typeface="Cambria Math" panose="02040503050406030204" pitchFamily="18" charset="0"/>
+                        </a:rPr>
+                        <m:t>=</m:t>
+                      </m:r>
+                      <m:sSub>
+                        <m:sSubPr>
+                          <m:ctrlPr>
+                            <a:rPr lang="en-US" b="0" i="1" smtClean="0">
+                              <a:latin typeface="Cambria Math" panose="02040503050406030204" pitchFamily="18" charset="0"/>
+                            </a:rPr>
+                          </m:ctrlPr>
+                        </m:sSubPr>
+                        <m:e>
+                          <m:r>
+                            <a:rPr lang="en-US" b="0" i="1" smtClean="0">
+                              <a:latin typeface="Cambria Math" panose="02040503050406030204" pitchFamily="18" charset="0"/>
+                            </a:rPr>
+                            <m:t>𝐾</m:t>
+                          </m:r>
+                        </m:e>
+                        <m:sub>
+                          <m:r>
+                            <a:rPr lang="en-US" b="0" i="1" smtClean="0">
+                              <a:latin typeface="Cambria Math" panose="02040503050406030204" pitchFamily="18" charset="0"/>
+                            </a:rPr>
+                            <m:t>∗∗</m:t>
+                          </m:r>
+                        </m:sub>
+                      </m:sSub>
+                      <m:r>
+                        <a:rPr lang="en-US" b="0" i="1" smtClean="0">
+                          <a:latin typeface="Cambria Math" panose="02040503050406030204" pitchFamily="18" charset="0"/>
+                        </a:rPr>
+                        <m:t>−</m:t>
+                      </m:r>
+                      <m:sSubSup>
+                        <m:sSubSupPr>
+                          <m:ctrlPr>
+                            <a:rPr lang="en-US" b="0" i="1" smtClean="0">
+                              <a:latin typeface="Cambria Math" panose="02040503050406030204" pitchFamily="18" charset="0"/>
+                            </a:rPr>
+                          </m:ctrlPr>
+                        </m:sSubSupPr>
+                        <m:e>
+                          <m:r>
+                            <a:rPr lang="en-US" b="0" i="1" smtClean="0">
+                              <a:latin typeface="Cambria Math" panose="02040503050406030204" pitchFamily="18" charset="0"/>
+                            </a:rPr>
+                            <m:t>𝐾</m:t>
+                          </m:r>
+                        </m:e>
+                        <m:sub>
+                          <m:r>
+                            <a:rPr lang="en-US" b="0" i="1" smtClean="0">
+                              <a:latin typeface="Cambria Math" panose="02040503050406030204" pitchFamily="18" charset="0"/>
+                            </a:rPr>
+                            <m:t>∗</m:t>
+                          </m:r>
+                        </m:sub>
+                        <m:sup>
+                          <m:r>
+                            <a:rPr lang="en-US" b="0" i="1" smtClean="0">
+                              <a:latin typeface="Cambria Math" panose="02040503050406030204" pitchFamily="18" charset="0"/>
+                            </a:rPr>
+                            <m:t>𝑇</m:t>
+                          </m:r>
+                        </m:sup>
+                      </m:sSubSup>
+                      <m:sSup>
+                        <m:sSupPr>
+                          <m:ctrlPr>
+                            <a:rPr lang="en-US" b="0" i="1" smtClean="0">
+                              <a:latin typeface="Cambria Math" panose="02040503050406030204" pitchFamily="18" charset="0"/>
+                            </a:rPr>
+                          </m:ctrlPr>
+                        </m:sSupPr>
+                        <m:e>
+                          <m:r>
+                            <a:rPr lang="en-US" b="0" i="1" smtClean="0">
+                              <a:latin typeface="Cambria Math" panose="02040503050406030204" pitchFamily="18" charset="0"/>
+                            </a:rPr>
+                            <m:t>𝐾</m:t>
+                          </m:r>
+                        </m:e>
+                        <m:sup>
+                          <m:r>
+                            <a:rPr lang="en-US" b="0" i="1" smtClean="0">
+                              <a:latin typeface="Cambria Math" panose="02040503050406030204" pitchFamily="18" charset="0"/>
+                            </a:rPr>
+                            <m:t>−1</m:t>
+                          </m:r>
+                        </m:sup>
+                      </m:sSup>
+                      <m:sSub>
+                        <m:sSubPr>
+                          <m:ctrlPr>
+                            <a:rPr lang="en-US" b="0" i="1" smtClean="0">
+                              <a:latin typeface="Cambria Math" panose="02040503050406030204" pitchFamily="18" charset="0"/>
+                            </a:rPr>
+                          </m:ctrlPr>
+                        </m:sSubPr>
+                        <m:e>
+                          <m:r>
+                            <a:rPr lang="en-US" b="0" i="1" smtClean="0">
+                              <a:latin typeface="Cambria Math" panose="02040503050406030204" pitchFamily="18" charset="0"/>
+                            </a:rPr>
+                            <m:t>𝐾</m:t>
+                          </m:r>
+                        </m:e>
+                        <m:sub>
+                          <m:r>
+                            <a:rPr lang="en-US" b="0" i="1" smtClean="0">
+                              <a:latin typeface="Cambria Math" panose="02040503050406030204" pitchFamily="18" charset="0"/>
+                            </a:rPr>
+                            <m:t>∗</m:t>
+                          </m:r>
+                        </m:sub>
+                      </m:sSub>
+                    </m:oMath>
+                  </m:oMathPara>
+                </a14:m>
+                <a:endParaRPr lang="en-US" dirty="0"/>
+              </a:p>
+              <a:p>
+                <a:pPr marL="0" indent="0">
+                  <a:buNone/>
+                </a:pPr>
+                <a:endParaRPr lang="en-US" dirty="0"/>
+              </a:p>
+              <a:p>
+                <a:pPr marL="0" indent="0">
+                  <a:buNone/>
+                </a:pPr>
+                <a14:m>
+                  <m:oMathPara xmlns:m="http://schemas.openxmlformats.org/officeDocument/2006/math">
+                    <m:oMathParaPr>
+                      <m:jc m:val="centerGroup"/>
+                    </m:oMathParaPr>
+                    <m:oMath xmlns:m="http://schemas.openxmlformats.org/officeDocument/2006/math">
+                      <m:r>
+                        <a:rPr lang="en-US" b="0" i="1" smtClean="0">
+                          <a:latin typeface="Cambria Math" panose="02040503050406030204" pitchFamily="18" charset="0"/>
+                        </a:rPr>
+                        <m:t>𝐾</m:t>
+                      </m:r>
+                      <m:d>
+                        <m:dPr>
+                          <m:ctrlPr>
+                            <a:rPr lang="en-US" b="0" i="1" smtClean="0">
+                              <a:latin typeface="Cambria Math" panose="02040503050406030204" pitchFamily="18" charset="0"/>
+                            </a:rPr>
+                          </m:ctrlPr>
+                        </m:dPr>
+                        <m:e>
+                          <m:r>
+                            <a:rPr lang="en-US" b="0" i="1" smtClean="0">
+                              <a:latin typeface="Cambria Math" panose="02040503050406030204" pitchFamily="18" charset="0"/>
+                            </a:rPr>
+                            <m:t>𝑥</m:t>
+                          </m:r>
+                          <m:r>
+                            <a:rPr lang="en-US" b="0" i="1" smtClean="0">
+                              <a:latin typeface="Cambria Math" panose="02040503050406030204" pitchFamily="18" charset="0"/>
+                            </a:rPr>
+                            <m:t>,</m:t>
+                          </m:r>
+                          <m:sSub>
+                            <m:sSubPr>
+                              <m:ctrlPr>
+                                <a:rPr lang="en-US" b="0" i="1" smtClean="0">
+                                  <a:latin typeface="Cambria Math" panose="02040503050406030204" pitchFamily="18" charset="0"/>
+                                </a:rPr>
+                              </m:ctrlPr>
+                            </m:sSubPr>
+                            <m:e>
+                              <m:r>
+                                <a:rPr lang="en-US" b="0" i="1" smtClean="0">
+                                  <a:latin typeface="Cambria Math" panose="02040503050406030204" pitchFamily="18" charset="0"/>
+                                </a:rPr>
+                                <m:t>𝑥</m:t>
+                              </m:r>
+                            </m:e>
+                            <m:sub>
+                              <m:r>
+                                <a:rPr lang="en-US" b="0" i="1" smtClean="0">
+                                  <a:latin typeface="Cambria Math" panose="02040503050406030204" pitchFamily="18" charset="0"/>
+                                </a:rPr>
+                                <m:t>∗</m:t>
+                              </m:r>
+                            </m:sub>
+                          </m:sSub>
+                        </m:e>
+                      </m:d>
+                      <m:r>
+                        <a:rPr lang="en-US" b="0" i="1" smtClean="0">
+                          <a:latin typeface="Cambria Math" panose="02040503050406030204" pitchFamily="18" charset="0"/>
+                        </a:rPr>
+                        <m:t>=</m:t>
+                      </m:r>
+                      <m:sSup>
+                        <m:sSupPr>
+                          <m:ctrlPr>
+                            <a:rPr lang="en-US" b="0" i="1" smtClean="0">
+                              <a:latin typeface="Cambria Math" panose="02040503050406030204" pitchFamily="18" charset="0"/>
+                            </a:rPr>
+                          </m:ctrlPr>
+                        </m:sSupPr>
+                        <m:e>
+                          <m:r>
+                            <a:rPr lang="en-US" b="0" i="1" smtClean="0">
+                              <a:latin typeface="Cambria Math" panose="02040503050406030204" pitchFamily="18" charset="0"/>
+                            </a:rPr>
+                            <m:t>𝑒</m:t>
+                          </m:r>
+                        </m:e>
+                        <m:sup>
+                          <m:d>
+                            <m:dPr>
+                              <m:ctrlPr>
+                                <a:rPr lang="en-US" b="0" i="1" smtClean="0">
+                                  <a:latin typeface="Cambria Math" panose="02040503050406030204" pitchFamily="18" charset="0"/>
+                                </a:rPr>
+                              </m:ctrlPr>
+                            </m:dPr>
+                            <m:e>
+                              <m:r>
+                                <a:rPr lang="en-US" b="0" i="1" smtClean="0">
+                                  <a:latin typeface="Cambria Math" panose="02040503050406030204" pitchFamily="18" charset="0"/>
+                                </a:rPr>
+                                <m:t>−</m:t>
+                              </m:r>
+                              <m:box>
+                                <m:boxPr>
+                                  <m:ctrlPr>
+                                    <a:rPr lang="en-US" b="0" i="1" smtClean="0">
+                                      <a:latin typeface="Cambria Math" panose="02040503050406030204" pitchFamily="18" charset="0"/>
+                                    </a:rPr>
+                                  </m:ctrlPr>
+                                </m:boxPr>
+                                <m:e>
+                                  <m:argPr>
+                                    <m:argSz m:val="-1"/>
+                                  </m:argPr>
+                                  <m:f>
+                                    <m:fPr>
+                                      <m:ctrlPr>
+                                        <a:rPr lang="en-US" b="0" i="1" smtClean="0">
+                                          <a:latin typeface="Cambria Math" panose="02040503050406030204" pitchFamily="18" charset="0"/>
+                                        </a:rPr>
+                                      </m:ctrlPr>
+                                    </m:fPr>
+                                    <m:num>
+                                      <m:r>
+                                        <a:rPr lang="en-US" b="0" i="1" smtClean="0">
+                                          <a:latin typeface="Cambria Math" panose="02040503050406030204" pitchFamily="18" charset="0"/>
+                                        </a:rPr>
+                                        <m:t>1</m:t>
+                                      </m:r>
+                                    </m:num>
+                                    <m:den>
+                                      <m:r>
+                                        <a:rPr lang="en-US" b="0" i="1" smtClean="0">
+                                          <a:latin typeface="Cambria Math" panose="02040503050406030204" pitchFamily="18" charset="0"/>
+                                        </a:rPr>
+                                        <m:t>2</m:t>
+                                      </m:r>
+                                    </m:den>
+                                  </m:f>
+                                  <m:sSup>
+                                    <m:sSupPr>
+                                      <m:ctrlPr>
+                                        <a:rPr lang="en-US" b="0" i="1" smtClean="0">
+                                          <a:latin typeface="Cambria Math" panose="02040503050406030204" pitchFamily="18" charset="0"/>
+                                        </a:rPr>
+                                      </m:ctrlPr>
+                                    </m:sSupPr>
+                                    <m:e>
+                                      <m:d>
+                                        <m:dPr>
+                                          <m:ctrlPr>
+                                            <a:rPr lang="en-US" b="0" i="1" smtClean="0">
+                                              <a:latin typeface="Cambria Math" panose="02040503050406030204" pitchFamily="18" charset="0"/>
+                                            </a:rPr>
+                                          </m:ctrlPr>
+                                        </m:dPr>
+                                        <m:e>
+                                          <m:r>
+                                            <a:rPr lang="en-US" b="0" i="1" smtClean="0">
+                                              <a:latin typeface="Cambria Math" panose="02040503050406030204" pitchFamily="18" charset="0"/>
+                                            </a:rPr>
+                                            <m:t>𝑥</m:t>
+                                          </m:r>
+                                          <m:r>
+                                            <a:rPr lang="en-US" b="0" i="1" smtClean="0">
+                                              <a:latin typeface="Cambria Math" panose="02040503050406030204" pitchFamily="18" charset="0"/>
+                                            </a:rPr>
+                                            <m:t>−</m:t>
+                                          </m:r>
+                                          <m:sSub>
+                                            <m:sSubPr>
+                                              <m:ctrlPr>
+                                                <a:rPr lang="en-US" b="0" i="1" smtClean="0">
+                                                  <a:latin typeface="Cambria Math" panose="02040503050406030204" pitchFamily="18" charset="0"/>
+                                                </a:rPr>
+                                              </m:ctrlPr>
+                                            </m:sSubPr>
+                                            <m:e>
+                                              <m:r>
+                                                <a:rPr lang="en-US" b="0" i="1" smtClean="0">
+                                                  <a:latin typeface="Cambria Math" panose="02040503050406030204" pitchFamily="18" charset="0"/>
+                                                </a:rPr>
+                                                <m:t>𝑥</m:t>
+                                              </m:r>
+                                            </m:e>
+                                            <m:sub>
+                                              <m:r>
+                                                <a:rPr lang="en-US" b="0" i="1" smtClean="0">
+                                                  <a:latin typeface="Cambria Math" panose="02040503050406030204" pitchFamily="18" charset="0"/>
+                                                </a:rPr>
+                                                <m:t>∗</m:t>
+                                              </m:r>
+                                            </m:sub>
+                                          </m:sSub>
+                                        </m:e>
+                                      </m:d>
+                                    </m:e>
+                                    <m:sup>
+                                      <m:r>
+                                        <a:rPr lang="en-US" b="0" i="1" smtClean="0">
+                                          <a:latin typeface="Cambria Math" panose="02040503050406030204" pitchFamily="18" charset="0"/>
+                                        </a:rPr>
+                                        <m:t>2</m:t>
+                                      </m:r>
+                                    </m:sup>
+                                  </m:sSup>
+                                </m:e>
+                              </m:box>
+                            </m:e>
+                          </m:d>
+                        </m:sup>
+                      </m:sSup>
+                    </m:oMath>
+                  </m:oMathPara>
+                </a14:m>
+                <a:endParaRPr lang="en-US" dirty="0"/>
+              </a:p>
+            </p:txBody>
+          </p:sp>
+        </mc:Choice>
+        <mc:Fallback>
+          <p:sp>
+            <p:nvSpPr>
+              <p:cNvPr id="4" name="Content Placeholder 3">
+                <a:extLst>
+                  <a:ext uri="{FF2B5EF4-FFF2-40B4-BE49-F238E27FC236}">
+                    <a16:creationId xmlns:a16="http://schemas.microsoft.com/office/drawing/2014/main" id="{354BB4C5-3B14-4FFD-B5CB-DEF062819067}"/>
+                  </a:ext>
+                </a:extLst>
+              </p:cNvPr>
+              <p:cNvSpPr>
+                <a:spLocks noGrp="1" noRot="1" noChangeAspect="1" noMove="1" noResize="1" noEditPoints="1" noAdjustHandles="1" noChangeArrowheads="1" noChangeShapeType="1" noTextEdit="1"/>
+              </p:cNvSpPr>
+              <p:nvPr>
+                <p:ph idx="1"/>
+              </p:nvPr>
+            </p:nvSpPr>
+            <p:spPr>
+              <a:blipFill>
+                <a:blip r:embed="rId2"/>
+                <a:stretch>
+                  <a:fillRect l="-1159" t="-2101"/>
+                </a:stretch>
+              </a:blipFill>
+            </p:spPr>
+            <p:txBody>
+              <a:bodyPr/>
+              <a:lstStyle/>
+              <a:p>
+                <a:r>
+                  <a:rPr lang="en-US">
+                    <a:noFill/>
+                  </a:rPr>
+                  <a:t> </a:t>
+                </a:r>
+              </a:p>
+            </p:txBody>
+          </p:sp>
+        </mc:Fallback>
+      </mc:AlternateContent>
+    </p:spTree>
+    <p:extLst>
+      <p:ext uri="{BB962C8B-B14F-4D97-AF65-F5344CB8AC3E}">
+        <p14:creationId xmlns:p14="http://schemas.microsoft.com/office/powerpoint/2010/main" val="1917845913"/>
+      </p:ext>
+    </p:extLst>
+  </p:cSld>
+  <p:clrMapOvr>
+    <a:masterClrMapping/>
+  </p:clrMapOvr>
+</p:sld>
+</file>
+
+<file path=ppt/slides/slide14.xml><?xml version="1.0" encoding="utf-8"?>
+<p:sld xmlns:a="http://schemas.openxmlformats.org/drawingml/2006/main" xmlns:r="http://schemas.openxmlformats.org/officeDocument/2006/relationships" xmlns:p="http://schemas.openxmlformats.org/presentationml/2006/main">
+  <p:cSld>
+    <p:spTree>
+      <p:nvGrpSpPr>
+        <p:cNvPr id="1" name=""/>
+        <p:cNvGrpSpPr/>
+        <p:nvPr/>
+      </p:nvGrpSpPr>
+      <p:grpSpPr>
+        <a:xfrm>
+          <a:off x="0" y="0"/>
+          <a:ext cx="0" cy="0"/>
+          <a:chOff x="0" y="0"/>
+          <a:chExt cx="0" cy="0"/>
+        </a:xfrm>
+      </p:grpSpPr>
+      <p:sp>
+        <p:nvSpPr>
+          <p:cNvPr id="2" name="Title 1">
+            <a:extLst>
+              <a:ext uri="{FF2B5EF4-FFF2-40B4-BE49-F238E27FC236}">
                 <a16:creationId xmlns:a16="http://schemas.microsoft.com/office/drawing/2014/main" id="{C7EF7884-E9DF-442A-A088-292308EBD28E}"/>
               </a:ext>
             </a:extLst>
@@ -3727,7 +5035,7 @@
 </p:sld>
 </file>
 
-<file path=ppt/slides/slide14.xml><?xml version="1.0" encoding="utf-8"?>
+<file path=ppt/slides/slide15.xml><?xml version="1.0" encoding="utf-8"?>
 <p:sld xmlns:a="http://schemas.openxmlformats.org/drawingml/2006/main" xmlns:r="http://schemas.openxmlformats.org/officeDocument/2006/relationships" xmlns:p="http://schemas.openxmlformats.org/presentationml/2006/main">
   <p:cSld>
     <p:spTree>
@@ -3869,7 +5177,7 @@
 </p:sld>
 </file>
 
-<file path=ppt/slides/slide15.xml><?xml version="1.0" encoding="utf-8"?>
+<file path=ppt/slides/slide16.xml><?xml version="1.0" encoding="utf-8"?>
 <p:sld xmlns:a="http://schemas.openxmlformats.org/drawingml/2006/main" xmlns:r="http://schemas.openxmlformats.org/officeDocument/2006/relationships" xmlns:p="http://schemas.openxmlformats.org/presentationml/2006/main">
   <p:cSld>
     <p:spTree>
@@ -4059,99 +5367,6 @@
 </p:sld>
 </file>
 
-<file path=ppt/slides/slide16.xml><?xml version="1.0" encoding="utf-8"?>
-<p:sld xmlns:a="http://schemas.openxmlformats.org/drawingml/2006/main" xmlns:r="http://schemas.openxmlformats.org/officeDocument/2006/relationships" xmlns:p="http://schemas.openxmlformats.org/presentationml/2006/main">
-  <p:cSld>
-    <p:spTree>
-      <p:nvGrpSpPr>
-        <p:cNvPr id="1" name=""/>
-        <p:cNvGrpSpPr/>
-        <p:nvPr/>
-      </p:nvGrpSpPr>
-      <p:grpSpPr>
-        <a:xfrm>
-          <a:off x="0" y="0"/>
-          <a:ext cx="0" cy="0"/>
-          <a:chOff x="0" y="0"/>
-          <a:chExt cx="0" cy="0"/>
-        </a:xfrm>
-      </p:grpSpPr>
-      <p:sp>
-        <p:nvSpPr>
-          <p:cNvPr id="2" name="Title 1">
-            <a:extLst>
-              <a:ext uri="{FF2B5EF4-FFF2-40B4-BE49-F238E27FC236}">
-                <a16:creationId xmlns:a16="http://schemas.microsoft.com/office/drawing/2014/main" id="{B2D8B04C-8D2B-4C12-8C87-85E5B584C253}"/>
-              </a:ext>
-            </a:extLst>
-          </p:cNvPr>
-          <p:cNvSpPr>
-            <a:spLocks noGrp="1"/>
-          </p:cNvSpPr>
-          <p:nvPr>
-            <p:ph type="title"/>
-          </p:nvPr>
-        </p:nvSpPr>
-        <p:spPr/>
-        <p:txBody>
-          <a:bodyPr/>
-          <a:lstStyle/>
-          <a:p>
-            <a:r>
-              <a:rPr lang="en-US" dirty="0"/>
-              <a:t>Gaussian Process Regression</a:t>
-            </a:r>
-          </a:p>
-        </p:txBody>
-      </p:sp>
-      <p:pic>
-        <p:nvPicPr>
-          <p:cNvPr id="6" name="Content Placeholder 5">
-            <a:extLst>
-              <a:ext uri="{FF2B5EF4-FFF2-40B4-BE49-F238E27FC236}">
-                <a16:creationId xmlns:a16="http://schemas.microsoft.com/office/drawing/2014/main" id="{7C0A74A7-66B3-4EFA-9B33-CA127D12841D}"/>
-              </a:ext>
-            </a:extLst>
-          </p:cNvPr>
-          <p:cNvPicPr>
-            <a:picLocks noGrp="1" noChangeAspect="1"/>
-          </p:cNvPicPr>
-          <p:nvPr>
-            <p:ph idx="1"/>
-          </p:nvPr>
-        </p:nvPicPr>
-        <p:blipFill>
-          <a:blip r:embed="rId2">
-            <a:extLst>
-              <a:ext uri="{28A0092B-C50C-407E-A947-70E740481C1C}">
-                <a14:useLocalDpi xmlns:a14="http://schemas.microsoft.com/office/drawing/2010/main" val="0"/>
-              </a:ext>
-            </a:extLst>
-          </a:blip>
-          <a:stretch>
-            <a:fillRect/>
-          </a:stretch>
-        </p:blipFill>
-        <p:spPr>
-          <a:xfrm>
-            <a:off x="1035844" y="1655172"/>
-            <a:ext cx="7072313" cy="4572000"/>
-          </a:xfrm>
-        </p:spPr>
-      </p:pic>
-    </p:spTree>
-    <p:extLst>
-      <p:ext uri="{BB962C8B-B14F-4D97-AF65-F5344CB8AC3E}">
-        <p14:creationId xmlns:p14="http://schemas.microsoft.com/office/powerpoint/2010/main" val="2204336628"/>
-      </p:ext>
-    </p:extLst>
-  </p:cSld>
-  <p:clrMapOvr>
-    <a:masterClrMapping/>
-  </p:clrMapOvr>
-</p:sld>
-</file>
-
 <file path=ppt/slides/slide17.xml><?xml version="1.0" encoding="utf-8"?>
 <p:sld xmlns:a="http://schemas.openxmlformats.org/drawingml/2006/main" xmlns:r="http://schemas.openxmlformats.org/officeDocument/2006/relationships" xmlns:p="http://schemas.openxmlformats.org/presentationml/2006/main">
   <p:cSld>
@@ -4174,7 +5389,7 @@
           <p:cNvPr id="2" name="Title 1">
             <a:extLst>
               <a:ext uri="{FF2B5EF4-FFF2-40B4-BE49-F238E27FC236}">
-                <a16:creationId xmlns:a16="http://schemas.microsoft.com/office/drawing/2014/main" id="{0888D31C-625A-496E-91E0-EDA1805176D3}"/>
+                <a16:creationId xmlns:a16="http://schemas.microsoft.com/office/drawing/2014/main" id="{B2D8B04C-8D2B-4C12-8C87-85E5B584C253}"/>
               </a:ext>
             </a:extLst>
           </p:cNvPr>
@@ -4192,17 +5407,17 @@
           <a:p>
             <a:r>
               <a:rPr lang="en-US" dirty="0"/>
-              <a:t>Gaussian Process - Kernels</a:t>
+              <a:t>Gaussian Process Regression</a:t>
             </a:r>
           </a:p>
         </p:txBody>
       </p:sp>
       <p:pic>
         <p:nvPicPr>
-          <p:cNvPr id="5" name="Content Placeholder 4">
+          <p:cNvPr id="6" name="Content Placeholder 5">
             <a:extLst>
               <a:ext uri="{FF2B5EF4-FFF2-40B4-BE49-F238E27FC236}">
-                <a16:creationId xmlns:a16="http://schemas.microsoft.com/office/drawing/2014/main" id="{0D8E1FF1-80EE-4C16-8E9B-993B85AD0C04}"/>
+                <a16:creationId xmlns:a16="http://schemas.microsoft.com/office/drawing/2014/main" id="{7C0A74A7-66B3-4EFA-9B33-CA127D12841D}"/>
               </a:ext>
             </a:extLst>
           </p:cNvPr>
@@ -4227,15 +5442,15 @@
         </p:blipFill>
         <p:spPr>
           <a:xfrm>
-            <a:off x="1144960" y="1516439"/>
-            <a:ext cx="6854081" cy="5029200"/>
+            <a:off x="1035844" y="1655172"/>
+            <a:ext cx="7072313" cy="4572000"/>
           </a:xfrm>
         </p:spPr>
       </p:pic>
     </p:spTree>
     <p:extLst>
       <p:ext uri="{BB962C8B-B14F-4D97-AF65-F5344CB8AC3E}">
-        <p14:creationId xmlns:p14="http://schemas.microsoft.com/office/powerpoint/2010/main" val="4174830690"/>
+        <p14:creationId xmlns:p14="http://schemas.microsoft.com/office/powerpoint/2010/main" val="2204336628"/>
       </p:ext>
     </p:extLst>
   </p:cSld>
@@ -4267,7 +5482,7 @@
           <p:cNvPr id="2" name="Title 1">
             <a:extLst>
               <a:ext uri="{FF2B5EF4-FFF2-40B4-BE49-F238E27FC236}">
-                <a16:creationId xmlns:a16="http://schemas.microsoft.com/office/drawing/2014/main" id="{BAC2B454-EDAC-4597-8F3B-7D9659B454FE}"/>
+                <a16:creationId xmlns:a16="http://schemas.microsoft.com/office/drawing/2014/main" id="{0888D31C-625A-496E-91E0-EDA1805176D3}"/>
               </a:ext>
             </a:extLst>
           </p:cNvPr>
@@ -4285,49 +5500,50 @@
           <a:p>
             <a:r>
               <a:rPr lang="en-US" dirty="0"/>
-              <a:t>Bayesian Optimization</a:t>
-            </a:r>
-          </a:p>
-        </p:txBody>
-      </p:sp>
-      <p:sp>
-        <p:nvSpPr>
-          <p:cNvPr id="3" name="Content Placeholder 2">
+              <a:t>Gaussian Process - Kernels</a:t>
+            </a:r>
+          </a:p>
+        </p:txBody>
+      </p:sp>
+      <p:pic>
+        <p:nvPicPr>
+          <p:cNvPr id="5" name="Content Placeholder 4">
             <a:extLst>
               <a:ext uri="{FF2B5EF4-FFF2-40B4-BE49-F238E27FC236}">
-                <a16:creationId xmlns:a16="http://schemas.microsoft.com/office/drawing/2014/main" id="{2A39B9D1-D955-406B-BC1E-647742984297}"/>
+                <a16:creationId xmlns:a16="http://schemas.microsoft.com/office/drawing/2014/main" id="{0D8E1FF1-80EE-4C16-8E9B-993B85AD0C04}"/>
               </a:ext>
             </a:extLst>
           </p:cNvPr>
-          <p:cNvSpPr>
-            <a:spLocks noGrp="1"/>
-          </p:cNvSpPr>
+          <p:cNvPicPr>
+            <a:picLocks noGrp="1" noChangeAspect="1"/>
+          </p:cNvPicPr>
           <p:nvPr>
             <p:ph idx="1"/>
           </p:nvPr>
-        </p:nvSpPr>
-        <p:spPr/>
-        <p:txBody>
-          <a:bodyPr anchor="ctr"/>
-          <a:lstStyle/>
-          <a:p>
-            <a:pPr marL="0" indent="0" algn="ctr">
-              <a:buNone/>
-            </a:pPr>
-            <a:r>
-              <a:rPr lang="en-US" dirty="0">
-                <a:hlinkClick r:id="rId2"/>
-              </a:rPr>
-              <a:t>bayes_opt_example.ipynb</a:t>
-            </a:r>
-            <a:endParaRPr lang="en-US" dirty="0"/>
-          </a:p>
-        </p:txBody>
-      </p:sp>
+        </p:nvPicPr>
+        <p:blipFill>
+          <a:blip r:embed="rId2">
+            <a:extLst>
+              <a:ext uri="{28A0092B-C50C-407E-A947-70E740481C1C}">
+                <a14:useLocalDpi xmlns:a14="http://schemas.microsoft.com/office/drawing/2010/main" val="0"/>
+              </a:ext>
+            </a:extLst>
+          </a:blip>
+          <a:stretch>
+            <a:fillRect/>
+          </a:stretch>
+        </p:blipFill>
+        <p:spPr>
+          <a:xfrm>
+            <a:off x="1144960" y="1516439"/>
+            <a:ext cx="6854081" cy="5029200"/>
+          </a:xfrm>
+        </p:spPr>
+      </p:pic>
     </p:spTree>
     <p:extLst>
       <p:ext uri="{BB962C8B-B14F-4D97-AF65-F5344CB8AC3E}">
-        <p14:creationId xmlns:p14="http://schemas.microsoft.com/office/powerpoint/2010/main" val="2073639596"/>
+        <p14:creationId xmlns:p14="http://schemas.microsoft.com/office/powerpoint/2010/main" val="4174830690"/>
       </p:ext>
     </p:extLst>
   </p:cSld>
@@ -4359,7 +5575,7 @@
           <p:cNvPr id="2" name="Title 1">
             <a:extLst>
               <a:ext uri="{FF2B5EF4-FFF2-40B4-BE49-F238E27FC236}">
-                <a16:creationId xmlns:a16="http://schemas.microsoft.com/office/drawing/2014/main" id="{00EAF0DA-00BB-405D-B4BC-8FE8557BF392}"/>
+                <a16:creationId xmlns:a16="http://schemas.microsoft.com/office/drawing/2014/main" id="{BAC2B454-EDAC-4597-8F3B-7D9659B454FE}"/>
               </a:ext>
             </a:extLst>
           </p:cNvPr>
@@ -4377,13 +5593,250 @@
           <a:p>
             <a:r>
               <a:rPr lang="en-US" dirty="0"/>
+              <a:t>Bayesian Optimization</a:t>
+            </a:r>
+          </a:p>
+        </p:txBody>
+      </p:sp>
+      <p:sp>
+        <p:nvSpPr>
+          <p:cNvPr id="3" name="Content Placeholder 2">
+            <a:extLst>
+              <a:ext uri="{FF2B5EF4-FFF2-40B4-BE49-F238E27FC236}">
+                <a16:creationId xmlns:a16="http://schemas.microsoft.com/office/drawing/2014/main" id="{2A39B9D1-D955-406B-BC1E-647742984297}"/>
+              </a:ext>
+            </a:extLst>
+          </p:cNvPr>
+          <p:cNvSpPr>
+            <a:spLocks noGrp="1"/>
+          </p:cNvSpPr>
+          <p:nvPr>
+            <p:ph idx="1"/>
+          </p:nvPr>
+        </p:nvSpPr>
+        <p:spPr/>
+        <p:txBody>
+          <a:bodyPr anchor="ctr"/>
+          <a:lstStyle/>
+          <a:p>
+            <a:pPr marL="0" indent="0" algn="ctr">
+              <a:buNone/>
+            </a:pPr>
+            <a:r>
+              <a:rPr lang="en-US" dirty="0">
+                <a:hlinkClick r:id="rId2"/>
+              </a:rPr>
+              <a:t>bayes_opt_example.ipynb</a:t>
+            </a:r>
+            <a:endParaRPr lang="en-US" dirty="0"/>
+          </a:p>
+        </p:txBody>
+      </p:sp>
+    </p:spTree>
+    <p:extLst>
+      <p:ext uri="{BB962C8B-B14F-4D97-AF65-F5344CB8AC3E}">
+        <p14:creationId xmlns:p14="http://schemas.microsoft.com/office/powerpoint/2010/main" val="2073639596"/>
+      </p:ext>
+    </p:extLst>
+  </p:cSld>
+  <p:clrMapOvr>
+    <a:masterClrMapping/>
+  </p:clrMapOvr>
+</p:sld>
+</file>
+
+<file path=ppt/slides/slide2.xml><?xml version="1.0" encoding="utf-8"?>
+<p:sld xmlns:a="http://schemas.openxmlformats.org/drawingml/2006/main" xmlns:r="http://schemas.openxmlformats.org/officeDocument/2006/relationships" xmlns:p="http://schemas.openxmlformats.org/presentationml/2006/main">
+  <p:cSld>
+    <p:spTree>
+      <p:nvGrpSpPr>
+        <p:cNvPr id="1" name=""/>
+        <p:cNvGrpSpPr/>
+        <p:nvPr/>
+      </p:nvGrpSpPr>
+      <p:grpSpPr>
+        <a:xfrm>
+          <a:off x="0" y="0"/>
+          <a:ext cx="0" cy="0"/>
+          <a:chOff x="0" y="0"/>
+          <a:chExt cx="0" cy="0"/>
+        </a:xfrm>
+      </p:grpSpPr>
+      <p:sp>
+        <p:nvSpPr>
+          <p:cNvPr id="4" name="Title 3">
+            <a:extLst>
+              <a:ext uri="{FF2B5EF4-FFF2-40B4-BE49-F238E27FC236}">
+                <a16:creationId xmlns:a16="http://schemas.microsoft.com/office/drawing/2014/main" id="{824D6633-28F1-4DB1-B0D9-346036B465EE}"/>
+              </a:ext>
+            </a:extLst>
+          </p:cNvPr>
+          <p:cNvSpPr>
+            <a:spLocks noGrp="1"/>
+          </p:cNvSpPr>
+          <p:nvPr>
+            <p:ph type="title"/>
+          </p:nvPr>
+        </p:nvSpPr>
+        <p:spPr/>
+        <p:txBody>
+          <a:bodyPr/>
+          <a:lstStyle/>
+          <a:p>
+            <a:r>
+              <a:rPr lang="en-US" dirty="0"/>
+              <a:t>What led me to Bayesian Optimization?</a:t>
+            </a:r>
+          </a:p>
+        </p:txBody>
+      </p:sp>
+      <p:sp>
+        <p:nvSpPr>
+          <p:cNvPr id="5" name="Content Placeholder 4">
+            <a:extLst>
+              <a:ext uri="{FF2B5EF4-FFF2-40B4-BE49-F238E27FC236}">
+                <a16:creationId xmlns:a16="http://schemas.microsoft.com/office/drawing/2014/main" id="{66405E59-0BD8-4EE7-B41E-5C6C3FDC0709}"/>
+              </a:ext>
+            </a:extLst>
+          </p:cNvPr>
+          <p:cNvSpPr>
+            <a:spLocks noGrp="1"/>
+          </p:cNvSpPr>
+          <p:nvPr>
+            <p:ph idx="1"/>
+          </p:nvPr>
+        </p:nvSpPr>
+        <p:spPr/>
+        <p:txBody>
+          <a:bodyPr>
+            <a:normAutofit lnSpcReduction="10000"/>
+          </a:bodyPr>
+          <a:lstStyle/>
+          <a:p>
+            <a:r>
+              <a:rPr lang="en-US" dirty="0"/>
+              <a:t>Like many of you, I compete in Kaggle competitions</a:t>
+            </a:r>
+          </a:p>
+          <a:p>
+            <a:r>
+              <a:rPr lang="en-US" dirty="0"/>
+              <a:t>For whatever reason, GBMs tend to be the most popular (single) model types</a:t>
+            </a:r>
+          </a:p>
+          <a:p>
+            <a:pPr lvl="1"/>
+            <a:r>
+              <a:rPr lang="en-US" dirty="0"/>
+              <a:t>Significantly more hyperparameters to consider compared to GLMs</a:t>
+            </a:r>
+          </a:p>
+          <a:p>
+            <a:r>
+              <a:rPr lang="en-US" dirty="0"/>
+              <a:t>Most competitive teams use </a:t>
+            </a:r>
+            <a:r>
+              <a:rPr lang="en-US" dirty="0" err="1"/>
+              <a:t>ensembling</a:t>
+            </a:r>
+            <a:r>
+              <a:rPr lang="en-US" dirty="0"/>
+              <a:t> and/or stacking</a:t>
+            </a:r>
+          </a:p>
+          <a:p>
+            <a:pPr lvl="1"/>
+            <a:r>
+              <a:rPr lang="en-US" dirty="0"/>
+              <a:t>Zillow entry was a stacked model: </a:t>
+            </a:r>
+            <a:r>
+              <a:rPr lang="en-US" dirty="0" err="1"/>
+              <a:t>XGBoost</a:t>
+            </a:r>
+            <a:r>
+              <a:rPr lang="en-US" dirty="0"/>
+              <a:t>, Light GBM, Random Forest, Extra Trees, </a:t>
+            </a:r>
+            <a:r>
+              <a:rPr lang="en-US" dirty="0" err="1"/>
+              <a:t>AdaBoost</a:t>
+            </a:r>
+            <a:r>
+              <a:rPr lang="en-US" dirty="0"/>
+              <a:t> (tree-based), two Neural Networks, and a K-Nearest-Neighbor.</a:t>
+            </a:r>
+          </a:p>
+          <a:p>
+            <a:pPr lvl="1"/>
+            <a:r>
+              <a:rPr lang="en-US" dirty="0"/>
+              <a:t>Linear Regression meta-learner</a:t>
+            </a:r>
+          </a:p>
+        </p:txBody>
+      </p:sp>
+    </p:spTree>
+    <p:extLst>
+      <p:ext uri="{BB962C8B-B14F-4D97-AF65-F5344CB8AC3E}">
+        <p14:creationId xmlns:p14="http://schemas.microsoft.com/office/powerpoint/2010/main" val="741182945"/>
+      </p:ext>
+    </p:extLst>
+  </p:cSld>
+  <p:clrMapOvr>
+    <a:masterClrMapping/>
+  </p:clrMapOvr>
+</p:sld>
+</file>
+
+<file path=ppt/slides/slide20.xml><?xml version="1.0" encoding="utf-8"?>
+<p:sld xmlns:a="http://schemas.openxmlformats.org/drawingml/2006/main" xmlns:r="http://schemas.openxmlformats.org/officeDocument/2006/relationships" xmlns:p="http://schemas.openxmlformats.org/presentationml/2006/main">
+  <p:cSld>
+    <p:spTree>
+      <p:nvGrpSpPr>
+        <p:cNvPr id="1" name=""/>
+        <p:cNvGrpSpPr/>
+        <p:nvPr/>
+      </p:nvGrpSpPr>
+      <p:grpSpPr>
+        <a:xfrm>
+          <a:off x="0" y="0"/>
+          <a:ext cx="0" cy="0"/>
+          <a:chOff x="0" y="0"/>
+          <a:chExt cx="0" cy="0"/>
+        </a:xfrm>
+      </p:grpSpPr>
+      <p:sp>
+        <p:nvSpPr>
+          <p:cNvPr id="2" name="Title 1">
+            <a:extLst>
+              <a:ext uri="{FF2B5EF4-FFF2-40B4-BE49-F238E27FC236}">
+                <a16:creationId xmlns:a16="http://schemas.microsoft.com/office/drawing/2014/main" id="{00EAF0DA-00BB-405D-B4BC-8FE8557BF392}"/>
+              </a:ext>
+            </a:extLst>
+          </p:cNvPr>
+          <p:cNvSpPr>
+            <a:spLocks noGrp="1"/>
+          </p:cNvSpPr>
+          <p:nvPr>
+            <p:ph type="title"/>
+          </p:nvPr>
+        </p:nvSpPr>
+        <p:spPr/>
+        <p:txBody>
+          <a:bodyPr/>
+          <a:lstStyle/>
+          <a:p>
+            <a:r>
+              <a:rPr lang="en-US" dirty="0"/>
               <a:t>Utility Functions</a:t>
             </a:r>
           </a:p>
         </p:txBody>
       </p:sp>
-      <mc:AlternateContent xmlns:mc="http://schemas.openxmlformats.org/markup-compatibility/2006" xmlns:a14="http://schemas.microsoft.com/office/drawing/2010/main">
-        <mc:Choice Requires="a14">
+      <mc:AlternateContent xmlns:mc="http://schemas.openxmlformats.org/markup-compatibility/2006">
+        <mc:Choice xmlns:a14="http://schemas.microsoft.com/office/drawing/2010/main" Requires="a14">
           <p:sp>
             <p:nvSpPr>
               <p:cNvPr id="3" name="Content Placeholder 2">
@@ -4781,10 +6234,10 @@
                       </m:dPr>
                       <m:e>
                         <m:r>
-                          <a:rPr lang="en-US" b="0" i="1" smtClean="0">
+                          <a:rPr lang="en-US" b="1" i="1" smtClean="0">
                             <a:latin typeface="Cambria Math" panose="02040503050406030204" pitchFamily="18" charset="0"/>
                           </a:rPr>
-                          <m:t>𝑥</m:t>
+                          <m:t>𝒙</m:t>
                         </m:r>
                       </m:e>
                     </m:d>
@@ -4795,10 +6248,10 @@
                       <m:t>=</m:t>
                     </m:r>
                     <m:r>
-                      <a:rPr lang="en-US" b="0" i="1" smtClean="0">
+                      <a:rPr lang="en-US" b="1" i="1" smtClean="0">
                         <a:latin typeface="Cambria Math" panose="02040503050406030204" pitchFamily="18" charset="0"/>
                       </a:rPr>
-                      <m:t>𝐸</m:t>
+                      <m:t>𝑬</m:t>
                     </m:r>
                     <m:d>
                       <m:dPr>
@@ -4850,10 +6303,10 @@
                               </m:dPr>
                               <m:e>
                                 <m:r>
-                                  <a:rPr lang="en-US" b="0" i="1" smtClean="0">
+                                  <a:rPr lang="en-US" b="1" i="1" smtClean="0">
                                     <a:latin typeface="Cambria Math" panose="02040503050406030204" pitchFamily="18" charset="0"/>
                                   </a:rPr>
-                                  <m:t>𝑥</m:t>
+                                  <m:t>𝒙</m:t>
                                 </m:r>
                               </m:e>
                             </m:d>
@@ -4965,7 +6418,7 @@
             </p:txBody>
           </p:sp>
         </mc:Choice>
-        <mc:Fallback xmlns="">
+        <mc:Fallback>
           <p:sp>
             <p:nvSpPr>
               <p:cNvPr id="3" name="Content Placeholder 2">
@@ -5044,6 +6497,13 @@
               <a:schemeClr val="tx1"/>
             </a:solidFill>
           </a:ln>
+          <a:effectLst>
+            <a:outerShdw blurRad="50800" dist="38100" dir="2700000" algn="tl" rotWithShape="0">
+              <a:prstClr val="black">
+                <a:alpha val="40000"/>
+              </a:prstClr>
+            </a:outerShdw>
+          </a:effectLst>
         </p:spPr>
       </p:pic>
       <p:pic>
@@ -5085,6 +6545,13 @@
               <a:schemeClr val="tx1"/>
             </a:solidFill>
           </a:ln>
+          <a:effectLst>
+            <a:outerShdw blurRad="50800" dist="38100" dir="2700000" algn="tl" rotWithShape="0">
+              <a:prstClr val="black">
+                <a:alpha val="40000"/>
+              </a:prstClr>
+            </a:outerShdw>
+          </a:effectLst>
         </p:spPr>
       </p:pic>
       <p:pic>
@@ -5126,250 +6593,19 @@
               <a:schemeClr val="tx1"/>
             </a:solidFill>
           </a:ln>
+          <a:effectLst>
+            <a:outerShdw blurRad="50800" dist="38100" dir="2700000" algn="tl" rotWithShape="0">
+              <a:prstClr val="black">
+                <a:alpha val="40000"/>
+              </a:prstClr>
+            </a:outerShdw>
+          </a:effectLst>
         </p:spPr>
       </p:pic>
     </p:spTree>
     <p:extLst>
       <p:ext uri="{BB962C8B-B14F-4D97-AF65-F5344CB8AC3E}">
         <p14:creationId xmlns:p14="http://schemas.microsoft.com/office/powerpoint/2010/main" val="3736318972"/>
-      </p:ext>
-    </p:extLst>
-  </p:cSld>
-  <p:clrMapOvr>
-    <a:masterClrMapping/>
-  </p:clrMapOvr>
-</p:sld>
-</file>
-
-<file path=ppt/slides/slide2.xml><?xml version="1.0" encoding="utf-8"?>
-<p:sld xmlns:a="http://schemas.openxmlformats.org/drawingml/2006/main" xmlns:r="http://schemas.openxmlformats.org/officeDocument/2006/relationships" xmlns:p="http://schemas.openxmlformats.org/presentationml/2006/main">
-  <p:cSld>
-    <p:spTree>
-      <p:nvGrpSpPr>
-        <p:cNvPr id="1" name=""/>
-        <p:cNvGrpSpPr/>
-        <p:nvPr/>
-      </p:nvGrpSpPr>
-      <p:grpSpPr>
-        <a:xfrm>
-          <a:off x="0" y="0"/>
-          <a:ext cx="0" cy="0"/>
-          <a:chOff x="0" y="0"/>
-          <a:chExt cx="0" cy="0"/>
-        </a:xfrm>
-      </p:grpSpPr>
-      <p:sp>
-        <p:nvSpPr>
-          <p:cNvPr id="4" name="Title 3">
-            <a:extLst>
-              <a:ext uri="{FF2B5EF4-FFF2-40B4-BE49-F238E27FC236}">
-                <a16:creationId xmlns:a16="http://schemas.microsoft.com/office/drawing/2014/main" id="{824D6633-28F1-4DB1-B0D9-346036B465EE}"/>
-              </a:ext>
-            </a:extLst>
-          </p:cNvPr>
-          <p:cNvSpPr>
-            <a:spLocks noGrp="1"/>
-          </p:cNvSpPr>
-          <p:nvPr>
-            <p:ph type="title"/>
-          </p:nvPr>
-        </p:nvSpPr>
-        <p:spPr/>
-        <p:txBody>
-          <a:bodyPr/>
-          <a:lstStyle/>
-          <a:p>
-            <a:r>
-              <a:rPr lang="en-US" dirty="0"/>
-              <a:t>What led me to Bayesian Optimization?</a:t>
-            </a:r>
-          </a:p>
-        </p:txBody>
-      </p:sp>
-      <p:sp>
-        <p:nvSpPr>
-          <p:cNvPr id="5" name="Content Placeholder 4">
-            <a:extLst>
-              <a:ext uri="{FF2B5EF4-FFF2-40B4-BE49-F238E27FC236}">
-                <a16:creationId xmlns:a16="http://schemas.microsoft.com/office/drawing/2014/main" id="{66405E59-0BD8-4EE7-B41E-5C6C3FDC0709}"/>
-              </a:ext>
-            </a:extLst>
-          </p:cNvPr>
-          <p:cNvSpPr>
-            <a:spLocks noGrp="1"/>
-          </p:cNvSpPr>
-          <p:nvPr>
-            <p:ph idx="1"/>
-          </p:nvPr>
-        </p:nvSpPr>
-        <p:spPr/>
-        <p:txBody>
-          <a:bodyPr>
-            <a:normAutofit lnSpcReduction="10000"/>
-          </a:bodyPr>
-          <a:lstStyle/>
-          <a:p>
-            <a:r>
-              <a:rPr lang="en-US" dirty="0"/>
-              <a:t>Like many of you, I compete in Kaggle competitions</a:t>
-            </a:r>
-          </a:p>
-          <a:p>
-            <a:r>
-              <a:rPr lang="en-US" dirty="0"/>
-              <a:t>For whatever reason, GBMs tend to be the most popular (single) model types</a:t>
-            </a:r>
-          </a:p>
-          <a:p>
-            <a:pPr lvl="1"/>
-            <a:r>
-              <a:rPr lang="en-US" dirty="0"/>
-              <a:t>Significantly more hyperparameters to consider compared to GLMs</a:t>
-            </a:r>
-          </a:p>
-          <a:p>
-            <a:r>
-              <a:rPr lang="en-US" dirty="0"/>
-              <a:t>Most competitive teams use </a:t>
-            </a:r>
-            <a:r>
-              <a:rPr lang="en-US" dirty="0" err="1"/>
-              <a:t>ensembling</a:t>
-            </a:r>
-            <a:r>
-              <a:rPr lang="en-US" dirty="0"/>
-              <a:t> and/or stacking</a:t>
-            </a:r>
-          </a:p>
-          <a:p>
-            <a:pPr lvl="1"/>
-            <a:r>
-              <a:rPr lang="en-US" dirty="0"/>
-              <a:t>Zillow entry was a stacked model: </a:t>
-            </a:r>
-            <a:r>
-              <a:rPr lang="en-US" dirty="0" err="1"/>
-              <a:t>XGBoost</a:t>
-            </a:r>
-            <a:r>
-              <a:rPr lang="en-US" dirty="0"/>
-              <a:t>, Light GBM, Random Forest, Extra Trees, </a:t>
-            </a:r>
-            <a:r>
-              <a:rPr lang="en-US" dirty="0" err="1"/>
-              <a:t>AdaBoost</a:t>
-            </a:r>
-            <a:r>
-              <a:rPr lang="en-US" dirty="0"/>
-              <a:t> (tree-based), two Neural Networks, and a K-Nearest-Neighbor.</a:t>
-            </a:r>
-          </a:p>
-          <a:p>
-            <a:pPr lvl="1"/>
-            <a:r>
-              <a:rPr lang="en-US" dirty="0"/>
-              <a:t>Linear Regression meta-learner</a:t>
-            </a:r>
-          </a:p>
-        </p:txBody>
-      </p:sp>
-    </p:spTree>
-    <p:extLst>
-      <p:ext uri="{BB962C8B-B14F-4D97-AF65-F5344CB8AC3E}">
-        <p14:creationId xmlns:p14="http://schemas.microsoft.com/office/powerpoint/2010/main" val="741182945"/>
-      </p:ext>
-    </p:extLst>
-  </p:cSld>
-  <p:clrMapOvr>
-    <a:masterClrMapping/>
-  </p:clrMapOvr>
-</p:sld>
-</file>
-
-<file path=ppt/slides/slide20.xml><?xml version="1.0" encoding="utf-8"?>
-<p:sld xmlns:a="http://schemas.openxmlformats.org/drawingml/2006/main" xmlns:r="http://schemas.openxmlformats.org/officeDocument/2006/relationships" xmlns:p="http://schemas.openxmlformats.org/presentationml/2006/main">
-  <p:cSld>
-    <p:spTree>
-      <p:nvGrpSpPr>
-        <p:cNvPr id="1" name=""/>
-        <p:cNvGrpSpPr/>
-        <p:nvPr/>
-      </p:nvGrpSpPr>
-      <p:grpSpPr>
-        <a:xfrm>
-          <a:off x="0" y="0"/>
-          <a:ext cx="0" cy="0"/>
-          <a:chOff x="0" y="0"/>
-          <a:chExt cx="0" cy="0"/>
-        </a:xfrm>
-      </p:grpSpPr>
-      <p:sp>
-        <p:nvSpPr>
-          <p:cNvPr id="2" name="Title 1">
-            <a:extLst>
-              <a:ext uri="{FF2B5EF4-FFF2-40B4-BE49-F238E27FC236}">
-                <a16:creationId xmlns:a16="http://schemas.microsoft.com/office/drawing/2014/main" id="{E425E6F5-5447-4F3A-B5B4-0F669676A794}"/>
-              </a:ext>
-            </a:extLst>
-          </p:cNvPr>
-          <p:cNvSpPr>
-            <a:spLocks noGrp="1"/>
-          </p:cNvSpPr>
-          <p:nvPr>
-            <p:ph type="title"/>
-          </p:nvPr>
-        </p:nvSpPr>
-        <p:spPr/>
-        <p:txBody>
-          <a:bodyPr/>
-          <a:lstStyle/>
-          <a:p>
-            <a:r>
-              <a:rPr lang="en-US" dirty="0"/>
-              <a:t>Utility Functions</a:t>
-            </a:r>
-          </a:p>
-        </p:txBody>
-      </p:sp>
-      <p:pic>
-        <p:nvPicPr>
-          <p:cNvPr id="7" name="Content Placeholder 6">
-            <a:extLst>
-              <a:ext uri="{FF2B5EF4-FFF2-40B4-BE49-F238E27FC236}">
-                <a16:creationId xmlns:a16="http://schemas.microsoft.com/office/drawing/2014/main" id="{F4680150-0DC8-4F84-9E73-65FBD5E45FA2}"/>
-              </a:ext>
-            </a:extLst>
-          </p:cNvPr>
-          <p:cNvPicPr>
-            <a:picLocks noGrp="1" noChangeAspect="1"/>
-          </p:cNvPicPr>
-          <p:nvPr>
-            <p:ph idx="1"/>
-          </p:nvPr>
-        </p:nvPicPr>
-        <p:blipFill>
-          <a:blip r:embed="rId2">
-            <a:extLst>
-              <a:ext uri="{28A0092B-C50C-407E-A947-70E740481C1C}">
-                <a14:useLocalDpi xmlns:a14="http://schemas.microsoft.com/office/drawing/2010/main" val="0"/>
-              </a:ext>
-            </a:extLst>
-          </a:blip>
-          <a:stretch>
-            <a:fillRect/>
-          </a:stretch>
-        </p:blipFill>
-        <p:spPr>
-          <a:xfrm>
-            <a:off x="2025685" y="1488841"/>
-            <a:ext cx="5092630" cy="5029200"/>
-          </a:xfrm>
-        </p:spPr>
-      </p:pic>
-    </p:spTree>
-    <p:extLst>
-      <p:ext uri="{BB962C8B-B14F-4D97-AF65-F5344CB8AC3E}">
-        <p14:creationId xmlns:p14="http://schemas.microsoft.com/office/powerpoint/2010/main" val="4119882280"/>
       </p:ext>
     </p:extLst>
   </p:cSld>
@@ -5454,15 +6690,15 @@
         </p:blipFill>
         <p:spPr>
           <a:xfrm>
-            <a:off x="2025685" y="1493308"/>
-            <a:ext cx="5092630" cy="5020265"/>
+            <a:off x="2025685" y="1488841"/>
+            <a:ext cx="5092630" cy="5029200"/>
           </a:xfrm>
         </p:spPr>
       </p:pic>
     </p:spTree>
     <p:extLst>
       <p:ext uri="{BB962C8B-B14F-4D97-AF65-F5344CB8AC3E}">
-        <p14:creationId xmlns:p14="http://schemas.microsoft.com/office/powerpoint/2010/main" val="3065491919"/>
+        <p14:creationId xmlns:p14="http://schemas.microsoft.com/office/powerpoint/2010/main" val="4119882280"/>
       </p:ext>
     </p:extLst>
   </p:cSld>
@@ -5547,15 +6783,15 @@
         </p:blipFill>
         <p:spPr>
           <a:xfrm>
-            <a:off x="2025685" y="1524134"/>
-            <a:ext cx="5092630" cy="4958613"/>
+            <a:off x="2025685" y="1493308"/>
+            <a:ext cx="5092630" cy="5020265"/>
           </a:xfrm>
         </p:spPr>
       </p:pic>
     </p:spTree>
     <p:extLst>
       <p:ext uri="{BB962C8B-B14F-4D97-AF65-F5344CB8AC3E}">
-        <p14:creationId xmlns:p14="http://schemas.microsoft.com/office/powerpoint/2010/main" val="3417688013"/>
+        <p14:creationId xmlns:p14="http://schemas.microsoft.com/office/powerpoint/2010/main" val="3065491919"/>
       </p:ext>
     </p:extLst>
   </p:cSld>
@@ -5587,6 +6823,99 @@
           <p:cNvPr id="2" name="Title 1">
             <a:extLst>
               <a:ext uri="{FF2B5EF4-FFF2-40B4-BE49-F238E27FC236}">
+                <a16:creationId xmlns:a16="http://schemas.microsoft.com/office/drawing/2014/main" id="{E425E6F5-5447-4F3A-B5B4-0F669676A794}"/>
+              </a:ext>
+            </a:extLst>
+          </p:cNvPr>
+          <p:cNvSpPr>
+            <a:spLocks noGrp="1"/>
+          </p:cNvSpPr>
+          <p:nvPr>
+            <p:ph type="title"/>
+          </p:nvPr>
+        </p:nvSpPr>
+        <p:spPr/>
+        <p:txBody>
+          <a:bodyPr/>
+          <a:lstStyle/>
+          <a:p>
+            <a:r>
+              <a:rPr lang="en-US" dirty="0"/>
+              <a:t>Utility Functions</a:t>
+            </a:r>
+          </a:p>
+        </p:txBody>
+      </p:sp>
+      <p:pic>
+        <p:nvPicPr>
+          <p:cNvPr id="7" name="Content Placeholder 6">
+            <a:extLst>
+              <a:ext uri="{FF2B5EF4-FFF2-40B4-BE49-F238E27FC236}">
+                <a16:creationId xmlns:a16="http://schemas.microsoft.com/office/drawing/2014/main" id="{F4680150-0DC8-4F84-9E73-65FBD5E45FA2}"/>
+              </a:ext>
+            </a:extLst>
+          </p:cNvPr>
+          <p:cNvPicPr>
+            <a:picLocks noGrp="1" noChangeAspect="1"/>
+          </p:cNvPicPr>
+          <p:nvPr>
+            <p:ph idx="1"/>
+          </p:nvPr>
+        </p:nvPicPr>
+        <p:blipFill>
+          <a:blip r:embed="rId2">
+            <a:extLst>
+              <a:ext uri="{28A0092B-C50C-407E-A947-70E740481C1C}">
+                <a14:useLocalDpi xmlns:a14="http://schemas.microsoft.com/office/drawing/2010/main" val="0"/>
+              </a:ext>
+            </a:extLst>
+          </a:blip>
+          <a:stretch>
+            <a:fillRect/>
+          </a:stretch>
+        </p:blipFill>
+        <p:spPr>
+          <a:xfrm>
+            <a:off x="2025685" y="1524134"/>
+            <a:ext cx="5092630" cy="4958613"/>
+          </a:xfrm>
+        </p:spPr>
+      </p:pic>
+    </p:spTree>
+    <p:extLst>
+      <p:ext uri="{BB962C8B-B14F-4D97-AF65-F5344CB8AC3E}">
+        <p14:creationId xmlns:p14="http://schemas.microsoft.com/office/powerpoint/2010/main" val="3417688013"/>
+      </p:ext>
+    </p:extLst>
+  </p:cSld>
+  <p:clrMapOvr>
+    <a:masterClrMapping/>
+  </p:clrMapOvr>
+</p:sld>
+</file>
+
+<file path=ppt/slides/slide24.xml><?xml version="1.0" encoding="utf-8"?>
+<p:sld xmlns:a="http://schemas.openxmlformats.org/drawingml/2006/main" xmlns:r="http://schemas.openxmlformats.org/officeDocument/2006/relationships" xmlns:p="http://schemas.openxmlformats.org/presentationml/2006/main">
+  <p:cSld>
+    <p:spTree>
+      <p:nvGrpSpPr>
+        <p:cNvPr id="1" name=""/>
+        <p:cNvGrpSpPr/>
+        <p:nvPr/>
+      </p:nvGrpSpPr>
+      <p:grpSpPr>
+        <a:xfrm>
+          <a:off x="0" y="0"/>
+          <a:ext cx="0" cy="0"/>
+          <a:chOff x="0" y="0"/>
+          <a:chExt cx="0" cy="0"/>
+        </a:xfrm>
+      </p:grpSpPr>
+      <p:sp>
+        <p:nvSpPr>
+          <p:cNvPr id="2" name="Title 1">
+            <a:extLst>
+              <a:ext uri="{FF2B5EF4-FFF2-40B4-BE49-F238E27FC236}">
                 <a16:creationId xmlns:a16="http://schemas.microsoft.com/office/drawing/2014/main" id="{D69990CD-FFC3-458B-AFD0-940D78C85BF2}"/>
               </a:ext>
             </a:extLst>
@@ -5720,7 +7049,7 @@
 </p:sld>
 </file>
 
-<file path=ppt/slides/slide24.xml><?xml version="1.0" encoding="utf-8"?>
+<file path=ppt/slides/slide25.xml><?xml version="1.0" encoding="utf-8"?>
 <p:sld xmlns:a="http://schemas.openxmlformats.org/drawingml/2006/main" xmlns:r="http://schemas.openxmlformats.org/officeDocument/2006/relationships" xmlns:p="http://schemas.openxmlformats.org/presentationml/2006/main">
   <p:cSld>
     <p:spTree>
@@ -5933,7 +7262,7 @@
 </p:sld>
 </file>
 
-<file path=ppt/slides/slide25.xml><?xml version="1.0" encoding="utf-8"?>
+<file path=ppt/slides/slide26.xml><?xml version="1.0" encoding="utf-8"?>
 <p:sld xmlns:a="http://schemas.openxmlformats.org/drawingml/2006/main" xmlns:r="http://schemas.openxmlformats.org/officeDocument/2006/relationships" xmlns:p="http://schemas.openxmlformats.org/presentationml/2006/main">
   <p:cSld>
     <p:spTree>
@@ -6040,7 +7369,7 @@
 </p:sld>
 </file>
 
-<file path=ppt/slides/slide26.xml><?xml version="1.0" encoding="utf-8"?>
+<file path=ppt/slides/slide27.xml><?xml version="1.0" encoding="utf-8"?>
 <p:sld xmlns:a="http://schemas.openxmlformats.org/drawingml/2006/main" xmlns:r="http://schemas.openxmlformats.org/officeDocument/2006/relationships" xmlns:p="http://schemas.openxmlformats.org/presentationml/2006/main">
   <p:cSld>
     <p:spTree>
@@ -6219,199 +7548,6 @@
 </p:sld>
 </file>
 
-<file path=ppt/slides/slide27.xml><?xml version="1.0" encoding="utf-8"?>
-<p:sld xmlns:a="http://schemas.openxmlformats.org/drawingml/2006/main" xmlns:r="http://schemas.openxmlformats.org/officeDocument/2006/relationships" xmlns:p="http://schemas.openxmlformats.org/presentationml/2006/main">
-  <p:cSld>
-    <p:spTree>
-      <p:nvGrpSpPr>
-        <p:cNvPr id="1" name=""/>
-        <p:cNvGrpSpPr/>
-        <p:nvPr/>
-      </p:nvGrpSpPr>
-      <p:grpSpPr>
-        <a:xfrm>
-          <a:off x="0" y="0"/>
-          <a:ext cx="0" cy="0"/>
-          <a:chOff x="0" y="0"/>
-          <a:chExt cx="0" cy="0"/>
-        </a:xfrm>
-      </p:grpSpPr>
-      <p:sp>
-        <p:nvSpPr>
-          <p:cNvPr id="2" name="Title 1">
-            <a:extLst>
-              <a:ext uri="{FF2B5EF4-FFF2-40B4-BE49-F238E27FC236}">
-                <a16:creationId xmlns:a16="http://schemas.microsoft.com/office/drawing/2014/main" id="{9592584F-B7D5-4727-97B4-4243AD36D413}"/>
-              </a:ext>
-            </a:extLst>
-          </p:cNvPr>
-          <p:cNvSpPr>
-            <a:spLocks noGrp="1"/>
-          </p:cNvSpPr>
-          <p:nvPr>
-            <p:ph type="title"/>
-          </p:nvPr>
-        </p:nvSpPr>
-        <p:spPr/>
-        <p:txBody>
-          <a:bodyPr/>
-          <a:lstStyle/>
-          <a:p>
-            <a:r>
-              <a:rPr lang="en-US" dirty="0"/>
-              <a:t>Scaling issues</a:t>
-            </a:r>
-          </a:p>
-        </p:txBody>
-      </p:sp>
-      <p:sp>
-        <p:nvSpPr>
-          <p:cNvPr id="3" name="Content Placeholder 2">
-            <a:extLst>
-              <a:ext uri="{FF2B5EF4-FFF2-40B4-BE49-F238E27FC236}">
-                <a16:creationId xmlns:a16="http://schemas.microsoft.com/office/drawing/2014/main" id="{26B72A78-823A-468F-807B-8C293B2D825E}"/>
-              </a:ext>
-            </a:extLst>
-          </p:cNvPr>
-          <p:cNvSpPr>
-            <a:spLocks noGrp="1"/>
-          </p:cNvSpPr>
-          <p:nvPr>
-            <p:ph idx="1"/>
-          </p:nvPr>
-        </p:nvSpPr>
-        <p:spPr/>
-        <p:txBody>
-          <a:bodyPr/>
-          <a:lstStyle/>
-          <a:p>
-            <a:r>
-              <a:rPr lang="en-US" dirty="0"/>
-              <a:t>Two methods</a:t>
-            </a:r>
-          </a:p>
-          <a:p>
-            <a:pPr lvl="1"/>
-            <a:r>
-              <a:rPr lang="en-US" dirty="0"/>
-              <a:t>Modify the kernel</a:t>
-            </a:r>
-          </a:p>
-          <a:p>
-            <a:pPr lvl="1"/>
-            <a:r>
-              <a:rPr lang="en-US" dirty="0"/>
-              <a:t>Transform the input (normalize)</a:t>
-            </a:r>
-          </a:p>
-        </p:txBody>
-      </p:sp>
-      <p:grpSp>
-        <p:nvGrpSpPr>
-          <p:cNvPr id="8" name="Group 7">
-            <a:extLst>
-              <a:ext uri="{FF2B5EF4-FFF2-40B4-BE49-F238E27FC236}">
-                <a16:creationId xmlns:a16="http://schemas.microsoft.com/office/drawing/2014/main" id="{AB9E7961-10C5-40E0-802A-F3E8BF7FFDA1}"/>
-              </a:ext>
-            </a:extLst>
-          </p:cNvPr>
-          <p:cNvGrpSpPr/>
-          <p:nvPr/>
-        </p:nvGrpSpPr>
-        <p:grpSpPr>
-          <a:xfrm>
-            <a:off x="675409" y="3247476"/>
-            <a:ext cx="7793182" cy="2705100"/>
-            <a:chOff x="-522017" y="2744136"/>
-            <a:chExt cx="7793182" cy="2705100"/>
-          </a:xfrm>
-        </p:grpSpPr>
-        <p:pic>
-          <p:nvPicPr>
-            <p:cNvPr id="5" name="Picture 4">
-              <a:extLst>
-                <a:ext uri="{FF2B5EF4-FFF2-40B4-BE49-F238E27FC236}">
-                  <a16:creationId xmlns:a16="http://schemas.microsoft.com/office/drawing/2014/main" id="{F2722D7E-9EA2-4EAA-8D56-C1B9AA13A78D}"/>
-                </a:ext>
-              </a:extLst>
-            </p:cNvPr>
-            <p:cNvPicPr>
-              <a:picLocks noChangeAspect="1"/>
-            </p:cNvPicPr>
-            <p:nvPr/>
-          </p:nvPicPr>
-          <p:blipFill>
-            <a:blip r:embed="rId2">
-              <a:extLst>
-                <a:ext uri="{28A0092B-C50C-407E-A947-70E740481C1C}">
-                  <a14:useLocalDpi xmlns:a14="http://schemas.microsoft.com/office/drawing/2010/main" val="0"/>
-                </a:ext>
-              </a:extLst>
-            </a:blip>
-            <a:stretch>
-              <a:fillRect/>
-            </a:stretch>
-          </p:blipFill>
-          <p:spPr>
-            <a:xfrm>
-              <a:off x="3336474" y="2744136"/>
-              <a:ext cx="3934691" cy="2705100"/>
-            </a:xfrm>
-            <a:prstGeom prst="rect">
-              <a:avLst/>
-            </a:prstGeom>
-          </p:spPr>
-        </p:pic>
-        <p:pic>
-          <p:nvPicPr>
-            <p:cNvPr id="7" name="Picture 6">
-              <a:extLst>
-                <a:ext uri="{FF2B5EF4-FFF2-40B4-BE49-F238E27FC236}">
-                  <a16:creationId xmlns:a16="http://schemas.microsoft.com/office/drawing/2014/main" id="{4A707AC4-CFF5-451B-A344-43A3E8FC1C87}"/>
-                </a:ext>
-              </a:extLst>
-            </p:cNvPr>
-            <p:cNvPicPr>
-              <a:picLocks noChangeAspect="1"/>
-            </p:cNvPicPr>
-            <p:nvPr/>
-          </p:nvPicPr>
-          <p:blipFill>
-            <a:blip r:embed="rId3">
-              <a:extLst>
-                <a:ext uri="{28A0092B-C50C-407E-A947-70E740481C1C}">
-                  <a14:useLocalDpi xmlns:a14="http://schemas.microsoft.com/office/drawing/2010/main" val="0"/>
-                </a:ext>
-              </a:extLst>
-            </a:blip>
-            <a:stretch>
-              <a:fillRect/>
-            </a:stretch>
-          </p:blipFill>
-          <p:spPr>
-            <a:xfrm>
-              <a:off x="-522017" y="2770330"/>
-              <a:ext cx="3858491" cy="2652712"/>
-            </a:xfrm>
-            <a:prstGeom prst="rect">
-              <a:avLst/>
-            </a:prstGeom>
-          </p:spPr>
-        </p:pic>
-      </p:grpSp>
-    </p:spTree>
-    <p:extLst>
-      <p:ext uri="{BB962C8B-B14F-4D97-AF65-F5344CB8AC3E}">
-        <p14:creationId xmlns:p14="http://schemas.microsoft.com/office/powerpoint/2010/main" val="2388840515"/>
-      </p:ext>
-    </p:extLst>
-  </p:cSld>
-  <p:clrMapOvr>
-    <a:masterClrMapping/>
-  </p:clrMapOvr>
-</p:sld>
-</file>
-
 <file path=ppt/slides/slide28.xml><?xml version="1.0" encoding="utf-8"?>
 <p:sld xmlns:a="http://schemas.openxmlformats.org/drawingml/2006/main" xmlns:r="http://schemas.openxmlformats.org/officeDocument/2006/relationships" xmlns:p="http://schemas.openxmlformats.org/presentationml/2006/main">
   <p:cSld>
@@ -6434,6 +7570,575 @@
           <p:cNvPr id="2" name="Title 1">
             <a:extLst>
               <a:ext uri="{FF2B5EF4-FFF2-40B4-BE49-F238E27FC236}">
+                <a16:creationId xmlns:a16="http://schemas.microsoft.com/office/drawing/2014/main" id="{9592584F-B7D5-4727-97B4-4243AD36D413}"/>
+              </a:ext>
+            </a:extLst>
+          </p:cNvPr>
+          <p:cNvSpPr>
+            <a:spLocks noGrp="1"/>
+          </p:cNvSpPr>
+          <p:nvPr>
+            <p:ph type="title"/>
+          </p:nvPr>
+        </p:nvSpPr>
+        <p:spPr/>
+        <p:txBody>
+          <a:bodyPr/>
+          <a:lstStyle/>
+          <a:p>
+            <a:r>
+              <a:rPr lang="en-US" dirty="0"/>
+              <a:t>Scaling issues</a:t>
+            </a:r>
+          </a:p>
+        </p:txBody>
+      </p:sp>
+      <p:pic>
+        <p:nvPicPr>
+          <p:cNvPr id="6" name="Content Placeholder 5">
+            <a:extLst>
+              <a:ext uri="{FF2B5EF4-FFF2-40B4-BE49-F238E27FC236}">
+                <a16:creationId xmlns:a16="http://schemas.microsoft.com/office/drawing/2014/main" id="{B2F1A125-0C63-455D-B2A3-2FABEB9E3FBC}"/>
+              </a:ext>
+            </a:extLst>
+          </p:cNvPr>
+          <p:cNvPicPr>
+            <a:picLocks noGrp="1" noChangeAspect="1"/>
+          </p:cNvPicPr>
+          <p:nvPr>
+            <p:ph idx="1"/>
+          </p:nvPr>
+        </p:nvPicPr>
+        <p:blipFill>
+          <a:blip r:embed="rId2">
+            <a:extLst>
+              <a:ext uri="{28A0092B-C50C-407E-A947-70E740481C1C}">
+                <a14:useLocalDpi xmlns:a14="http://schemas.microsoft.com/office/drawing/2010/main" val="0"/>
+              </a:ext>
+            </a:extLst>
+          </a:blip>
+          <a:stretch>
+            <a:fillRect/>
+          </a:stretch>
+        </p:blipFill>
+        <p:spPr>
+          <a:xfrm>
+            <a:off x="1407391" y="1825625"/>
+            <a:ext cx="6329218" cy="4351338"/>
+          </a:xfrm>
+        </p:spPr>
+      </p:pic>
+      <p:pic>
+        <p:nvPicPr>
+          <p:cNvPr id="10" name="Picture 9">
+            <a:extLst>
+              <a:ext uri="{FF2B5EF4-FFF2-40B4-BE49-F238E27FC236}">
+                <a16:creationId xmlns:a16="http://schemas.microsoft.com/office/drawing/2014/main" id="{34019AEA-CC6D-454A-8E1C-319CA7008691}"/>
+              </a:ext>
+            </a:extLst>
+          </p:cNvPr>
+          <p:cNvPicPr>
+            <a:picLocks noChangeAspect="1"/>
+          </p:cNvPicPr>
+          <p:nvPr/>
+        </p:nvPicPr>
+        <p:blipFill>
+          <a:blip r:embed="rId3">
+            <a:extLst>
+              <a:ext uri="{28A0092B-C50C-407E-A947-70E740481C1C}">
+                <a14:useLocalDpi xmlns:a14="http://schemas.microsoft.com/office/drawing/2010/main" val="0"/>
+              </a:ext>
+            </a:extLst>
+          </a:blip>
+          <a:stretch>
+            <a:fillRect/>
+          </a:stretch>
+        </p:blipFill>
+        <p:spPr>
+          <a:xfrm>
+            <a:off x="228600" y="6176962"/>
+            <a:ext cx="8686800" cy="525904"/>
+          </a:xfrm>
+          <a:prstGeom prst="rect">
+            <a:avLst/>
+          </a:prstGeom>
+          <a:ln>
+            <a:solidFill>
+              <a:schemeClr val="tx1"/>
+            </a:solidFill>
+          </a:ln>
+          <a:effectLst>
+            <a:outerShdw blurRad="50800" dist="38100" dir="2700000" algn="tl" rotWithShape="0">
+              <a:prstClr val="black">
+                <a:alpha val="40000"/>
+              </a:prstClr>
+            </a:outerShdw>
+          </a:effectLst>
+        </p:spPr>
+      </p:pic>
+    </p:spTree>
+    <p:extLst>
+      <p:ext uri="{BB962C8B-B14F-4D97-AF65-F5344CB8AC3E}">
+        <p14:creationId xmlns:p14="http://schemas.microsoft.com/office/powerpoint/2010/main" val="1302564635"/>
+      </p:ext>
+    </p:extLst>
+  </p:cSld>
+  <p:clrMapOvr>
+    <a:masterClrMapping/>
+  </p:clrMapOvr>
+</p:sld>
+</file>
+
+<file path=ppt/slides/slide29.xml><?xml version="1.0" encoding="utf-8"?>
+<p:sld xmlns:a="http://schemas.openxmlformats.org/drawingml/2006/main" xmlns:r="http://schemas.openxmlformats.org/officeDocument/2006/relationships" xmlns:p="http://schemas.openxmlformats.org/presentationml/2006/main">
+  <p:cSld>
+    <p:spTree>
+      <p:nvGrpSpPr>
+        <p:cNvPr id="1" name=""/>
+        <p:cNvGrpSpPr/>
+        <p:nvPr/>
+      </p:nvGrpSpPr>
+      <p:grpSpPr>
+        <a:xfrm>
+          <a:off x="0" y="0"/>
+          <a:ext cx="0" cy="0"/>
+          <a:chOff x="0" y="0"/>
+          <a:chExt cx="0" cy="0"/>
+        </a:xfrm>
+      </p:grpSpPr>
+      <p:sp>
+        <p:nvSpPr>
+          <p:cNvPr id="2" name="Title 1">
+            <a:extLst>
+              <a:ext uri="{FF2B5EF4-FFF2-40B4-BE49-F238E27FC236}">
+                <a16:creationId xmlns:a16="http://schemas.microsoft.com/office/drawing/2014/main" id="{9592584F-B7D5-4727-97B4-4243AD36D413}"/>
+              </a:ext>
+            </a:extLst>
+          </p:cNvPr>
+          <p:cNvSpPr>
+            <a:spLocks noGrp="1"/>
+          </p:cNvSpPr>
+          <p:nvPr>
+            <p:ph type="title"/>
+          </p:nvPr>
+        </p:nvSpPr>
+        <p:spPr/>
+        <p:txBody>
+          <a:bodyPr/>
+          <a:lstStyle/>
+          <a:p>
+            <a:r>
+              <a:rPr lang="en-US" dirty="0"/>
+              <a:t>Scaling issues</a:t>
+            </a:r>
+          </a:p>
+        </p:txBody>
+      </p:sp>
+      <p:pic>
+        <p:nvPicPr>
+          <p:cNvPr id="6" name="Content Placeholder 5">
+            <a:extLst>
+              <a:ext uri="{FF2B5EF4-FFF2-40B4-BE49-F238E27FC236}">
+                <a16:creationId xmlns:a16="http://schemas.microsoft.com/office/drawing/2014/main" id="{B2F1A125-0C63-455D-B2A3-2FABEB9E3FBC}"/>
+              </a:ext>
+            </a:extLst>
+          </p:cNvPr>
+          <p:cNvPicPr>
+            <a:picLocks noGrp="1" noChangeAspect="1"/>
+          </p:cNvPicPr>
+          <p:nvPr>
+            <p:ph idx="1"/>
+          </p:nvPr>
+        </p:nvPicPr>
+        <p:blipFill>
+          <a:blip r:embed="rId2">
+            <a:extLst>
+              <a:ext uri="{28A0092B-C50C-407E-A947-70E740481C1C}">
+                <a14:useLocalDpi xmlns:a14="http://schemas.microsoft.com/office/drawing/2010/main" val="0"/>
+              </a:ext>
+            </a:extLst>
+          </a:blip>
+          <a:stretch>
+            <a:fillRect/>
+          </a:stretch>
+        </p:blipFill>
+        <p:spPr>
+          <a:xfrm>
+            <a:off x="1407391" y="1825625"/>
+            <a:ext cx="6329218" cy="4351337"/>
+          </a:xfrm>
+        </p:spPr>
+      </p:pic>
+      <p:pic>
+        <p:nvPicPr>
+          <p:cNvPr id="10" name="Picture 9">
+            <a:extLst>
+              <a:ext uri="{FF2B5EF4-FFF2-40B4-BE49-F238E27FC236}">
+                <a16:creationId xmlns:a16="http://schemas.microsoft.com/office/drawing/2014/main" id="{34019AEA-CC6D-454A-8E1C-319CA7008691}"/>
+              </a:ext>
+            </a:extLst>
+          </p:cNvPr>
+          <p:cNvPicPr>
+            <a:picLocks noChangeAspect="1"/>
+          </p:cNvPicPr>
+          <p:nvPr/>
+        </p:nvPicPr>
+        <p:blipFill>
+          <a:blip r:embed="rId3">
+            <a:extLst>
+              <a:ext uri="{28A0092B-C50C-407E-A947-70E740481C1C}">
+                <a14:useLocalDpi xmlns:a14="http://schemas.microsoft.com/office/drawing/2010/main" val="0"/>
+              </a:ext>
+            </a:extLst>
+          </a:blip>
+          <a:stretch>
+            <a:fillRect/>
+          </a:stretch>
+        </p:blipFill>
+        <p:spPr>
+          <a:xfrm>
+            <a:off x="317739" y="5374395"/>
+            <a:ext cx="3794757" cy="1143000"/>
+          </a:xfrm>
+          <a:prstGeom prst="rect">
+            <a:avLst/>
+          </a:prstGeom>
+          <a:ln>
+            <a:solidFill>
+              <a:schemeClr val="tx1"/>
+            </a:solidFill>
+          </a:ln>
+          <a:effectLst>
+            <a:outerShdw blurRad="50800" dist="38100" dir="2700000" algn="tl" rotWithShape="0">
+              <a:prstClr val="black">
+                <a:alpha val="40000"/>
+              </a:prstClr>
+            </a:outerShdw>
+          </a:effectLst>
+        </p:spPr>
+      </p:pic>
+      <p:pic>
+        <p:nvPicPr>
+          <p:cNvPr id="4" name="Picture 3">
+            <a:extLst>
+              <a:ext uri="{FF2B5EF4-FFF2-40B4-BE49-F238E27FC236}">
+                <a16:creationId xmlns:a16="http://schemas.microsoft.com/office/drawing/2014/main" id="{4F90C1E3-7523-47DF-A712-4AB7E0A5B2CF}"/>
+              </a:ext>
+            </a:extLst>
+          </p:cNvPr>
+          <p:cNvPicPr>
+            <a:picLocks noChangeAspect="1"/>
+          </p:cNvPicPr>
+          <p:nvPr/>
+        </p:nvPicPr>
+        <p:blipFill>
+          <a:blip r:embed="rId4">
+            <a:extLst>
+              <a:ext uri="{28A0092B-C50C-407E-A947-70E740481C1C}">
+                <a14:useLocalDpi xmlns:a14="http://schemas.microsoft.com/office/drawing/2010/main" val="0"/>
+              </a:ext>
+            </a:extLst>
+          </a:blip>
+          <a:stretch>
+            <a:fillRect/>
+          </a:stretch>
+        </p:blipFill>
+        <p:spPr>
+          <a:xfrm>
+            <a:off x="5253329" y="6060195"/>
+            <a:ext cx="3572932" cy="457200"/>
+          </a:xfrm>
+          <a:prstGeom prst="rect">
+            <a:avLst/>
+          </a:prstGeom>
+          <a:ln>
+            <a:solidFill>
+              <a:schemeClr val="tx1"/>
+            </a:solidFill>
+          </a:ln>
+          <a:effectLst>
+            <a:outerShdw blurRad="50800" dist="38100" dir="2700000" algn="tl" rotWithShape="0">
+              <a:prstClr val="black">
+                <a:alpha val="40000"/>
+              </a:prstClr>
+            </a:outerShdw>
+          </a:effectLst>
+        </p:spPr>
+      </p:pic>
+    </p:spTree>
+    <p:extLst>
+      <p:ext uri="{BB962C8B-B14F-4D97-AF65-F5344CB8AC3E}">
+        <p14:creationId xmlns:p14="http://schemas.microsoft.com/office/powerpoint/2010/main" val="1262145773"/>
+      </p:ext>
+    </p:extLst>
+  </p:cSld>
+  <p:clrMapOvr>
+    <a:masterClrMapping/>
+  </p:clrMapOvr>
+</p:sld>
+</file>
+
+<file path=ppt/slides/slide3.xml><?xml version="1.0" encoding="utf-8"?>
+<p:sld xmlns:a="http://schemas.openxmlformats.org/drawingml/2006/main" xmlns:r="http://schemas.openxmlformats.org/officeDocument/2006/relationships" xmlns:p="http://schemas.openxmlformats.org/presentationml/2006/main">
+  <p:cSld>
+    <p:spTree>
+      <p:nvGrpSpPr>
+        <p:cNvPr id="1" name=""/>
+        <p:cNvGrpSpPr/>
+        <p:nvPr/>
+      </p:nvGrpSpPr>
+      <p:grpSpPr>
+        <a:xfrm>
+          <a:off x="0" y="0"/>
+          <a:ext cx="0" cy="0"/>
+          <a:chOff x="0" y="0"/>
+          <a:chExt cx="0" cy="0"/>
+        </a:xfrm>
+      </p:grpSpPr>
+      <p:sp>
+        <p:nvSpPr>
+          <p:cNvPr id="4" name="Title 3">
+            <a:extLst>
+              <a:ext uri="{FF2B5EF4-FFF2-40B4-BE49-F238E27FC236}">
+                <a16:creationId xmlns:a16="http://schemas.microsoft.com/office/drawing/2014/main" id="{824D6633-28F1-4DB1-B0D9-346036B465EE}"/>
+              </a:ext>
+            </a:extLst>
+          </p:cNvPr>
+          <p:cNvSpPr>
+            <a:spLocks noGrp="1"/>
+          </p:cNvSpPr>
+          <p:nvPr>
+            <p:ph type="title"/>
+          </p:nvPr>
+        </p:nvSpPr>
+        <p:spPr/>
+        <p:txBody>
+          <a:bodyPr/>
+          <a:lstStyle/>
+          <a:p>
+            <a:r>
+              <a:rPr lang="en-US" dirty="0"/>
+              <a:t>Hyperparameter comparison</a:t>
+            </a:r>
+          </a:p>
+        </p:txBody>
+      </p:sp>
+      <p:sp>
+        <p:nvSpPr>
+          <p:cNvPr id="5" name="Content Placeholder 4">
+            <a:extLst>
+              <a:ext uri="{FF2B5EF4-FFF2-40B4-BE49-F238E27FC236}">
+                <a16:creationId xmlns:a16="http://schemas.microsoft.com/office/drawing/2014/main" id="{66405E59-0BD8-4EE7-B41E-5C6C3FDC0709}"/>
+              </a:ext>
+            </a:extLst>
+          </p:cNvPr>
+          <p:cNvSpPr>
+            <a:spLocks noGrp="1"/>
+          </p:cNvSpPr>
+          <p:nvPr>
+            <p:ph idx="1"/>
+          </p:nvPr>
+        </p:nvSpPr>
+        <p:spPr/>
+        <p:txBody>
+          <a:bodyPr>
+            <a:normAutofit lnSpcReduction="10000"/>
+          </a:bodyPr>
+          <a:lstStyle/>
+          <a:p>
+            <a:r>
+              <a:rPr lang="en-US" u="sng" dirty="0"/>
+              <a:t>Linear Regression</a:t>
+            </a:r>
+            <a:r>
+              <a:rPr lang="en-US" dirty="0"/>
+              <a:t>:</a:t>
+            </a:r>
+          </a:p>
+          <a:p>
+            <a:pPr lvl="1"/>
+            <a:r>
+              <a:rPr lang="en-US" dirty="0" err="1"/>
+              <a:t>fit_intercept</a:t>
+            </a:r>
+            <a:r>
+              <a:rPr lang="en-US" dirty="0"/>
+              <a:t>, normalize</a:t>
+            </a:r>
+          </a:p>
+          <a:p>
+            <a:r>
+              <a:rPr lang="en-US" u="sng" dirty="0"/>
+              <a:t>Ridge</a:t>
+            </a:r>
+            <a:r>
+              <a:rPr lang="en-US" dirty="0"/>
+              <a:t>:</a:t>
+            </a:r>
+          </a:p>
+          <a:p>
+            <a:pPr lvl="1"/>
+            <a:r>
+              <a:rPr lang="en-US" dirty="0"/>
+              <a:t>alpha, </a:t>
+            </a:r>
+            <a:r>
+              <a:rPr lang="en-US" dirty="0" err="1"/>
+              <a:t>fit_intercept</a:t>
+            </a:r>
+            <a:r>
+              <a:rPr lang="en-US" dirty="0"/>
+              <a:t>, normalize, solver, </a:t>
+            </a:r>
+            <a:r>
+              <a:rPr lang="en-US" dirty="0" err="1"/>
+              <a:t>max_iter</a:t>
+            </a:r>
+            <a:endParaRPr lang="en-US" dirty="0"/>
+          </a:p>
+          <a:p>
+            <a:r>
+              <a:rPr lang="en-US" u="sng" dirty="0"/>
+              <a:t>Decision Tree</a:t>
+            </a:r>
+            <a:r>
+              <a:rPr lang="en-US" dirty="0"/>
+              <a:t>:</a:t>
+            </a:r>
+          </a:p>
+          <a:p>
+            <a:pPr lvl="1"/>
+            <a:r>
+              <a:rPr lang="en-US" dirty="0"/>
+              <a:t>criterion, splitter, </a:t>
+            </a:r>
+            <a:r>
+              <a:rPr lang="en-US" dirty="0" err="1"/>
+              <a:t>max_depth</a:t>
+            </a:r>
+            <a:r>
+              <a:rPr lang="en-US" dirty="0"/>
+              <a:t>, </a:t>
+            </a:r>
+            <a:r>
+              <a:rPr lang="en-US" dirty="0" err="1"/>
+              <a:t>min_samples_split</a:t>
+            </a:r>
+            <a:r>
+              <a:rPr lang="en-US" dirty="0"/>
+              <a:t>, </a:t>
+            </a:r>
+            <a:r>
+              <a:rPr lang="en-US" dirty="0" err="1"/>
+              <a:t>min_samples_leaf</a:t>
+            </a:r>
+            <a:r>
+              <a:rPr lang="en-US" dirty="0"/>
+              <a:t>, </a:t>
+            </a:r>
+            <a:r>
+              <a:rPr lang="en-US" dirty="0" err="1"/>
+              <a:t>min_weight_fraction_leaf</a:t>
+            </a:r>
+            <a:r>
+              <a:rPr lang="en-US" dirty="0"/>
+              <a:t>, </a:t>
+            </a:r>
+            <a:r>
+              <a:rPr lang="en-US" dirty="0" err="1"/>
+              <a:t>max_features</a:t>
+            </a:r>
+            <a:r>
+              <a:rPr lang="en-US" dirty="0"/>
+              <a:t>, </a:t>
+            </a:r>
+            <a:r>
+              <a:rPr lang="en-US" dirty="0" err="1"/>
+              <a:t>max_leaf_nodes</a:t>
+            </a:r>
+            <a:r>
+              <a:rPr lang="en-US" dirty="0"/>
+              <a:t>, </a:t>
+            </a:r>
+            <a:r>
+              <a:rPr lang="en-US" dirty="0" err="1"/>
+              <a:t>min_impurity_split</a:t>
+            </a:r>
+            <a:r>
+              <a:rPr lang="en-US" dirty="0"/>
+              <a:t>, </a:t>
+            </a:r>
+            <a:r>
+              <a:rPr lang="en-US" dirty="0" err="1"/>
+              <a:t>min_impurity_descrease</a:t>
+            </a:r>
+            <a:r>
+              <a:rPr lang="en-US" dirty="0"/>
+              <a:t>, presort</a:t>
+            </a:r>
+          </a:p>
+          <a:p>
+            <a:r>
+              <a:rPr lang="en-US" u="sng" dirty="0"/>
+              <a:t>Random Forest</a:t>
+            </a:r>
+            <a:r>
+              <a:rPr lang="en-US" dirty="0"/>
+              <a:t>:</a:t>
+            </a:r>
+          </a:p>
+          <a:p>
+            <a:pPr lvl="1"/>
+            <a:r>
+              <a:rPr lang="en-US" dirty="0"/>
+              <a:t>above, </a:t>
+            </a:r>
+            <a:r>
+              <a:rPr lang="en-US" dirty="0" err="1"/>
+              <a:t>n_estimators</a:t>
+            </a:r>
+            <a:r>
+              <a:rPr lang="en-US" dirty="0"/>
+              <a:t>, bootstrap</a:t>
+            </a:r>
+          </a:p>
+        </p:txBody>
+      </p:sp>
+    </p:spTree>
+    <p:extLst>
+      <p:ext uri="{BB962C8B-B14F-4D97-AF65-F5344CB8AC3E}">
+        <p14:creationId xmlns:p14="http://schemas.microsoft.com/office/powerpoint/2010/main" val="292934350"/>
+      </p:ext>
+    </p:extLst>
+  </p:cSld>
+  <p:clrMapOvr>
+    <a:masterClrMapping/>
+  </p:clrMapOvr>
+</p:sld>
+</file>
+
+<file path=ppt/slides/slide30.xml><?xml version="1.0" encoding="utf-8"?>
+<p:sld xmlns:a="http://schemas.openxmlformats.org/drawingml/2006/main" xmlns:r="http://schemas.openxmlformats.org/officeDocument/2006/relationships" xmlns:p="http://schemas.openxmlformats.org/presentationml/2006/main">
+  <p:cSld>
+    <p:spTree>
+      <p:nvGrpSpPr>
+        <p:cNvPr id="1" name=""/>
+        <p:cNvGrpSpPr/>
+        <p:nvPr/>
+      </p:nvGrpSpPr>
+      <p:grpSpPr>
+        <a:xfrm>
+          <a:off x="0" y="0"/>
+          <a:ext cx="0" cy="0"/>
+          <a:chOff x="0" y="0"/>
+          <a:chExt cx="0" cy="0"/>
+        </a:xfrm>
+      </p:grpSpPr>
+      <p:sp>
+        <p:nvSpPr>
+          <p:cNvPr id="2" name="Title 1">
+            <a:extLst>
+              <a:ext uri="{FF2B5EF4-FFF2-40B4-BE49-F238E27FC236}">
                 <a16:creationId xmlns:a16="http://schemas.microsoft.com/office/drawing/2014/main" id="{0D102CFF-D46C-4B8C-80FA-E02FF3694FE9}"/>
               </a:ext>
             </a:extLst>
@@ -6536,6 +8241,16 @@
           <a:prstGeom prst="rect">
             <a:avLst/>
           </a:prstGeom>
+          <a:ln>
+            <a:noFill/>
+          </a:ln>
+          <a:effectLst>
+            <a:outerShdw blurRad="50800" dist="38100" dir="2700000" algn="tl" rotWithShape="0">
+              <a:prstClr val="black">
+                <a:alpha val="40000"/>
+              </a:prstClr>
+            </a:outerShdw>
+          </a:effectLst>
         </p:spPr>
       </p:pic>
     </p:spTree>
@@ -6551,7 +8266,7 @@
 </p:sld>
 </file>
 
-<file path=ppt/slides/slide29.xml><?xml version="1.0" encoding="utf-8"?>
+<file path=ppt/slides/slide31.xml><?xml version="1.0" encoding="utf-8"?>
 <p:sld xmlns:a="http://schemas.openxmlformats.org/drawingml/2006/main" xmlns:r="http://schemas.openxmlformats.org/officeDocument/2006/relationships" xmlns:p="http://schemas.openxmlformats.org/presentationml/2006/main">
   <p:cSld>
     <p:spTree>
@@ -6736,246 +8451,7 @@
 </p:sld>
 </file>
 
-<file path=ppt/slides/slide3.xml><?xml version="1.0" encoding="utf-8"?>
-<p:sld xmlns:a="http://schemas.openxmlformats.org/drawingml/2006/main" xmlns:r="http://schemas.openxmlformats.org/officeDocument/2006/relationships" xmlns:p="http://schemas.openxmlformats.org/presentationml/2006/main">
-  <p:cSld>
-    <p:spTree>
-      <p:nvGrpSpPr>
-        <p:cNvPr id="1" name=""/>
-        <p:cNvGrpSpPr/>
-        <p:nvPr/>
-      </p:nvGrpSpPr>
-      <p:grpSpPr>
-        <a:xfrm>
-          <a:off x="0" y="0"/>
-          <a:ext cx="0" cy="0"/>
-          <a:chOff x="0" y="0"/>
-          <a:chExt cx="0" cy="0"/>
-        </a:xfrm>
-      </p:grpSpPr>
-      <p:sp>
-        <p:nvSpPr>
-          <p:cNvPr id="4" name="Title 3">
-            <a:extLst>
-              <a:ext uri="{FF2B5EF4-FFF2-40B4-BE49-F238E27FC236}">
-                <a16:creationId xmlns:a16="http://schemas.microsoft.com/office/drawing/2014/main" id="{824D6633-28F1-4DB1-B0D9-346036B465EE}"/>
-              </a:ext>
-            </a:extLst>
-          </p:cNvPr>
-          <p:cNvSpPr>
-            <a:spLocks noGrp="1"/>
-          </p:cNvSpPr>
-          <p:nvPr>
-            <p:ph type="title"/>
-          </p:nvPr>
-        </p:nvSpPr>
-        <p:spPr/>
-        <p:txBody>
-          <a:bodyPr/>
-          <a:lstStyle/>
-          <a:p>
-            <a:r>
-              <a:rPr lang="en-US" dirty="0"/>
-              <a:t>Hyperparameter comparison</a:t>
-            </a:r>
-          </a:p>
-        </p:txBody>
-      </p:sp>
-      <p:sp>
-        <p:nvSpPr>
-          <p:cNvPr id="5" name="Content Placeholder 4">
-            <a:extLst>
-              <a:ext uri="{FF2B5EF4-FFF2-40B4-BE49-F238E27FC236}">
-                <a16:creationId xmlns:a16="http://schemas.microsoft.com/office/drawing/2014/main" id="{66405E59-0BD8-4EE7-B41E-5C6C3FDC0709}"/>
-              </a:ext>
-            </a:extLst>
-          </p:cNvPr>
-          <p:cNvSpPr>
-            <a:spLocks noGrp="1"/>
-          </p:cNvSpPr>
-          <p:nvPr>
-            <p:ph idx="1"/>
-          </p:nvPr>
-        </p:nvSpPr>
-        <p:spPr/>
-        <p:txBody>
-          <a:bodyPr>
-            <a:normAutofit lnSpcReduction="10000"/>
-          </a:bodyPr>
-          <a:lstStyle/>
-          <a:p>
-            <a:r>
-              <a:rPr lang="en-US" u="sng" dirty="0"/>
-              <a:t>Linear Regression</a:t>
-            </a:r>
-            <a:r>
-              <a:rPr lang="en-US" dirty="0"/>
-              <a:t>:</a:t>
-            </a:r>
-          </a:p>
-          <a:p>
-            <a:pPr lvl="1"/>
-            <a:r>
-              <a:rPr lang="en-US" dirty="0" err="1"/>
-              <a:t>fit_intercept</a:t>
-            </a:r>
-            <a:r>
-              <a:rPr lang="en-US" dirty="0"/>
-              <a:t>, normalize</a:t>
-            </a:r>
-          </a:p>
-          <a:p>
-            <a:r>
-              <a:rPr lang="en-US" u="sng" dirty="0"/>
-              <a:t>Ridge</a:t>
-            </a:r>
-            <a:r>
-              <a:rPr lang="en-US" dirty="0"/>
-              <a:t>:</a:t>
-            </a:r>
-          </a:p>
-          <a:p>
-            <a:pPr lvl="1"/>
-            <a:r>
-              <a:rPr lang="en-US" dirty="0"/>
-              <a:t>alpha, </a:t>
-            </a:r>
-            <a:r>
-              <a:rPr lang="en-US" dirty="0" err="1"/>
-              <a:t>fit_intercept</a:t>
-            </a:r>
-            <a:r>
-              <a:rPr lang="en-US" dirty="0"/>
-              <a:t>, normalize, solver, </a:t>
-            </a:r>
-            <a:r>
-              <a:rPr lang="en-US" dirty="0" err="1"/>
-              <a:t>max_iter</a:t>
-            </a:r>
-            <a:endParaRPr lang="en-US" dirty="0"/>
-          </a:p>
-          <a:p>
-            <a:r>
-              <a:rPr lang="en-US" u="sng" dirty="0"/>
-              <a:t>Decision Tree</a:t>
-            </a:r>
-            <a:r>
-              <a:rPr lang="en-US" dirty="0"/>
-              <a:t>:</a:t>
-            </a:r>
-          </a:p>
-          <a:p>
-            <a:pPr lvl="1"/>
-            <a:r>
-              <a:rPr lang="en-US" dirty="0"/>
-              <a:t>criterion, splitter, </a:t>
-            </a:r>
-            <a:r>
-              <a:rPr lang="en-US" dirty="0" err="1"/>
-              <a:t>max_depth</a:t>
-            </a:r>
-            <a:r>
-              <a:rPr lang="en-US" dirty="0"/>
-              <a:t>, </a:t>
-            </a:r>
-            <a:r>
-              <a:rPr lang="en-US" dirty="0" err="1"/>
-              <a:t>min_samples_split</a:t>
-            </a:r>
-            <a:r>
-              <a:rPr lang="en-US" dirty="0"/>
-              <a:t>, </a:t>
-            </a:r>
-            <a:r>
-              <a:rPr lang="en-US" dirty="0" err="1"/>
-              <a:t>min_samples_leaf</a:t>
-            </a:r>
-            <a:r>
-              <a:rPr lang="en-US" dirty="0"/>
-              <a:t>, </a:t>
-            </a:r>
-            <a:r>
-              <a:rPr lang="en-US" dirty="0" err="1"/>
-              <a:t>min_weight_fraction_leaf</a:t>
-            </a:r>
-            <a:r>
-              <a:rPr lang="en-US" dirty="0"/>
-              <a:t>, </a:t>
-            </a:r>
-            <a:r>
-              <a:rPr lang="en-US" dirty="0" err="1"/>
-              <a:t>max_features</a:t>
-            </a:r>
-            <a:r>
-              <a:rPr lang="en-US" dirty="0"/>
-              <a:t>, </a:t>
-            </a:r>
-            <a:r>
-              <a:rPr lang="en-US" dirty="0" err="1"/>
-              <a:t>max_leaf_nodes</a:t>
-            </a:r>
-            <a:r>
-              <a:rPr lang="en-US" dirty="0"/>
-              <a:t>, </a:t>
-            </a:r>
-            <a:r>
-              <a:rPr lang="en-US" dirty="0" err="1"/>
-              <a:t>min_impurity_split</a:t>
-            </a:r>
-            <a:r>
-              <a:rPr lang="en-US" dirty="0"/>
-              <a:t>, </a:t>
-            </a:r>
-            <a:r>
-              <a:rPr lang="en-US" dirty="0" err="1"/>
-              <a:t>min_impurity_descrease</a:t>
-            </a:r>
-            <a:r>
-              <a:rPr lang="en-US" dirty="0"/>
-              <a:t>, presort</a:t>
-            </a:r>
-          </a:p>
-          <a:p>
-            <a:r>
-              <a:rPr lang="en-US" u="sng" dirty="0"/>
-              <a:t>Random Forest</a:t>
-            </a:r>
-            <a:r>
-              <a:rPr lang="en-US" dirty="0"/>
-              <a:t>:</a:t>
-            </a:r>
-          </a:p>
-          <a:p>
-            <a:pPr lvl="1"/>
-            <a:r>
-              <a:rPr lang="en-US" dirty="0"/>
-              <a:t>above, </a:t>
-            </a:r>
-            <a:r>
-              <a:rPr lang="en-US" dirty="0" err="1"/>
-              <a:t>n_estimators</a:t>
-            </a:r>
-            <a:r>
-              <a:rPr lang="en-US" dirty="0"/>
-              <a:t>, bootstrap</a:t>
-            </a:r>
-          </a:p>
-        </p:txBody>
-      </p:sp>
-    </p:spTree>
-    <p:extLst>
-      <p:ext uri="{BB962C8B-B14F-4D97-AF65-F5344CB8AC3E}">
-        <p14:creationId xmlns:p14="http://schemas.microsoft.com/office/powerpoint/2010/main" val="292934350"/>
-      </p:ext>
-    </p:extLst>
-  </p:cSld>
-  <p:clrMapOvr>
-    <a:masterClrMapping/>
-  </p:clrMapOvr>
-</p:sld>
-</file>
-
-<file path=ppt/slides/slide30.xml><?xml version="1.0" encoding="utf-8"?>
+<file path=ppt/slides/slide32.xml><?xml version="1.0" encoding="utf-8"?>
 <p:sld xmlns:a="http://schemas.openxmlformats.org/drawingml/2006/main" xmlns:r="http://schemas.openxmlformats.org/officeDocument/2006/relationships" xmlns:p="http://schemas.openxmlformats.org/presentationml/2006/main">
   <p:cSld>
     <p:spTree>
@@ -7946,15 +9422,15 @@
           </a:xfrm>
         </p:spPr>
         <p:txBody>
-          <a:bodyPr/>
+          <a:bodyPr anchor="ctr"/>
           <a:lstStyle/>
           <a:p>
-            <a:pPr marL="0" indent="0">
+            <a:pPr marL="0" indent="0" algn="ctr">
               <a:buNone/>
             </a:pPr>
             <a:r>
               <a:rPr lang="en-US" dirty="0"/>
-              <a:t>&gt;pip install </a:t>
+              <a:t>pip install </a:t>
             </a:r>
             <a:r>
               <a:rPr lang="en-US" dirty="0" err="1"/>
@@ -7970,15 +9446,6 @@
               <a:buNone/>
             </a:pPr>
             <a:endParaRPr lang="en-US" dirty="0"/>
-          </a:p>
-          <a:p>
-            <a:pPr marL="0" indent="0" algn="r">
-              <a:buNone/>
-            </a:pPr>
-            <a:r>
-              <a:rPr lang="en-US" dirty="0"/>
-              <a:t>…that’s it.</a:t>
-            </a:r>
           </a:p>
         </p:txBody>
       </p:sp>

</xml_diff>

<commit_message>
Fixed visualizations in simple_classification notebook. Minor changes to PPT.
</commit_message>
<xml_diff>
--- a/Data_science_nashville_jkk.pptx
+++ b/Data_science_nashville_jkk.pptx
@@ -6971,34 +6971,34 @@
             <a:pPr lvl="1"/>
             <a:r>
               <a:rPr lang="en-US" dirty="0"/>
-              <a:t>Lazy learner</a:t>
+              <a:t>Retrain Gaussian process regressor every iteration</a:t>
+            </a:r>
+          </a:p>
+          <a:p>
+            <a:r>
+              <a:rPr lang="en-US" dirty="0"/>
+              <a:t>(Hyper)-Hyperparameters</a:t>
             </a:r>
           </a:p>
           <a:p>
             <a:pPr lvl="1"/>
             <a:r>
               <a:rPr lang="en-US" dirty="0"/>
-              <a:t>Retrain Gaussian process regressor every iteration</a:t>
-            </a:r>
-          </a:p>
-          <a:p>
-            <a:r>
-              <a:rPr lang="en-US" dirty="0"/>
-              <a:t>(Hyper)-Hyperparameters</a:t>
+              <a:t>Kernel choice</a:t>
             </a:r>
           </a:p>
           <a:p>
             <a:pPr lvl="1"/>
             <a:r>
               <a:rPr lang="en-US" dirty="0"/>
-              <a:t>Kernel choice</a:t>
+              <a:t>Scaling</a:t>
             </a:r>
           </a:p>
           <a:p>
             <a:pPr lvl="1"/>
             <a:r>
               <a:rPr lang="en-US" dirty="0"/>
-              <a:t>Scaling</a:t>
+              <a:t>Noise level</a:t>
             </a:r>
           </a:p>
           <a:p>

</xml_diff>